<commit_message>
Small visual studio demo added.
</commit_message>
<xml_diff>
--- a/presentation.pptx
+++ b/presentation.pptx
@@ -5,7 +5,7 @@
     <p:sldMasterId id="2147483648" r:id="rId1"/>
   </p:sldMasterIdLst>
   <p:notesMasterIdLst>
-    <p:notesMasterId r:id="rId20"/>
+    <p:notesMasterId r:id="rId24"/>
   </p:notesMasterIdLst>
   <p:sldIdLst>
     <p:sldId id="256" r:id="rId2"/>
@@ -25,7 +25,11 @@
     <p:sldId id="272" r:id="rId16"/>
     <p:sldId id="271" r:id="rId17"/>
     <p:sldId id="273" r:id="rId18"/>
-    <p:sldId id="260" r:id="rId19"/>
+    <p:sldId id="277" r:id="rId19"/>
+    <p:sldId id="276" r:id="rId20"/>
+    <p:sldId id="275" r:id="rId21"/>
+    <p:sldId id="278" r:id="rId22"/>
+    <p:sldId id="274" r:id="rId23"/>
   </p:sldIdLst>
   <p:sldSz cx="12192000" cy="6858000"/>
   <p:notesSz cx="6858000" cy="9144000"/>
@@ -1109,6 +1113,539 @@
     <p:extLst>
       <p:ext uri="{BB962C8B-B14F-4D97-AF65-F5344CB8AC3E}">
         <p14:creationId xmlns:p14="http://schemas.microsoft.com/office/powerpoint/2010/main" val="2359302890"/>
+      </p:ext>
+    </p:extLst>
+  </p:cSld>
+  <p:clrMapOvr>
+    <a:masterClrMapping/>
+  </p:clrMapOvr>
+</p:notes>
+</file>
+
+<file path=ppt/notesSlides/notesSlide15.xml><?xml version="1.0" encoding="utf-8"?>
+<p:notes xmlns:a="http://schemas.openxmlformats.org/drawingml/2006/main" xmlns:r="http://schemas.openxmlformats.org/officeDocument/2006/relationships" xmlns:p="http://schemas.openxmlformats.org/presentationml/2006/main">
+  <p:cSld>
+    <p:spTree>
+      <p:nvGrpSpPr>
+        <p:cNvPr id="1" name=""/>
+        <p:cNvGrpSpPr/>
+        <p:nvPr/>
+      </p:nvGrpSpPr>
+      <p:grpSpPr>
+        <a:xfrm>
+          <a:off x="0" y="0"/>
+          <a:ext cx="0" cy="0"/>
+          <a:chOff x="0" y="0"/>
+          <a:chExt cx="0" cy="0"/>
+        </a:xfrm>
+      </p:grpSpPr>
+      <p:sp>
+        <p:nvSpPr>
+          <p:cNvPr id="2" name="Slide Image Placeholder 1"/>
+          <p:cNvSpPr>
+            <a:spLocks noGrp="1" noRot="1" noChangeAspect="1"/>
+          </p:cNvSpPr>
+          <p:nvPr>
+            <p:ph type="sldImg"/>
+          </p:nvPr>
+        </p:nvSpPr>
+        <p:spPr/>
+      </p:sp>
+      <p:sp>
+        <p:nvSpPr>
+          <p:cNvPr id="3" name="Notes Placeholder 2"/>
+          <p:cNvSpPr>
+            <a:spLocks noGrp="1"/>
+          </p:cNvSpPr>
+          <p:nvPr>
+            <p:ph type="body" idx="1"/>
+          </p:nvPr>
+        </p:nvSpPr>
+        <p:spPr/>
+        <p:txBody>
+          <a:bodyPr/>
+          <a:lstStyle/>
+          <a:p>
+            <a:r>
+              <a:rPr lang="de-CH" dirty="0" smtClean="0"/>
+              <a:t>Wir wissen was es ist, jetzt kommt was es kann</a:t>
+            </a:r>
+            <a:endParaRPr lang="de-CH" dirty="0"/>
+          </a:p>
+        </p:txBody>
+      </p:sp>
+      <p:sp>
+        <p:nvSpPr>
+          <p:cNvPr id="4" name="Slide Number Placeholder 3"/>
+          <p:cNvSpPr>
+            <a:spLocks noGrp="1"/>
+          </p:cNvSpPr>
+          <p:nvPr>
+            <p:ph type="sldNum" sz="quarter" idx="10"/>
+          </p:nvPr>
+        </p:nvSpPr>
+        <p:spPr/>
+        <p:txBody>
+          <a:bodyPr/>
+          <a:lstStyle/>
+          <a:p>
+            <a:fld id="{DA58BC1F-B303-41BB-B1E5-E3EE1F495441}" type="slidenum">
+              <a:rPr lang="de-CH" smtClean="0"/>
+              <a:t>18</a:t>
+            </a:fld>
+            <a:endParaRPr lang="de-CH"/>
+          </a:p>
+        </p:txBody>
+      </p:sp>
+    </p:spTree>
+    <p:extLst>
+      <p:ext uri="{BB962C8B-B14F-4D97-AF65-F5344CB8AC3E}">
+        <p14:creationId xmlns:p14="http://schemas.microsoft.com/office/powerpoint/2010/main" val="1626842335"/>
+      </p:ext>
+    </p:extLst>
+  </p:cSld>
+  <p:clrMapOvr>
+    <a:masterClrMapping/>
+  </p:clrMapOvr>
+</p:notes>
+</file>
+
+<file path=ppt/notesSlides/notesSlide16.xml><?xml version="1.0" encoding="utf-8"?>
+<p:notes xmlns:a="http://schemas.openxmlformats.org/drawingml/2006/main" xmlns:r="http://schemas.openxmlformats.org/officeDocument/2006/relationships" xmlns:p="http://schemas.openxmlformats.org/presentationml/2006/main">
+  <p:cSld>
+    <p:spTree>
+      <p:nvGrpSpPr>
+        <p:cNvPr id="1" name=""/>
+        <p:cNvGrpSpPr/>
+        <p:nvPr/>
+      </p:nvGrpSpPr>
+      <p:grpSpPr>
+        <a:xfrm>
+          <a:off x="0" y="0"/>
+          <a:ext cx="0" cy="0"/>
+          <a:chOff x="0" y="0"/>
+          <a:chExt cx="0" cy="0"/>
+        </a:xfrm>
+      </p:grpSpPr>
+      <p:sp>
+        <p:nvSpPr>
+          <p:cNvPr id="2" name="Slide Image Placeholder 1"/>
+          <p:cNvSpPr>
+            <a:spLocks noGrp="1" noRot="1" noChangeAspect="1"/>
+          </p:cNvSpPr>
+          <p:nvPr>
+            <p:ph type="sldImg"/>
+          </p:nvPr>
+        </p:nvSpPr>
+        <p:spPr/>
+      </p:sp>
+      <p:sp>
+        <p:nvSpPr>
+          <p:cNvPr id="3" name="Notes Placeholder 2"/>
+          <p:cNvSpPr>
+            <a:spLocks noGrp="1"/>
+          </p:cNvSpPr>
+          <p:nvPr>
+            <p:ph type="body" idx="1"/>
+          </p:nvPr>
+        </p:nvSpPr>
+        <p:spPr/>
+        <p:txBody>
+          <a:bodyPr/>
+          <a:lstStyle/>
+          <a:p>
+            <a:r>
+              <a:rPr lang="de-CH" dirty="0" smtClean="0"/>
+              <a:t>Rtools</a:t>
+            </a:r>
+            <a:r>
+              <a:rPr lang="de-CH" baseline="0" dirty="0" smtClean="0"/>
+              <a:t> b</a:t>
+            </a:r>
+            <a:r>
+              <a:rPr lang="de-CH" dirty="0" smtClean="0"/>
+              <a:t>ereits in 2015 einsetzbar</a:t>
+            </a:r>
+            <a:endParaRPr lang="de-CH" dirty="0"/>
+          </a:p>
+        </p:txBody>
+      </p:sp>
+      <p:sp>
+        <p:nvSpPr>
+          <p:cNvPr id="4" name="Slide Number Placeholder 3"/>
+          <p:cNvSpPr>
+            <a:spLocks noGrp="1"/>
+          </p:cNvSpPr>
+          <p:nvPr>
+            <p:ph type="sldNum" sz="quarter" idx="10"/>
+          </p:nvPr>
+        </p:nvSpPr>
+        <p:spPr/>
+        <p:txBody>
+          <a:bodyPr/>
+          <a:lstStyle/>
+          <a:p>
+            <a:fld id="{DA58BC1F-B303-41BB-B1E5-E3EE1F495441}" type="slidenum">
+              <a:rPr lang="de-CH" smtClean="0"/>
+              <a:t>19</a:t>
+            </a:fld>
+            <a:endParaRPr lang="de-CH"/>
+          </a:p>
+        </p:txBody>
+      </p:sp>
+    </p:spTree>
+    <p:extLst>
+      <p:ext uri="{BB962C8B-B14F-4D97-AF65-F5344CB8AC3E}">
+        <p14:creationId xmlns:p14="http://schemas.microsoft.com/office/powerpoint/2010/main" val="2454586652"/>
+      </p:ext>
+    </p:extLst>
+  </p:cSld>
+  <p:clrMapOvr>
+    <a:masterClrMapping/>
+  </p:clrMapOvr>
+</p:notes>
+</file>
+
+<file path=ppt/notesSlides/notesSlide17.xml><?xml version="1.0" encoding="utf-8"?>
+<p:notes xmlns:a="http://schemas.openxmlformats.org/drawingml/2006/main" xmlns:r="http://schemas.openxmlformats.org/officeDocument/2006/relationships" xmlns:p="http://schemas.openxmlformats.org/presentationml/2006/main">
+  <p:cSld>
+    <p:spTree>
+      <p:nvGrpSpPr>
+        <p:cNvPr id="1" name=""/>
+        <p:cNvGrpSpPr/>
+        <p:nvPr/>
+      </p:nvGrpSpPr>
+      <p:grpSpPr>
+        <a:xfrm>
+          <a:off x="0" y="0"/>
+          <a:ext cx="0" cy="0"/>
+          <a:chOff x="0" y="0"/>
+          <a:chExt cx="0" cy="0"/>
+        </a:xfrm>
+      </p:grpSpPr>
+      <p:sp>
+        <p:nvSpPr>
+          <p:cNvPr id="2" name="Slide Image Placeholder 1"/>
+          <p:cNvSpPr>
+            <a:spLocks noGrp="1" noRot="1" noChangeAspect="1"/>
+          </p:cNvSpPr>
+          <p:nvPr>
+            <p:ph type="sldImg"/>
+          </p:nvPr>
+        </p:nvSpPr>
+        <p:spPr/>
+      </p:sp>
+      <p:sp>
+        <p:nvSpPr>
+          <p:cNvPr id="3" name="Notes Placeholder 2"/>
+          <p:cNvSpPr>
+            <a:spLocks noGrp="1"/>
+          </p:cNvSpPr>
+          <p:nvPr>
+            <p:ph type="body" idx="1"/>
+          </p:nvPr>
+        </p:nvSpPr>
+        <p:spPr/>
+        <p:txBody>
+          <a:bodyPr/>
+          <a:lstStyle/>
+          <a:p>
+            <a:r>
+              <a:rPr lang="de-CH" dirty="0" smtClean="0"/>
+              <a:t>Todo: Unterschied schwach und dynamisch sattelfest</a:t>
+            </a:r>
+            <a:r>
+              <a:rPr lang="de-CH" baseline="0" dirty="0" smtClean="0"/>
+              <a:t> haben</a:t>
+            </a:r>
+          </a:p>
+          <a:p>
+            <a:r>
+              <a:rPr lang="de-CH" dirty="0" smtClean="0"/>
+              <a:t>Ob R oder Python spielt eigentlich</a:t>
+            </a:r>
+            <a:r>
+              <a:rPr lang="de-CH" baseline="0" dirty="0" smtClean="0"/>
+              <a:t> keine Rolle (Einfachere Visualisierungen)</a:t>
+            </a:r>
+            <a:endParaRPr lang="de-CH" dirty="0" smtClean="0"/>
+          </a:p>
+          <a:p>
+            <a:r>
+              <a:rPr lang="de-CH" dirty="0" smtClean="0"/>
+              <a:t>Python ist auch in Visual Studio integriert</a:t>
+            </a:r>
+          </a:p>
+          <a:p>
+            <a:r>
+              <a:rPr lang="de-CH" dirty="0" smtClean="0"/>
+              <a:t>Funktional/Objektorientiert</a:t>
+            </a:r>
+          </a:p>
+          <a:p>
+            <a:r>
+              <a:rPr lang="de-CH" dirty="0" smtClean="0"/>
+              <a:t>Open Source (Riesen Community, Fast für</a:t>
+            </a:r>
+            <a:r>
+              <a:rPr lang="de-CH" baseline="0" dirty="0" smtClean="0"/>
+              <a:t> alles ein Package)</a:t>
+            </a:r>
+            <a:endParaRPr lang="de-CH" dirty="0" smtClean="0"/>
+          </a:p>
+          <a:p>
+            <a:r>
+              <a:rPr lang="de-CH" dirty="0" smtClean="0"/>
+              <a:t>Interpretiert -&gt; (Jit-Kompiler,</a:t>
+            </a:r>
+            <a:r>
+              <a:rPr lang="de-CH" baseline="0" dirty="0" smtClean="0"/>
+              <a:t> Vorkompilierte Funktionen)</a:t>
+            </a:r>
+          </a:p>
+          <a:p>
+            <a:endParaRPr lang="de-CH" dirty="0" smtClean="0"/>
+          </a:p>
+          <a:p>
+            <a:endParaRPr lang="de-CH" dirty="0"/>
+          </a:p>
+        </p:txBody>
+      </p:sp>
+      <p:sp>
+        <p:nvSpPr>
+          <p:cNvPr id="4" name="Slide Number Placeholder 3"/>
+          <p:cNvSpPr>
+            <a:spLocks noGrp="1"/>
+          </p:cNvSpPr>
+          <p:nvPr>
+            <p:ph type="sldNum" sz="quarter" idx="10"/>
+          </p:nvPr>
+        </p:nvSpPr>
+        <p:spPr/>
+        <p:txBody>
+          <a:bodyPr/>
+          <a:lstStyle/>
+          <a:p>
+            <a:fld id="{DA58BC1F-B303-41BB-B1E5-E3EE1F495441}" type="slidenum">
+              <a:rPr lang="de-CH" smtClean="0"/>
+              <a:t>20</a:t>
+            </a:fld>
+            <a:endParaRPr lang="de-CH"/>
+          </a:p>
+        </p:txBody>
+      </p:sp>
+    </p:spTree>
+    <p:extLst>
+      <p:ext uri="{BB962C8B-B14F-4D97-AF65-F5344CB8AC3E}">
+        <p14:creationId xmlns:p14="http://schemas.microsoft.com/office/powerpoint/2010/main" val="743457412"/>
+      </p:ext>
+    </p:extLst>
+  </p:cSld>
+  <p:clrMapOvr>
+    <a:masterClrMapping/>
+  </p:clrMapOvr>
+</p:notes>
+</file>
+
+<file path=ppt/notesSlides/notesSlide18.xml><?xml version="1.0" encoding="utf-8"?>
+<p:notes xmlns:a="http://schemas.openxmlformats.org/drawingml/2006/main" xmlns:r="http://schemas.openxmlformats.org/officeDocument/2006/relationships" xmlns:p="http://schemas.openxmlformats.org/presentationml/2006/main">
+  <p:cSld>
+    <p:spTree>
+      <p:nvGrpSpPr>
+        <p:cNvPr id="1" name=""/>
+        <p:cNvGrpSpPr/>
+        <p:nvPr/>
+      </p:nvGrpSpPr>
+      <p:grpSpPr>
+        <a:xfrm>
+          <a:off x="0" y="0"/>
+          <a:ext cx="0" cy="0"/>
+          <a:chOff x="0" y="0"/>
+          <a:chExt cx="0" cy="0"/>
+        </a:xfrm>
+      </p:grpSpPr>
+      <p:sp>
+        <p:nvSpPr>
+          <p:cNvPr id="2" name="Slide Image Placeholder 1"/>
+          <p:cNvSpPr>
+            <a:spLocks noGrp="1" noRot="1" noChangeAspect="1"/>
+          </p:cNvSpPr>
+          <p:nvPr>
+            <p:ph type="sldImg"/>
+          </p:nvPr>
+        </p:nvSpPr>
+        <p:spPr/>
+      </p:sp>
+      <p:sp>
+        <p:nvSpPr>
+          <p:cNvPr id="3" name="Notes Placeholder 2"/>
+          <p:cNvSpPr>
+            <a:spLocks noGrp="1"/>
+          </p:cNvSpPr>
+          <p:nvPr>
+            <p:ph type="body" idx="1"/>
+          </p:nvPr>
+        </p:nvSpPr>
+        <p:spPr/>
+        <p:txBody>
+          <a:bodyPr/>
+          <a:lstStyle/>
+          <a:p>
+            <a:r>
+              <a:rPr lang="de-CH" smtClean="0"/>
+              <a:t>HelloR</a:t>
+            </a:r>
+            <a:r>
+              <a:rPr lang="de-CH" baseline="0" smtClean="0"/>
+              <a:t> zeigen über Remote-Desktop-Verbindung</a:t>
+            </a:r>
+            <a:endParaRPr lang="de-CH" smtClean="0"/>
+          </a:p>
+          <a:p>
+            <a:endParaRPr lang="de-CH" dirty="0" smtClean="0"/>
+          </a:p>
+          <a:p>
+            <a:r>
+              <a:rPr lang="de-CH" dirty="0" smtClean="0"/>
+              <a:t>Pakete</a:t>
+            </a:r>
+            <a:r>
+              <a:rPr lang="de-CH" baseline="0" dirty="0" smtClean="0"/>
+              <a:t> installieren</a:t>
+            </a:r>
+          </a:p>
+          <a:p>
+            <a:r>
+              <a:rPr lang="de-CH" baseline="0" dirty="0" smtClean="0"/>
+              <a:t>Pakete includieren</a:t>
+            </a:r>
+          </a:p>
+          <a:p>
+            <a:r>
+              <a:rPr lang="de-CH" baseline="0" dirty="0" smtClean="0"/>
+              <a:t>Variable assgnement</a:t>
+            </a:r>
+          </a:p>
+          <a:p>
+            <a:r>
+              <a:rPr lang="de-CH" baseline="0" dirty="0" smtClean="0"/>
+              <a:t>Datenbank connection</a:t>
+            </a:r>
+            <a:endParaRPr lang="de-CH" dirty="0"/>
+          </a:p>
+        </p:txBody>
+      </p:sp>
+      <p:sp>
+        <p:nvSpPr>
+          <p:cNvPr id="4" name="Slide Number Placeholder 3"/>
+          <p:cNvSpPr>
+            <a:spLocks noGrp="1"/>
+          </p:cNvSpPr>
+          <p:nvPr>
+            <p:ph type="sldNum" sz="quarter" idx="10"/>
+          </p:nvPr>
+        </p:nvSpPr>
+        <p:spPr/>
+        <p:txBody>
+          <a:bodyPr/>
+          <a:lstStyle/>
+          <a:p>
+            <a:fld id="{DA58BC1F-B303-41BB-B1E5-E3EE1F495441}" type="slidenum">
+              <a:rPr lang="de-CH" smtClean="0"/>
+              <a:t>21</a:t>
+            </a:fld>
+            <a:endParaRPr lang="de-CH"/>
+          </a:p>
+        </p:txBody>
+      </p:sp>
+    </p:spTree>
+    <p:extLst>
+      <p:ext uri="{BB962C8B-B14F-4D97-AF65-F5344CB8AC3E}">
+        <p14:creationId xmlns:p14="http://schemas.microsoft.com/office/powerpoint/2010/main" val="2403547180"/>
+      </p:ext>
+    </p:extLst>
+  </p:cSld>
+  <p:clrMapOvr>
+    <a:masterClrMapping/>
+  </p:clrMapOvr>
+</p:notes>
+</file>
+
+<file path=ppt/notesSlides/notesSlide19.xml><?xml version="1.0" encoding="utf-8"?>
+<p:notes xmlns:a="http://schemas.openxmlformats.org/drawingml/2006/main" xmlns:r="http://schemas.openxmlformats.org/officeDocument/2006/relationships" xmlns:p="http://schemas.openxmlformats.org/presentationml/2006/main">
+  <p:cSld>
+    <p:spTree>
+      <p:nvGrpSpPr>
+        <p:cNvPr id="1" name=""/>
+        <p:cNvGrpSpPr/>
+        <p:nvPr/>
+      </p:nvGrpSpPr>
+      <p:grpSpPr>
+        <a:xfrm>
+          <a:off x="0" y="0"/>
+          <a:ext cx="0" cy="0"/>
+          <a:chOff x="0" y="0"/>
+          <a:chExt cx="0" cy="0"/>
+        </a:xfrm>
+      </p:grpSpPr>
+      <p:sp>
+        <p:nvSpPr>
+          <p:cNvPr id="2" name="Slide Image Placeholder 1"/>
+          <p:cNvSpPr>
+            <a:spLocks noGrp="1" noRot="1" noChangeAspect="1"/>
+          </p:cNvSpPr>
+          <p:nvPr>
+            <p:ph type="sldImg"/>
+          </p:nvPr>
+        </p:nvSpPr>
+        <p:spPr/>
+      </p:sp>
+      <p:sp>
+        <p:nvSpPr>
+          <p:cNvPr id="3" name="Notes Placeholder 2"/>
+          <p:cNvSpPr>
+            <a:spLocks noGrp="1"/>
+          </p:cNvSpPr>
+          <p:nvPr>
+            <p:ph type="body" idx="1"/>
+          </p:nvPr>
+        </p:nvSpPr>
+        <p:spPr/>
+        <p:txBody>
+          <a:bodyPr/>
+          <a:lstStyle/>
+          <a:p>
+            <a:endParaRPr lang="de-CH" dirty="0"/>
+          </a:p>
+        </p:txBody>
+      </p:sp>
+      <p:sp>
+        <p:nvSpPr>
+          <p:cNvPr id="4" name="Slide Number Placeholder 3"/>
+          <p:cNvSpPr>
+            <a:spLocks noGrp="1"/>
+          </p:cNvSpPr>
+          <p:nvPr>
+            <p:ph type="sldNum" sz="quarter" idx="10"/>
+          </p:nvPr>
+        </p:nvSpPr>
+        <p:spPr/>
+        <p:txBody>
+          <a:bodyPr/>
+          <a:lstStyle/>
+          <a:p>
+            <a:fld id="{DA58BC1F-B303-41BB-B1E5-E3EE1F495441}" type="slidenum">
+              <a:rPr lang="de-CH" smtClean="0"/>
+              <a:t>22</a:t>
+            </a:fld>
+            <a:endParaRPr lang="de-CH"/>
+          </a:p>
+        </p:txBody>
+      </p:sp>
+    </p:spTree>
+    <p:extLst>
+      <p:ext uri="{BB962C8B-B14F-4D97-AF65-F5344CB8AC3E}">
+        <p14:creationId xmlns:p14="http://schemas.microsoft.com/office/powerpoint/2010/main" val="2488689134"/>
       </p:ext>
     </p:extLst>
   </p:cSld>
@@ -18573,9 +19110,8 @@
           <a:noFill/>
           <a:ln>
             <a:solidFill>
-              <a:schemeClr val="bg2">
-                <a:lumMod val="90000"/>
-                <a:lumOff val="10000"/>
+              <a:schemeClr val="tx2">
+                <a:lumMod val="75000"/>
               </a:schemeClr>
             </a:solidFill>
           </a:ln>
@@ -18692,7 +19228,7 @@
           <a:p>
             <a:r>
               <a:rPr lang="de-CH" dirty="0" smtClean="0"/>
-              <a:t>Welche Fragen kann ML beanworten?</a:t>
+              <a:t>Was kann maschinelles Lernen?</a:t>
             </a:r>
             <a:endParaRPr lang="de-CH" dirty="0"/>
           </a:p>
@@ -18710,70 +19246,482 @@
         </p:nvSpPr>
         <p:spPr>
           <a:xfrm>
-            <a:off x="2221832" y="2249487"/>
-            <a:ext cx="8825579" cy="3541714"/>
+            <a:off x="1472024" y="1883726"/>
+            <a:ext cx="8825579" cy="4142169"/>
           </a:xfrm>
         </p:spPr>
         <p:txBody>
-          <a:bodyPr/>
+          <a:bodyPr>
+            <a:normAutofit/>
+          </a:bodyPr>
           <a:lstStyle/>
           <a:p>
             <a:pPr marL="0" indent="0">
               <a:buNone/>
             </a:pPr>
-            <a:r>
-              <a:rPr lang="de-CH" dirty="0" smtClean="0"/>
-              <a:t>5 Fragen können von ML beanwortet werden</a:t>
-            </a:r>
-          </a:p>
-          <a:p>
-            <a:pPr marL="0" indent="0">
-              <a:buNone/>
-            </a:pPr>
-            <a:endParaRPr lang="de-CH" dirty="0" smtClean="0"/>
+            <a:endParaRPr lang="de-CH" sz="2800" dirty="0" smtClean="0"/>
           </a:p>
           <a:p>
             <a:pPr lvl="1"/>
             <a:r>
-              <a:rPr lang="de-CH" dirty="0" smtClean="0"/>
+              <a:rPr lang="de-CH" sz="2400" dirty="0" smtClean="0"/>
               <a:t>Ist das A oder B?</a:t>
             </a:r>
           </a:p>
           <a:p>
             <a:pPr lvl="1"/>
             <a:r>
-              <a:rPr lang="de-CH" dirty="0" smtClean="0"/>
+              <a:rPr lang="de-CH" sz="2400" dirty="0" smtClean="0"/>
               <a:t>Wieviel/wieviele?</a:t>
             </a:r>
           </a:p>
           <a:p>
             <a:pPr lvl="1"/>
             <a:r>
-              <a:rPr lang="de-CH" dirty="0" smtClean="0"/>
+              <a:rPr lang="de-CH" sz="2400" dirty="0" smtClean="0"/>
               <a:t>Ist das sonderbar?</a:t>
             </a:r>
           </a:p>
           <a:p>
             <a:pPr lvl="1"/>
             <a:r>
-              <a:rPr lang="de-CH" dirty="0" smtClean="0"/>
+              <a:rPr lang="de-CH" sz="2400" dirty="0" smtClean="0"/>
               <a:t>Wie ist das organisiert?</a:t>
             </a:r>
           </a:p>
           <a:p>
             <a:pPr lvl="1"/>
             <a:r>
-              <a:rPr lang="de-CH" dirty="0" smtClean="0"/>
+              <a:rPr lang="de-CH" sz="2400" dirty="0" smtClean="0"/>
               <a:t>Was soll ich als nächstes tun?</a:t>
             </a:r>
-            <a:endParaRPr lang="de-CH" dirty="0"/>
+            <a:endParaRPr lang="de-CH" sz="2400" dirty="0"/>
           </a:p>
         </p:txBody>
       </p:sp>
     </p:spTree>
     <p:extLst>
       <p:ext uri="{BB962C8B-B14F-4D97-AF65-F5344CB8AC3E}">
-        <p14:creationId xmlns:p14="http://schemas.microsoft.com/office/powerpoint/2010/main" val="3794958679"/>
+        <p14:creationId xmlns:p14="http://schemas.microsoft.com/office/powerpoint/2010/main" val="1029467136"/>
+      </p:ext>
+    </p:extLst>
+  </p:cSld>
+  <p:clrMapOvr>
+    <a:masterClrMapping/>
+  </p:clrMapOvr>
+  <mc:AlternateContent xmlns:mc="http://schemas.openxmlformats.org/markup-compatibility/2006">
+    <mc:Choice xmlns:p14="http://schemas.microsoft.com/office/powerpoint/2010/main" Requires="p14">
+      <p:transition spd="slow" p14:dur="2000"/>
+    </mc:Choice>
+    <mc:Fallback>
+      <p:transition spd="slow"/>
+    </mc:Fallback>
+  </mc:AlternateContent>
+  <p:timing>
+    <p:tnLst>
+      <p:par>
+        <p:cTn id="1" dur="indefinite" restart="never" nodeType="tmRoot">
+          <p:childTnLst>
+            <p:seq concurrent="1" nextAc="seek">
+              <p:cTn id="2" dur="indefinite" nodeType="mainSeq">
+                <p:childTnLst>
+                  <p:par>
+                    <p:cTn id="3" fill="hold">
+                      <p:stCondLst>
+                        <p:cond delay="indefinite"/>
+                      </p:stCondLst>
+                      <p:childTnLst>
+                        <p:par>
+                          <p:cTn id="4" fill="hold">
+                            <p:stCondLst>
+                              <p:cond delay="0"/>
+                            </p:stCondLst>
+                            <p:childTnLst>
+                              <p:par>
+                                <p:cTn id="5" presetID="10" presetClass="entr" presetSubtype="0" fill="hold" nodeType="clickEffect">
+                                  <p:stCondLst>
+                                    <p:cond delay="0"/>
+                                  </p:stCondLst>
+                                  <p:childTnLst>
+                                    <p:set>
+                                      <p:cBhvr>
+                                        <p:cTn id="6" dur="1" fill="hold">
+                                          <p:stCondLst>
+                                            <p:cond delay="0"/>
+                                          </p:stCondLst>
+                                        </p:cTn>
+                                        <p:tgtEl>
+                                          <p:spTgt spid="3">
+                                            <p:txEl>
+                                              <p:pRg st="1" end="1"/>
+                                            </p:txEl>
+                                          </p:spTgt>
+                                        </p:tgtEl>
+                                        <p:attrNameLst>
+                                          <p:attrName>style.visibility</p:attrName>
+                                        </p:attrNameLst>
+                                      </p:cBhvr>
+                                      <p:to>
+                                        <p:strVal val="visible"/>
+                                      </p:to>
+                                    </p:set>
+                                    <p:animEffect transition="in" filter="fade">
+                                      <p:cBhvr>
+                                        <p:cTn id="7" dur="500"/>
+                                        <p:tgtEl>
+                                          <p:spTgt spid="3">
+                                            <p:txEl>
+                                              <p:pRg st="1" end="1"/>
+                                            </p:txEl>
+                                          </p:spTgt>
+                                        </p:tgtEl>
+                                      </p:cBhvr>
+                                    </p:animEffect>
+                                  </p:childTnLst>
+                                </p:cTn>
+                              </p:par>
+                            </p:childTnLst>
+                          </p:cTn>
+                        </p:par>
+                      </p:childTnLst>
+                    </p:cTn>
+                  </p:par>
+                  <p:par>
+                    <p:cTn id="8" fill="hold">
+                      <p:stCondLst>
+                        <p:cond delay="indefinite"/>
+                      </p:stCondLst>
+                      <p:childTnLst>
+                        <p:par>
+                          <p:cTn id="9" fill="hold">
+                            <p:stCondLst>
+                              <p:cond delay="0"/>
+                            </p:stCondLst>
+                            <p:childTnLst>
+                              <p:par>
+                                <p:cTn id="10" presetID="10" presetClass="entr" presetSubtype="0" fill="hold" nodeType="clickEffect">
+                                  <p:stCondLst>
+                                    <p:cond delay="0"/>
+                                  </p:stCondLst>
+                                  <p:childTnLst>
+                                    <p:set>
+                                      <p:cBhvr>
+                                        <p:cTn id="11" dur="1" fill="hold">
+                                          <p:stCondLst>
+                                            <p:cond delay="0"/>
+                                          </p:stCondLst>
+                                        </p:cTn>
+                                        <p:tgtEl>
+                                          <p:spTgt spid="3">
+                                            <p:txEl>
+                                              <p:pRg st="2" end="2"/>
+                                            </p:txEl>
+                                          </p:spTgt>
+                                        </p:tgtEl>
+                                        <p:attrNameLst>
+                                          <p:attrName>style.visibility</p:attrName>
+                                        </p:attrNameLst>
+                                      </p:cBhvr>
+                                      <p:to>
+                                        <p:strVal val="visible"/>
+                                      </p:to>
+                                    </p:set>
+                                    <p:animEffect transition="in" filter="fade">
+                                      <p:cBhvr>
+                                        <p:cTn id="12" dur="500"/>
+                                        <p:tgtEl>
+                                          <p:spTgt spid="3">
+                                            <p:txEl>
+                                              <p:pRg st="2" end="2"/>
+                                            </p:txEl>
+                                          </p:spTgt>
+                                        </p:tgtEl>
+                                      </p:cBhvr>
+                                    </p:animEffect>
+                                  </p:childTnLst>
+                                </p:cTn>
+                              </p:par>
+                            </p:childTnLst>
+                          </p:cTn>
+                        </p:par>
+                      </p:childTnLst>
+                    </p:cTn>
+                  </p:par>
+                  <p:par>
+                    <p:cTn id="13" fill="hold">
+                      <p:stCondLst>
+                        <p:cond delay="indefinite"/>
+                      </p:stCondLst>
+                      <p:childTnLst>
+                        <p:par>
+                          <p:cTn id="14" fill="hold">
+                            <p:stCondLst>
+                              <p:cond delay="0"/>
+                            </p:stCondLst>
+                            <p:childTnLst>
+                              <p:par>
+                                <p:cTn id="15" presetID="10" presetClass="entr" presetSubtype="0" fill="hold" nodeType="clickEffect">
+                                  <p:stCondLst>
+                                    <p:cond delay="0"/>
+                                  </p:stCondLst>
+                                  <p:childTnLst>
+                                    <p:set>
+                                      <p:cBhvr>
+                                        <p:cTn id="16" dur="1" fill="hold">
+                                          <p:stCondLst>
+                                            <p:cond delay="0"/>
+                                          </p:stCondLst>
+                                        </p:cTn>
+                                        <p:tgtEl>
+                                          <p:spTgt spid="3">
+                                            <p:txEl>
+                                              <p:pRg st="3" end="3"/>
+                                            </p:txEl>
+                                          </p:spTgt>
+                                        </p:tgtEl>
+                                        <p:attrNameLst>
+                                          <p:attrName>style.visibility</p:attrName>
+                                        </p:attrNameLst>
+                                      </p:cBhvr>
+                                      <p:to>
+                                        <p:strVal val="visible"/>
+                                      </p:to>
+                                    </p:set>
+                                    <p:animEffect transition="in" filter="fade">
+                                      <p:cBhvr>
+                                        <p:cTn id="17" dur="500"/>
+                                        <p:tgtEl>
+                                          <p:spTgt spid="3">
+                                            <p:txEl>
+                                              <p:pRg st="3" end="3"/>
+                                            </p:txEl>
+                                          </p:spTgt>
+                                        </p:tgtEl>
+                                      </p:cBhvr>
+                                    </p:animEffect>
+                                  </p:childTnLst>
+                                </p:cTn>
+                              </p:par>
+                            </p:childTnLst>
+                          </p:cTn>
+                        </p:par>
+                      </p:childTnLst>
+                    </p:cTn>
+                  </p:par>
+                  <p:par>
+                    <p:cTn id="18" fill="hold">
+                      <p:stCondLst>
+                        <p:cond delay="indefinite"/>
+                      </p:stCondLst>
+                      <p:childTnLst>
+                        <p:par>
+                          <p:cTn id="19" fill="hold">
+                            <p:stCondLst>
+                              <p:cond delay="0"/>
+                            </p:stCondLst>
+                            <p:childTnLst>
+                              <p:par>
+                                <p:cTn id="20" presetID="10" presetClass="entr" presetSubtype="0" fill="hold" nodeType="clickEffect">
+                                  <p:stCondLst>
+                                    <p:cond delay="0"/>
+                                  </p:stCondLst>
+                                  <p:childTnLst>
+                                    <p:set>
+                                      <p:cBhvr>
+                                        <p:cTn id="21" dur="1" fill="hold">
+                                          <p:stCondLst>
+                                            <p:cond delay="0"/>
+                                          </p:stCondLst>
+                                        </p:cTn>
+                                        <p:tgtEl>
+                                          <p:spTgt spid="3">
+                                            <p:txEl>
+                                              <p:pRg st="4" end="4"/>
+                                            </p:txEl>
+                                          </p:spTgt>
+                                        </p:tgtEl>
+                                        <p:attrNameLst>
+                                          <p:attrName>style.visibility</p:attrName>
+                                        </p:attrNameLst>
+                                      </p:cBhvr>
+                                      <p:to>
+                                        <p:strVal val="visible"/>
+                                      </p:to>
+                                    </p:set>
+                                    <p:animEffect transition="in" filter="fade">
+                                      <p:cBhvr>
+                                        <p:cTn id="22" dur="500"/>
+                                        <p:tgtEl>
+                                          <p:spTgt spid="3">
+                                            <p:txEl>
+                                              <p:pRg st="4" end="4"/>
+                                            </p:txEl>
+                                          </p:spTgt>
+                                        </p:tgtEl>
+                                      </p:cBhvr>
+                                    </p:animEffect>
+                                  </p:childTnLst>
+                                </p:cTn>
+                              </p:par>
+                            </p:childTnLst>
+                          </p:cTn>
+                        </p:par>
+                      </p:childTnLst>
+                    </p:cTn>
+                  </p:par>
+                  <p:par>
+                    <p:cTn id="23" fill="hold">
+                      <p:stCondLst>
+                        <p:cond delay="indefinite"/>
+                      </p:stCondLst>
+                      <p:childTnLst>
+                        <p:par>
+                          <p:cTn id="24" fill="hold">
+                            <p:stCondLst>
+                              <p:cond delay="0"/>
+                            </p:stCondLst>
+                            <p:childTnLst>
+                              <p:par>
+                                <p:cTn id="25" presetID="10" presetClass="entr" presetSubtype="0" fill="hold" nodeType="clickEffect">
+                                  <p:stCondLst>
+                                    <p:cond delay="0"/>
+                                  </p:stCondLst>
+                                  <p:childTnLst>
+                                    <p:set>
+                                      <p:cBhvr>
+                                        <p:cTn id="26" dur="1" fill="hold">
+                                          <p:stCondLst>
+                                            <p:cond delay="0"/>
+                                          </p:stCondLst>
+                                        </p:cTn>
+                                        <p:tgtEl>
+                                          <p:spTgt spid="3">
+                                            <p:txEl>
+                                              <p:pRg st="5" end="5"/>
+                                            </p:txEl>
+                                          </p:spTgt>
+                                        </p:tgtEl>
+                                        <p:attrNameLst>
+                                          <p:attrName>style.visibility</p:attrName>
+                                        </p:attrNameLst>
+                                      </p:cBhvr>
+                                      <p:to>
+                                        <p:strVal val="visible"/>
+                                      </p:to>
+                                    </p:set>
+                                    <p:animEffect transition="in" filter="fade">
+                                      <p:cBhvr>
+                                        <p:cTn id="27" dur="500"/>
+                                        <p:tgtEl>
+                                          <p:spTgt spid="3">
+                                            <p:txEl>
+                                              <p:pRg st="5" end="5"/>
+                                            </p:txEl>
+                                          </p:spTgt>
+                                        </p:tgtEl>
+                                      </p:cBhvr>
+                                    </p:animEffect>
+                                  </p:childTnLst>
+                                </p:cTn>
+                              </p:par>
+                            </p:childTnLst>
+                          </p:cTn>
+                        </p:par>
+                      </p:childTnLst>
+                    </p:cTn>
+                  </p:par>
+                </p:childTnLst>
+              </p:cTn>
+              <p:prevCondLst>
+                <p:cond evt="onPrev" delay="0">
+                  <p:tgtEl>
+                    <p:sldTgt/>
+                  </p:tgtEl>
+                </p:cond>
+              </p:prevCondLst>
+              <p:nextCondLst>
+                <p:cond evt="onNext" delay="0">
+                  <p:tgtEl>
+                    <p:sldTgt/>
+                  </p:tgtEl>
+                </p:cond>
+              </p:nextCondLst>
+            </p:seq>
+          </p:childTnLst>
+        </p:cTn>
+      </p:par>
+    </p:tnLst>
+  </p:timing>
+</p:sld>
+</file>
+
+<file path=ppt/slides/slide19.xml><?xml version="1.0" encoding="utf-8"?>
+<p:sld xmlns:a="http://schemas.openxmlformats.org/drawingml/2006/main" xmlns:r="http://schemas.openxmlformats.org/officeDocument/2006/relationships" xmlns:p="http://schemas.openxmlformats.org/presentationml/2006/main">
+  <p:cSld>
+    <p:spTree>
+      <p:nvGrpSpPr>
+        <p:cNvPr id="1" name=""/>
+        <p:cNvGrpSpPr/>
+        <p:nvPr/>
+      </p:nvGrpSpPr>
+      <p:grpSpPr>
+        <a:xfrm>
+          <a:off x="0" y="0"/>
+          <a:ext cx="0" cy="0"/>
+          <a:chOff x="0" y="0"/>
+          <a:chExt cx="0" cy="0"/>
+        </a:xfrm>
+      </p:grpSpPr>
+      <p:sp>
+        <p:nvSpPr>
+          <p:cNvPr id="2" name="Title 1"/>
+          <p:cNvSpPr>
+            <a:spLocks noGrp="1"/>
+          </p:cNvSpPr>
+          <p:nvPr>
+            <p:ph type="title"/>
+          </p:nvPr>
+        </p:nvSpPr>
+        <p:spPr/>
+        <p:txBody>
+          <a:bodyPr/>
+          <a:lstStyle/>
+          <a:p>
+            <a:r>
+              <a:rPr lang="de-CH" dirty="0"/>
+              <a:t>R und Visual </a:t>
+            </a:r>
+            <a:r>
+              <a:rPr lang="de-CH" dirty="0" smtClean="0"/>
+              <a:t>Studio</a:t>
+            </a:r>
+            <a:endParaRPr lang="de-CH" dirty="0"/>
+          </a:p>
+        </p:txBody>
+      </p:sp>
+      <p:sp>
+        <p:nvSpPr>
+          <p:cNvPr id="4" name="Text Placeholder 3"/>
+          <p:cNvSpPr>
+            <a:spLocks noGrp="1"/>
+          </p:cNvSpPr>
+          <p:nvPr>
+            <p:ph type="body" idx="1"/>
+          </p:nvPr>
+        </p:nvSpPr>
+        <p:spPr/>
+        <p:txBody>
+          <a:bodyPr/>
+          <a:lstStyle/>
+          <a:p>
+            <a:endParaRPr lang="de-CH" dirty="0"/>
+          </a:p>
+        </p:txBody>
+      </p:sp>
+    </p:spTree>
+    <p:extLst>
+      <p:ext uri="{BB962C8B-B14F-4D97-AF65-F5344CB8AC3E}">
+        <p14:creationId xmlns:p14="http://schemas.microsoft.com/office/powerpoint/2010/main" val="11550923"/>
       </p:ext>
     </p:extLst>
   </p:cSld>
@@ -18849,37 +19797,59 @@
           <a:p>
             <a:r>
               <a:rPr lang="de-CH" dirty="0" smtClean="0"/>
-              <a:t>Was ist maschinelles Lernen?</a:t>
-            </a:r>
-          </a:p>
-          <a:p>
+              <a:t>Was </a:t>
+            </a:r>
             <a:r>
               <a:rPr lang="de-CH" dirty="0" smtClean="0"/>
-              <a:t>Was ist R/Rstudio?</a:t>
-            </a:r>
-          </a:p>
-          <a:p>
+              <a:t>ist maschinelles Lernen</a:t>
+            </a:r>
             <a:r>
               <a:rPr lang="de-CH" dirty="0" smtClean="0"/>
-              <a:t>Arten von maschinellem Lernen</a:t>
+              <a:t>?</a:t>
             </a:r>
           </a:p>
           <a:p>
             <a:r>
               <a:rPr lang="de-CH" dirty="0" smtClean="0"/>
+              <a:t>R und Visual Studio</a:t>
+            </a:r>
+            <a:endParaRPr lang="de-CH" dirty="0" smtClean="0"/>
+          </a:p>
+          <a:p>
+            <a:r>
+              <a:rPr lang="de-CH" dirty="0"/>
               <a:t>Tutorial/Demo</a:t>
             </a:r>
           </a:p>
           <a:p>
             <a:r>
               <a:rPr lang="de-CH" dirty="0" smtClean="0"/>
-              <a:t>ML mit Visual Studio 2017</a:t>
-            </a:r>
-          </a:p>
-          <a:p>
+              <a:t>Arten </a:t>
+            </a:r>
             <a:r>
               <a:rPr lang="de-CH" dirty="0" smtClean="0"/>
-              <a:t>Weiterführende Konzepte</a:t>
+              <a:t>von maschinellem </a:t>
+            </a:r>
+            <a:r>
+              <a:rPr lang="de-CH" dirty="0" smtClean="0"/>
+              <a:t>Lernen</a:t>
+            </a:r>
+          </a:p>
+          <a:p>
+            <a:r>
+              <a:rPr lang="de-CH" dirty="0" smtClean="0"/>
+              <a:t>Die 5 Fragen</a:t>
+            </a:r>
+            <a:endParaRPr lang="de-CH" dirty="0" smtClean="0"/>
+          </a:p>
+          <a:p>
+            <a:r>
+              <a:rPr lang="de-CH" dirty="0" smtClean="0"/>
+              <a:t>Weiterführende </a:t>
+            </a:r>
+            <a:r>
+              <a:rPr lang="de-CH" dirty="0" smtClean="0"/>
+              <a:t>Konzepte</a:t>
             </a:r>
           </a:p>
         </p:txBody>
@@ -18894,6 +19864,757 @@
   <p:clrMapOvr>
     <a:masterClrMapping/>
   </p:clrMapOvr>
+  <p:timing>
+    <p:tnLst>
+      <p:par>
+        <p:cTn id="1" dur="indefinite" restart="never" nodeType="tmRoot"/>
+      </p:par>
+    </p:tnLst>
+  </p:timing>
+</p:sld>
+</file>
+
+<file path=ppt/slides/slide20.xml><?xml version="1.0" encoding="utf-8"?>
+<p:sld xmlns:a="http://schemas.openxmlformats.org/drawingml/2006/main" xmlns:r="http://schemas.openxmlformats.org/officeDocument/2006/relationships" xmlns:p="http://schemas.openxmlformats.org/presentationml/2006/main">
+  <p:cSld>
+    <p:spTree>
+      <p:nvGrpSpPr>
+        <p:cNvPr id="1" name=""/>
+        <p:cNvGrpSpPr/>
+        <p:nvPr/>
+      </p:nvGrpSpPr>
+      <p:grpSpPr>
+        <a:xfrm>
+          <a:off x="0" y="0"/>
+          <a:ext cx="0" cy="0"/>
+          <a:chOff x="0" y="0"/>
+          <a:chExt cx="0" cy="0"/>
+        </a:xfrm>
+      </p:grpSpPr>
+      <p:sp>
+        <p:nvSpPr>
+          <p:cNvPr id="2" name="Title 1"/>
+          <p:cNvSpPr>
+            <a:spLocks noGrp="1"/>
+          </p:cNvSpPr>
+          <p:nvPr>
+            <p:ph type="title"/>
+          </p:nvPr>
+        </p:nvSpPr>
+        <p:spPr/>
+        <p:txBody>
+          <a:bodyPr/>
+          <a:lstStyle/>
+          <a:p>
+            <a:r>
+              <a:rPr lang="de-CH" dirty="0" smtClean="0"/>
+              <a:t>Die Programmiersprache R</a:t>
+            </a:r>
+            <a:endParaRPr lang="de-CH" dirty="0"/>
+          </a:p>
+        </p:txBody>
+      </p:sp>
+      <p:sp>
+        <p:nvSpPr>
+          <p:cNvPr id="3" name="Content Placeholder 2"/>
+          <p:cNvSpPr>
+            <a:spLocks noGrp="1"/>
+          </p:cNvSpPr>
+          <p:nvPr>
+            <p:ph idx="1"/>
+          </p:nvPr>
+        </p:nvSpPr>
+        <p:spPr/>
+        <p:txBody>
+          <a:bodyPr>
+            <a:normAutofit/>
+          </a:bodyPr>
+          <a:lstStyle/>
+          <a:p>
+            <a:r>
+              <a:rPr lang="de-CH" dirty="0" smtClean="0"/>
+              <a:t>Populäre Sprache für Data Science (</a:t>
+            </a:r>
+            <a:r>
+              <a:rPr lang="de-CH" dirty="0" smtClean="0">
+                <a:hlinkClick r:id="rId3"/>
+              </a:rPr>
+              <a:t>trends</a:t>
+            </a:r>
+            <a:r>
+              <a:rPr lang="de-CH" dirty="0" smtClean="0"/>
+              <a:t>)</a:t>
+            </a:r>
+          </a:p>
+          <a:p>
+            <a:r>
+              <a:rPr lang="de-CH" dirty="0" smtClean="0"/>
+              <a:t>Integriert in Visual Studio (RTools)</a:t>
+            </a:r>
+          </a:p>
+          <a:p>
+            <a:r>
+              <a:rPr lang="de-CH" dirty="0" smtClean="0"/>
+              <a:t>Multiparadigmen</a:t>
+            </a:r>
+          </a:p>
+          <a:p>
+            <a:r>
+              <a:rPr lang="de-CH" dirty="0" smtClean="0"/>
+              <a:t>Open Source </a:t>
+            </a:r>
+          </a:p>
+          <a:p>
+            <a:r>
+              <a:rPr lang="de-CH" dirty="0" smtClean="0"/>
+              <a:t>Interpretiert (mit Optimierungen)</a:t>
+            </a:r>
+          </a:p>
+          <a:p>
+            <a:r>
+              <a:rPr lang="de-CH" dirty="0" smtClean="0"/>
+              <a:t>Dynamisch, implizit, schwach typisiert</a:t>
+            </a:r>
+            <a:endParaRPr lang="de-CH" dirty="0"/>
+          </a:p>
+        </p:txBody>
+      </p:sp>
+    </p:spTree>
+    <p:extLst>
+      <p:ext uri="{BB962C8B-B14F-4D97-AF65-F5344CB8AC3E}">
+        <p14:creationId xmlns:p14="http://schemas.microsoft.com/office/powerpoint/2010/main" val="1892391967"/>
+      </p:ext>
+    </p:extLst>
+  </p:cSld>
+  <p:clrMapOvr>
+    <a:masterClrMapping/>
+  </p:clrMapOvr>
+  <p:timing>
+    <p:tnLst>
+      <p:par>
+        <p:cTn id="1" dur="indefinite" restart="never" nodeType="tmRoot">
+          <p:childTnLst>
+            <p:seq concurrent="1" nextAc="seek">
+              <p:cTn id="2" dur="indefinite" nodeType="mainSeq">
+                <p:childTnLst>
+                  <p:par>
+                    <p:cTn id="3" fill="hold">
+                      <p:stCondLst>
+                        <p:cond delay="indefinite"/>
+                      </p:stCondLst>
+                      <p:childTnLst>
+                        <p:par>
+                          <p:cTn id="4" fill="hold">
+                            <p:stCondLst>
+                              <p:cond delay="0"/>
+                            </p:stCondLst>
+                            <p:childTnLst>
+                              <p:par>
+                                <p:cTn id="5" presetID="10" presetClass="entr" presetSubtype="0" fill="hold" grpId="0" nodeType="clickEffect">
+                                  <p:stCondLst>
+                                    <p:cond delay="0"/>
+                                  </p:stCondLst>
+                                  <p:childTnLst>
+                                    <p:set>
+                                      <p:cBhvr>
+                                        <p:cTn id="6" dur="1" fill="hold">
+                                          <p:stCondLst>
+                                            <p:cond delay="0"/>
+                                          </p:stCondLst>
+                                        </p:cTn>
+                                        <p:tgtEl>
+                                          <p:spTgt spid="3">
+                                            <p:txEl>
+                                              <p:pRg st="0" end="0"/>
+                                            </p:txEl>
+                                          </p:spTgt>
+                                        </p:tgtEl>
+                                        <p:attrNameLst>
+                                          <p:attrName>style.visibility</p:attrName>
+                                        </p:attrNameLst>
+                                      </p:cBhvr>
+                                      <p:to>
+                                        <p:strVal val="visible"/>
+                                      </p:to>
+                                    </p:set>
+                                    <p:animEffect transition="in" filter="fade">
+                                      <p:cBhvr>
+                                        <p:cTn id="7" dur="500"/>
+                                        <p:tgtEl>
+                                          <p:spTgt spid="3">
+                                            <p:txEl>
+                                              <p:pRg st="0" end="0"/>
+                                            </p:txEl>
+                                          </p:spTgt>
+                                        </p:tgtEl>
+                                      </p:cBhvr>
+                                    </p:animEffect>
+                                  </p:childTnLst>
+                                </p:cTn>
+                              </p:par>
+                            </p:childTnLst>
+                          </p:cTn>
+                        </p:par>
+                      </p:childTnLst>
+                    </p:cTn>
+                  </p:par>
+                  <p:par>
+                    <p:cTn id="8" fill="hold">
+                      <p:stCondLst>
+                        <p:cond delay="indefinite"/>
+                      </p:stCondLst>
+                      <p:childTnLst>
+                        <p:par>
+                          <p:cTn id="9" fill="hold">
+                            <p:stCondLst>
+                              <p:cond delay="0"/>
+                            </p:stCondLst>
+                            <p:childTnLst>
+                              <p:par>
+                                <p:cTn id="10" presetID="10" presetClass="entr" presetSubtype="0" fill="hold" grpId="0" nodeType="clickEffect">
+                                  <p:stCondLst>
+                                    <p:cond delay="0"/>
+                                  </p:stCondLst>
+                                  <p:childTnLst>
+                                    <p:set>
+                                      <p:cBhvr>
+                                        <p:cTn id="11" dur="1" fill="hold">
+                                          <p:stCondLst>
+                                            <p:cond delay="0"/>
+                                          </p:stCondLst>
+                                        </p:cTn>
+                                        <p:tgtEl>
+                                          <p:spTgt spid="3">
+                                            <p:txEl>
+                                              <p:pRg st="1" end="1"/>
+                                            </p:txEl>
+                                          </p:spTgt>
+                                        </p:tgtEl>
+                                        <p:attrNameLst>
+                                          <p:attrName>style.visibility</p:attrName>
+                                        </p:attrNameLst>
+                                      </p:cBhvr>
+                                      <p:to>
+                                        <p:strVal val="visible"/>
+                                      </p:to>
+                                    </p:set>
+                                    <p:animEffect transition="in" filter="fade">
+                                      <p:cBhvr>
+                                        <p:cTn id="12" dur="500"/>
+                                        <p:tgtEl>
+                                          <p:spTgt spid="3">
+                                            <p:txEl>
+                                              <p:pRg st="1" end="1"/>
+                                            </p:txEl>
+                                          </p:spTgt>
+                                        </p:tgtEl>
+                                      </p:cBhvr>
+                                    </p:animEffect>
+                                  </p:childTnLst>
+                                </p:cTn>
+                              </p:par>
+                            </p:childTnLst>
+                          </p:cTn>
+                        </p:par>
+                      </p:childTnLst>
+                    </p:cTn>
+                  </p:par>
+                  <p:par>
+                    <p:cTn id="13" fill="hold">
+                      <p:stCondLst>
+                        <p:cond delay="indefinite"/>
+                      </p:stCondLst>
+                      <p:childTnLst>
+                        <p:par>
+                          <p:cTn id="14" fill="hold">
+                            <p:stCondLst>
+                              <p:cond delay="0"/>
+                            </p:stCondLst>
+                            <p:childTnLst>
+                              <p:par>
+                                <p:cTn id="15" presetID="10" presetClass="entr" presetSubtype="0" fill="hold" grpId="0" nodeType="clickEffect">
+                                  <p:stCondLst>
+                                    <p:cond delay="0"/>
+                                  </p:stCondLst>
+                                  <p:childTnLst>
+                                    <p:set>
+                                      <p:cBhvr>
+                                        <p:cTn id="16" dur="1" fill="hold">
+                                          <p:stCondLst>
+                                            <p:cond delay="0"/>
+                                          </p:stCondLst>
+                                        </p:cTn>
+                                        <p:tgtEl>
+                                          <p:spTgt spid="3">
+                                            <p:txEl>
+                                              <p:pRg st="2" end="2"/>
+                                            </p:txEl>
+                                          </p:spTgt>
+                                        </p:tgtEl>
+                                        <p:attrNameLst>
+                                          <p:attrName>style.visibility</p:attrName>
+                                        </p:attrNameLst>
+                                      </p:cBhvr>
+                                      <p:to>
+                                        <p:strVal val="visible"/>
+                                      </p:to>
+                                    </p:set>
+                                    <p:animEffect transition="in" filter="fade">
+                                      <p:cBhvr>
+                                        <p:cTn id="17" dur="500"/>
+                                        <p:tgtEl>
+                                          <p:spTgt spid="3">
+                                            <p:txEl>
+                                              <p:pRg st="2" end="2"/>
+                                            </p:txEl>
+                                          </p:spTgt>
+                                        </p:tgtEl>
+                                      </p:cBhvr>
+                                    </p:animEffect>
+                                  </p:childTnLst>
+                                </p:cTn>
+                              </p:par>
+                            </p:childTnLst>
+                          </p:cTn>
+                        </p:par>
+                      </p:childTnLst>
+                    </p:cTn>
+                  </p:par>
+                  <p:par>
+                    <p:cTn id="18" fill="hold">
+                      <p:stCondLst>
+                        <p:cond delay="indefinite"/>
+                      </p:stCondLst>
+                      <p:childTnLst>
+                        <p:par>
+                          <p:cTn id="19" fill="hold">
+                            <p:stCondLst>
+                              <p:cond delay="0"/>
+                            </p:stCondLst>
+                            <p:childTnLst>
+                              <p:par>
+                                <p:cTn id="20" presetID="10" presetClass="entr" presetSubtype="0" fill="hold" grpId="0" nodeType="clickEffect">
+                                  <p:stCondLst>
+                                    <p:cond delay="0"/>
+                                  </p:stCondLst>
+                                  <p:childTnLst>
+                                    <p:set>
+                                      <p:cBhvr>
+                                        <p:cTn id="21" dur="1" fill="hold">
+                                          <p:stCondLst>
+                                            <p:cond delay="0"/>
+                                          </p:stCondLst>
+                                        </p:cTn>
+                                        <p:tgtEl>
+                                          <p:spTgt spid="3">
+                                            <p:txEl>
+                                              <p:pRg st="3" end="3"/>
+                                            </p:txEl>
+                                          </p:spTgt>
+                                        </p:tgtEl>
+                                        <p:attrNameLst>
+                                          <p:attrName>style.visibility</p:attrName>
+                                        </p:attrNameLst>
+                                      </p:cBhvr>
+                                      <p:to>
+                                        <p:strVal val="visible"/>
+                                      </p:to>
+                                    </p:set>
+                                    <p:animEffect transition="in" filter="fade">
+                                      <p:cBhvr>
+                                        <p:cTn id="22" dur="500"/>
+                                        <p:tgtEl>
+                                          <p:spTgt spid="3">
+                                            <p:txEl>
+                                              <p:pRg st="3" end="3"/>
+                                            </p:txEl>
+                                          </p:spTgt>
+                                        </p:tgtEl>
+                                      </p:cBhvr>
+                                    </p:animEffect>
+                                  </p:childTnLst>
+                                </p:cTn>
+                              </p:par>
+                            </p:childTnLst>
+                          </p:cTn>
+                        </p:par>
+                      </p:childTnLst>
+                    </p:cTn>
+                  </p:par>
+                  <p:par>
+                    <p:cTn id="23" fill="hold">
+                      <p:stCondLst>
+                        <p:cond delay="indefinite"/>
+                      </p:stCondLst>
+                      <p:childTnLst>
+                        <p:par>
+                          <p:cTn id="24" fill="hold">
+                            <p:stCondLst>
+                              <p:cond delay="0"/>
+                            </p:stCondLst>
+                            <p:childTnLst>
+                              <p:par>
+                                <p:cTn id="25" presetID="10" presetClass="entr" presetSubtype="0" fill="hold" grpId="0" nodeType="clickEffect">
+                                  <p:stCondLst>
+                                    <p:cond delay="0"/>
+                                  </p:stCondLst>
+                                  <p:childTnLst>
+                                    <p:set>
+                                      <p:cBhvr>
+                                        <p:cTn id="26" dur="1" fill="hold">
+                                          <p:stCondLst>
+                                            <p:cond delay="0"/>
+                                          </p:stCondLst>
+                                        </p:cTn>
+                                        <p:tgtEl>
+                                          <p:spTgt spid="3">
+                                            <p:txEl>
+                                              <p:pRg st="4" end="4"/>
+                                            </p:txEl>
+                                          </p:spTgt>
+                                        </p:tgtEl>
+                                        <p:attrNameLst>
+                                          <p:attrName>style.visibility</p:attrName>
+                                        </p:attrNameLst>
+                                      </p:cBhvr>
+                                      <p:to>
+                                        <p:strVal val="visible"/>
+                                      </p:to>
+                                    </p:set>
+                                    <p:animEffect transition="in" filter="fade">
+                                      <p:cBhvr>
+                                        <p:cTn id="27" dur="500"/>
+                                        <p:tgtEl>
+                                          <p:spTgt spid="3">
+                                            <p:txEl>
+                                              <p:pRg st="4" end="4"/>
+                                            </p:txEl>
+                                          </p:spTgt>
+                                        </p:tgtEl>
+                                      </p:cBhvr>
+                                    </p:animEffect>
+                                  </p:childTnLst>
+                                </p:cTn>
+                              </p:par>
+                            </p:childTnLst>
+                          </p:cTn>
+                        </p:par>
+                      </p:childTnLst>
+                    </p:cTn>
+                  </p:par>
+                  <p:par>
+                    <p:cTn id="28" fill="hold">
+                      <p:stCondLst>
+                        <p:cond delay="indefinite"/>
+                      </p:stCondLst>
+                      <p:childTnLst>
+                        <p:par>
+                          <p:cTn id="29" fill="hold">
+                            <p:stCondLst>
+                              <p:cond delay="0"/>
+                            </p:stCondLst>
+                            <p:childTnLst>
+                              <p:par>
+                                <p:cTn id="30" presetID="10" presetClass="entr" presetSubtype="0" fill="hold" grpId="0" nodeType="clickEffect">
+                                  <p:stCondLst>
+                                    <p:cond delay="0"/>
+                                  </p:stCondLst>
+                                  <p:childTnLst>
+                                    <p:set>
+                                      <p:cBhvr>
+                                        <p:cTn id="31" dur="1" fill="hold">
+                                          <p:stCondLst>
+                                            <p:cond delay="0"/>
+                                          </p:stCondLst>
+                                        </p:cTn>
+                                        <p:tgtEl>
+                                          <p:spTgt spid="3">
+                                            <p:txEl>
+                                              <p:pRg st="5" end="5"/>
+                                            </p:txEl>
+                                          </p:spTgt>
+                                        </p:tgtEl>
+                                        <p:attrNameLst>
+                                          <p:attrName>style.visibility</p:attrName>
+                                        </p:attrNameLst>
+                                      </p:cBhvr>
+                                      <p:to>
+                                        <p:strVal val="visible"/>
+                                      </p:to>
+                                    </p:set>
+                                    <p:animEffect transition="in" filter="fade">
+                                      <p:cBhvr>
+                                        <p:cTn id="32" dur="500"/>
+                                        <p:tgtEl>
+                                          <p:spTgt spid="3">
+                                            <p:txEl>
+                                              <p:pRg st="5" end="5"/>
+                                            </p:txEl>
+                                          </p:spTgt>
+                                        </p:tgtEl>
+                                      </p:cBhvr>
+                                    </p:animEffect>
+                                  </p:childTnLst>
+                                </p:cTn>
+                              </p:par>
+                            </p:childTnLst>
+                          </p:cTn>
+                        </p:par>
+                      </p:childTnLst>
+                    </p:cTn>
+                  </p:par>
+                </p:childTnLst>
+              </p:cTn>
+              <p:prevCondLst>
+                <p:cond evt="onPrev" delay="0">
+                  <p:tgtEl>
+                    <p:sldTgt/>
+                  </p:tgtEl>
+                </p:cond>
+              </p:prevCondLst>
+              <p:nextCondLst>
+                <p:cond evt="onNext" delay="0">
+                  <p:tgtEl>
+                    <p:sldTgt/>
+                  </p:tgtEl>
+                </p:cond>
+              </p:nextCondLst>
+            </p:seq>
+          </p:childTnLst>
+        </p:cTn>
+      </p:par>
+    </p:tnLst>
+    <p:bldLst>
+      <p:bldP spid="3" grpId="0" build="p"/>
+    </p:bldLst>
+  </p:timing>
+</p:sld>
+</file>
+
+<file path=ppt/slides/slide21.xml><?xml version="1.0" encoding="utf-8"?>
+<p:sld xmlns:a="http://schemas.openxmlformats.org/drawingml/2006/main" xmlns:r="http://schemas.openxmlformats.org/officeDocument/2006/relationships" xmlns:p="http://schemas.openxmlformats.org/presentationml/2006/main">
+  <p:cSld>
+    <p:spTree>
+      <p:nvGrpSpPr>
+        <p:cNvPr id="1" name=""/>
+        <p:cNvGrpSpPr/>
+        <p:nvPr/>
+      </p:nvGrpSpPr>
+      <p:grpSpPr>
+        <a:xfrm>
+          <a:off x="0" y="0"/>
+          <a:ext cx="0" cy="0"/>
+          <a:chOff x="0" y="0"/>
+          <a:chExt cx="0" cy="0"/>
+        </a:xfrm>
+      </p:grpSpPr>
+      <p:sp>
+        <p:nvSpPr>
+          <p:cNvPr id="2" name="Title 1"/>
+          <p:cNvSpPr>
+            <a:spLocks noGrp="1"/>
+          </p:cNvSpPr>
+          <p:nvPr>
+            <p:ph type="title"/>
+          </p:nvPr>
+        </p:nvSpPr>
+        <p:spPr/>
+        <p:txBody>
+          <a:bodyPr/>
+          <a:lstStyle/>
+          <a:p>
+            <a:r>
+              <a:rPr lang="de-CH" dirty="0" smtClean="0"/>
+              <a:t>Visual Studio 2017</a:t>
+            </a:r>
+            <a:endParaRPr lang="de-CH" dirty="0"/>
+          </a:p>
+        </p:txBody>
+      </p:sp>
+      <p:sp>
+        <p:nvSpPr>
+          <p:cNvPr id="3" name="Content Placeholder 2"/>
+          <p:cNvSpPr>
+            <a:spLocks noGrp="1"/>
+          </p:cNvSpPr>
+          <p:nvPr>
+            <p:ph idx="1"/>
+          </p:nvPr>
+        </p:nvSpPr>
+        <p:spPr>
+          <a:xfrm>
+            <a:off x="3502152" y="3099879"/>
+            <a:ext cx="4773169" cy="1618425"/>
+          </a:xfrm>
+        </p:spPr>
+        <p:txBody>
+          <a:bodyPr>
+            <a:normAutofit/>
+          </a:bodyPr>
+          <a:lstStyle/>
+          <a:p>
+            <a:pPr marL="0" indent="0" algn="ctr">
+              <a:buNone/>
+            </a:pPr>
+            <a:r>
+              <a:rPr lang="de-CH" i="1" dirty="0" smtClean="0"/>
+              <a:t>Kurze Thema in bekanntem Kontex</a:t>
+            </a:r>
+            <a:endParaRPr lang="de-CH" i="1" dirty="0"/>
+          </a:p>
+        </p:txBody>
+      </p:sp>
+    </p:spTree>
+    <p:extLst>
+      <p:ext uri="{BB962C8B-B14F-4D97-AF65-F5344CB8AC3E}">
+        <p14:creationId xmlns:p14="http://schemas.microsoft.com/office/powerpoint/2010/main" val="606922813"/>
+      </p:ext>
+    </p:extLst>
+  </p:cSld>
+  <p:clrMapOvr>
+    <a:masterClrMapping/>
+  </p:clrMapOvr>
+  <p:timing>
+    <p:tnLst>
+      <p:par>
+        <p:cTn id="1" dur="indefinite" restart="never" nodeType="tmRoot"/>
+      </p:par>
+    </p:tnLst>
+  </p:timing>
+</p:sld>
+</file>
+
+<file path=ppt/slides/slide22.xml><?xml version="1.0" encoding="utf-8"?>
+<p:sld xmlns:a="http://schemas.openxmlformats.org/drawingml/2006/main" xmlns:r="http://schemas.openxmlformats.org/officeDocument/2006/relationships" xmlns:p="http://schemas.openxmlformats.org/presentationml/2006/main" show="0">
+  <p:cSld>
+    <p:spTree>
+      <p:nvGrpSpPr>
+        <p:cNvPr id="1" name=""/>
+        <p:cNvGrpSpPr/>
+        <p:nvPr/>
+      </p:nvGrpSpPr>
+      <p:grpSpPr>
+        <a:xfrm>
+          <a:off x="0" y="0"/>
+          <a:ext cx="0" cy="0"/>
+          <a:chOff x="0" y="0"/>
+          <a:chExt cx="0" cy="0"/>
+        </a:xfrm>
+      </p:grpSpPr>
+      <p:sp>
+        <p:nvSpPr>
+          <p:cNvPr id="2" name="Title 1"/>
+          <p:cNvSpPr>
+            <a:spLocks noGrp="1"/>
+          </p:cNvSpPr>
+          <p:nvPr>
+            <p:ph type="title"/>
+          </p:nvPr>
+        </p:nvSpPr>
+        <p:spPr/>
+        <p:txBody>
+          <a:bodyPr/>
+          <a:lstStyle/>
+          <a:p>
+            <a:r>
+              <a:rPr lang="de-CH" dirty="0" smtClean="0"/>
+              <a:t>Die </a:t>
+            </a:r>
+            <a:r>
+              <a:rPr lang="de-CH" sz="6600" dirty="0" smtClean="0"/>
+              <a:t>5</a:t>
+            </a:r>
+            <a:r>
+              <a:rPr lang="de-CH" dirty="0" smtClean="0"/>
+              <a:t> Fragen die ML beantworten kann</a:t>
+            </a:r>
+            <a:endParaRPr lang="de-CH" dirty="0"/>
+          </a:p>
+        </p:txBody>
+      </p:sp>
+      <p:sp>
+        <p:nvSpPr>
+          <p:cNvPr id="3" name="Content Placeholder 2"/>
+          <p:cNvSpPr>
+            <a:spLocks noGrp="1"/>
+          </p:cNvSpPr>
+          <p:nvPr>
+            <p:ph idx="1"/>
+          </p:nvPr>
+        </p:nvSpPr>
+        <p:spPr>
+          <a:xfrm>
+            <a:off x="2578448" y="1892870"/>
+            <a:ext cx="8825579" cy="4142169"/>
+          </a:xfrm>
+        </p:spPr>
+        <p:txBody>
+          <a:bodyPr>
+            <a:normAutofit/>
+          </a:bodyPr>
+          <a:lstStyle/>
+          <a:p>
+            <a:pPr marL="0" indent="0">
+              <a:buNone/>
+            </a:pPr>
+            <a:endParaRPr lang="de-CH" sz="2800" dirty="0" smtClean="0"/>
+          </a:p>
+          <a:p>
+            <a:pPr lvl="1"/>
+            <a:r>
+              <a:rPr lang="de-CH" sz="2400" dirty="0" smtClean="0"/>
+              <a:t>Ist das A oder B?</a:t>
+            </a:r>
+          </a:p>
+          <a:p>
+            <a:pPr lvl="1"/>
+            <a:r>
+              <a:rPr lang="de-CH" sz="2400" dirty="0" smtClean="0"/>
+              <a:t>Wieviel/wieviele?</a:t>
+            </a:r>
+          </a:p>
+          <a:p>
+            <a:pPr lvl="1"/>
+            <a:r>
+              <a:rPr lang="de-CH" sz="2400" dirty="0" smtClean="0"/>
+              <a:t>Ist das sonderbar?</a:t>
+            </a:r>
+          </a:p>
+          <a:p>
+            <a:pPr lvl="1"/>
+            <a:r>
+              <a:rPr lang="de-CH" sz="2400" dirty="0" smtClean="0"/>
+              <a:t>Wie ist das organisiert?</a:t>
+            </a:r>
+          </a:p>
+          <a:p>
+            <a:pPr lvl="1"/>
+            <a:r>
+              <a:rPr lang="de-CH" sz="2400" dirty="0" smtClean="0"/>
+              <a:t>Was soll ich als nächstes tun?</a:t>
+            </a:r>
+            <a:endParaRPr lang="de-CH" sz="2400" dirty="0"/>
+          </a:p>
+        </p:txBody>
+      </p:sp>
+    </p:spTree>
+    <p:extLst>
+      <p:ext uri="{BB962C8B-B14F-4D97-AF65-F5344CB8AC3E}">
+        <p14:creationId xmlns:p14="http://schemas.microsoft.com/office/powerpoint/2010/main" val="3379965065"/>
+      </p:ext>
+    </p:extLst>
+  </p:cSld>
+  <p:clrMapOvr>
+    <a:masterClrMapping/>
+  </p:clrMapOvr>
+  <mc:AlternateContent xmlns:mc="http://schemas.openxmlformats.org/markup-compatibility/2006">
+    <mc:Choice xmlns:p14="http://schemas.microsoft.com/office/powerpoint/2010/main" Requires="p14">
+      <p:transition spd="slow" p14:dur="2000"/>
+    </mc:Choice>
+    <mc:Fallback>
+      <p:transition spd="slow"/>
+    </mc:Fallback>
+  </mc:AlternateContent>
   <p:timing>
     <p:tnLst>
       <p:par>

</xml_diff>

<commit_message>
Why a statistic programming language.
</commit_message>
<xml_diff>
--- a/presentation.pptx
+++ b/presentation.pptx
@@ -5,7 +5,7 @@
     <p:sldMasterId id="2147483648" r:id="rId1"/>
   </p:sldMasterIdLst>
   <p:notesMasterIdLst>
-    <p:notesMasterId r:id="rId31"/>
+    <p:notesMasterId r:id="rId33"/>
   </p:notesMasterIdLst>
   <p:sldIdLst>
     <p:sldId id="256" r:id="rId2"/>
@@ -29,14 +29,16 @@
     <p:sldId id="276" r:id="rId20"/>
     <p:sldId id="275" r:id="rId21"/>
     <p:sldId id="278" r:id="rId22"/>
-    <p:sldId id="281" r:id="rId23"/>
-    <p:sldId id="283" r:id="rId24"/>
-    <p:sldId id="284" r:id="rId25"/>
-    <p:sldId id="285" r:id="rId26"/>
-    <p:sldId id="279" r:id="rId27"/>
-    <p:sldId id="280" r:id="rId28"/>
-    <p:sldId id="282" r:id="rId29"/>
-    <p:sldId id="274" r:id="rId30"/>
+    <p:sldId id="287" r:id="rId23"/>
+    <p:sldId id="286" r:id="rId24"/>
+    <p:sldId id="281" r:id="rId25"/>
+    <p:sldId id="283" r:id="rId26"/>
+    <p:sldId id="284" r:id="rId27"/>
+    <p:sldId id="285" r:id="rId28"/>
+    <p:sldId id="279" r:id="rId29"/>
+    <p:sldId id="280" r:id="rId30"/>
+    <p:sldId id="282" r:id="rId31"/>
+    <p:sldId id="274" r:id="rId32"/>
   </p:sldIdLst>
   <p:sldSz cx="12192000" cy="6858000"/>
   <p:notesSz cx="6858000" cy="9144000"/>
@@ -1620,46 +1622,6 @@
           <a:bodyPr/>
           <a:lstStyle/>
           <a:p>
-            <a:r>
-              <a:rPr lang="de-CH" smtClean="0"/>
-              <a:t>HelloR</a:t>
-            </a:r>
-            <a:r>
-              <a:rPr lang="de-CH" baseline="0" smtClean="0"/>
-              <a:t> zeigen über Remote-Desktop-Verbindung</a:t>
-            </a:r>
-            <a:endParaRPr lang="de-CH" smtClean="0"/>
-          </a:p>
-          <a:p>
-            <a:endParaRPr lang="de-CH" dirty="0" smtClean="0"/>
-          </a:p>
-          <a:p>
-            <a:r>
-              <a:rPr lang="de-CH" dirty="0" smtClean="0"/>
-              <a:t>Pakete</a:t>
-            </a:r>
-            <a:r>
-              <a:rPr lang="de-CH" baseline="0" dirty="0" smtClean="0"/>
-              <a:t> installieren</a:t>
-            </a:r>
-          </a:p>
-          <a:p>
-            <a:r>
-              <a:rPr lang="de-CH" baseline="0" dirty="0" smtClean="0"/>
-              <a:t>Pakete includieren</a:t>
-            </a:r>
-          </a:p>
-          <a:p>
-            <a:r>
-              <a:rPr lang="de-CH" baseline="0" dirty="0" smtClean="0"/>
-              <a:t>Variable assgnement</a:t>
-            </a:r>
-          </a:p>
-          <a:p>
-            <a:r>
-              <a:rPr lang="de-CH" baseline="0" dirty="0" smtClean="0"/>
-              <a:t>Datenbank connection</a:t>
-            </a:r>
             <a:endParaRPr lang="de-CH" dirty="0"/>
           </a:p>
         </p:txBody>
@@ -1844,14 +1806,6 @@
           <a:bodyPr/>
           <a:lstStyle/>
           <a:p>
-            <a:r>
-              <a:rPr lang="de-CH" dirty="0" smtClean="0"/>
-              <a:t>Und</a:t>
-            </a:r>
-            <a:r>
-              <a:rPr lang="de-CH" baseline="0" dirty="0" smtClean="0"/>
-              <a:t> semi-supervised learning und semi-reinforced learning.</a:t>
-            </a:r>
             <a:endParaRPr lang="de-CH" dirty="0"/>
           </a:p>
         </p:txBody>
@@ -1873,7 +1827,7 @@
           <a:p>
             <a:fld id="{DA58BC1F-B303-41BB-B1E5-E3EE1F495441}" type="slidenum">
               <a:rPr lang="de-CH" smtClean="0"/>
-              <a:t>23</a:t>
+              <a:t>22</a:t>
             </a:fld>
             <a:endParaRPr lang="de-CH"/>
           </a:p>
@@ -1882,7 +1836,7 @@
     </p:spTree>
     <p:extLst>
       <p:ext uri="{BB962C8B-B14F-4D97-AF65-F5344CB8AC3E}">
-        <p14:creationId xmlns:p14="http://schemas.microsoft.com/office/powerpoint/2010/main" val="3482313808"/>
+        <p14:creationId xmlns:p14="http://schemas.microsoft.com/office/powerpoint/2010/main" val="409478653"/>
       </p:ext>
     </p:extLst>
   </p:cSld>
@@ -1937,18 +1891,44 @@
           <a:lstStyle/>
           <a:p>
             <a:r>
+              <a:rPr lang="de-CH" smtClean="0"/>
+              <a:t>HelloR</a:t>
+            </a:r>
+            <a:r>
+              <a:rPr lang="de-CH" baseline="0" smtClean="0"/>
+              <a:t> zeigen über Remote-Desktop-Verbindung</a:t>
+            </a:r>
+            <a:endParaRPr lang="de-CH" smtClean="0"/>
+          </a:p>
+          <a:p>
+            <a:endParaRPr lang="de-CH" dirty="0" smtClean="0"/>
+          </a:p>
+          <a:p>
+            <a:r>
               <a:rPr lang="de-CH" dirty="0" smtClean="0"/>
-              <a:t>Labeled</a:t>
-            </a:r>
-          </a:p>
-          <a:p>
-            <a:r>
-              <a:rPr lang="de-CH" dirty="0" smtClean="0"/>
-              <a:t>Weiss jemand wo</a:t>
+              <a:t>Pakete</a:t>
             </a:r>
             <a:r>
               <a:rPr lang="de-CH" baseline="0" dirty="0" smtClean="0"/>
-              <a:t> man das bereits macht?</a:t>
+              <a:t> installieren</a:t>
+            </a:r>
+          </a:p>
+          <a:p>
+            <a:r>
+              <a:rPr lang="de-CH" baseline="0" dirty="0" smtClean="0"/>
+              <a:t>Pakete includieren</a:t>
+            </a:r>
+          </a:p>
+          <a:p>
+            <a:r>
+              <a:rPr lang="de-CH" baseline="0" dirty="0" smtClean="0"/>
+              <a:t>Variable assgnement</a:t>
+            </a:r>
+          </a:p>
+          <a:p>
+            <a:r>
+              <a:rPr lang="de-CH" baseline="0" dirty="0" smtClean="0"/>
+              <a:t>Datenbank connection</a:t>
             </a:r>
             <a:endParaRPr lang="de-CH" dirty="0"/>
           </a:p>
@@ -1971,7 +1951,7 @@
           <a:p>
             <a:fld id="{DA58BC1F-B303-41BB-B1E5-E3EE1F495441}" type="slidenum">
               <a:rPr lang="de-CH" smtClean="0"/>
-              <a:t>24</a:t>
+              <a:t>23</a:t>
             </a:fld>
             <a:endParaRPr lang="de-CH"/>
           </a:p>
@@ -1980,7 +1960,7 @@
     </p:spTree>
     <p:extLst>
       <p:ext uri="{BB962C8B-B14F-4D97-AF65-F5344CB8AC3E}">
-        <p14:creationId xmlns:p14="http://schemas.microsoft.com/office/powerpoint/2010/main" val="3681622079"/>
+        <p14:creationId xmlns:p14="http://schemas.microsoft.com/office/powerpoint/2010/main" val="1946402774"/>
       </p:ext>
     </p:extLst>
   </p:cSld>
@@ -2036,17 +2016,11 @@
           <a:p>
             <a:r>
               <a:rPr lang="de-CH" dirty="0" smtClean="0"/>
-              <a:t>Labeled</a:t>
-            </a:r>
-          </a:p>
-          <a:p>
-            <a:r>
-              <a:rPr lang="de-CH" dirty="0" smtClean="0"/>
-              <a:t>Weiss jemand wo</a:t>
+              <a:t>Und</a:t>
             </a:r>
             <a:r>
               <a:rPr lang="de-CH" baseline="0" dirty="0" smtClean="0"/>
-              <a:t> man das bereits macht?</a:t>
+              <a:t> semi-supervised learning und semi-reinforced learning.</a:t>
             </a:r>
             <a:endParaRPr lang="de-CH" dirty="0"/>
           </a:p>
@@ -2078,7 +2052,7 @@
     </p:spTree>
     <p:extLst>
       <p:ext uri="{BB962C8B-B14F-4D97-AF65-F5344CB8AC3E}">
-        <p14:creationId xmlns:p14="http://schemas.microsoft.com/office/powerpoint/2010/main" val="3614108088"/>
+        <p14:creationId xmlns:p14="http://schemas.microsoft.com/office/powerpoint/2010/main" val="3482313808"/>
       </p:ext>
     </p:extLst>
   </p:cSld>
@@ -2133,44 +2107,18 @@
           <a:lstStyle/>
           <a:p>
             <a:r>
-              <a:rPr lang="de-CH" smtClean="0"/>
-              <a:t>HelloR</a:t>
-            </a:r>
-            <a:r>
-              <a:rPr lang="de-CH" baseline="0" smtClean="0"/>
-              <a:t> zeigen über Remote-Desktop-Verbindung</a:t>
-            </a:r>
-            <a:endParaRPr lang="de-CH" smtClean="0"/>
-          </a:p>
-          <a:p>
-            <a:endParaRPr lang="de-CH" dirty="0" smtClean="0"/>
-          </a:p>
-          <a:p>
-            <a:r>
               <a:rPr lang="de-CH" dirty="0" smtClean="0"/>
-              <a:t>Pakete</a:t>
+              <a:t>Labeled</a:t>
+            </a:r>
+          </a:p>
+          <a:p>
+            <a:r>
+              <a:rPr lang="de-CH" dirty="0" smtClean="0"/>
+              <a:t>Weiss jemand wo</a:t>
             </a:r>
             <a:r>
               <a:rPr lang="de-CH" baseline="0" dirty="0" smtClean="0"/>
-              <a:t> installieren</a:t>
-            </a:r>
-          </a:p>
-          <a:p>
-            <a:r>
-              <a:rPr lang="de-CH" baseline="0" dirty="0" smtClean="0"/>
-              <a:t>Pakete includieren</a:t>
-            </a:r>
-          </a:p>
-          <a:p>
-            <a:r>
-              <a:rPr lang="de-CH" baseline="0" dirty="0" smtClean="0"/>
-              <a:t>Variable assgnement</a:t>
-            </a:r>
-          </a:p>
-          <a:p>
-            <a:r>
-              <a:rPr lang="de-CH" baseline="0" dirty="0" smtClean="0"/>
-              <a:t>Datenbank connection</a:t>
+              <a:t> man das bereits macht?</a:t>
             </a:r>
             <a:endParaRPr lang="de-CH" dirty="0"/>
           </a:p>
@@ -2193,7 +2141,7 @@
           <a:p>
             <a:fld id="{DA58BC1F-B303-41BB-B1E5-E3EE1F495441}" type="slidenum">
               <a:rPr lang="de-CH" smtClean="0"/>
-              <a:t>27</a:t>
+              <a:t>26</a:t>
             </a:fld>
             <a:endParaRPr lang="de-CH"/>
           </a:p>
@@ -2202,7 +2150,7 @@
     </p:spTree>
     <p:extLst>
       <p:ext uri="{BB962C8B-B14F-4D97-AF65-F5344CB8AC3E}">
-        <p14:creationId xmlns:p14="http://schemas.microsoft.com/office/powerpoint/2010/main" val="3516317793"/>
+        <p14:creationId xmlns:p14="http://schemas.microsoft.com/office/powerpoint/2010/main" val="3681622079"/>
       </p:ext>
     </p:extLst>
   </p:cSld>
@@ -2258,7 +2206,17 @@
           <a:p>
             <a:r>
               <a:rPr lang="de-CH" dirty="0" smtClean="0"/>
-              <a:t>Screenshots von Walkthrough</a:t>
+              <a:t>Labeled</a:t>
+            </a:r>
+          </a:p>
+          <a:p>
+            <a:r>
+              <a:rPr lang="de-CH" dirty="0" smtClean="0"/>
+              <a:t>Weiss jemand wo</a:t>
+            </a:r>
+            <a:r>
+              <a:rPr lang="de-CH" baseline="0" dirty="0" smtClean="0"/>
+              <a:t> man das bereits macht?</a:t>
             </a:r>
             <a:endParaRPr lang="de-CH" dirty="0"/>
           </a:p>
@@ -2281,7 +2239,7 @@
           <a:p>
             <a:fld id="{DA58BC1F-B303-41BB-B1E5-E3EE1F495441}" type="slidenum">
               <a:rPr lang="de-CH" smtClean="0"/>
-              <a:t>28</a:t>
+              <a:t>27</a:t>
             </a:fld>
             <a:endParaRPr lang="de-CH"/>
           </a:p>
@@ -2290,7 +2248,7 @@
     </p:spTree>
     <p:extLst>
       <p:ext uri="{BB962C8B-B14F-4D97-AF65-F5344CB8AC3E}">
-        <p14:creationId xmlns:p14="http://schemas.microsoft.com/office/powerpoint/2010/main" val="2842412450"/>
+        <p14:creationId xmlns:p14="http://schemas.microsoft.com/office/powerpoint/2010/main" val="3614108088"/>
       </p:ext>
     </p:extLst>
   </p:cSld>
@@ -2344,6 +2302,46 @@
           <a:bodyPr/>
           <a:lstStyle/>
           <a:p>
+            <a:r>
+              <a:rPr lang="de-CH" smtClean="0"/>
+              <a:t>HelloR</a:t>
+            </a:r>
+            <a:r>
+              <a:rPr lang="de-CH" baseline="0" smtClean="0"/>
+              <a:t> zeigen über Remote-Desktop-Verbindung</a:t>
+            </a:r>
+            <a:endParaRPr lang="de-CH" smtClean="0"/>
+          </a:p>
+          <a:p>
+            <a:endParaRPr lang="de-CH" dirty="0" smtClean="0"/>
+          </a:p>
+          <a:p>
+            <a:r>
+              <a:rPr lang="de-CH" dirty="0" smtClean="0"/>
+              <a:t>Pakete</a:t>
+            </a:r>
+            <a:r>
+              <a:rPr lang="de-CH" baseline="0" dirty="0" smtClean="0"/>
+              <a:t> installieren</a:t>
+            </a:r>
+          </a:p>
+          <a:p>
+            <a:r>
+              <a:rPr lang="de-CH" baseline="0" dirty="0" smtClean="0"/>
+              <a:t>Pakete includieren</a:t>
+            </a:r>
+          </a:p>
+          <a:p>
+            <a:r>
+              <a:rPr lang="de-CH" baseline="0" dirty="0" smtClean="0"/>
+              <a:t>Variable assgnement</a:t>
+            </a:r>
+          </a:p>
+          <a:p>
+            <a:r>
+              <a:rPr lang="de-CH" baseline="0" dirty="0" smtClean="0"/>
+              <a:t>Datenbank connection</a:t>
+            </a:r>
             <a:endParaRPr lang="de-CH" dirty="0"/>
           </a:p>
         </p:txBody>
@@ -2366,6 +2364,178 @@
             <a:fld id="{DA58BC1F-B303-41BB-B1E5-E3EE1F495441}" type="slidenum">
               <a:rPr lang="de-CH" smtClean="0"/>
               <a:t>29</a:t>
+            </a:fld>
+            <a:endParaRPr lang="de-CH"/>
+          </a:p>
+        </p:txBody>
+      </p:sp>
+    </p:spTree>
+    <p:extLst>
+      <p:ext uri="{BB962C8B-B14F-4D97-AF65-F5344CB8AC3E}">
+        <p14:creationId xmlns:p14="http://schemas.microsoft.com/office/powerpoint/2010/main" val="3516317793"/>
+      </p:ext>
+    </p:extLst>
+  </p:cSld>
+  <p:clrMapOvr>
+    <a:masterClrMapping/>
+  </p:clrMapOvr>
+</p:notes>
+</file>
+
+<file path=ppt/notesSlides/notesSlide26.xml><?xml version="1.0" encoding="utf-8"?>
+<p:notes xmlns:a="http://schemas.openxmlformats.org/drawingml/2006/main" xmlns:r="http://schemas.openxmlformats.org/officeDocument/2006/relationships" xmlns:p="http://schemas.openxmlformats.org/presentationml/2006/main">
+  <p:cSld>
+    <p:spTree>
+      <p:nvGrpSpPr>
+        <p:cNvPr id="1" name=""/>
+        <p:cNvGrpSpPr/>
+        <p:nvPr/>
+      </p:nvGrpSpPr>
+      <p:grpSpPr>
+        <a:xfrm>
+          <a:off x="0" y="0"/>
+          <a:ext cx="0" cy="0"/>
+          <a:chOff x="0" y="0"/>
+          <a:chExt cx="0" cy="0"/>
+        </a:xfrm>
+      </p:grpSpPr>
+      <p:sp>
+        <p:nvSpPr>
+          <p:cNvPr id="2" name="Slide Image Placeholder 1"/>
+          <p:cNvSpPr>
+            <a:spLocks noGrp="1" noRot="1" noChangeAspect="1"/>
+          </p:cNvSpPr>
+          <p:nvPr>
+            <p:ph type="sldImg"/>
+          </p:nvPr>
+        </p:nvSpPr>
+        <p:spPr/>
+      </p:sp>
+      <p:sp>
+        <p:nvSpPr>
+          <p:cNvPr id="3" name="Notes Placeholder 2"/>
+          <p:cNvSpPr>
+            <a:spLocks noGrp="1"/>
+          </p:cNvSpPr>
+          <p:nvPr>
+            <p:ph type="body" idx="1"/>
+          </p:nvPr>
+        </p:nvSpPr>
+        <p:spPr/>
+        <p:txBody>
+          <a:bodyPr/>
+          <a:lstStyle/>
+          <a:p>
+            <a:r>
+              <a:rPr lang="de-CH" dirty="0" smtClean="0"/>
+              <a:t>Screenshots von Walkthrough</a:t>
+            </a:r>
+            <a:endParaRPr lang="de-CH" dirty="0"/>
+          </a:p>
+        </p:txBody>
+      </p:sp>
+      <p:sp>
+        <p:nvSpPr>
+          <p:cNvPr id="4" name="Slide Number Placeholder 3"/>
+          <p:cNvSpPr>
+            <a:spLocks noGrp="1"/>
+          </p:cNvSpPr>
+          <p:nvPr>
+            <p:ph type="sldNum" sz="quarter" idx="10"/>
+          </p:nvPr>
+        </p:nvSpPr>
+        <p:spPr/>
+        <p:txBody>
+          <a:bodyPr/>
+          <a:lstStyle/>
+          <a:p>
+            <a:fld id="{DA58BC1F-B303-41BB-B1E5-E3EE1F495441}" type="slidenum">
+              <a:rPr lang="de-CH" smtClean="0"/>
+              <a:t>30</a:t>
+            </a:fld>
+            <a:endParaRPr lang="de-CH"/>
+          </a:p>
+        </p:txBody>
+      </p:sp>
+    </p:spTree>
+    <p:extLst>
+      <p:ext uri="{BB962C8B-B14F-4D97-AF65-F5344CB8AC3E}">
+        <p14:creationId xmlns:p14="http://schemas.microsoft.com/office/powerpoint/2010/main" val="2842412450"/>
+      </p:ext>
+    </p:extLst>
+  </p:cSld>
+  <p:clrMapOvr>
+    <a:masterClrMapping/>
+  </p:clrMapOvr>
+</p:notes>
+</file>
+
+<file path=ppt/notesSlides/notesSlide27.xml><?xml version="1.0" encoding="utf-8"?>
+<p:notes xmlns:a="http://schemas.openxmlformats.org/drawingml/2006/main" xmlns:r="http://schemas.openxmlformats.org/officeDocument/2006/relationships" xmlns:p="http://schemas.openxmlformats.org/presentationml/2006/main">
+  <p:cSld>
+    <p:spTree>
+      <p:nvGrpSpPr>
+        <p:cNvPr id="1" name=""/>
+        <p:cNvGrpSpPr/>
+        <p:nvPr/>
+      </p:nvGrpSpPr>
+      <p:grpSpPr>
+        <a:xfrm>
+          <a:off x="0" y="0"/>
+          <a:ext cx="0" cy="0"/>
+          <a:chOff x="0" y="0"/>
+          <a:chExt cx="0" cy="0"/>
+        </a:xfrm>
+      </p:grpSpPr>
+      <p:sp>
+        <p:nvSpPr>
+          <p:cNvPr id="2" name="Slide Image Placeholder 1"/>
+          <p:cNvSpPr>
+            <a:spLocks noGrp="1" noRot="1" noChangeAspect="1"/>
+          </p:cNvSpPr>
+          <p:nvPr>
+            <p:ph type="sldImg"/>
+          </p:nvPr>
+        </p:nvSpPr>
+        <p:spPr/>
+      </p:sp>
+      <p:sp>
+        <p:nvSpPr>
+          <p:cNvPr id="3" name="Notes Placeholder 2"/>
+          <p:cNvSpPr>
+            <a:spLocks noGrp="1"/>
+          </p:cNvSpPr>
+          <p:nvPr>
+            <p:ph type="body" idx="1"/>
+          </p:nvPr>
+        </p:nvSpPr>
+        <p:spPr/>
+        <p:txBody>
+          <a:bodyPr/>
+          <a:lstStyle/>
+          <a:p>
+            <a:endParaRPr lang="de-CH" dirty="0"/>
+          </a:p>
+        </p:txBody>
+      </p:sp>
+      <p:sp>
+        <p:nvSpPr>
+          <p:cNvPr id="4" name="Slide Number Placeholder 3"/>
+          <p:cNvSpPr>
+            <a:spLocks noGrp="1"/>
+          </p:cNvSpPr>
+          <p:nvPr>
+            <p:ph type="sldNum" sz="quarter" idx="10"/>
+          </p:nvPr>
+        </p:nvSpPr>
+        <p:spPr/>
+        <p:txBody>
+          <a:bodyPr/>
+          <a:lstStyle/>
+          <a:p>
+            <a:fld id="{DA58BC1F-B303-41BB-B1E5-E3EE1F495441}" type="slidenum">
+              <a:rPr lang="de-CH" smtClean="0"/>
+              <a:t>31</a:t>
             </a:fld>
             <a:endParaRPr lang="de-CH"/>
           </a:p>
@@ -3488,7 +3658,7 @@
           <a:noFill/>
           <a:extLst>
             <a:ext uri="{909E8E84-426E-40dd-AFC4-6F175D3DCCD1}">
-              <a14:hiddenFill xmlns:a14="http://schemas.microsoft.com/office/drawing/2010/main" xmlns="">
+              <a14:hiddenFill xmlns="" xmlns:a14="http://schemas.microsoft.com/office/drawing/2010/main">
                 <a:solidFill>
                   <a:srgbClr val="FFFFFF"/>
                 </a:solidFill>
@@ -3547,7 +3717,7 @@
             </a:ln>
             <a:extLst>
               <a:ext uri="{91240B29-F687-4f45-9708-019B960494DF}">
-                <a14:hiddenLine xmlns:a14="http://schemas.microsoft.com/office/drawing/2010/main" xmlns="" w="9525">
+                <a14:hiddenLine xmlns="" xmlns:a14="http://schemas.microsoft.com/office/drawing/2010/main" w="9525">
                   <a:solidFill>
                     <a:srgbClr val="000000"/>
                   </a:solidFill>
@@ -3637,7 +3807,7 @@
             </a:ln>
             <a:extLst>
               <a:ext uri="{91240B29-F687-4f45-9708-019B960494DF}">
-                <a14:hiddenLine xmlns:a14="http://schemas.microsoft.com/office/drawing/2010/main" xmlns="" w="9525">
+                <a14:hiddenLine xmlns="" xmlns:a14="http://schemas.microsoft.com/office/drawing/2010/main" w="9525">
                   <a:solidFill>
                     <a:srgbClr val="000000"/>
                   </a:solidFill>
@@ -3727,7 +3897,7 @@
             </a:ln>
             <a:extLst>
               <a:ext uri="{91240B29-F687-4f45-9708-019B960494DF}">
-                <a14:hiddenLine xmlns:a14="http://schemas.microsoft.com/office/drawing/2010/main" xmlns="" w="9525">
+                <a14:hiddenLine xmlns="" xmlns:a14="http://schemas.microsoft.com/office/drawing/2010/main" w="9525">
                   <a:solidFill>
                     <a:srgbClr val="000000"/>
                   </a:solidFill>
@@ -3761,7 +3931,7 @@
             </a:ln>
             <a:extLst>
               <a:ext uri="{91240B29-F687-4f45-9708-019B960494DF}">
-                <a14:hiddenLine xmlns:a14="http://schemas.microsoft.com/office/drawing/2010/main" xmlns="" w="9525">
+                <a14:hiddenLine xmlns="" xmlns:a14="http://schemas.microsoft.com/office/drawing/2010/main" w="9525">
                   <a:solidFill>
                     <a:srgbClr val="000000"/>
                   </a:solidFill>
@@ -3851,7 +4021,7 @@
             </a:ln>
             <a:extLst>
               <a:ext uri="{91240B29-F687-4f45-9708-019B960494DF}">
-                <a14:hiddenLine xmlns:a14="http://schemas.microsoft.com/office/drawing/2010/main" xmlns="" w="9525">
+                <a14:hiddenLine xmlns="" xmlns:a14="http://schemas.microsoft.com/office/drawing/2010/main" w="9525">
                   <a:solidFill>
                     <a:srgbClr val="000000"/>
                   </a:solidFill>
@@ -3913,7 +4083,7 @@
             </a:ln>
             <a:extLst>
               <a:ext uri="{91240B29-F687-4f45-9708-019B960494DF}">
-                <a14:hiddenLine xmlns:a14="http://schemas.microsoft.com/office/drawing/2010/main" xmlns="" w="9525">
+                <a14:hiddenLine xmlns="" xmlns:a14="http://schemas.microsoft.com/office/drawing/2010/main" w="9525">
                   <a:solidFill>
                     <a:srgbClr val="000000"/>
                   </a:solidFill>
@@ -3975,7 +4145,7 @@
             </a:ln>
             <a:extLst>
               <a:ext uri="{91240B29-F687-4f45-9708-019B960494DF}">
-                <a14:hiddenLine xmlns:a14="http://schemas.microsoft.com/office/drawing/2010/main" xmlns="" w="9525">
+                <a14:hiddenLine xmlns="" xmlns:a14="http://schemas.microsoft.com/office/drawing/2010/main" w="9525">
                   <a:solidFill>
                     <a:srgbClr val="000000"/>
                   </a:solidFill>
@@ -4065,7 +4235,7 @@
             </a:ln>
             <a:extLst>
               <a:ext uri="{91240B29-F687-4f45-9708-019B960494DF}">
-                <a14:hiddenLine xmlns:a14="http://schemas.microsoft.com/office/drawing/2010/main" xmlns="" w="9525">
+                <a14:hiddenLine xmlns="" xmlns:a14="http://schemas.microsoft.com/office/drawing/2010/main" w="9525">
                   <a:solidFill>
                     <a:srgbClr val="000000"/>
                   </a:solidFill>
@@ -4127,7 +4297,7 @@
             </a:ln>
             <a:extLst>
               <a:ext uri="{91240B29-F687-4f45-9708-019B960494DF}">
-                <a14:hiddenLine xmlns:a14="http://schemas.microsoft.com/office/drawing/2010/main" xmlns="" w="9525">
+                <a14:hiddenLine xmlns="" xmlns:a14="http://schemas.microsoft.com/office/drawing/2010/main" w="9525">
                   <a:solidFill>
                     <a:srgbClr val="000000"/>
                   </a:solidFill>
@@ -4189,7 +4359,7 @@
             </a:ln>
             <a:extLst>
               <a:ext uri="{91240B29-F687-4f45-9708-019B960494DF}">
-                <a14:hiddenLine xmlns:a14="http://schemas.microsoft.com/office/drawing/2010/main" xmlns="" w="9525">
+                <a14:hiddenLine xmlns="" xmlns:a14="http://schemas.microsoft.com/office/drawing/2010/main" w="9525">
                   <a:solidFill>
                     <a:srgbClr val="000000"/>
                   </a:solidFill>
@@ -4279,7 +4449,7 @@
             </a:ln>
             <a:extLst>
               <a:ext uri="{91240B29-F687-4f45-9708-019B960494DF}">
-                <a14:hiddenLine xmlns:a14="http://schemas.microsoft.com/office/drawing/2010/main" xmlns="" w="9525">
+                <a14:hiddenLine xmlns="" xmlns:a14="http://schemas.microsoft.com/office/drawing/2010/main" w="9525">
                   <a:solidFill>
                     <a:srgbClr val="000000"/>
                   </a:solidFill>
@@ -4369,7 +4539,7 @@
             </a:ln>
             <a:extLst>
               <a:ext uri="{91240B29-F687-4f45-9708-019B960494DF}">
-                <a14:hiddenLine xmlns:a14="http://schemas.microsoft.com/office/drawing/2010/main" xmlns="" w="9525">
+                <a14:hiddenLine xmlns="" xmlns:a14="http://schemas.microsoft.com/office/drawing/2010/main" w="9525">
                   <a:solidFill>
                     <a:srgbClr val="000000"/>
                   </a:solidFill>
@@ -4431,7 +4601,7 @@
             </a:ln>
             <a:extLst>
               <a:ext uri="{91240B29-F687-4f45-9708-019B960494DF}">
-                <a14:hiddenLine xmlns:a14="http://schemas.microsoft.com/office/drawing/2010/main" xmlns="" w="9525">
+                <a14:hiddenLine xmlns="" xmlns:a14="http://schemas.microsoft.com/office/drawing/2010/main" w="9525">
                   <a:solidFill>
                     <a:srgbClr val="000000"/>
                   </a:solidFill>
@@ -4541,7 +4711,7 @@
             </a:ln>
             <a:extLst>
               <a:ext uri="{91240B29-F687-4f45-9708-019B960494DF}">
-                <a14:hiddenLine xmlns:a14="http://schemas.microsoft.com/office/drawing/2010/main" xmlns="" w="9525">
+                <a14:hiddenLine xmlns="" xmlns:a14="http://schemas.microsoft.com/office/drawing/2010/main" w="9525">
                   <a:solidFill>
                     <a:srgbClr val="000000"/>
                   </a:solidFill>
@@ -4603,7 +4773,7 @@
             </a:ln>
             <a:extLst>
               <a:ext uri="{91240B29-F687-4f45-9708-019B960494DF}">
-                <a14:hiddenLine xmlns:a14="http://schemas.microsoft.com/office/drawing/2010/main" xmlns="" w="9525">
+                <a14:hiddenLine xmlns="" xmlns:a14="http://schemas.microsoft.com/office/drawing/2010/main" w="9525">
                   <a:solidFill>
                     <a:srgbClr val="000000"/>
                   </a:solidFill>
@@ -4693,7 +4863,7 @@
             </a:ln>
             <a:extLst>
               <a:ext uri="{91240B29-F687-4f45-9708-019B960494DF}">
-                <a14:hiddenLine xmlns:a14="http://schemas.microsoft.com/office/drawing/2010/main" xmlns="" w="9525">
+                <a14:hiddenLine xmlns="" xmlns:a14="http://schemas.microsoft.com/office/drawing/2010/main" w="9525">
                   <a:solidFill>
                     <a:srgbClr val="000000"/>
                   </a:solidFill>
@@ -4783,7 +4953,7 @@
             </a:ln>
             <a:extLst>
               <a:ext uri="{91240B29-F687-4f45-9708-019B960494DF}">
-                <a14:hiddenLine xmlns:a14="http://schemas.microsoft.com/office/drawing/2010/main" xmlns="" w="9525">
+                <a14:hiddenLine xmlns="" xmlns:a14="http://schemas.microsoft.com/office/drawing/2010/main" w="9525">
                   <a:solidFill>
                     <a:srgbClr val="000000"/>
                   </a:solidFill>
@@ -4845,7 +5015,7 @@
             </a:ln>
             <a:extLst>
               <a:ext uri="{91240B29-F687-4f45-9708-019B960494DF}">
-                <a14:hiddenLine xmlns:a14="http://schemas.microsoft.com/office/drawing/2010/main" xmlns="" w="9525">
+                <a14:hiddenLine xmlns="" xmlns:a14="http://schemas.microsoft.com/office/drawing/2010/main" w="9525">
                   <a:solidFill>
                     <a:srgbClr val="000000"/>
                   </a:solidFill>
@@ -4935,7 +5105,7 @@
             </a:ln>
             <a:extLst>
               <a:ext uri="{91240B29-F687-4f45-9708-019B960494DF}">
-                <a14:hiddenLine xmlns:a14="http://schemas.microsoft.com/office/drawing/2010/main" xmlns="" w="9525">
+                <a14:hiddenLine xmlns="" xmlns:a14="http://schemas.microsoft.com/office/drawing/2010/main" w="9525">
                   <a:solidFill>
                     <a:srgbClr val="000000"/>
                   </a:solidFill>
@@ -5025,7 +5195,7 @@
             </a:ln>
             <a:extLst>
               <a:ext uri="{91240B29-F687-4f45-9708-019B960494DF}">
-                <a14:hiddenLine xmlns:a14="http://schemas.microsoft.com/office/drawing/2010/main" xmlns="" w="9525">
+                <a14:hiddenLine xmlns="" xmlns:a14="http://schemas.microsoft.com/office/drawing/2010/main" w="9525">
                   <a:solidFill>
                     <a:srgbClr val="000000"/>
                   </a:solidFill>
@@ -5081,7 +5251,7 @@
             </a:ln>
             <a:extLst>
               <a:ext uri="{91240B29-F687-4f45-9708-019B960494DF}">
-                <a14:hiddenLine xmlns:a14="http://schemas.microsoft.com/office/drawing/2010/main" xmlns="" w="9525">
+                <a14:hiddenLine xmlns="" xmlns:a14="http://schemas.microsoft.com/office/drawing/2010/main" w="9525">
                   <a:solidFill>
                     <a:srgbClr val="000000"/>
                   </a:solidFill>
@@ -5171,7 +5341,7 @@
             </a:ln>
             <a:extLst>
               <a:ext uri="{91240B29-F687-4f45-9708-019B960494DF}">
-                <a14:hiddenLine xmlns:a14="http://schemas.microsoft.com/office/drawing/2010/main" xmlns="" w="9525">
+                <a14:hiddenLine xmlns="" xmlns:a14="http://schemas.microsoft.com/office/drawing/2010/main" w="9525">
                   <a:solidFill>
                     <a:srgbClr val="000000"/>
                   </a:solidFill>
@@ -5227,7 +5397,7 @@
             </a:ln>
             <a:extLst>
               <a:ext uri="{91240B29-F687-4f45-9708-019B960494DF}">
-                <a14:hiddenLine xmlns:a14="http://schemas.microsoft.com/office/drawing/2010/main" xmlns="" w="9525">
+                <a14:hiddenLine xmlns="" xmlns:a14="http://schemas.microsoft.com/office/drawing/2010/main" w="9525">
                   <a:solidFill>
                     <a:srgbClr val="000000"/>
                   </a:solidFill>
@@ -5317,7 +5487,7 @@
             </a:ln>
             <a:extLst>
               <a:ext uri="{91240B29-F687-4f45-9708-019B960494DF}">
-                <a14:hiddenLine xmlns:a14="http://schemas.microsoft.com/office/drawing/2010/main" xmlns="" w="9525">
+                <a14:hiddenLine xmlns="" xmlns:a14="http://schemas.microsoft.com/office/drawing/2010/main" w="9525">
                   <a:solidFill>
                     <a:srgbClr val="000000"/>
                   </a:solidFill>
@@ -5385,7 +5555,7 @@
             </a:ln>
             <a:extLst>
               <a:ext uri="{91240B29-F687-4f45-9708-019B960494DF}">
-                <a14:hiddenLine xmlns:a14="http://schemas.microsoft.com/office/drawing/2010/main" xmlns="" w="9525">
+                <a14:hiddenLine xmlns="" xmlns:a14="http://schemas.microsoft.com/office/drawing/2010/main" w="9525">
                   <a:solidFill>
                     <a:srgbClr val="000000"/>
                   </a:solidFill>
@@ -5475,7 +5645,7 @@
             </a:ln>
             <a:extLst>
               <a:ext uri="{91240B29-F687-4f45-9708-019B960494DF}">
-                <a14:hiddenLine xmlns:a14="http://schemas.microsoft.com/office/drawing/2010/main" xmlns="" w="9525">
+                <a14:hiddenLine xmlns="" xmlns:a14="http://schemas.microsoft.com/office/drawing/2010/main" w="9525">
                   <a:solidFill>
                     <a:srgbClr val="000000"/>
                   </a:solidFill>
@@ -5543,7 +5713,7 @@
             </a:ln>
             <a:extLst>
               <a:ext uri="{91240B29-F687-4f45-9708-019B960494DF}">
-                <a14:hiddenLine xmlns:a14="http://schemas.microsoft.com/office/drawing/2010/main" xmlns="" w="9525">
+                <a14:hiddenLine xmlns="" xmlns:a14="http://schemas.microsoft.com/office/drawing/2010/main" w="9525">
                   <a:solidFill>
                     <a:srgbClr val="000000"/>
                   </a:solidFill>
@@ -5633,7 +5803,7 @@
             </a:ln>
             <a:extLst>
               <a:ext uri="{91240B29-F687-4f45-9708-019B960494DF}">
-                <a14:hiddenLine xmlns:a14="http://schemas.microsoft.com/office/drawing/2010/main" xmlns="" w="9525">
+                <a14:hiddenLine xmlns="" xmlns:a14="http://schemas.microsoft.com/office/drawing/2010/main" w="9525">
                   <a:solidFill>
                     <a:srgbClr val="000000"/>
                   </a:solidFill>
@@ -5667,7 +5837,7 @@
             </a:ln>
             <a:extLst>
               <a:ext uri="{91240B29-F687-4f45-9708-019B960494DF}">
-                <a14:hiddenLine xmlns:a14="http://schemas.microsoft.com/office/drawing/2010/main" xmlns="" w="9525">
+                <a14:hiddenLine xmlns="" xmlns:a14="http://schemas.microsoft.com/office/drawing/2010/main" w="9525">
                   <a:solidFill>
                     <a:srgbClr val="000000"/>
                   </a:solidFill>
@@ -5757,7 +5927,7 @@
             </a:ln>
             <a:extLst>
               <a:ext uri="{91240B29-F687-4f45-9708-019B960494DF}">
-                <a14:hiddenLine xmlns:a14="http://schemas.microsoft.com/office/drawing/2010/main" xmlns="" w="9525">
+                <a14:hiddenLine xmlns="" xmlns:a14="http://schemas.microsoft.com/office/drawing/2010/main" w="9525">
                   <a:solidFill>
                     <a:srgbClr val="000000"/>
                   </a:solidFill>
@@ -5819,7 +5989,7 @@
             </a:ln>
             <a:extLst>
               <a:ext uri="{91240B29-F687-4f45-9708-019B960494DF}">
-                <a14:hiddenLine xmlns:a14="http://schemas.microsoft.com/office/drawing/2010/main" xmlns="" w="9525">
+                <a14:hiddenLine xmlns="" xmlns:a14="http://schemas.microsoft.com/office/drawing/2010/main" w="9525">
                   <a:solidFill>
                     <a:srgbClr val="000000"/>
                   </a:solidFill>
@@ -5881,7 +6051,7 @@
             </a:ln>
             <a:extLst>
               <a:ext uri="{91240B29-F687-4f45-9708-019B960494DF}">
-                <a14:hiddenLine xmlns:a14="http://schemas.microsoft.com/office/drawing/2010/main" xmlns="" w="9525">
+                <a14:hiddenLine xmlns="" xmlns:a14="http://schemas.microsoft.com/office/drawing/2010/main" w="9525">
                   <a:solidFill>
                     <a:srgbClr val="000000"/>
                   </a:solidFill>
@@ -5971,7 +6141,7 @@
             </a:ln>
             <a:extLst>
               <a:ext uri="{91240B29-F687-4f45-9708-019B960494DF}">
-                <a14:hiddenLine xmlns:a14="http://schemas.microsoft.com/office/drawing/2010/main" xmlns="" w="9525">
+                <a14:hiddenLine xmlns="" xmlns:a14="http://schemas.microsoft.com/office/drawing/2010/main" w="9525">
                   <a:solidFill>
                     <a:srgbClr val="000000"/>
                   </a:solidFill>
@@ -6039,7 +6209,7 @@
             </a:ln>
             <a:extLst>
               <a:ext uri="{91240B29-F687-4f45-9708-019B960494DF}">
-                <a14:hiddenLine xmlns:a14="http://schemas.microsoft.com/office/drawing/2010/main" xmlns="" w="9525">
+                <a14:hiddenLine xmlns="" xmlns:a14="http://schemas.microsoft.com/office/drawing/2010/main" w="9525">
                   <a:solidFill>
                     <a:srgbClr val="000000"/>
                   </a:solidFill>
@@ -6101,7 +6271,7 @@
             </a:ln>
             <a:extLst>
               <a:ext uri="{91240B29-F687-4f45-9708-019B960494DF}">
-                <a14:hiddenLine xmlns:a14="http://schemas.microsoft.com/office/drawing/2010/main" xmlns="" w="9525">
+                <a14:hiddenLine xmlns="" xmlns:a14="http://schemas.microsoft.com/office/drawing/2010/main" w="9525">
                   <a:solidFill>
                     <a:srgbClr val="000000"/>
                   </a:solidFill>
@@ -6191,7 +6361,7 @@
             </a:ln>
             <a:extLst>
               <a:ext uri="{91240B29-F687-4f45-9708-019B960494DF}">
-                <a14:hiddenLine xmlns:a14="http://schemas.microsoft.com/office/drawing/2010/main" xmlns="" w="9525">
+                <a14:hiddenLine xmlns="" xmlns:a14="http://schemas.microsoft.com/office/drawing/2010/main" w="9525">
                   <a:solidFill>
                     <a:srgbClr val="000000"/>
                   </a:solidFill>
@@ -6253,7 +6423,7 @@
             </a:ln>
             <a:extLst>
               <a:ext uri="{91240B29-F687-4f45-9708-019B960494DF}">
-                <a14:hiddenLine xmlns:a14="http://schemas.microsoft.com/office/drawing/2010/main" xmlns="" w="9525">
+                <a14:hiddenLine xmlns="" xmlns:a14="http://schemas.microsoft.com/office/drawing/2010/main" w="9525">
                   <a:solidFill>
                     <a:srgbClr val="000000"/>
                   </a:solidFill>
@@ -6343,7 +6513,7 @@
             </a:ln>
             <a:extLst>
               <a:ext uri="{91240B29-F687-4f45-9708-019B960494DF}">
-                <a14:hiddenLine xmlns:a14="http://schemas.microsoft.com/office/drawing/2010/main" xmlns="" w="9525">
+                <a14:hiddenLine xmlns="" xmlns:a14="http://schemas.microsoft.com/office/drawing/2010/main" w="9525">
                   <a:solidFill>
                     <a:srgbClr val="000000"/>
                   </a:solidFill>
@@ -6405,7 +6575,7 @@
             </a:ln>
             <a:extLst>
               <a:ext uri="{91240B29-F687-4f45-9708-019B960494DF}">
-                <a14:hiddenLine xmlns:a14="http://schemas.microsoft.com/office/drawing/2010/main" xmlns="" w="9525">
+                <a14:hiddenLine xmlns="" xmlns:a14="http://schemas.microsoft.com/office/drawing/2010/main" w="9525">
                   <a:solidFill>
                     <a:srgbClr val="000000"/>
                   </a:solidFill>
@@ -6495,7 +6665,7 @@
             </a:ln>
             <a:extLst>
               <a:ext uri="{91240B29-F687-4f45-9708-019B960494DF}">
-                <a14:hiddenLine xmlns:a14="http://schemas.microsoft.com/office/drawing/2010/main" xmlns="" w="9525">
+                <a14:hiddenLine xmlns="" xmlns:a14="http://schemas.microsoft.com/office/drawing/2010/main" w="9525">
                   <a:solidFill>
                     <a:srgbClr val="000000"/>
                   </a:solidFill>
@@ -6529,7 +6699,7 @@
             </a:ln>
             <a:extLst>
               <a:ext uri="{91240B29-F687-4f45-9708-019B960494DF}">
-                <a14:hiddenLine xmlns:a14="http://schemas.microsoft.com/office/drawing/2010/main" xmlns="" w="9525">
+                <a14:hiddenLine xmlns="" xmlns:a14="http://schemas.microsoft.com/office/drawing/2010/main" w="9525">
                   <a:solidFill>
                     <a:srgbClr val="000000"/>
                   </a:solidFill>
@@ -6594,7 +6764,7 @@
             </a:ln>
             <a:extLst>
               <a:ext uri="{91240B29-F687-4f45-9708-019B960494DF}">
-                <a14:hiddenLine xmlns:a14="http://schemas.microsoft.com/office/drawing/2010/main" xmlns="" w="9525">
+                <a14:hiddenLine xmlns="" xmlns:a14="http://schemas.microsoft.com/office/drawing/2010/main" w="9525">
                   <a:solidFill>
                     <a:srgbClr val="000000"/>
                   </a:solidFill>
@@ -6684,7 +6854,7 @@
             </a:ln>
             <a:extLst>
               <a:ext uri="{91240B29-F687-4f45-9708-019B960494DF}">
-                <a14:hiddenLine xmlns:a14="http://schemas.microsoft.com/office/drawing/2010/main" xmlns="" w="9525">
+                <a14:hiddenLine xmlns="" xmlns:a14="http://schemas.microsoft.com/office/drawing/2010/main" w="9525">
                   <a:solidFill>
                     <a:srgbClr val="000000"/>
                   </a:solidFill>
@@ -6746,7 +6916,7 @@
             </a:ln>
             <a:extLst>
               <a:ext uri="{91240B29-F687-4f45-9708-019B960494DF}">
-                <a14:hiddenLine xmlns:a14="http://schemas.microsoft.com/office/drawing/2010/main" xmlns="" w="9525">
+                <a14:hiddenLine xmlns="" xmlns:a14="http://schemas.microsoft.com/office/drawing/2010/main" w="9525">
                   <a:solidFill>
                     <a:srgbClr val="000000"/>
                   </a:solidFill>
@@ -6836,7 +7006,7 @@
             </a:ln>
             <a:extLst>
               <a:ext uri="{91240B29-F687-4f45-9708-019B960494DF}">
-                <a14:hiddenLine xmlns:a14="http://schemas.microsoft.com/office/drawing/2010/main" xmlns="" w="9525">
+                <a14:hiddenLine xmlns="" xmlns:a14="http://schemas.microsoft.com/office/drawing/2010/main" w="9525">
                   <a:solidFill>
                     <a:srgbClr val="000000"/>
                   </a:solidFill>
@@ -6926,7 +7096,7 @@
             </a:ln>
             <a:extLst>
               <a:ext uri="{91240B29-F687-4f45-9708-019B960494DF}">
-                <a14:hiddenLine xmlns:a14="http://schemas.microsoft.com/office/drawing/2010/main" xmlns="" w="9525">
+                <a14:hiddenLine xmlns="" xmlns:a14="http://schemas.microsoft.com/office/drawing/2010/main" w="9525">
                   <a:solidFill>
                     <a:srgbClr val="000000"/>
                   </a:solidFill>
@@ -6991,7 +7161,7 @@
             </a:ln>
             <a:extLst>
               <a:ext uri="{91240B29-F687-4f45-9708-019B960494DF}">
-                <a14:hiddenLine xmlns:a14="http://schemas.microsoft.com/office/drawing/2010/main" xmlns="" w="9525">
+                <a14:hiddenLine xmlns="" xmlns:a14="http://schemas.microsoft.com/office/drawing/2010/main" w="9525">
                   <a:solidFill>
                     <a:srgbClr val="000000"/>
                   </a:solidFill>
@@ -7053,7 +7223,7 @@
             </a:ln>
             <a:extLst>
               <a:ext uri="{91240B29-F687-4f45-9708-019B960494DF}">
-                <a14:hiddenLine xmlns:a14="http://schemas.microsoft.com/office/drawing/2010/main" xmlns="" w="9525">
+                <a14:hiddenLine xmlns="" xmlns:a14="http://schemas.microsoft.com/office/drawing/2010/main" w="9525">
                   <a:solidFill>
                     <a:srgbClr val="000000"/>
                   </a:solidFill>
@@ -7143,7 +7313,7 @@
             </a:ln>
             <a:extLst>
               <a:ext uri="{91240B29-F687-4f45-9708-019B960494DF}">
-                <a14:hiddenLine xmlns:a14="http://schemas.microsoft.com/office/drawing/2010/main" xmlns="" w="9525">
+                <a14:hiddenLine xmlns="" xmlns:a14="http://schemas.microsoft.com/office/drawing/2010/main" w="9525">
                   <a:solidFill>
                     <a:srgbClr val="000000"/>
                   </a:solidFill>
@@ -7233,7 +7403,7 @@
             </a:ln>
             <a:extLst>
               <a:ext uri="{91240B29-F687-4f45-9708-019B960494DF}">
-                <a14:hiddenLine xmlns:a14="http://schemas.microsoft.com/office/drawing/2010/main" xmlns="" w="9525">
+                <a14:hiddenLine xmlns="" xmlns:a14="http://schemas.microsoft.com/office/drawing/2010/main" w="9525">
                   <a:solidFill>
                     <a:srgbClr val="000000"/>
                   </a:solidFill>
@@ -7295,7 +7465,7 @@
             </a:ln>
             <a:extLst>
               <a:ext uri="{91240B29-F687-4f45-9708-019B960494DF}">
-                <a14:hiddenLine xmlns:a14="http://schemas.microsoft.com/office/drawing/2010/main" xmlns="" w="9525">
+                <a14:hiddenLine xmlns="" xmlns:a14="http://schemas.microsoft.com/office/drawing/2010/main" w="9525">
                   <a:solidFill>
                     <a:srgbClr val="000000"/>
                   </a:solidFill>
@@ -7415,7 +7585,7 @@
             </a:ln>
             <a:extLst>
               <a:ext uri="{91240B29-F687-4f45-9708-019B960494DF}">
-                <a14:hiddenLine xmlns:a14="http://schemas.microsoft.com/office/drawing/2010/main" xmlns="" w="9525">
+                <a14:hiddenLine xmlns="" xmlns:a14="http://schemas.microsoft.com/office/drawing/2010/main" w="9525">
                   <a:solidFill>
                     <a:srgbClr val="000000"/>
                   </a:solidFill>
@@ -7483,7 +7653,7 @@
             </a:ln>
             <a:extLst>
               <a:ext uri="{91240B29-F687-4f45-9708-019B960494DF}">
-                <a14:hiddenLine xmlns:a14="http://schemas.microsoft.com/office/drawing/2010/main" xmlns="" w="9525">
+                <a14:hiddenLine xmlns="" xmlns:a14="http://schemas.microsoft.com/office/drawing/2010/main" w="9525">
                   <a:solidFill>
                     <a:srgbClr val="000000"/>
                   </a:solidFill>
@@ -7573,7 +7743,7 @@
             </a:ln>
             <a:extLst>
               <a:ext uri="{91240B29-F687-4f45-9708-019B960494DF}">
-                <a14:hiddenLine xmlns:a14="http://schemas.microsoft.com/office/drawing/2010/main" xmlns="" w="9525">
+                <a14:hiddenLine xmlns="" xmlns:a14="http://schemas.microsoft.com/office/drawing/2010/main" w="9525">
                   <a:solidFill>
                     <a:srgbClr val="000000"/>
                   </a:solidFill>
@@ -12302,7 +12472,7 @@
           <a:noFill/>
           <a:extLst>
             <a:ext uri="{909E8E84-426E-40dd-AFC4-6F175D3DCCD1}">
-              <a14:hiddenFill xmlns:a14="http://schemas.microsoft.com/office/drawing/2010/main" xmlns="">
+              <a14:hiddenFill xmlns="" xmlns:a14="http://schemas.microsoft.com/office/drawing/2010/main">
                 <a:solidFill>
                   <a:srgbClr val="FFFFFF"/>
                 </a:solidFill>
@@ -12376,7 +12546,7 @@
               </a:ln>
               <a:extLst>
                 <a:ext uri="{91240B29-F687-4f45-9708-019B960494DF}">
-                  <a14:hiddenLine xmlns:a14="http://schemas.microsoft.com/office/drawing/2010/main" xmlns="" w="9525">
+                  <a14:hiddenLine xmlns="" xmlns:a14="http://schemas.microsoft.com/office/drawing/2010/main" w="9525">
                     <a:solidFill>
                       <a:srgbClr val="000000"/>
                     </a:solidFill>
@@ -12466,7 +12636,7 @@
               </a:ln>
               <a:extLst>
                 <a:ext uri="{91240B29-F687-4f45-9708-019B960494DF}">
-                  <a14:hiddenLine xmlns:a14="http://schemas.microsoft.com/office/drawing/2010/main" xmlns="" w="9525">
+                  <a14:hiddenLine xmlns="" xmlns:a14="http://schemas.microsoft.com/office/drawing/2010/main" w="9525">
                     <a:solidFill>
                       <a:srgbClr val="000000"/>
                     </a:solidFill>
@@ -12556,7 +12726,7 @@
               </a:ln>
               <a:extLst>
                 <a:ext uri="{91240B29-F687-4f45-9708-019B960494DF}">
-                  <a14:hiddenLine xmlns:a14="http://schemas.microsoft.com/office/drawing/2010/main" xmlns="" w="9525">
+                  <a14:hiddenLine xmlns="" xmlns:a14="http://schemas.microsoft.com/office/drawing/2010/main" w="9525">
                     <a:solidFill>
                       <a:srgbClr val="000000"/>
                     </a:solidFill>
@@ -12618,7 +12788,7 @@
               </a:ln>
               <a:extLst>
                 <a:ext uri="{91240B29-F687-4f45-9708-019B960494DF}">
-                  <a14:hiddenLine xmlns:a14="http://schemas.microsoft.com/office/drawing/2010/main" xmlns="" w="9525">
+                  <a14:hiddenLine xmlns="" xmlns:a14="http://schemas.microsoft.com/office/drawing/2010/main" w="9525">
                     <a:solidFill>
                       <a:srgbClr val="000000"/>
                     </a:solidFill>
@@ -12708,7 +12878,7 @@
               </a:ln>
               <a:extLst>
                 <a:ext uri="{91240B29-F687-4f45-9708-019B960494DF}">
-                  <a14:hiddenLine xmlns:a14="http://schemas.microsoft.com/office/drawing/2010/main" xmlns="" w="9525">
+                  <a14:hiddenLine xmlns="" xmlns:a14="http://schemas.microsoft.com/office/drawing/2010/main" w="9525">
                     <a:solidFill>
                       <a:srgbClr val="000000"/>
                     </a:solidFill>
@@ -12770,7 +12940,7 @@
               </a:ln>
               <a:extLst>
                 <a:ext uri="{91240B29-F687-4f45-9708-019B960494DF}">
-                  <a14:hiddenLine xmlns:a14="http://schemas.microsoft.com/office/drawing/2010/main" xmlns="" w="9525">
+                  <a14:hiddenLine xmlns="" xmlns:a14="http://schemas.microsoft.com/office/drawing/2010/main" w="9525">
                     <a:solidFill>
                       <a:srgbClr val="000000"/>
                     </a:solidFill>
@@ -12832,7 +13002,7 @@
               </a:ln>
               <a:extLst>
                 <a:ext uri="{91240B29-F687-4f45-9708-019B960494DF}">
-                  <a14:hiddenLine xmlns:a14="http://schemas.microsoft.com/office/drawing/2010/main" xmlns="" w="9525">
+                  <a14:hiddenLine xmlns="" xmlns:a14="http://schemas.microsoft.com/office/drawing/2010/main" w="9525">
                     <a:solidFill>
                       <a:srgbClr val="000000"/>
                     </a:solidFill>
@@ -12922,7 +13092,7 @@
               </a:ln>
               <a:extLst>
                 <a:ext uri="{91240B29-F687-4f45-9708-019B960494DF}">
-                  <a14:hiddenLine xmlns:a14="http://schemas.microsoft.com/office/drawing/2010/main" xmlns="" w="9525">
+                  <a14:hiddenLine xmlns="" xmlns:a14="http://schemas.microsoft.com/office/drawing/2010/main" w="9525">
                     <a:solidFill>
                       <a:srgbClr val="000000"/>
                     </a:solidFill>
@@ -13012,7 +13182,7 @@
               </a:ln>
               <a:extLst>
                 <a:ext uri="{91240B29-F687-4f45-9708-019B960494DF}">
-                  <a14:hiddenLine xmlns:a14="http://schemas.microsoft.com/office/drawing/2010/main" xmlns="" w="9525">
+                  <a14:hiddenLine xmlns="" xmlns:a14="http://schemas.microsoft.com/office/drawing/2010/main" w="9525">
                     <a:solidFill>
                       <a:srgbClr val="000000"/>
                     </a:solidFill>
@@ -13074,7 +13244,7 @@
               </a:ln>
               <a:extLst>
                 <a:ext uri="{91240B29-F687-4f45-9708-019B960494DF}">
-                  <a14:hiddenLine xmlns:a14="http://schemas.microsoft.com/office/drawing/2010/main" xmlns="" w="9525">
+                  <a14:hiddenLine xmlns="" xmlns:a14="http://schemas.microsoft.com/office/drawing/2010/main" w="9525">
                     <a:solidFill>
                       <a:srgbClr val="000000"/>
                     </a:solidFill>
@@ -13184,7 +13354,7 @@
               </a:ln>
               <a:extLst>
                 <a:ext uri="{91240B29-F687-4f45-9708-019B960494DF}">
-                  <a14:hiddenLine xmlns:a14="http://schemas.microsoft.com/office/drawing/2010/main" xmlns="" w="9525">
+                  <a14:hiddenLine xmlns="" xmlns:a14="http://schemas.microsoft.com/office/drawing/2010/main" w="9525">
                     <a:solidFill>
                       <a:srgbClr val="000000"/>
                     </a:solidFill>
@@ -13268,7 +13438,7 @@
               </a:ln>
               <a:extLst>
                 <a:ext uri="{91240B29-F687-4f45-9708-019B960494DF}">
-                  <a14:hiddenLine xmlns:a14="http://schemas.microsoft.com/office/drawing/2010/main" xmlns="" w="9525">
+                  <a14:hiddenLine xmlns="" xmlns:a14="http://schemas.microsoft.com/office/drawing/2010/main" w="9525">
                     <a:solidFill>
                       <a:srgbClr val="000000"/>
                     </a:solidFill>
@@ -13330,7 +13500,7 @@
               </a:ln>
               <a:extLst>
                 <a:ext uri="{91240B29-F687-4f45-9708-019B960494DF}">
-                  <a14:hiddenLine xmlns:a14="http://schemas.microsoft.com/office/drawing/2010/main" xmlns="" w="9525">
+                  <a14:hiddenLine xmlns="" xmlns:a14="http://schemas.microsoft.com/office/drawing/2010/main" w="9525">
                     <a:solidFill>
                       <a:srgbClr val="000000"/>
                     </a:solidFill>
@@ -13392,7 +13562,7 @@
               </a:ln>
               <a:extLst>
                 <a:ext uri="{91240B29-F687-4f45-9708-019B960494DF}">
-                  <a14:hiddenLine xmlns:a14="http://schemas.microsoft.com/office/drawing/2010/main" xmlns="" w="9525">
+                  <a14:hiddenLine xmlns="" xmlns:a14="http://schemas.microsoft.com/office/drawing/2010/main" w="9525">
                     <a:solidFill>
                       <a:srgbClr val="000000"/>
                     </a:solidFill>
@@ -13482,7 +13652,7 @@
               </a:ln>
               <a:extLst>
                 <a:ext uri="{91240B29-F687-4f45-9708-019B960494DF}">
-                  <a14:hiddenLine xmlns:a14="http://schemas.microsoft.com/office/drawing/2010/main" xmlns="" w="9525">
+                  <a14:hiddenLine xmlns="" xmlns:a14="http://schemas.microsoft.com/office/drawing/2010/main" w="9525">
                     <a:solidFill>
                       <a:srgbClr val="000000"/>
                     </a:solidFill>
@@ -13516,7 +13686,7 @@
               </a:ln>
               <a:extLst>
                 <a:ext uri="{91240B29-F687-4f45-9708-019B960494DF}">
-                  <a14:hiddenLine xmlns:a14="http://schemas.microsoft.com/office/drawing/2010/main" xmlns="" w="9525">
+                  <a14:hiddenLine xmlns="" xmlns:a14="http://schemas.microsoft.com/office/drawing/2010/main" w="9525">
                     <a:solidFill>
                       <a:srgbClr val="000000"/>
                     </a:solidFill>
@@ -13581,7 +13751,7 @@
               </a:ln>
               <a:extLst>
                 <a:ext uri="{91240B29-F687-4f45-9708-019B960494DF}">
-                  <a14:hiddenLine xmlns:a14="http://schemas.microsoft.com/office/drawing/2010/main" xmlns="" w="9525">
+                  <a14:hiddenLine xmlns="" xmlns:a14="http://schemas.microsoft.com/office/drawing/2010/main" w="9525">
                     <a:solidFill>
                       <a:srgbClr val="000000"/>
                     </a:solidFill>
@@ -13671,7 +13841,7 @@
               </a:ln>
               <a:extLst>
                 <a:ext uri="{91240B29-F687-4f45-9708-019B960494DF}">
-                  <a14:hiddenLine xmlns:a14="http://schemas.microsoft.com/office/drawing/2010/main" xmlns="" w="9525">
+                  <a14:hiddenLine xmlns="" xmlns:a14="http://schemas.microsoft.com/office/drawing/2010/main" w="9525">
                     <a:solidFill>
                       <a:srgbClr val="000000"/>
                     </a:solidFill>
@@ -13733,7 +13903,7 @@
               </a:ln>
               <a:extLst>
                 <a:ext uri="{91240B29-F687-4f45-9708-019B960494DF}">
-                  <a14:hiddenLine xmlns:a14="http://schemas.microsoft.com/office/drawing/2010/main" xmlns="" w="9525">
+                  <a14:hiddenLine xmlns="" xmlns:a14="http://schemas.microsoft.com/office/drawing/2010/main" w="9525">
                     <a:solidFill>
                       <a:srgbClr val="000000"/>
                     </a:solidFill>
@@ -13823,7 +13993,7 @@
               </a:ln>
               <a:extLst>
                 <a:ext uri="{91240B29-F687-4f45-9708-019B960494DF}">
-                  <a14:hiddenLine xmlns:a14="http://schemas.microsoft.com/office/drawing/2010/main" xmlns="" w="9525">
+                  <a14:hiddenLine xmlns="" xmlns:a14="http://schemas.microsoft.com/office/drawing/2010/main" w="9525">
                     <a:solidFill>
                       <a:srgbClr val="000000"/>
                     </a:solidFill>
@@ -13888,7 +14058,7 @@
               </a:ln>
               <a:extLst>
                 <a:ext uri="{91240B29-F687-4f45-9708-019B960494DF}">
-                  <a14:hiddenLine xmlns:a14="http://schemas.microsoft.com/office/drawing/2010/main" xmlns="" w="9525">
+                  <a14:hiddenLine xmlns="" xmlns:a14="http://schemas.microsoft.com/office/drawing/2010/main" w="9525">
                     <a:solidFill>
                       <a:srgbClr val="000000"/>
                     </a:solidFill>
@@ -13950,7 +14120,7 @@
               </a:ln>
               <a:extLst>
                 <a:ext uri="{91240B29-F687-4f45-9708-019B960494DF}">
-                  <a14:hiddenLine xmlns:a14="http://schemas.microsoft.com/office/drawing/2010/main" xmlns="" w="9525">
+                  <a14:hiddenLine xmlns="" xmlns:a14="http://schemas.microsoft.com/office/drawing/2010/main" w="9525">
                     <a:solidFill>
                       <a:srgbClr val="000000"/>
                     </a:solidFill>
@@ -14040,7 +14210,7 @@
               </a:ln>
               <a:extLst>
                 <a:ext uri="{91240B29-F687-4f45-9708-019B960494DF}">
-                  <a14:hiddenLine xmlns:a14="http://schemas.microsoft.com/office/drawing/2010/main" xmlns="" w="9525">
+                  <a14:hiddenLine xmlns="" xmlns:a14="http://schemas.microsoft.com/office/drawing/2010/main" w="9525">
                     <a:solidFill>
                       <a:srgbClr val="000000"/>
                     </a:solidFill>
@@ -14130,7 +14300,7 @@
               </a:ln>
               <a:extLst>
                 <a:ext uri="{91240B29-F687-4f45-9708-019B960494DF}">
-                  <a14:hiddenLine xmlns:a14="http://schemas.microsoft.com/office/drawing/2010/main" xmlns="" w="9525">
+                  <a14:hiddenLine xmlns="" xmlns:a14="http://schemas.microsoft.com/office/drawing/2010/main" w="9525">
                     <a:solidFill>
                       <a:srgbClr val="000000"/>
                     </a:solidFill>
@@ -14195,7 +14365,7 @@
               </a:ln>
               <a:extLst>
                 <a:ext uri="{91240B29-F687-4f45-9708-019B960494DF}">
-                  <a14:hiddenLine xmlns:a14="http://schemas.microsoft.com/office/drawing/2010/main" xmlns="" w="9525">
+                  <a14:hiddenLine xmlns="" xmlns:a14="http://schemas.microsoft.com/office/drawing/2010/main" w="9525">
                     <a:solidFill>
                       <a:srgbClr val="000000"/>
                     </a:solidFill>
@@ -14315,7 +14485,7 @@
               </a:ln>
               <a:extLst>
                 <a:ext uri="{91240B29-F687-4f45-9708-019B960494DF}">
-                  <a14:hiddenLine xmlns:a14="http://schemas.microsoft.com/office/drawing/2010/main" xmlns="" w="9525">
+                  <a14:hiddenLine xmlns="" xmlns:a14="http://schemas.microsoft.com/office/drawing/2010/main" w="9525">
                     <a:solidFill>
                       <a:srgbClr val="000000"/>
                     </a:solidFill>
@@ -14396,7 +14566,7 @@
               </a:ln>
               <a:extLst>
                 <a:ext uri="{91240B29-F687-4f45-9708-019B960494DF}">
-                  <a14:hiddenLine xmlns:a14="http://schemas.microsoft.com/office/drawing/2010/main" xmlns="" w="9525">
+                  <a14:hiddenLine xmlns="" xmlns:a14="http://schemas.microsoft.com/office/drawing/2010/main" w="9525">
                     <a:solidFill>
                       <a:srgbClr val="000000"/>
                     </a:solidFill>
@@ -14511,7 +14681,7 @@
               </a:ln>
               <a:extLst>
                 <a:ext uri="{91240B29-F687-4f45-9708-019B960494DF}">
-                  <a14:hiddenLine xmlns:a14="http://schemas.microsoft.com/office/drawing/2010/main" xmlns="" w="9525">
+                  <a14:hiddenLine xmlns="" xmlns:a14="http://schemas.microsoft.com/office/drawing/2010/main" w="9525">
                     <a:solidFill>
                       <a:srgbClr val="000000"/>
                     </a:solidFill>
@@ -14601,7 +14771,7 @@
               </a:ln>
               <a:extLst>
                 <a:ext uri="{91240B29-F687-4f45-9708-019B960494DF}">
-                  <a14:hiddenLine xmlns:a14="http://schemas.microsoft.com/office/drawing/2010/main" xmlns="" w="9525">
+                  <a14:hiddenLine xmlns="" xmlns:a14="http://schemas.microsoft.com/office/drawing/2010/main" w="9525">
                     <a:solidFill>
                       <a:srgbClr val="000000"/>
                     </a:solidFill>
@@ -14666,7 +14836,7 @@
               </a:ln>
               <a:extLst>
                 <a:ext uri="{91240B29-F687-4f45-9708-019B960494DF}">
-                  <a14:hiddenLine xmlns:a14="http://schemas.microsoft.com/office/drawing/2010/main" xmlns="" w="9525">
+                  <a14:hiddenLine xmlns="" xmlns:a14="http://schemas.microsoft.com/office/drawing/2010/main" w="9525">
                     <a:solidFill>
                       <a:srgbClr val="000000"/>
                     </a:solidFill>
@@ -14756,7 +14926,7 @@
               </a:ln>
               <a:extLst>
                 <a:ext uri="{91240B29-F687-4f45-9708-019B960494DF}">
-                  <a14:hiddenLine xmlns:a14="http://schemas.microsoft.com/office/drawing/2010/main" xmlns="" w="9525">
+                  <a14:hiddenLine xmlns="" xmlns:a14="http://schemas.microsoft.com/office/drawing/2010/main" w="9525">
                     <a:solidFill>
                       <a:srgbClr val="000000"/>
                     </a:solidFill>
@@ -14824,7 +14994,7 @@
               </a:ln>
               <a:extLst>
                 <a:ext uri="{91240B29-F687-4f45-9708-019B960494DF}">
-                  <a14:hiddenLine xmlns:a14="http://schemas.microsoft.com/office/drawing/2010/main" xmlns="" w="9525">
+                  <a14:hiddenLine xmlns="" xmlns:a14="http://schemas.microsoft.com/office/drawing/2010/main" w="9525">
                     <a:solidFill>
                       <a:srgbClr val="000000"/>
                     </a:solidFill>
@@ -14914,7 +15084,7 @@
               </a:ln>
               <a:extLst>
                 <a:ext uri="{91240B29-F687-4f45-9708-019B960494DF}">
-                  <a14:hiddenLine xmlns:a14="http://schemas.microsoft.com/office/drawing/2010/main" xmlns="" w="9525">
+                  <a14:hiddenLine xmlns="" xmlns:a14="http://schemas.microsoft.com/office/drawing/2010/main" w="9525">
                     <a:solidFill>
                       <a:srgbClr val="000000"/>
                     </a:solidFill>
@@ -14982,7 +15152,7 @@
               </a:ln>
               <a:extLst>
                 <a:ext uri="{91240B29-F687-4f45-9708-019B960494DF}">
-                  <a14:hiddenLine xmlns:a14="http://schemas.microsoft.com/office/drawing/2010/main" xmlns="" w="9525">
+                  <a14:hiddenLine xmlns="" xmlns:a14="http://schemas.microsoft.com/office/drawing/2010/main" w="9525">
                     <a:solidFill>
                       <a:srgbClr val="000000"/>
                     </a:solidFill>
@@ -15072,7 +15242,7 @@
               </a:ln>
               <a:extLst>
                 <a:ext uri="{91240B29-F687-4f45-9708-019B960494DF}">
-                  <a14:hiddenLine xmlns:a14="http://schemas.microsoft.com/office/drawing/2010/main" xmlns="" w="9525">
+                  <a14:hiddenLine xmlns="" xmlns:a14="http://schemas.microsoft.com/office/drawing/2010/main" w="9525">
                     <a:solidFill>
                       <a:srgbClr val="000000"/>
                     </a:solidFill>
@@ -15106,7 +15276,7 @@
               </a:ln>
               <a:extLst>
                 <a:ext uri="{91240B29-F687-4f45-9708-019B960494DF}">
-                  <a14:hiddenLine xmlns:a14="http://schemas.microsoft.com/office/drawing/2010/main" xmlns="" w="9525">
+                  <a14:hiddenLine xmlns="" xmlns:a14="http://schemas.microsoft.com/office/drawing/2010/main" w="9525">
                     <a:solidFill>
                       <a:srgbClr val="000000"/>
                     </a:solidFill>
@@ -15812,8 +15982,16 @@
           <a:lstStyle/>
           <a:p>
             <a:r>
-              <a:rPr lang="de-CH" dirty="0" smtClean="0"/>
-              <a:t>Buzzword cleanup</a:t>
+              <a:rPr lang="de-CH" dirty="0" err="1"/>
+              <a:t>Demystifying</a:t>
+            </a:r>
+            <a:r>
+              <a:rPr lang="de-CH" dirty="0"/>
+              <a:t> </a:t>
+            </a:r>
+            <a:r>
+              <a:rPr lang="de-CH" dirty="0" err="1"/>
+              <a:t>Buzzwords</a:t>
             </a:r>
             <a:endParaRPr lang="de-CH" dirty="0"/>
           </a:p>
@@ -16440,8 +16618,16 @@
           <a:lstStyle/>
           <a:p>
             <a:r>
-              <a:rPr lang="de-CH" dirty="0" smtClean="0"/>
-              <a:t>Buzzword cleanup</a:t>
+              <a:rPr lang="de-CH" dirty="0" err="1"/>
+              <a:t>Demystifying</a:t>
+            </a:r>
+            <a:r>
+              <a:rPr lang="de-CH" dirty="0"/>
+              <a:t> </a:t>
+            </a:r>
+            <a:r>
+              <a:rPr lang="de-CH" dirty="0" err="1"/>
+              <a:t>Buzzwords</a:t>
             </a:r>
             <a:endParaRPr lang="de-CH" dirty="0"/>
           </a:p>
@@ -16809,8 +16995,16 @@
           <a:lstStyle/>
           <a:p>
             <a:r>
-              <a:rPr lang="de-CH" dirty="0" smtClean="0"/>
-              <a:t>Buzzword cleanup</a:t>
+              <a:rPr lang="de-CH" dirty="0" err="1"/>
+              <a:t>Demystifying</a:t>
+            </a:r>
+            <a:r>
+              <a:rPr lang="de-CH" dirty="0"/>
+              <a:t> </a:t>
+            </a:r>
+            <a:r>
+              <a:rPr lang="de-CH" dirty="0" err="1"/>
+              <a:t>Buzzwords</a:t>
             </a:r>
             <a:endParaRPr lang="de-CH" dirty="0"/>
           </a:p>
@@ -17214,8 +17408,16 @@
           <a:lstStyle/>
           <a:p>
             <a:r>
-              <a:rPr lang="de-CH" dirty="0" smtClean="0"/>
-              <a:t>Buzzword cleanup</a:t>
+              <a:rPr lang="de-CH" dirty="0" err="1"/>
+              <a:t>Demystifying</a:t>
+            </a:r>
+            <a:r>
+              <a:rPr lang="de-CH" dirty="0"/>
+              <a:t> </a:t>
+            </a:r>
+            <a:r>
+              <a:rPr lang="de-CH" dirty="0" err="1"/>
+              <a:t>Buzzwords</a:t>
             </a:r>
             <a:endParaRPr lang="de-CH" dirty="0"/>
           </a:p>
@@ -17774,8 +17976,16 @@
           <a:lstStyle/>
           <a:p>
             <a:r>
-              <a:rPr lang="de-CH" dirty="0" smtClean="0"/>
-              <a:t>Buzzword cleanup</a:t>
+              <a:rPr lang="de-CH" dirty="0" err="1"/>
+              <a:t>Demystifying</a:t>
+            </a:r>
+            <a:r>
+              <a:rPr lang="de-CH" dirty="0"/>
+              <a:t> </a:t>
+            </a:r>
+            <a:r>
+              <a:rPr lang="de-CH" dirty="0" err="1"/>
+              <a:t>Buzzwords</a:t>
             </a:r>
             <a:endParaRPr lang="de-CH" dirty="0"/>
           </a:p>
@@ -18338,8 +18548,16 @@
           <a:lstStyle/>
           <a:p>
             <a:r>
-              <a:rPr lang="de-CH" dirty="0" smtClean="0"/>
-              <a:t>Buzzword cleanup</a:t>
+              <a:rPr lang="de-CH" dirty="0" err="1"/>
+              <a:t>Demystifying</a:t>
+            </a:r>
+            <a:r>
+              <a:rPr lang="de-CH" dirty="0"/>
+              <a:t> </a:t>
+            </a:r>
+            <a:r>
+              <a:rPr lang="de-CH" dirty="0" err="1"/>
+              <a:t>Buzzwords</a:t>
             </a:r>
             <a:endParaRPr lang="de-CH" dirty="0"/>
           </a:p>
@@ -18894,8 +19112,16 @@
           <a:lstStyle/>
           <a:p>
             <a:r>
-              <a:rPr lang="de-CH" dirty="0" smtClean="0"/>
-              <a:t>Buzzword cleanup</a:t>
+              <a:rPr lang="de-CH" dirty="0" err="1"/>
+              <a:t>Demystifying</a:t>
+            </a:r>
+            <a:r>
+              <a:rPr lang="de-CH" dirty="0"/>
+              <a:t> </a:t>
+            </a:r>
+            <a:r>
+              <a:rPr lang="de-CH" dirty="0" err="1"/>
+              <a:t>Buzzwords</a:t>
             </a:r>
             <a:endParaRPr lang="de-CH" dirty="0"/>
           </a:p>
@@ -19227,8 +19453,16 @@
           <a:lstStyle/>
           <a:p>
             <a:r>
-              <a:rPr lang="de-CH" dirty="0" smtClean="0"/>
-              <a:t>Buzzword cleanup</a:t>
+              <a:rPr lang="de-CH" dirty="0" err="1"/>
+              <a:t>Demystifying</a:t>
+            </a:r>
+            <a:r>
+              <a:rPr lang="de-CH" dirty="0"/>
+              <a:t> </a:t>
+            </a:r>
+            <a:r>
+              <a:rPr lang="de-CH" dirty="0" err="1"/>
+              <a:t>Buzzwords</a:t>
             </a:r>
             <a:endParaRPr lang="de-CH" dirty="0"/>
           </a:p>
@@ -19942,8 +20176,8 @@
         </p:nvSpPr>
         <p:spPr>
           <a:xfrm rot="20487536">
-            <a:off x="2174789" y="3282971"/>
-            <a:ext cx="6809878" cy="923330"/>
+            <a:off x="1887218" y="2993082"/>
+            <a:ext cx="8196475" cy="1200329"/>
           </a:xfrm>
           <a:prstGeom prst="rect">
             <a:avLst/>
@@ -19956,6 +20190,17 @@
           </a:bodyPr>
           <a:lstStyle/>
           <a:p>
+            <a:r>
+              <a:rPr lang="de-CH" sz="7200" b="1" dirty="0" smtClean="0">
+                <a:solidFill>
+                  <a:schemeClr val="tx2">
+                    <a:lumMod val="60000"/>
+                    <a:lumOff val="40000"/>
+                  </a:schemeClr>
+                </a:solidFill>
+              </a:rPr>
+              <a:t>Didaktischer</a:t>
+            </a:r>
             <a:r>
               <a:rPr lang="de-CH" sz="5400" b="1" dirty="0" smtClean="0">
                 <a:solidFill>
@@ -19965,7 +20210,7 @@
                   </a:schemeClr>
                 </a:solidFill>
               </a:rPr>
-              <a:t>Didaktischer Spoiler</a:t>
+              <a:t> Spoiler</a:t>
             </a:r>
             <a:endParaRPr lang="de-CH" sz="5400" b="1" dirty="0">
               <a:solidFill>
@@ -20403,10 +20648,10 @@
                                         </p:attrNameLst>
                                       </p:cBhvr>
                                       <p:to>
-                                        <p:strVal val="0.75"/>
+                                        <p:strVal val="0.9"/>
                                       </p:to>
                                     </p:set>
-                                    <p:animEffect filter="image" prLst="opacity: 0.75">
+                                    <p:animEffect filter="image" prLst="opacity: 0.9">
                                       <p:cBhvr rctx="IE">
                                         <p:cTn id="37" dur="indefinite"/>
                                         <p:tgtEl>
@@ -20442,10 +20687,10 @@
                                         </p:attrNameLst>
                                       </p:cBhvr>
                                       <p:to>
-                                        <p:strVal val="0.75"/>
+                                        <p:strVal val="0.5"/>
                                       </p:to>
                                     </p:set>
-                                    <p:animEffect filter="image" prLst="opacity: 0.75">
+                                    <p:animEffect filter="image" prLst="opacity: 0.5">
                                       <p:cBhvr rctx="IE">
                                         <p:cTn id="40" dur="indefinite"/>
                                         <p:tgtEl>
@@ -20481,10 +20726,10 @@
                                         </p:attrNameLst>
                                       </p:cBhvr>
                                       <p:to>
-                                        <p:strVal val="0.75"/>
+                                        <p:strVal val="0.5"/>
                                       </p:to>
                                     </p:set>
-                                    <p:animEffect filter="image" prLst="opacity: 0.75">
+                                    <p:animEffect filter="image" prLst="opacity: 0.5">
                                       <p:cBhvr rctx="IE">
                                         <p:cTn id="43" dur="indefinite"/>
                                         <p:tgtEl>
@@ -20520,10 +20765,10 @@
                                         </p:attrNameLst>
                                       </p:cBhvr>
                                       <p:to>
-                                        <p:strVal val="0.75"/>
+                                        <p:strVal val="0.5"/>
                                       </p:to>
                                     </p:set>
-                                    <p:animEffect filter="image" prLst="opacity: 0.75">
+                                    <p:animEffect filter="image" prLst="opacity: 0.5">
                                       <p:cBhvr rctx="IE">
                                         <p:cTn id="46" dur="indefinite"/>
                                         <p:tgtEl>
@@ -20559,10 +20804,10 @@
                                         </p:attrNameLst>
                                       </p:cBhvr>
                                       <p:to>
-                                        <p:strVal val="0.75"/>
+                                        <p:strVal val="0.5"/>
                                       </p:to>
                                     </p:set>
-                                    <p:animEffect filter="image" prLst="opacity: 0.75">
+                                    <p:animEffect filter="image" prLst="opacity: 0.5">
                                       <p:cBhvr rctx="IE">
                                         <p:cTn id="49" dur="indefinite"/>
                                         <p:tgtEl>
@@ -20598,10 +20843,10 @@
                                         </p:attrNameLst>
                                       </p:cBhvr>
                                       <p:to>
-                                        <p:strVal val="0.75"/>
+                                        <p:strVal val="0.5"/>
                                       </p:to>
                                     </p:set>
-                                    <p:animEffect filter="image" prLst="opacity: 0.75">
+                                    <p:animEffect filter="image" prLst="opacity: 0.5">
                                       <p:cBhvr rctx="IE">
                                         <p:cTn id="52" dur="indefinite"/>
                                         <p:tgtEl>
@@ -20671,7 +20916,7 @@
       </p:par>
     </p:tnLst>
     <p:bldLst>
-      <p:bldP spid="3" grpId="0" build="p"/>
+      <p:bldP spid="3" grpId="0" uiExpand="1" build="p"/>
       <p:bldP spid="4" grpId="0"/>
     </p:bldLst>
   </p:timing>
@@ -20737,6 +20982,10 @@
           <a:bodyPr/>
           <a:lstStyle/>
           <a:p>
+            <a:r>
+              <a:rPr lang="de-CH" dirty="0" smtClean="0"/>
+              <a:t>Die statistische Programmiersprache R und deren Integration in Visual Studio</a:t>
+            </a:r>
             <a:endParaRPr lang="de-CH" dirty="0"/>
           </a:p>
         </p:txBody>
@@ -21422,20 +21671,22 @@
         </p:nvSpPr>
         <p:spPr/>
         <p:txBody>
-          <a:bodyPr/>
-          <a:lstStyle/>
-          <a:p>
-            <a:r>
-              <a:rPr lang="de-CH" dirty="0" smtClean="0"/>
-              <a:t>Visual Studio 2017</a:t>
-            </a:r>
-            <a:endParaRPr lang="de-CH" dirty="0"/>
-          </a:p>
-        </p:txBody>
-      </p:sp>
-      <p:sp>
-        <p:nvSpPr>
-          <p:cNvPr id="3" name="Content Placeholder 2"/>
+          <a:bodyPr>
+            <a:normAutofit/>
+          </a:bodyPr>
+          <a:lstStyle/>
+          <a:p>
+            <a:r>
+              <a:rPr lang="de-CH" sz="3200" dirty="0" smtClean="0"/>
+              <a:t>Warum eine statistische Programmiersprache?</a:t>
+            </a:r>
+            <a:endParaRPr lang="de-CH" sz="3200" dirty="0"/>
+          </a:p>
+        </p:txBody>
+      </p:sp>
+      <p:sp>
+        <p:nvSpPr>
+          <p:cNvPr id="4" name="Content Placeholder 3"/>
           <p:cNvSpPr>
             <a:spLocks noGrp="1"/>
           </p:cNvSpPr>
@@ -21443,37 +21694,63 @@
             <p:ph idx="1"/>
           </p:nvPr>
         </p:nvSpPr>
-        <p:spPr>
-          <a:xfrm>
-            <a:off x="3502152" y="3099879"/>
-            <a:ext cx="4773169" cy="1618425"/>
-          </a:xfrm>
-        </p:spPr>
+        <p:spPr/>
         <p:txBody>
           <a:bodyPr>
             <a:normAutofit/>
           </a:bodyPr>
           <a:lstStyle/>
           <a:p>
-            <a:pPr marL="0" indent="0" algn="ctr">
+            <a:r>
+              <a:rPr lang="de-CH" dirty="0" err="1" smtClean="0"/>
+              <a:t>Machine</a:t>
+            </a:r>
+            <a:r>
+              <a:rPr lang="de-CH" dirty="0" smtClean="0"/>
+              <a:t> Learning ist ein Teilgebiet der Informatik</a:t>
+            </a:r>
+          </a:p>
+          <a:p>
+            <a:r>
+              <a:rPr lang="de-CH" dirty="0" smtClean="0"/>
+              <a:t>Statistik ist ein Teilgebiet der Mathematik</a:t>
+            </a:r>
+          </a:p>
+          <a:p>
+            <a:endParaRPr lang="de-CH" dirty="0" smtClean="0"/>
+          </a:p>
+          <a:p>
+            <a:pPr marL="0" indent="0">
               <a:buNone/>
             </a:pPr>
             <a:r>
-              <a:rPr lang="de-CH" i="1" dirty="0" smtClean="0"/>
-              <a:t>Kurze Thema in bekanntem Kontex</a:t>
-            </a:r>
-          </a:p>
-          <a:p>
-            <a:pPr marL="0" indent="0" algn="ctr">
+              <a:rPr lang="en-US" sz="1600" i="1" dirty="0" smtClean="0"/>
+              <a:t>ML </a:t>
+            </a:r>
+            <a:r>
+              <a:rPr lang="en-US" sz="1600" i="1" dirty="0"/>
+              <a:t>professional: “The model is 85% accurate in predicting Y, given a, b and c</a:t>
+            </a:r>
+            <a:r>
+              <a:rPr lang="en-US" sz="1600" i="1" dirty="0" smtClean="0"/>
+              <a:t>.”</a:t>
+            </a:r>
+          </a:p>
+          <a:p>
+            <a:pPr marL="0" indent="0">
               <a:buNone/>
             </a:pPr>
             <a:r>
-              <a:rPr lang="de-CH" sz="1300" i="1" dirty="0">
-                <a:hlinkClick r:id="rId3"/>
-              </a:rPr>
-              <a:t>https://github.com/huli/introduction-machine-learning/tree/master/visual-studio/HelloR</a:t>
-            </a:r>
-            <a:endParaRPr lang="de-CH" sz="1300" i="1" dirty="0"/>
+              <a:rPr lang="en-US" sz="1600" i="1" dirty="0"/>
+              <a:t>Statistician: “The model is 85% accurate in predicting Y, given a, b and c; and I am 90% certain that you will obtain the same result.”</a:t>
+            </a:r>
+            <a:endParaRPr lang="de-CH" sz="1600" dirty="0" smtClean="0"/>
+          </a:p>
+          <a:p>
+            <a:pPr marL="0" indent="0">
+              <a:buNone/>
+            </a:pPr>
+            <a:endParaRPr lang="de-CH" sz="4400" dirty="0"/>
           </a:p>
         </p:txBody>
       </p:sp>
@@ -21490,9 +21767,261 @@
   <p:timing>
     <p:tnLst>
       <p:par>
-        <p:cTn id="1" dur="indefinite" restart="never" nodeType="tmRoot"/>
+        <p:cTn id="1" dur="indefinite" restart="never" nodeType="tmRoot">
+          <p:childTnLst>
+            <p:seq concurrent="1" nextAc="seek">
+              <p:cTn id="2" dur="indefinite" nodeType="mainSeq">
+                <p:childTnLst>
+                  <p:par>
+                    <p:cTn id="3" fill="hold">
+                      <p:stCondLst>
+                        <p:cond delay="indefinite"/>
+                      </p:stCondLst>
+                      <p:childTnLst>
+                        <p:par>
+                          <p:cTn id="4" fill="hold">
+                            <p:stCondLst>
+                              <p:cond delay="0"/>
+                            </p:stCondLst>
+                            <p:childTnLst>
+                              <p:par>
+                                <p:cTn id="5" presetID="10" presetClass="entr" presetSubtype="0" fill="hold" grpId="0" nodeType="clickEffect">
+                                  <p:stCondLst>
+                                    <p:cond delay="0"/>
+                                  </p:stCondLst>
+                                  <p:childTnLst>
+                                    <p:set>
+                                      <p:cBhvr>
+                                        <p:cTn id="6" dur="1" fill="hold">
+                                          <p:stCondLst>
+                                            <p:cond delay="0"/>
+                                          </p:stCondLst>
+                                        </p:cTn>
+                                        <p:tgtEl>
+                                          <p:spTgt spid="4">
+                                            <p:txEl>
+                                              <p:pRg st="0" end="0"/>
+                                            </p:txEl>
+                                          </p:spTgt>
+                                        </p:tgtEl>
+                                        <p:attrNameLst>
+                                          <p:attrName>style.visibility</p:attrName>
+                                        </p:attrNameLst>
+                                      </p:cBhvr>
+                                      <p:to>
+                                        <p:strVal val="visible"/>
+                                      </p:to>
+                                    </p:set>
+                                    <p:animEffect transition="in" filter="fade">
+                                      <p:cBhvr>
+                                        <p:cTn id="7" dur="500"/>
+                                        <p:tgtEl>
+                                          <p:spTgt spid="4">
+                                            <p:txEl>
+                                              <p:pRg st="0" end="0"/>
+                                            </p:txEl>
+                                          </p:spTgt>
+                                        </p:tgtEl>
+                                      </p:cBhvr>
+                                    </p:animEffect>
+                                  </p:childTnLst>
+                                </p:cTn>
+                              </p:par>
+                            </p:childTnLst>
+                          </p:cTn>
+                        </p:par>
+                      </p:childTnLst>
+                    </p:cTn>
+                  </p:par>
+                  <p:par>
+                    <p:cTn id="8" fill="hold">
+                      <p:stCondLst>
+                        <p:cond delay="indefinite"/>
+                      </p:stCondLst>
+                      <p:childTnLst>
+                        <p:par>
+                          <p:cTn id="9" fill="hold">
+                            <p:stCondLst>
+                              <p:cond delay="0"/>
+                            </p:stCondLst>
+                            <p:childTnLst>
+                              <p:par>
+                                <p:cTn id="10" presetID="10" presetClass="entr" presetSubtype="0" fill="hold" grpId="0" nodeType="clickEffect">
+                                  <p:stCondLst>
+                                    <p:cond delay="0"/>
+                                  </p:stCondLst>
+                                  <p:childTnLst>
+                                    <p:set>
+                                      <p:cBhvr>
+                                        <p:cTn id="11" dur="1" fill="hold">
+                                          <p:stCondLst>
+                                            <p:cond delay="0"/>
+                                          </p:stCondLst>
+                                        </p:cTn>
+                                        <p:tgtEl>
+                                          <p:spTgt spid="4">
+                                            <p:txEl>
+                                              <p:pRg st="1" end="1"/>
+                                            </p:txEl>
+                                          </p:spTgt>
+                                        </p:tgtEl>
+                                        <p:attrNameLst>
+                                          <p:attrName>style.visibility</p:attrName>
+                                        </p:attrNameLst>
+                                      </p:cBhvr>
+                                      <p:to>
+                                        <p:strVal val="visible"/>
+                                      </p:to>
+                                    </p:set>
+                                    <p:animEffect transition="in" filter="fade">
+                                      <p:cBhvr>
+                                        <p:cTn id="12" dur="500"/>
+                                        <p:tgtEl>
+                                          <p:spTgt spid="4">
+                                            <p:txEl>
+                                              <p:pRg st="1" end="1"/>
+                                            </p:txEl>
+                                          </p:spTgt>
+                                        </p:tgtEl>
+                                      </p:cBhvr>
+                                    </p:animEffect>
+                                  </p:childTnLst>
+                                </p:cTn>
+                              </p:par>
+                            </p:childTnLst>
+                          </p:cTn>
+                        </p:par>
+                      </p:childTnLst>
+                    </p:cTn>
+                  </p:par>
+                  <p:par>
+                    <p:cTn id="13" fill="hold">
+                      <p:stCondLst>
+                        <p:cond delay="indefinite"/>
+                      </p:stCondLst>
+                      <p:childTnLst>
+                        <p:par>
+                          <p:cTn id="14" fill="hold">
+                            <p:stCondLst>
+                              <p:cond delay="0"/>
+                            </p:stCondLst>
+                            <p:childTnLst>
+                              <p:par>
+                                <p:cTn id="15" presetID="10" presetClass="entr" presetSubtype="0" fill="hold" grpId="0" nodeType="clickEffect">
+                                  <p:stCondLst>
+                                    <p:cond delay="0"/>
+                                  </p:stCondLst>
+                                  <p:childTnLst>
+                                    <p:set>
+                                      <p:cBhvr>
+                                        <p:cTn id="16" dur="1" fill="hold">
+                                          <p:stCondLst>
+                                            <p:cond delay="0"/>
+                                          </p:stCondLst>
+                                        </p:cTn>
+                                        <p:tgtEl>
+                                          <p:spTgt spid="4">
+                                            <p:txEl>
+                                              <p:pRg st="3" end="3"/>
+                                            </p:txEl>
+                                          </p:spTgt>
+                                        </p:tgtEl>
+                                        <p:attrNameLst>
+                                          <p:attrName>style.visibility</p:attrName>
+                                        </p:attrNameLst>
+                                      </p:cBhvr>
+                                      <p:to>
+                                        <p:strVal val="visible"/>
+                                      </p:to>
+                                    </p:set>
+                                    <p:animEffect transition="in" filter="fade">
+                                      <p:cBhvr>
+                                        <p:cTn id="17" dur="500"/>
+                                        <p:tgtEl>
+                                          <p:spTgt spid="4">
+                                            <p:txEl>
+                                              <p:pRg st="3" end="3"/>
+                                            </p:txEl>
+                                          </p:spTgt>
+                                        </p:tgtEl>
+                                      </p:cBhvr>
+                                    </p:animEffect>
+                                  </p:childTnLst>
+                                </p:cTn>
+                              </p:par>
+                              <p:par>
+                                <p:cTn id="18" presetID="10" presetClass="entr" presetSubtype="0" fill="hold" grpId="0" nodeType="withEffect">
+                                  <p:stCondLst>
+                                    <p:cond delay="0"/>
+                                  </p:stCondLst>
+                                  <p:childTnLst>
+                                    <p:set>
+                                      <p:cBhvr>
+                                        <p:cTn id="19" dur="1" fill="hold">
+                                          <p:stCondLst>
+                                            <p:cond delay="0"/>
+                                          </p:stCondLst>
+                                        </p:cTn>
+                                        <p:tgtEl>
+                                          <p:spTgt spid="4">
+                                            <p:txEl>
+                                              <p:pRg st="4" end="4"/>
+                                            </p:txEl>
+                                          </p:spTgt>
+                                        </p:tgtEl>
+                                        <p:attrNameLst>
+                                          <p:attrName>style.visibility</p:attrName>
+                                        </p:attrNameLst>
+                                      </p:cBhvr>
+                                      <p:to>
+                                        <p:strVal val="visible"/>
+                                      </p:to>
+                                    </p:set>
+                                    <p:animEffect transition="in" filter="fade">
+                                      <p:cBhvr>
+                                        <p:cTn id="20" dur="500"/>
+                                        <p:tgtEl>
+                                          <p:spTgt spid="4">
+                                            <p:txEl>
+                                              <p:pRg st="4" end="4"/>
+                                            </p:txEl>
+                                          </p:spTgt>
+                                        </p:tgtEl>
+                                      </p:cBhvr>
+                                    </p:animEffect>
+                                  </p:childTnLst>
+                                </p:cTn>
+                              </p:par>
+                            </p:childTnLst>
+                          </p:cTn>
+                        </p:par>
+                      </p:childTnLst>
+                    </p:cTn>
+                  </p:par>
+                </p:childTnLst>
+              </p:cTn>
+              <p:prevCondLst>
+                <p:cond evt="onPrev" delay="0">
+                  <p:tgtEl>
+                    <p:sldTgt/>
+                  </p:tgtEl>
+                </p:cond>
+              </p:prevCondLst>
+              <p:nextCondLst>
+                <p:cond evt="onNext" delay="0">
+                  <p:tgtEl>
+                    <p:sldTgt/>
+                  </p:tgtEl>
+                </p:cond>
+              </p:nextCondLst>
+            </p:seq>
+          </p:childTnLst>
+        </p:cTn>
       </p:par>
     </p:tnLst>
+    <p:bldLst>
+      <p:bldP spid="4" grpId="0" uiExpand="1" build="p"/>
+    </p:bldLst>
   </p:timing>
 </p:sld>
 </file>
@@ -21526,6 +22055,488 @@
         </p:nvSpPr>
         <p:spPr/>
         <p:txBody>
+          <a:bodyPr>
+            <a:normAutofit/>
+          </a:bodyPr>
+          <a:lstStyle/>
+          <a:p>
+            <a:r>
+              <a:rPr lang="de-CH" sz="3200" dirty="0" smtClean="0"/>
+              <a:t>Warum eine statistische Programmiersprache?</a:t>
+            </a:r>
+            <a:endParaRPr lang="de-CH" sz="3200" dirty="0"/>
+          </a:p>
+        </p:txBody>
+      </p:sp>
+      <p:sp>
+        <p:nvSpPr>
+          <p:cNvPr id="4" name="Content Placeholder 3"/>
+          <p:cNvSpPr>
+            <a:spLocks noGrp="1"/>
+          </p:cNvSpPr>
+          <p:nvPr>
+            <p:ph idx="1"/>
+          </p:nvPr>
+        </p:nvSpPr>
+        <p:spPr/>
+        <p:txBody>
+          <a:bodyPr/>
+          <a:lstStyle/>
+          <a:p>
+            <a:pPr marL="0" indent="0" algn="ctr">
+              <a:buNone/>
+            </a:pPr>
+            <a:endParaRPr lang="de-CH" dirty="0" smtClean="0"/>
+          </a:p>
+          <a:p>
+            <a:pPr marL="0" indent="0" algn="ctr">
+              <a:buNone/>
+            </a:pPr>
+            <a:r>
+              <a:rPr lang="de-CH" sz="2000" dirty="0" smtClean="0"/>
+              <a:t>beschäftigen sich mit der gleichen Frage</a:t>
+            </a:r>
+            <a:endParaRPr lang="de-CH" sz="4000" dirty="0" smtClean="0"/>
+          </a:p>
+          <a:p>
+            <a:pPr marL="0" indent="0" algn="ctr">
+              <a:buNone/>
+            </a:pPr>
+            <a:r>
+              <a:rPr lang="de-CH" sz="4400" dirty="0" smtClean="0"/>
+              <a:t>Wie lernen wir von Daten?</a:t>
+            </a:r>
+            <a:endParaRPr lang="de-CH" sz="4400" dirty="0"/>
+          </a:p>
+        </p:txBody>
+      </p:sp>
+      <p:sp>
+        <p:nvSpPr>
+          <p:cNvPr id="3" name="TextBox 2"/>
+          <p:cNvSpPr txBox="1"/>
+          <p:nvPr/>
+        </p:nvSpPr>
+        <p:spPr>
+          <a:xfrm>
+            <a:off x="2916380" y="4821382"/>
+            <a:ext cx="6756978" cy="738664"/>
+          </a:xfrm>
+          <a:prstGeom prst="rect">
+            <a:avLst/>
+          </a:prstGeom>
+          <a:noFill/>
+        </p:spPr>
+        <p:txBody>
+          <a:bodyPr wrap="none" rtlCol="0">
+            <a:spAutoFit/>
+          </a:bodyPr>
+          <a:lstStyle/>
+          <a:p>
+            <a:r>
+              <a:rPr lang="de-CH" sz="2800" dirty="0" err="1" smtClean="0"/>
+              <a:t>Machine</a:t>
+            </a:r>
+            <a:r>
+              <a:rPr lang="de-CH" sz="2800" dirty="0" smtClean="0"/>
+              <a:t> Learning = </a:t>
+            </a:r>
+            <a:r>
+              <a:rPr lang="de-CH" sz="2800" dirty="0" err="1" smtClean="0"/>
+              <a:t>glorified</a:t>
+            </a:r>
+            <a:r>
+              <a:rPr lang="de-CH" sz="2800" dirty="0" smtClean="0"/>
+              <a:t> </a:t>
+            </a:r>
+            <a:r>
+              <a:rPr lang="de-CH" sz="2800" dirty="0" err="1" smtClean="0"/>
+              <a:t>statistics</a:t>
+            </a:r>
+            <a:r>
+              <a:rPr lang="de-CH" sz="2800" dirty="0" smtClean="0"/>
+              <a:t> </a:t>
+            </a:r>
+          </a:p>
+          <a:p>
+            <a:r>
+              <a:rPr lang="de-CH" sz="1400" dirty="0" smtClean="0"/>
+              <a:t>(</a:t>
+            </a:r>
+            <a:r>
+              <a:rPr lang="en-US" sz="1400" dirty="0" smtClean="0"/>
+              <a:t>R. </a:t>
+            </a:r>
+            <a:r>
+              <a:rPr lang="en-US" sz="1400" dirty="0" err="1"/>
+              <a:t>Tibshirani</a:t>
+            </a:r>
+            <a:r>
+              <a:rPr lang="en-US" sz="1400" dirty="0"/>
+              <a:t>, a statistician and machine learning expert at </a:t>
+            </a:r>
+            <a:r>
+              <a:rPr lang="en-US" sz="1400" dirty="0" smtClean="0"/>
+              <a:t>Stanford)</a:t>
+            </a:r>
+            <a:endParaRPr lang="de-CH" sz="1400" dirty="0"/>
+          </a:p>
+        </p:txBody>
+      </p:sp>
+    </p:spTree>
+    <p:extLst>
+      <p:ext uri="{BB962C8B-B14F-4D97-AF65-F5344CB8AC3E}">
+        <p14:creationId xmlns:p14="http://schemas.microsoft.com/office/powerpoint/2010/main" val="1658939079"/>
+      </p:ext>
+    </p:extLst>
+  </p:cSld>
+  <p:clrMapOvr>
+    <a:masterClrMapping/>
+  </p:clrMapOvr>
+  <p:timing>
+    <p:tnLst>
+      <p:par>
+        <p:cTn id="1" dur="indefinite" restart="never" nodeType="tmRoot">
+          <p:childTnLst>
+            <p:seq concurrent="1" nextAc="seek">
+              <p:cTn id="2" dur="indefinite" nodeType="mainSeq">
+                <p:childTnLst>
+                  <p:par>
+                    <p:cTn id="3" fill="hold">
+                      <p:stCondLst>
+                        <p:cond delay="indefinite"/>
+                      </p:stCondLst>
+                      <p:childTnLst>
+                        <p:par>
+                          <p:cTn id="4" fill="hold">
+                            <p:stCondLst>
+                              <p:cond delay="0"/>
+                            </p:stCondLst>
+                            <p:childTnLst>
+                              <p:par>
+                                <p:cTn id="5" presetID="10" presetClass="entr" presetSubtype="0" fill="hold" grpId="0" nodeType="clickEffect">
+                                  <p:stCondLst>
+                                    <p:cond delay="0"/>
+                                  </p:stCondLst>
+                                  <p:childTnLst>
+                                    <p:set>
+                                      <p:cBhvr>
+                                        <p:cTn id="6" dur="1" fill="hold">
+                                          <p:stCondLst>
+                                            <p:cond delay="0"/>
+                                          </p:stCondLst>
+                                        </p:cTn>
+                                        <p:tgtEl>
+                                          <p:spTgt spid="4">
+                                            <p:txEl>
+                                              <p:pRg st="1" end="1"/>
+                                            </p:txEl>
+                                          </p:spTgt>
+                                        </p:tgtEl>
+                                        <p:attrNameLst>
+                                          <p:attrName>style.visibility</p:attrName>
+                                        </p:attrNameLst>
+                                      </p:cBhvr>
+                                      <p:to>
+                                        <p:strVal val="visible"/>
+                                      </p:to>
+                                    </p:set>
+                                    <p:animEffect transition="in" filter="fade">
+                                      <p:cBhvr>
+                                        <p:cTn id="7" dur="500"/>
+                                        <p:tgtEl>
+                                          <p:spTgt spid="4">
+                                            <p:txEl>
+                                              <p:pRg st="1" end="1"/>
+                                            </p:txEl>
+                                          </p:spTgt>
+                                        </p:tgtEl>
+                                      </p:cBhvr>
+                                    </p:animEffect>
+                                  </p:childTnLst>
+                                </p:cTn>
+                              </p:par>
+                            </p:childTnLst>
+                          </p:cTn>
+                        </p:par>
+                      </p:childTnLst>
+                    </p:cTn>
+                  </p:par>
+                  <p:par>
+                    <p:cTn id="8" fill="hold">
+                      <p:stCondLst>
+                        <p:cond delay="indefinite"/>
+                      </p:stCondLst>
+                      <p:childTnLst>
+                        <p:par>
+                          <p:cTn id="9" fill="hold">
+                            <p:stCondLst>
+                              <p:cond delay="0"/>
+                            </p:stCondLst>
+                            <p:childTnLst>
+                              <p:par>
+                                <p:cTn id="10" presetID="10" presetClass="entr" presetSubtype="0" fill="hold" grpId="0" nodeType="clickEffect">
+                                  <p:stCondLst>
+                                    <p:cond delay="0"/>
+                                  </p:stCondLst>
+                                  <p:childTnLst>
+                                    <p:set>
+                                      <p:cBhvr>
+                                        <p:cTn id="11" dur="1" fill="hold">
+                                          <p:stCondLst>
+                                            <p:cond delay="0"/>
+                                          </p:stCondLst>
+                                        </p:cTn>
+                                        <p:tgtEl>
+                                          <p:spTgt spid="4">
+                                            <p:txEl>
+                                              <p:pRg st="2" end="2"/>
+                                            </p:txEl>
+                                          </p:spTgt>
+                                        </p:tgtEl>
+                                        <p:attrNameLst>
+                                          <p:attrName>style.visibility</p:attrName>
+                                        </p:attrNameLst>
+                                      </p:cBhvr>
+                                      <p:to>
+                                        <p:strVal val="visible"/>
+                                      </p:to>
+                                    </p:set>
+                                    <p:animEffect transition="in" filter="fade">
+                                      <p:cBhvr>
+                                        <p:cTn id="12" dur="500"/>
+                                        <p:tgtEl>
+                                          <p:spTgt spid="4">
+                                            <p:txEl>
+                                              <p:pRg st="2" end="2"/>
+                                            </p:txEl>
+                                          </p:spTgt>
+                                        </p:tgtEl>
+                                      </p:cBhvr>
+                                    </p:animEffect>
+                                  </p:childTnLst>
+                                </p:cTn>
+                              </p:par>
+                            </p:childTnLst>
+                          </p:cTn>
+                        </p:par>
+                      </p:childTnLst>
+                    </p:cTn>
+                  </p:par>
+                  <p:par>
+                    <p:cTn id="13" fill="hold">
+                      <p:stCondLst>
+                        <p:cond delay="indefinite"/>
+                      </p:stCondLst>
+                      <p:childTnLst>
+                        <p:par>
+                          <p:cTn id="14" fill="hold">
+                            <p:stCondLst>
+                              <p:cond delay="0"/>
+                            </p:stCondLst>
+                            <p:childTnLst>
+                              <p:par>
+                                <p:cTn id="15" presetID="14" presetClass="entr" presetSubtype="10" fill="hold" grpId="0" nodeType="clickEffect">
+                                  <p:stCondLst>
+                                    <p:cond delay="0"/>
+                                  </p:stCondLst>
+                                  <p:childTnLst>
+                                    <p:set>
+                                      <p:cBhvr>
+                                        <p:cTn id="16" dur="1" fill="hold">
+                                          <p:stCondLst>
+                                            <p:cond delay="0"/>
+                                          </p:stCondLst>
+                                        </p:cTn>
+                                        <p:tgtEl>
+                                          <p:spTgt spid="3"/>
+                                        </p:tgtEl>
+                                        <p:attrNameLst>
+                                          <p:attrName>style.visibility</p:attrName>
+                                        </p:attrNameLst>
+                                      </p:cBhvr>
+                                      <p:to>
+                                        <p:strVal val="visible"/>
+                                      </p:to>
+                                    </p:set>
+                                    <p:animEffect transition="in" filter="randombar(horizontal)">
+                                      <p:cBhvr>
+                                        <p:cTn id="17" dur="500"/>
+                                        <p:tgtEl>
+                                          <p:spTgt spid="3"/>
+                                        </p:tgtEl>
+                                      </p:cBhvr>
+                                    </p:animEffect>
+                                  </p:childTnLst>
+                                </p:cTn>
+                              </p:par>
+                            </p:childTnLst>
+                          </p:cTn>
+                        </p:par>
+                      </p:childTnLst>
+                    </p:cTn>
+                  </p:par>
+                </p:childTnLst>
+              </p:cTn>
+              <p:prevCondLst>
+                <p:cond evt="onPrev" delay="0">
+                  <p:tgtEl>
+                    <p:sldTgt/>
+                  </p:tgtEl>
+                </p:cond>
+              </p:prevCondLst>
+              <p:nextCondLst>
+                <p:cond evt="onNext" delay="0">
+                  <p:tgtEl>
+                    <p:sldTgt/>
+                  </p:tgtEl>
+                </p:cond>
+              </p:nextCondLst>
+            </p:seq>
+          </p:childTnLst>
+        </p:cTn>
+      </p:par>
+    </p:tnLst>
+    <p:bldLst>
+      <p:bldP spid="4" grpId="0" build="p"/>
+      <p:bldP spid="3" grpId="0"/>
+    </p:bldLst>
+  </p:timing>
+</p:sld>
+</file>
+
+<file path=ppt/slides/slide23.xml><?xml version="1.0" encoding="utf-8"?>
+<p:sld xmlns:a="http://schemas.openxmlformats.org/drawingml/2006/main" xmlns:r="http://schemas.openxmlformats.org/officeDocument/2006/relationships" xmlns:p="http://schemas.openxmlformats.org/presentationml/2006/main">
+  <p:cSld>
+    <p:spTree>
+      <p:nvGrpSpPr>
+        <p:cNvPr id="1" name=""/>
+        <p:cNvGrpSpPr/>
+        <p:nvPr/>
+      </p:nvGrpSpPr>
+      <p:grpSpPr>
+        <a:xfrm>
+          <a:off x="0" y="0"/>
+          <a:ext cx="0" cy="0"/>
+          <a:chOff x="0" y="0"/>
+          <a:chExt cx="0" cy="0"/>
+        </a:xfrm>
+      </p:grpSpPr>
+      <p:sp>
+        <p:nvSpPr>
+          <p:cNvPr id="2" name="Title 1"/>
+          <p:cNvSpPr>
+            <a:spLocks noGrp="1"/>
+          </p:cNvSpPr>
+          <p:nvPr>
+            <p:ph type="title"/>
+          </p:nvPr>
+        </p:nvSpPr>
+        <p:spPr/>
+        <p:txBody>
+          <a:bodyPr/>
+          <a:lstStyle/>
+          <a:p>
+            <a:r>
+              <a:rPr lang="de-CH" dirty="0" smtClean="0"/>
+              <a:t>Visual Studio 2017</a:t>
+            </a:r>
+            <a:endParaRPr lang="de-CH" dirty="0"/>
+          </a:p>
+        </p:txBody>
+      </p:sp>
+      <p:sp>
+        <p:nvSpPr>
+          <p:cNvPr id="3" name="Content Placeholder 2"/>
+          <p:cNvSpPr>
+            <a:spLocks noGrp="1"/>
+          </p:cNvSpPr>
+          <p:nvPr>
+            <p:ph idx="1"/>
+          </p:nvPr>
+        </p:nvSpPr>
+        <p:spPr>
+          <a:xfrm>
+            <a:off x="3502152" y="3099879"/>
+            <a:ext cx="4773169" cy="1618425"/>
+          </a:xfrm>
+        </p:spPr>
+        <p:txBody>
+          <a:bodyPr>
+            <a:normAutofit/>
+          </a:bodyPr>
+          <a:lstStyle/>
+          <a:p>
+            <a:pPr marL="0" indent="0" algn="ctr">
+              <a:buNone/>
+            </a:pPr>
+            <a:r>
+              <a:rPr lang="de-CH" i="1" dirty="0" smtClean="0"/>
+              <a:t>Kurze Thema in bekanntem Kontex</a:t>
+            </a:r>
+          </a:p>
+          <a:p>
+            <a:pPr marL="0" indent="0" algn="ctr">
+              <a:buNone/>
+            </a:pPr>
+            <a:r>
+              <a:rPr lang="de-CH" sz="1300" i="1" dirty="0">
+                <a:hlinkClick r:id="rId3"/>
+              </a:rPr>
+              <a:t>https://github.com/huli/introduction-machine-learning/tree/master/visual-studio/HelloR</a:t>
+            </a:r>
+            <a:endParaRPr lang="de-CH" sz="1300" i="1" dirty="0"/>
+          </a:p>
+        </p:txBody>
+      </p:sp>
+    </p:spTree>
+    <p:extLst>
+      <p:ext uri="{BB962C8B-B14F-4D97-AF65-F5344CB8AC3E}">
+        <p14:creationId xmlns:p14="http://schemas.microsoft.com/office/powerpoint/2010/main" val="2304250550"/>
+      </p:ext>
+    </p:extLst>
+  </p:cSld>
+  <p:clrMapOvr>
+    <a:masterClrMapping/>
+  </p:clrMapOvr>
+  <p:timing>
+    <p:tnLst>
+      <p:par>
+        <p:cTn id="1" dur="indefinite" restart="never" nodeType="tmRoot"/>
+      </p:par>
+    </p:tnLst>
+  </p:timing>
+</p:sld>
+</file>
+
+<file path=ppt/slides/slide24.xml><?xml version="1.0" encoding="utf-8"?>
+<p:sld xmlns:a="http://schemas.openxmlformats.org/drawingml/2006/main" xmlns:r="http://schemas.openxmlformats.org/officeDocument/2006/relationships" xmlns:p="http://schemas.openxmlformats.org/presentationml/2006/main">
+  <p:cSld>
+    <p:spTree>
+      <p:nvGrpSpPr>
+        <p:cNvPr id="1" name=""/>
+        <p:cNvGrpSpPr/>
+        <p:nvPr/>
+      </p:nvGrpSpPr>
+      <p:grpSpPr>
+        <a:xfrm>
+          <a:off x="0" y="0"/>
+          <a:ext cx="0" cy="0"/>
+          <a:chOff x="0" y="0"/>
+          <a:chExt cx="0" cy="0"/>
+        </a:xfrm>
+      </p:grpSpPr>
+      <p:sp>
+        <p:nvSpPr>
+          <p:cNvPr id="2" name="Title 1"/>
+          <p:cNvSpPr>
+            <a:spLocks noGrp="1"/>
+          </p:cNvSpPr>
+          <p:nvPr>
+            <p:ph type="title"/>
+          </p:nvPr>
+        </p:nvSpPr>
+        <p:spPr/>
+        <p:txBody>
           <a:bodyPr/>
           <a:lstStyle/>
           <a:p>
@@ -21552,6 +22563,10 @@
           <a:bodyPr/>
           <a:lstStyle/>
           <a:p>
+            <a:r>
+              <a:rPr lang="de-CH" dirty="0" smtClean="0"/>
+              <a:t>Die drei Hauptzweige von maschinellem Lernen und deren Anwendung</a:t>
+            </a:r>
             <a:endParaRPr lang="de-CH" dirty="0"/>
           </a:p>
         </p:txBody>
@@ -21576,7 +22591,7 @@
 </p:sld>
 </file>
 
-<file path=ppt/slides/slide23.xml><?xml version="1.0" encoding="utf-8"?>
+<file path=ppt/slides/slide25.xml><?xml version="1.0" encoding="utf-8"?>
 <p:sld xmlns:a="http://schemas.openxmlformats.org/drawingml/2006/main" xmlns:r="http://schemas.openxmlformats.org/officeDocument/2006/relationships" xmlns:p="http://schemas.openxmlformats.org/presentationml/2006/main">
   <p:cSld>
     <p:spTree>
@@ -21916,7 +22931,7 @@
 </p:sld>
 </file>
 
-<file path=ppt/slides/slide24.xml><?xml version="1.0" encoding="utf-8"?>
+<file path=ppt/slides/slide26.xml><?xml version="1.0" encoding="utf-8"?>
 <p:sld xmlns:a="http://schemas.openxmlformats.org/drawingml/2006/main" xmlns:r="http://schemas.openxmlformats.org/officeDocument/2006/relationships" xmlns:p="http://schemas.openxmlformats.org/presentationml/2006/main">
   <p:cSld>
     <p:spTree>
@@ -22138,198 +23153,6 @@
 </p:sld>
 </file>
 
-<file path=ppt/slides/slide25.xml><?xml version="1.0" encoding="utf-8"?>
-<p:sld xmlns:a="http://schemas.openxmlformats.org/drawingml/2006/main" xmlns:r="http://schemas.openxmlformats.org/officeDocument/2006/relationships" xmlns:p="http://schemas.openxmlformats.org/presentationml/2006/main">
-  <p:cSld>
-    <p:spTree>
-      <p:nvGrpSpPr>
-        <p:cNvPr id="1" name=""/>
-        <p:cNvGrpSpPr/>
-        <p:nvPr/>
-      </p:nvGrpSpPr>
-      <p:grpSpPr>
-        <a:xfrm>
-          <a:off x="0" y="0"/>
-          <a:ext cx="0" cy="0"/>
-          <a:chOff x="0" y="0"/>
-          <a:chExt cx="0" cy="0"/>
-        </a:xfrm>
-      </p:grpSpPr>
-      <p:sp>
-        <p:nvSpPr>
-          <p:cNvPr id="2" name="Title 1"/>
-          <p:cNvSpPr>
-            <a:spLocks noGrp="1"/>
-          </p:cNvSpPr>
-          <p:nvPr>
-            <p:ph type="title"/>
-          </p:nvPr>
-        </p:nvSpPr>
-        <p:spPr/>
-        <p:txBody>
-          <a:bodyPr/>
-          <a:lstStyle/>
-          <a:p>
-            <a:r>
-              <a:rPr lang="de-CH" dirty="0" smtClean="0"/>
-              <a:t>Uns</a:t>
-            </a:r>
-            <a:r>
-              <a:rPr lang="de-CH" dirty="0" smtClean="0"/>
-              <a:t>upervised Learning</a:t>
-            </a:r>
-            <a:endParaRPr lang="de-CH" dirty="0"/>
-          </a:p>
-        </p:txBody>
-      </p:sp>
-      <p:sp>
-        <p:nvSpPr>
-          <p:cNvPr id="3" name="Content Placeholder 2"/>
-          <p:cNvSpPr>
-            <a:spLocks noGrp="1"/>
-          </p:cNvSpPr>
-          <p:nvPr>
-            <p:ph idx="1"/>
-          </p:nvPr>
-        </p:nvSpPr>
-        <p:spPr/>
-        <p:txBody>
-          <a:bodyPr>
-            <a:normAutofit/>
-          </a:bodyPr>
-          <a:lstStyle/>
-          <a:p>
-            <a:pPr marL="457200" indent="-457200">
-              <a:buFont typeface="+mj-lt"/>
-              <a:buAutoNum type="arabicPeriod"/>
-            </a:pPr>
-            <a:r>
-              <a:rPr lang="de-CH" dirty="0" smtClean="0"/>
-              <a:t>Keine geordneten (labeled) Daten</a:t>
-            </a:r>
-          </a:p>
-          <a:p>
-            <a:pPr marL="457200" indent="-457200">
-              <a:buFont typeface="+mj-lt"/>
-              <a:buAutoNum type="arabicPeriod"/>
-            </a:pPr>
-            <a:r>
-              <a:rPr lang="de-CH" dirty="0" smtClean="0"/>
-              <a:t>Schlüsse werden gezogen</a:t>
-            </a:r>
-          </a:p>
-          <a:p>
-            <a:pPr marL="457200" indent="-457200">
-              <a:buFont typeface="+mj-lt"/>
-              <a:buAutoNum type="arabicPeriod"/>
-            </a:pPr>
-            <a:r>
-              <a:rPr lang="de-CH" dirty="0" smtClean="0"/>
-              <a:t>Neue Strukturen/Muster werden erkannt </a:t>
-            </a:r>
-            <a:endParaRPr lang="de-CH" dirty="0"/>
-          </a:p>
-        </p:txBody>
-      </p:sp>
-    </p:spTree>
-    <p:extLst>
-      <p:ext uri="{BB962C8B-B14F-4D97-AF65-F5344CB8AC3E}">
-        <p14:creationId xmlns:p14="http://schemas.microsoft.com/office/powerpoint/2010/main" val="1554952212"/>
-      </p:ext>
-    </p:extLst>
-  </p:cSld>
-  <p:clrMapOvr>
-    <a:masterClrMapping/>
-  </p:clrMapOvr>
-  <p:timing>
-    <p:tnLst>
-      <p:par>
-        <p:cTn id="1" dur="indefinite" restart="never" nodeType="tmRoot"/>
-      </p:par>
-    </p:tnLst>
-  </p:timing>
-</p:sld>
-</file>
-
-<file path=ppt/slides/slide26.xml><?xml version="1.0" encoding="utf-8"?>
-<p:sld xmlns:a="http://schemas.openxmlformats.org/drawingml/2006/main" xmlns:r="http://schemas.openxmlformats.org/officeDocument/2006/relationships" xmlns:p="http://schemas.openxmlformats.org/presentationml/2006/main">
-  <p:cSld>
-    <p:spTree>
-      <p:nvGrpSpPr>
-        <p:cNvPr id="1" name=""/>
-        <p:cNvGrpSpPr/>
-        <p:nvPr/>
-      </p:nvGrpSpPr>
-      <p:grpSpPr>
-        <a:xfrm>
-          <a:off x="0" y="0"/>
-          <a:ext cx="0" cy="0"/>
-          <a:chOff x="0" y="0"/>
-          <a:chExt cx="0" cy="0"/>
-        </a:xfrm>
-      </p:grpSpPr>
-      <p:sp>
-        <p:nvSpPr>
-          <p:cNvPr id="2" name="Title 1"/>
-          <p:cNvSpPr>
-            <a:spLocks noGrp="1"/>
-          </p:cNvSpPr>
-          <p:nvPr>
-            <p:ph type="title"/>
-          </p:nvPr>
-        </p:nvSpPr>
-        <p:spPr/>
-        <p:txBody>
-          <a:bodyPr/>
-          <a:lstStyle/>
-          <a:p>
-            <a:r>
-              <a:rPr lang="de-CH" dirty="0" smtClean="0"/>
-              <a:t>Machine Learning by Example</a:t>
-            </a:r>
-            <a:endParaRPr lang="de-CH" dirty="0"/>
-          </a:p>
-        </p:txBody>
-      </p:sp>
-      <p:sp>
-        <p:nvSpPr>
-          <p:cNvPr id="4" name="Text Placeholder 3"/>
-          <p:cNvSpPr>
-            <a:spLocks noGrp="1"/>
-          </p:cNvSpPr>
-          <p:nvPr>
-            <p:ph type="body" idx="1"/>
-          </p:nvPr>
-        </p:nvSpPr>
-        <p:spPr/>
-        <p:txBody>
-          <a:bodyPr/>
-          <a:lstStyle/>
-          <a:p>
-            <a:endParaRPr lang="de-CH" dirty="0"/>
-          </a:p>
-        </p:txBody>
-      </p:sp>
-    </p:spTree>
-    <p:extLst>
-      <p:ext uri="{BB962C8B-B14F-4D97-AF65-F5344CB8AC3E}">
-        <p14:creationId xmlns:p14="http://schemas.microsoft.com/office/powerpoint/2010/main" val="3233697467"/>
-      </p:ext>
-    </p:extLst>
-  </p:cSld>
-  <p:clrMapOvr>
-    <a:masterClrMapping/>
-  </p:clrMapOvr>
-  <p:timing>
-    <p:tnLst>
-      <p:par>
-        <p:cTn id="1" dur="indefinite" restart="never" nodeType="tmRoot"/>
-      </p:par>
-    </p:tnLst>
-  </p:timing>
-</p:sld>
-</file>
-
 <file path=ppt/slides/slide27.xml><?xml version="1.0" encoding="utf-8"?>
 <p:sld xmlns:a="http://schemas.openxmlformats.org/drawingml/2006/main" xmlns:r="http://schemas.openxmlformats.org/officeDocument/2006/relationships" xmlns:p="http://schemas.openxmlformats.org/presentationml/2006/main">
   <p:cSld>
@@ -22364,7 +23187,7 @@
           <a:p>
             <a:r>
               <a:rPr lang="de-CH" dirty="0" smtClean="0"/>
-              <a:t>Machine Learning with RStudio</a:t>
+              <a:t>Unsupervised Learning</a:t>
             </a:r>
             <a:endParaRPr lang="de-CH" dirty="0"/>
           </a:p>
@@ -22380,44 +23203,49 @@
             <p:ph idx="1"/>
           </p:nvPr>
         </p:nvSpPr>
-        <p:spPr>
-          <a:xfrm>
-            <a:off x="3502152" y="3099879"/>
-            <a:ext cx="4773169" cy="1618425"/>
-          </a:xfrm>
-        </p:spPr>
+        <p:spPr/>
         <p:txBody>
           <a:bodyPr>
             <a:normAutofit/>
           </a:bodyPr>
           <a:lstStyle/>
           <a:p>
-            <a:pPr marL="0" indent="0" algn="ctr">
-              <a:buNone/>
+            <a:pPr marL="457200" indent="-457200">
+              <a:buFont typeface="+mj-lt"/>
+              <a:buAutoNum type="arabicPeriod"/>
             </a:pPr>
             <a:r>
-              <a:rPr lang="de-CH" i="1" dirty="0" smtClean="0"/>
-              <a:t>Walkthrough</a:t>
-            </a:r>
-          </a:p>
-          <a:p>
-            <a:pPr marL="0" indent="0" algn="ctr">
-              <a:buNone/>
+              <a:rPr lang="de-CH" dirty="0" smtClean="0"/>
+              <a:t>Keine geordneten (labeled) Daten</a:t>
+            </a:r>
+          </a:p>
+          <a:p>
+            <a:pPr marL="457200" indent="-457200">
+              <a:buFont typeface="+mj-lt"/>
+              <a:buAutoNum type="arabicPeriod"/>
             </a:pPr>
             <a:r>
-              <a:rPr lang="de-CH" sz="1300" i="1" dirty="0">
-                <a:hlinkClick r:id="rId3"/>
-              </a:rPr>
-              <a:t>https://github.com/huli/introduction-machine-learning/blob/master/walkthrough.R</a:t>
-            </a:r>
-            <a:endParaRPr lang="de-CH" sz="1300" i="1" dirty="0"/>
+              <a:rPr lang="de-CH" dirty="0" smtClean="0"/>
+              <a:t>Schlüsse werden gezogen</a:t>
+            </a:r>
+          </a:p>
+          <a:p>
+            <a:pPr marL="457200" indent="-457200">
+              <a:buFont typeface="+mj-lt"/>
+              <a:buAutoNum type="arabicPeriod"/>
+            </a:pPr>
+            <a:r>
+              <a:rPr lang="de-CH" dirty="0" smtClean="0"/>
+              <a:t>Neue Strukturen/Muster werden erkannt </a:t>
+            </a:r>
+            <a:endParaRPr lang="de-CH" dirty="0"/>
           </a:p>
         </p:txBody>
       </p:sp>
     </p:spTree>
     <p:extLst>
       <p:ext uri="{BB962C8B-B14F-4D97-AF65-F5344CB8AC3E}">
-        <p14:creationId xmlns:p14="http://schemas.microsoft.com/office/powerpoint/2010/main" val="590116814"/>
+        <p14:creationId xmlns:p14="http://schemas.microsoft.com/office/powerpoint/2010/main" val="1554952212"/>
       </p:ext>
     </p:extLst>
   </p:cSld>
@@ -22468,7 +23296,7 @@
           <a:p>
             <a:r>
               <a:rPr lang="de-CH" dirty="0" smtClean="0"/>
-              <a:t>Die 5 Fragen die ML beanworten kann </a:t>
+              <a:t>Machine Learning by Example</a:t>
             </a:r>
             <a:endParaRPr lang="de-CH" dirty="0"/>
           </a:p>
@@ -22489,6 +23317,284 @@
           <a:bodyPr/>
           <a:lstStyle/>
           <a:p>
+            <a:r>
+              <a:rPr lang="de-CH" dirty="0" err="1" smtClean="0"/>
+              <a:t>Walkthrough</a:t>
+            </a:r>
+            <a:r>
+              <a:rPr lang="de-CH" dirty="0" smtClean="0"/>
+              <a:t> durch ein praktisches Beispiel an einem konkreten Datensatz</a:t>
+            </a:r>
+            <a:endParaRPr lang="de-CH" dirty="0"/>
+          </a:p>
+        </p:txBody>
+      </p:sp>
+    </p:spTree>
+    <p:extLst>
+      <p:ext uri="{BB962C8B-B14F-4D97-AF65-F5344CB8AC3E}">
+        <p14:creationId xmlns:p14="http://schemas.microsoft.com/office/powerpoint/2010/main" val="3233697467"/>
+      </p:ext>
+    </p:extLst>
+  </p:cSld>
+  <p:clrMapOvr>
+    <a:masterClrMapping/>
+  </p:clrMapOvr>
+  <p:timing>
+    <p:tnLst>
+      <p:par>
+        <p:cTn id="1" dur="indefinite" restart="never" nodeType="tmRoot"/>
+      </p:par>
+    </p:tnLst>
+  </p:timing>
+</p:sld>
+</file>
+
+<file path=ppt/slides/slide29.xml><?xml version="1.0" encoding="utf-8"?>
+<p:sld xmlns:a="http://schemas.openxmlformats.org/drawingml/2006/main" xmlns:r="http://schemas.openxmlformats.org/officeDocument/2006/relationships" xmlns:p="http://schemas.openxmlformats.org/presentationml/2006/main">
+  <p:cSld>
+    <p:spTree>
+      <p:nvGrpSpPr>
+        <p:cNvPr id="1" name=""/>
+        <p:cNvGrpSpPr/>
+        <p:nvPr/>
+      </p:nvGrpSpPr>
+      <p:grpSpPr>
+        <a:xfrm>
+          <a:off x="0" y="0"/>
+          <a:ext cx="0" cy="0"/>
+          <a:chOff x="0" y="0"/>
+          <a:chExt cx="0" cy="0"/>
+        </a:xfrm>
+      </p:grpSpPr>
+      <p:sp>
+        <p:nvSpPr>
+          <p:cNvPr id="2" name="Title 1"/>
+          <p:cNvSpPr>
+            <a:spLocks noGrp="1"/>
+          </p:cNvSpPr>
+          <p:nvPr>
+            <p:ph type="title"/>
+          </p:nvPr>
+        </p:nvSpPr>
+        <p:spPr/>
+        <p:txBody>
+          <a:bodyPr/>
+          <a:lstStyle/>
+          <a:p>
+            <a:r>
+              <a:rPr lang="de-CH" dirty="0" smtClean="0"/>
+              <a:t>Machine Learning with RStudio</a:t>
+            </a:r>
+            <a:endParaRPr lang="de-CH" dirty="0"/>
+          </a:p>
+        </p:txBody>
+      </p:sp>
+      <p:sp>
+        <p:nvSpPr>
+          <p:cNvPr id="3" name="Content Placeholder 2"/>
+          <p:cNvSpPr>
+            <a:spLocks noGrp="1"/>
+          </p:cNvSpPr>
+          <p:nvPr>
+            <p:ph idx="1"/>
+          </p:nvPr>
+        </p:nvSpPr>
+        <p:spPr>
+          <a:xfrm>
+            <a:off x="3502152" y="3099879"/>
+            <a:ext cx="4773169" cy="1618425"/>
+          </a:xfrm>
+        </p:spPr>
+        <p:txBody>
+          <a:bodyPr>
+            <a:normAutofit/>
+          </a:bodyPr>
+          <a:lstStyle/>
+          <a:p>
+            <a:pPr marL="0" indent="0" algn="ctr">
+              <a:buNone/>
+            </a:pPr>
+            <a:r>
+              <a:rPr lang="de-CH" i="1" dirty="0" smtClean="0"/>
+              <a:t>Walkthrough</a:t>
+            </a:r>
+          </a:p>
+          <a:p>
+            <a:pPr marL="0" indent="0" algn="ctr">
+              <a:buNone/>
+            </a:pPr>
+            <a:r>
+              <a:rPr lang="de-CH" sz="1300" i="1" dirty="0">
+                <a:hlinkClick r:id="rId3"/>
+              </a:rPr>
+              <a:t>https://github.com/huli/introduction-machine-learning/blob/master/walkthrough.R</a:t>
+            </a:r>
+            <a:endParaRPr lang="de-CH" sz="1300" i="1" dirty="0"/>
+          </a:p>
+        </p:txBody>
+      </p:sp>
+    </p:spTree>
+    <p:extLst>
+      <p:ext uri="{BB962C8B-B14F-4D97-AF65-F5344CB8AC3E}">
+        <p14:creationId xmlns:p14="http://schemas.microsoft.com/office/powerpoint/2010/main" val="590116814"/>
+      </p:ext>
+    </p:extLst>
+  </p:cSld>
+  <p:clrMapOvr>
+    <a:masterClrMapping/>
+  </p:clrMapOvr>
+  <p:timing>
+    <p:tnLst>
+      <p:par>
+        <p:cTn id="1" dur="indefinite" restart="never" nodeType="tmRoot"/>
+      </p:par>
+    </p:tnLst>
+  </p:timing>
+</p:sld>
+</file>
+
+<file path=ppt/slides/slide3.xml><?xml version="1.0" encoding="utf-8"?>
+<p:sld xmlns:a="http://schemas.openxmlformats.org/drawingml/2006/main" xmlns:r="http://schemas.openxmlformats.org/officeDocument/2006/relationships" xmlns:p="http://schemas.openxmlformats.org/presentationml/2006/main">
+  <p:cSld>
+    <p:spTree>
+      <p:nvGrpSpPr>
+        <p:cNvPr id="1" name=""/>
+        <p:cNvGrpSpPr/>
+        <p:nvPr/>
+      </p:nvGrpSpPr>
+      <p:grpSpPr>
+        <a:xfrm>
+          <a:off x="0" y="0"/>
+          <a:ext cx="0" cy="0"/>
+          <a:chOff x="0" y="0"/>
+          <a:chExt cx="0" cy="0"/>
+        </a:xfrm>
+      </p:grpSpPr>
+      <p:sp>
+        <p:nvSpPr>
+          <p:cNvPr id="2" name="Title 1"/>
+          <p:cNvSpPr>
+            <a:spLocks noGrp="1"/>
+          </p:cNvSpPr>
+          <p:nvPr>
+            <p:ph type="title"/>
+          </p:nvPr>
+        </p:nvSpPr>
+        <p:spPr/>
+        <p:txBody>
+          <a:bodyPr/>
+          <a:lstStyle/>
+          <a:p>
+            <a:r>
+              <a:rPr lang="de-CH" dirty="0" smtClean="0"/>
+              <a:t>Was ist maschinelles Lernen?</a:t>
+            </a:r>
+            <a:endParaRPr lang="de-CH" dirty="0"/>
+          </a:p>
+        </p:txBody>
+      </p:sp>
+      <p:sp>
+        <p:nvSpPr>
+          <p:cNvPr id="4" name="Text Placeholder 3"/>
+          <p:cNvSpPr>
+            <a:spLocks noGrp="1"/>
+          </p:cNvSpPr>
+          <p:nvPr>
+            <p:ph type="body" idx="1"/>
+          </p:nvPr>
+        </p:nvSpPr>
+        <p:spPr/>
+        <p:txBody>
+          <a:bodyPr/>
+          <a:lstStyle/>
+          <a:p>
+            <a:r>
+              <a:rPr lang="de-CH" dirty="0" smtClean="0"/>
+              <a:t>Begriffliche Aufräumaktion und die Fragen die ML beantworten kann</a:t>
+            </a:r>
+            <a:endParaRPr lang="de-CH" dirty="0"/>
+          </a:p>
+        </p:txBody>
+      </p:sp>
+    </p:spTree>
+    <p:extLst>
+      <p:ext uri="{BB962C8B-B14F-4D97-AF65-F5344CB8AC3E}">
+        <p14:creationId xmlns:p14="http://schemas.microsoft.com/office/powerpoint/2010/main" val="3194009361"/>
+      </p:ext>
+    </p:extLst>
+  </p:cSld>
+  <p:clrMapOvr>
+    <a:masterClrMapping/>
+  </p:clrMapOvr>
+  <p:timing>
+    <p:tnLst>
+      <p:par>
+        <p:cTn id="1" dur="indefinite" restart="never" nodeType="tmRoot"/>
+      </p:par>
+    </p:tnLst>
+  </p:timing>
+</p:sld>
+</file>
+
+<file path=ppt/slides/slide30.xml><?xml version="1.0" encoding="utf-8"?>
+<p:sld xmlns:a="http://schemas.openxmlformats.org/drawingml/2006/main" xmlns:r="http://schemas.openxmlformats.org/officeDocument/2006/relationships" xmlns:p="http://schemas.openxmlformats.org/presentationml/2006/main">
+  <p:cSld>
+    <p:spTree>
+      <p:nvGrpSpPr>
+        <p:cNvPr id="1" name=""/>
+        <p:cNvGrpSpPr/>
+        <p:nvPr/>
+      </p:nvGrpSpPr>
+      <p:grpSpPr>
+        <a:xfrm>
+          <a:off x="0" y="0"/>
+          <a:ext cx="0" cy="0"/>
+          <a:chOff x="0" y="0"/>
+          <a:chExt cx="0" cy="0"/>
+        </a:xfrm>
+      </p:grpSpPr>
+      <p:sp>
+        <p:nvSpPr>
+          <p:cNvPr id="2" name="Title 1"/>
+          <p:cNvSpPr>
+            <a:spLocks noGrp="1"/>
+          </p:cNvSpPr>
+          <p:nvPr>
+            <p:ph type="title"/>
+          </p:nvPr>
+        </p:nvSpPr>
+        <p:spPr/>
+        <p:txBody>
+          <a:bodyPr/>
+          <a:lstStyle/>
+          <a:p>
+            <a:r>
+              <a:rPr lang="de-CH" dirty="0" smtClean="0"/>
+              <a:t>Die 5 Fragen die ML beanworten kann </a:t>
+            </a:r>
+            <a:endParaRPr lang="de-CH" dirty="0"/>
+          </a:p>
+        </p:txBody>
+      </p:sp>
+      <p:sp>
+        <p:nvSpPr>
+          <p:cNvPr id="4" name="Text Placeholder 3"/>
+          <p:cNvSpPr>
+            <a:spLocks noGrp="1"/>
+          </p:cNvSpPr>
+          <p:nvPr>
+            <p:ph type="body" idx="1"/>
+          </p:nvPr>
+        </p:nvSpPr>
+        <p:spPr/>
+        <p:txBody>
+          <a:bodyPr/>
+          <a:lstStyle/>
+          <a:p>
+            <a:r>
+              <a:rPr lang="de-CH" dirty="0" smtClean="0"/>
+              <a:t>Repetition und Verbindung der Praxis mit den Fragen von maschinellem Lernen</a:t>
+            </a:r>
             <a:endParaRPr lang="de-CH" dirty="0"/>
           </a:p>
         </p:txBody>
@@ -22513,7 +23619,7 @@
 </p:sld>
 </file>
 
-<file path=ppt/slides/slide29.xml><?xml version="1.0" encoding="utf-8"?>
+<file path=ppt/slides/slide31.xml><?xml version="1.0" encoding="utf-8"?>
 <p:sld xmlns:a="http://schemas.openxmlformats.org/drawingml/2006/main" xmlns:r="http://schemas.openxmlformats.org/officeDocument/2006/relationships" xmlns:p="http://schemas.openxmlformats.org/presentationml/2006/main" show="0">
   <p:cSld>
     <p:spTree>
@@ -22654,85 +23760,6 @@
 </p:sld>
 </file>
 
-<file path=ppt/slides/slide3.xml><?xml version="1.0" encoding="utf-8"?>
-<p:sld xmlns:a="http://schemas.openxmlformats.org/drawingml/2006/main" xmlns:r="http://schemas.openxmlformats.org/officeDocument/2006/relationships" xmlns:p="http://schemas.openxmlformats.org/presentationml/2006/main">
-  <p:cSld>
-    <p:spTree>
-      <p:nvGrpSpPr>
-        <p:cNvPr id="1" name=""/>
-        <p:cNvGrpSpPr/>
-        <p:nvPr/>
-      </p:nvGrpSpPr>
-      <p:grpSpPr>
-        <a:xfrm>
-          <a:off x="0" y="0"/>
-          <a:ext cx="0" cy="0"/>
-          <a:chOff x="0" y="0"/>
-          <a:chExt cx="0" cy="0"/>
-        </a:xfrm>
-      </p:grpSpPr>
-      <p:sp>
-        <p:nvSpPr>
-          <p:cNvPr id="2" name="Title 1"/>
-          <p:cNvSpPr>
-            <a:spLocks noGrp="1"/>
-          </p:cNvSpPr>
-          <p:nvPr>
-            <p:ph type="title"/>
-          </p:nvPr>
-        </p:nvSpPr>
-        <p:spPr/>
-        <p:txBody>
-          <a:bodyPr/>
-          <a:lstStyle/>
-          <a:p>
-            <a:r>
-              <a:rPr lang="de-CH" dirty="0" smtClean="0"/>
-              <a:t>Was ist maschinelles Lernen?</a:t>
-            </a:r>
-            <a:endParaRPr lang="de-CH" dirty="0"/>
-          </a:p>
-        </p:txBody>
-      </p:sp>
-      <p:sp>
-        <p:nvSpPr>
-          <p:cNvPr id="4" name="Text Placeholder 3"/>
-          <p:cNvSpPr>
-            <a:spLocks noGrp="1"/>
-          </p:cNvSpPr>
-          <p:nvPr>
-            <p:ph type="body" idx="1"/>
-          </p:nvPr>
-        </p:nvSpPr>
-        <p:spPr/>
-        <p:txBody>
-          <a:bodyPr/>
-          <a:lstStyle/>
-          <a:p>
-            <a:endParaRPr lang="de-CH" dirty="0"/>
-          </a:p>
-        </p:txBody>
-      </p:sp>
-    </p:spTree>
-    <p:extLst>
-      <p:ext uri="{BB962C8B-B14F-4D97-AF65-F5344CB8AC3E}">
-        <p14:creationId xmlns:p14="http://schemas.microsoft.com/office/powerpoint/2010/main" val="3194009361"/>
-      </p:ext>
-    </p:extLst>
-  </p:cSld>
-  <p:clrMapOvr>
-    <a:masterClrMapping/>
-  </p:clrMapOvr>
-  <p:timing>
-    <p:tnLst>
-      <p:par>
-        <p:cTn id="1" dur="indefinite" restart="never" nodeType="tmRoot"/>
-      </p:par>
-    </p:tnLst>
-  </p:timing>
-</p:sld>
-</file>
-
 <file path=ppt/slides/slide4.xml><?xml version="1.0" encoding="utf-8"?>
 <p:sld xmlns:a="http://schemas.openxmlformats.org/drawingml/2006/main" xmlns:r="http://schemas.openxmlformats.org/officeDocument/2006/relationships" xmlns:p="http://schemas.openxmlformats.org/presentationml/2006/main">
   <p:cSld>
@@ -22766,8 +23793,16 @@
           <a:lstStyle/>
           <a:p>
             <a:r>
+              <a:rPr lang="de-CH" dirty="0" err="1" smtClean="0"/>
+              <a:t>Demystifying</a:t>
+            </a:r>
+            <a:r>
               <a:rPr lang="de-CH" dirty="0" smtClean="0"/>
-              <a:t>Buzzword cleanup</a:t>
+              <a:t> </a:t>
+            </a:r>
+            <a:r>
+              <a:rPr lang="de-CH" dirty="0" err="1" smtClean="0"/>
+              <a:t>Buzzwords</a:t>
             </a:r>
             <a:endParaRPr lang="de-CH" dirty="0"/>
           </a:p>
@@ -23099,8 +24134,16 @@
           <a:lstStyle/>
           <a:p>
             <a:r>
-              <a:rPr lang="de-CH" dirty="0" smtClean="0"/>
-              <a:t>Buzzword cleanup</a:t>
+              <a:rPr lang="de-CH" dirty="0" err="1"/>
+              <a:t>Demystifying</a:t>
+            </a:r>
+            <a:r>
+              <a:rPr lang="de-CH" dirty="0"/>
+              <a:t> </a:t>
+            </a:r>
+            <a:r>
+              <a:rPr lang="de-CH" dirty="0" err="1"/>
+              <a:t>Buzzwords</a:t>
             </a:r>
             <a:endParaRPr lang="de-CH" dirty="0"/>
           </a:p>
@@ -23872,8 +24915,16 @@
           <a:lstStyle/>
           <a:p>
             <a:r>
-              <a:rPr lang="de-CH" dirty="0" smtClean="0"/>
-              <a:t>Buzzword cleanup</a:t>
+              <a:rPr lang="de-CH" dirty="0" err="1"/>
+              <a:t>Demystifying</a:t>
+            </a:r>
+            <a:r>
+              <a:rPr lang="de-CH" dirty="0"/>
+              <a:t> </a:t>
+            </a:r>
+            <a:r>
+              <a:rPr lang="de-CH" dirty="0" err="1"/>
+              <a:t>Buzzwords</a:t>
             </a:r>
             <a:endParaRPr lang="de-CH" dirty="0"/>
           </a:p>
@@ -24452,8 +25503,16 @@
           <a:lstStyle/>
           <a:p>
             <a:r>
-              <a:rPr lang="de-CH" dirty="0" smtClean="0"/>
-              <a:t>Buzzword cleanup</a:t>
+              <a:rPr lang="de-CH" dirty="0" err="1"/>
+              <a:t>Demystifying</a:t>
+            </a:r>
+            <a:r>
+              <a:rPr lang="de-CH" dirty="0"/>
+              <a:t> </a:t>
+            </a:r>
+            <a:r>
+              <a:rPr lang="de-CH" dirty="0" err="1"/>
+              <a:t>Buzzwords</a:t>
             </a:r>
             <a:endParaRPr lang="de-CH" dirty="0"/>
           </a:p>
@@ -25188,8 +26247,16 @@
           <a:lstStyle/>
           <a:p>
             <a:r>
-              <a:rPr lang="de-CH" dirty="0" smtClean="0"/>
-              <a:t>Buzzword cleanup</a:t>
+              <a:rPr lang="de-CH" dirty="0" err="1"/>
+              <a:t>Demystifying</a:t>
+            </a:r>
+            <a:r>
+              <a:rPr lang="de-CH" dirty="0"/>
+              <a:t> </a:t>
+            </a:r>
+            <a:r>
+              <a:rPr lang="de-CH" dirty="0" err="1"/>
+              <a:t>Buzzwords</a:t>
             </a:r>
             <a:endParaRPr lang="de-CH" dirty="0"/>
           </a:p>
@@ -25751,8 +26818,16 @@
           <a:lstStyle/>
           <a:p>
             <a:r>
-              <a:rPr lang="de-CH" dirty="0" smtClean="0"/>
-              <a:t>Buzzword cleanup</a:t>
+              <a:rPr lang="de-CH" dirty="0" err="1"/>
+              <a:t>Demystifying</a:t>
+            </a:r>
+            <a:r>
+              <a:rPr lang="de-CH" dirty="0"/>
+              <a:t> </a:t>
+            </a:r>
+            <a:r>
+              <a:rPr lang="de-CH" dirty="0" err="1"/>
+              <a:t>Buzzwords</a:t>
             </a:r>
             <a:endParaRPr lang="de-CH" dirty="0"/>
           </a:p>

</xml_diff>

<commit_message>
Added the performance index field guide.
</commit_message>
<xml_diff>
--- a/presentation.pptx
+++ b/presentation.pptx
@@ -238,7 +238,7 @@
           <a:p>
             <a:fld id="{7C9032C8-5182-4818-BB2B-C6DBA1F28B4F}" type="datetimeFigureOut">
               <a:rPr lang="de-CH" smtClean="0"/>
-              <a:t>15.10.2017</a:t>
+              <a:t>16.10.2017</a:t>
             </a:fld>
             <a:endParaRPr lang="de-CH"/>
           </a:p>
@@ -3071,7 +3071,7 @@
               <a:t> </a:t>
             </a:r>
             <a:r>
-              <a:rPr lang="de-CH" baseline="0" smtClean="0"/>
+              <a:rPr lang="de-CH" baseline="0" dirty="0" err="1" smtClean="0"/>
               <a:t>Negativity</a:t>
             </a:r>
             <a:endParaRPr lang="de-CH" baseline="0" dirty="0" smtClean="0"/>
@@ -4211,7 +4211,7 @@
           <a:noFill/>
           <a:extLst>
             <a:ext uri="{909E8E84-426E-40dd-AFC4-6F175D3DCCD1}">
-              <a14:hiddenFill xmlns="" xmlns:a14="http://schemas.microsoft.com/office/drawing/2010/main">
+              <a14:hiddenFill xmlns:a14="http://schemas.microsoft.com/office/drawing/2010/main" xmlns="">
                 <a:solidFill>
                   <a:srgbClr val="FFFFFF"/>
                 </a:solidFill>
@@ -4270,7 +4270,7 @@
             </a:ln>
             <a:extLst>
               <a:ext uri="{91240B29-F687-4f45-9708-019B960494DF}">
-                <a14:hiddenLine xmlns="" xmlns:a14="http://schemas.microsoft.com/office/drawing/2010/main" w="9525">
+                <a14:hiddenLine xmlns:a14="http://schemas.microsoft.com/office/drawing/2010/main" xmlns="" w="9525">
                   <a:solidFill>
                     <a:srgbClr val="000000"/>
                   </a:solidFill>
@@ -4360,7 +4360,7 @@
             </a:ln>
             <a:extLst>
               <a:ext uri="{91240B29-F687-4f45-9708-019B960494DF}">
-                <a14:hiddenLine xmlns="" xmlns:a14="http://schemas.microsoft.com/office/drawing/2010/main" w="9525">
+                <a14:hiddenLine xmlns:a14="http://schemas.microsoft.com/office/drawing/2010/main" xmlns="" w="9525">
                   <a:solidFill>
                     <a:srgbClr val="000000"/>
                   </a:solidFill>
@@ -4450,7 +4450,7 @@
             </a:ln>
             <a:extLst>
               <a:ext uri="{91240B29-F687-4f45-9708-019B960494DF}">
-                <a14:hiddenLine xmlns="" xmlns:a14="http://schemas.microsoft.com/office/drawing/2010/main" w="9525">
+                <a14:hiddenLine xmlns:a14="http://schemas.microsoft.com/office/drawing/2010/main" xmlns="" w="9525">
                   <a:solidFill>
                     <a:srgbClr val="000000"/>
                   </a:solidFill>
@@ -4484,7 +4484,7 @@
             </a:ln>
             <a:extLst>
               <a:ext uri="{91240B29-F687-4f45-9708-019B960494DF}">
-                <a14:hiddenLine xmlns="" xmlns:a14="http://schemas.microsoft.com/office/drawing/2010/main" w="9525">
+                <a14:hiddenLine xmlns:a14="http://schemas.microsoft.com/office/drawing/2010/main" xmlns="" w="9525">
                   <a:solidFill>
                     <a:srgbClr val="000000"/>
                   </a:solidFill>
@@ -4574,7 +4574,7 @@
             </a:ln>
             <a:extLst>
               <a:ext uri="{91240B29-F687-4f45-9708-019B960494DF}">
-                <a14:hiddenLine xmlns="" xmlns:a14="http://schemas.microsoft.com/office/drawing/2010/main" w="9525">
+                <a14:hiddenLine xmlns:a14="http://schemas.microsoft.com/office/drawing/2010/main" xmlns="" w="9525">
                   <a:solidFill>
                     <a:srgbClr val="000000"/>
                   </a:solidFill>
@@ -4636,7 +4636,7 @@
             </a:ln>
             <a:extLst>
               <a:ext uri="{91240B29-F687-4f45-9708-019B960494DF}">
-                <a14:hiddenLine xmlns="" xmlns:a14="http://schemas.microsoft.com/office/drawing/2010/main" w="9525">
+                <a14:hiddenLine xmlns:a14="http://schemas.microsoft.com/office/drawing/2010/main" xmlns="" w="9525">
                   <a:solidFill>
                     <a:srgbClr val="000000"/>
                   </a:solidFill>
@@ -4698,7 +4698,7 @@
             </a:ln>
             <a:extLst>
               <a:ext uri="{91240B29-F687-4f45-9708-019B960494DF}">
-                <a14:hiddenLine xmlns="" xmlns:a14="http://schemas.microsoft.com/office/drawing/2010/main" w="9525">
+                <a14:hiddenLine xmlns:a14="http://schemas.microsoft.com/office/drawing/2010/main" xmlns="" w="9525">
                   <a:solidFill>
                     <a:srgbClr val="000000"/>
                   </a:solidFill>
@@ -4788,7 +4788,7 @@
             </a:ln>
             <a:extLst>
               <a:ext uri="{91240B29-F687-4f45-9708-019B960494DF}">
-                <a14:hiddenLine xmlns="" xmlns:a14="http://schemas.microsoft.com/office/drawing/2010/main" w="9525">
+                <a14:hiddenLine xmlns:a14="http://schemas.microsoft.com/office/drawing/2010/main" xmlns="" w="9525">
                   <a:solidFill>
                     <a:srgbClr val="000000"/>
                   </a:solidFill>
@@ -4850,7 +4850,7 @@
             </a:ln>
             <a:extLst>
               <a:ext uri="{91240B29-F687-4f45-9708-019B960494DF}">
-                <a14:hiddenLine xmlns="" xmlns:a14="http://schemas.microsoft.com/office/drawing/2010/main" w="9525">
+                <a14:hiddenLine xmlns:a14="http://schemas.microsoft.com/office/drawing/2010/main" xmlns="" w="9525">
                   <a:solidFill>
                     <a:srgbClr val="000000"/>
                   </a:solidFill>
@@ -4912,7 +4912,7 @@
             </a:ln>
             <a:extLst>
               <a:ext uri="{91240B29-F687-4f45-9708-019B960494DF}">
-                <a14:hiddenLine xmlns="" xmlns:a14="http://schemas.microsoft.com/office/drawing/2010/main" w="9525">
+                <a14:hiddenLine xmlns:a14="http://schemas.microsoft.com/office/drawing/2010/main" xmlns="" w="9525">
                   <a:solidFill>
                     <a:srgbClr val="000000"/>
                   </a:solidFill>
@@ -5002,7 +5002,7 @@
             </a:ln>
             <a:extLst>
               <a:ext uri="{91240B29-F687-4f45-9708-019B960494DF}">
-                <a14:hiddenLine xmlns="" xmlns:a14="http://schemas.microsoft.com/office/drawing/2010/main" w="9525">
+                <a14:hiddenLine xmlns:a14="http://schemas.microsoft.com/office/drawing/2010/main" xmlns="" w="9525">
                   <a:solidFill>
                     <a:srgbClr val="000000"/>
                   </a:solidFill>
@@ -5092,7 +5092,7 @@
             </a:ln>
             <a:extLst>
               <a:ext uri="{91240B29-F687-4f45-9708-019B960494DF}">
-                <a14:hiddenLine xmlns="" xmlns:a14="http://schemas.microsoft.com/office/drawing/2010/main" w="9525">
+                <a14:hiddenLine xmlns:a14="http://schemas.microsoft.com/office/drawing/2010/main" xmlns="" w="9525">
                   <a:solidFill>
                     <a:srgbClr val="000000"/>
                   </a:solidFill>
@@ -5154,7 +5154,7 @@
             </a:ln>
             <a:extLst>
               <a:ext uri="{91240B29-F687-4f45-9708-019B960494DF}">
-                <a14:hiddenLine xmlns="" xmlns:a14="http://schemas.microsoft.com/office/drawing/2010/main" w="9525">
+                <a14:hiddenLine xmlns:a14="http://schemas.microsoft.com/office/drawing/2010/main" xmlns="" w="9525">
                   <a:solidFill>
                     <a:srgbClr val="000000"/>
                   </a:solidFill>
@@ -5264,7 +5264,7 @@
             </a:ln>
             <a:extLst>
               <a:ext uri="{91240B29-F687-4f45-9708-019B960494DF}">
-                <a14:hiddenLine xmlns="" xmlns:a14="http://schemas.microsoft.com/office/drawing/2010/main" w="9525">
+                <a14:hiddenLine xmlns:a14="http://schemas.microsoft.com/office/drawing/2010/main" xmlns="" w="9525">
                   <a:solidFill>
                     <a:srgbClr val="000000"/>
                   </a:solidFill>
@@ -5326,7 +5326,7 @@
             </a:ln>
             <a:extLst>
               <a:ext uri="{91240B29-F687-4f45-9708-019B960494DF}">
-                <a14:hiddenLine xmlns="" xmlns:a14="http://schemas.microsoft.com/office/drawing/2010/main" w="9525">
+                <a14:hiddenLine xmlns:a14="http://schemas.microsoft.com/office/drawing/2010/main" xmlns="" w="9525">
                   <a:solidFill>
                     <a:srgbClr val="000000"/>
                   </a:solidFill>
@@ -5416,7 +5416,7 @@
             </a:ln>
             <a:extLst>
               <a:ext uri="{91240B29-F687-4f45-9708-019B960494DF}">
-                <a14:hiddenLine xmlns="" xmlns:a14="http://schemas.microsoft.com/office/drawing/2010/main" w="9525">
+                <a14:hiddenLine xmlns:a14="http://schemas.microsoft.com/office/drawing/2010/main" xmlns="" w="9525">
                   <a:solidFill>
                     <a:srgbClr val="000000"/>
                   </a:solidFill>
@@ -5506,7 +5506,7 @@
             </a:ln>
             <a:extLst>
               <a:ext uri="{91240B29-F687-4f45-9708-019B960494DF}">
-                <a14:hiddenLine xmlns="" xmlns:a14="http://schemas.microsoft.com/office/drawing/2010/main" w="9525">
+                <a14:hiddenLine xmlns:a14="http://schemas.microsoft.com/office/drawing/2010/main" xmlns="" w="9525">
                   <a:solidFill>
                     <a:srgbClr val="000000"/>
                   </a:solidFill>
@@ -5568,7 +5568,7 @@
             </a:ln>
             <a:extLst>
               <a:ext uri="{91240B29-F687-4f45-9708-019B960494DF}">
-                <a14:hiddenLine xmlns="" xmlns:a14="http://schemas.microsoft.com/office/drawing/2010/main" w="9525">
+                <a14:hiddenLine xmlns:a14="http://schemas.microsoft.com/office/drawing/2010/main" xmlns="" w="9525">
                   <a:solidFill>
                     <a:srgbClr val="000000"/>
                   </a:solidFill>
@@ -5658,7 +5658,7 @@
             </a:ln>
             <a:extLst>
               <a:ext uri="{91240B29-F687-4f45-9708-019B960494DF}">
-                <a14:hiddenLine xmlns="" xmlns:a14="http://schemas.microsoft.com/office/drawing/2010/main" w="9525">
+                <a14:hiddenLine xmlns:a14="http://schemas.microsoft.com/office/drawing/2010/main" xmlns="" w="9525">
                   <a:solidFill>
                     <a:srgbClr val="000000"/>
                   </a:solidFill>
@@ -5748,7 +5748,7 @@
             </a:ln>
             <a:extLst>
               <a:ext uri="{91240B29-F687-4f45-9708-019B960494DF}">
-                <a14:hiddenLine xmlns="" xmlns:a14="http://schemas.microsoft.com/office/drawing/2010/main" w="9525">
+                <a14:hiddenLine xmlns:a14="http://schemas.microsoft.com/office/drawing/2010/main" xmlns="" w="9525">
                   <a:solidFill>
                     <a:srgbClr val="000000"/>
                   </a:solidFill>
@@ -5804,7 +5804,7 @@
             </a:ln>
             <a:extLst>
               <a:ext uri="{91240B29-F687-4f45-9708-019B960494DF}">
-                <a14:hiddenLine xmlns="" xmlns:a14="http://schemas.microsoft.com/office/drawing/2010/main" w="9525">
+                <a14:hiddenLine xmlns:a14="http://schemas.microsoft.com/office/drawing/2010/main" xmlns="" w="9525">
                   <a:solidFill>
                     <a:srgbClr val="000000"/>
                   </a:solidFill>
@@ -5894,7 +5894,7 @@
             </a:ln>
             <a:extLst>
               <a:ext uri="{91240B29-F687-4f45-9708-019B960494DF}">
-                <a14:hiddenLine xmlns="" xmlns:a14="http://schemas.microsoft.com/office/drawing/2010/main" w="9525">
+                <a14:hiddenLine xmlns:a14="http://schemas.microsoft.com/office/drawing/2010/main" xmlns="" w="9525">
                   <a:solidFill>
                     <a:srgbClr val="000000"/>
                   </a:solidFill>
@@ -5950,7 +5950,7 @@
             </a:ln>
             <a:extLst>
               <a:ext uri="{91240B29-F687-4f45-9708-019B960494DF}">
-                <a14:hiddenLine xmlns="" xmlns:a14="http://schemas.microsoft.com/office/drawing/2010/main" w="9525">
+                <a14:hiddenLine xmlns:a14="http://schemas.microsoft.com/office/drawing/2010/main" xmlns="" w="9525">
                   <a:solidFill>
                     <a:srgbClr val="000000"/>
                   </a:solidFill>
@@ -6040,7 +6040,7 @@
             </a:ln>
             <a:extLst>
               <a:ext uri="{91240B29-F687-4f45-9708-019B960494DF}">
-                <a14:hiddenLine xmlns="" xmlns:a14="http://schemas.microsoft.com/office/drawing/2010/main" w="9525">
+                <a14:hiddenLine xmlns:a14="http://schemas.microsoft.com/office/drawing/2010/main" xmlns="" w="9525">
                   <a:solidFill>
                     <a:srgbClr val="000000"/>
                   </a:solidFill>
@@ -6108,7 +6108,7 @@
             </a:ln>
             <a:extLst>
               <a:ext uri="{91240B29-F687-4f45-9708-019B960494DF}">
-                <a14:hiddenLine xmlns="" xmlns:a14="http://schemas.microsoft.com/office/drawing/2010/main" w="9525">
+                <a14:hiddenLine xmlns:a14="http://schemas.microsoft.com/office/drawing/2010/main" xmlns="" w="9525">
                   <a:solidFill>
                     <a:srgbClr val="000000"/>
                   </a:solidFill>
@@ -6198,7 +6198,7 @@
             </a:ln>
             <a:extLst>
               <a:ext uri="{91240B29-F687-4f45-9708-019B960494DF}">
-                <a14:hiddenLine xmlns="" xmlns:a14="http://schemas.microsoft.com/office/drawing/2010/main" w="9525">
+                <a14:hiddenLine xmlns:a14="http://schemas.microsoft.com/office/drawing/2010/main" xmlns="" w="9525">
                   <a:solidFill>
                     <a:srgbClr val="000000"/>
                   </a:solidFill>
@@ -6266,7 +6266,7 @@
             </a:ln>
             <a:extLst>
               <a:ext uri="{91240B29-F687-4f45-9708-019B960494DF}">
-                <a14:hiddenLine xmlns="" xmlns:a14="http://schemas.microsoft.com/office/drawing/2010/main" w="9525">
+                <a14:hiddenLine xmlns:a14="http://schemas.microsoft.com/office/drawing/2010/main" xmlns="" w="9525">
                   <a:solidFill>
                     <a:srgbClr val="000000"/>
                   </a:solidFill>
@@ -6356,7 +6356,7 @@
             </a:ln>
             <a:extLst>
               <a:ext uri="{91240B29-F687-4f45-9708-019B960494DF}">
-                <a14:hiddenLine xmlns="" xmlns:a14="http://schemas.microsoft.com/office/drawing/2010/main" w="9525">
+                <a14:hiddenLine xmlns:a14="http://schemas.microsoft.com/office/drawing/2010/main" xmlns="" w="9525">
                   <a:solidFill>
                     <a:srgbClr val="000000"/>
                   </a:solidFill>
@@ -6390,7 +6390,7 @@
             </a:ln>
             <a:extLst>
               <a:ext uri="{91240B29-F687-4f45-9708-019B960494DF}">
-                <a14:hiddenLine xmlns="" xmlns:a14="http://schemas.microsoft.com/office/drawing/2010/main" w="9525">
+                <a14:hiddenLine xmlns:a14="http://schemas.microsoft.com/office/drawing/2010/main" xmlns="" w="9525">
                   <a:solidFill>
                     <a:srgbClr val="000000"/>
                   </a:solidFill>
@@ -6480,7 +6480,7 @@
             </a:ln>
             <a:extLst>
               <a:ext uri="{91240B29-F687-4f45-9708-019B960494DF}">
-                <a14:hiddenLine xmlns="" xmlns:a14="http://schemas.microsoft.com/office/drawing/2010/main" w="9525">
+                <a14:hiddenLine xmlns:a14="http://schemas.microsoft.com/office/drawing/2010/main" xmlns="" w="9525">
                   <a:solidFill>
                     <a:srgbClr val="000000"/>
                   </a:solidFill>
@@ -6542,7 +6542,7 @@
             </a:ln>
             <a:extLst>
               <a:ext uri="{91240B29-F687-4f45-9708-019B960494DF}">
-                <a14:hiddenLine xmlns="" xmlns:a14="http://schemas.microsoft.com/office/drawing/2010/main" w="9525">
+                <a14:hiddenLine xmlns:a14="http://schemas.microsoft.com/office/drawing/2010/main" xmlns="" w="9525">
                   <a:solidFill>
                     <a:srgbClr val="000000"/>
                   </a:solidFill>
@@ -6604,7 +6604,7 @@
             </a:ln>
             <a:extLst>
               <a:ext uri="{91240B29-F687-4f45-9708-019B960494DF}">
-                <a14:hiddenLine xmlns="" xmlns:a14="http://schemas.microsoft.com/office/drawing/2010/main" w="9525">
+                <a14:hiddenLine xmlns:a14="http://schemas.microsoft.com/office/drawing/2010/main" xmlns="" w="9525">
                   <a:solidFill>
                     <a:srgbClr val="000000"/>
                   </a:solidFill>
@@ -6694,7 +6694,7 @@
             </a:ln>
             <a:extLst>
               <a:ext uri="{91240B29-F687-4f45-9708-019B960494DF}">
-                <a14:hiddenLine xmlns="" xmlns:a14="http://schemas.microsoft.com/office/drawing/2010/main" w="9525">
+                <a14:hiddenLine xmlns:a14="http://schemas.microsoft.com/office/drawing/2010/main" xmlns="" w="9525">
                   <a:solidFill>
                     <a:srgbClr val="000000"/>
                   </a:solidFill>
@@ -6762,7 +6762,7 @@
             </a:ln>
             <a:extLst>
               <a:ext uri="{91240B29-F687-4f45-9708-019B960494DF}">
-                <a14:hiddenLine xmlns="" xmlns:a14="http://schemas.microsoft.com/office/drawing/2010/main" w="9525">
+                <a14:hiddenLine xmlns:a14="http://schemas.microsoft.com/office/drawing/2010/main" xmlns="" w="9525">
                   <a:solidFill>
                     <a:srgbClr val="000000"/>
                   </a:solidFill>
@@ -6824,7 +6824,7 @@
             </a:ln>
             <a:extLst>
               <a:ext uri="{91240B29-F687-4f45-9708-019B960494DF}">
-                <a14:hiddenLine xmlns="" xmlns:a14="http://schemas.microsoft.com/office/drawing/2010/main" w="9525">
+                <a14:hiddenLine xmlns:a14="http://schemas.microsoft.com/office/drawing/2010/main" xmlns="" w="9525">
                   <a:solidFill>
                     <a:srgbClr val="000000"/>
                   </a:solidFill>
@@ -6914,7 +6914,7 @@
             </a:ln>
             <a:extLst>
               <a:ext uri="{91240B29-F687-4f45-9708-019B960494DF}">
-                <a14:hiddenLine xmlns="" xmlns:a14="http://schemas.microsoft.com/office/drawing/2010/main" w="9525">
+                <a14:hiddenLine xmlns:a14="http://schemas.microsoft.com/office/drawing/2010/main" xmlns="" w="9525">
                   <a:solidFill>
                     <a:srgbClr val="000000"/>
                   </a:solidFill>
@@ -6976,7 +6976,7 @@
             </a:ln>
             <a:extLst>
               <a:ext uri="{91240B29-F687-4f45-9708-019B960494DF}">
-                <a14:hiddenLine xmlns="" xmlns:a14="http://schemas.microsoft.com/office/drawing/2010/main" w="9525">
+                <a14:hiddenLine xmlns:a14="http://schemas.microsoft.com/office/drawing/2010/main" xmlns="" w="9525">
                   <a:solidFill>
                     <a:srgbClr val="000000"/>
                   </a:solidFill>
@@ -7066,7 +7066,7 @@
             </a:ln>
             <a:extLst>
               <a:ext uri="{91240B29-F687-4f45-9708-019B960494DF}">
-                <a14:hiddenLine xmlns="" xmlns:a14="http://schemas.microsoft.com/office/drawing/2010/main" w="9525">
+                <a14:hiddenLine xmlns:a14="http://schemas.microsoft.com/office/drawing/2010/main" xmlns="" w="9525">
                   <a:solidFill>
                     <a:srgbClr val="000000"/>
                   </a:solidFill>
@@ -7128,7 +7128,7 @@
             </a:ln>
             <a:extLst>
               <a:ext uri="{91240B29-F687-4f45-9708-019B960494DF}">
-                <a14:hiddenLine xmlns="" xmlns:a14="http://schemas.microsoft.com/office/drawing/2010/main" w="9525">
+                <a14:hiddenLine xmlns:a14="http://schemas.microsoft.com/office/drawing/2010/main" xmlns="" w="9525">
                   <a:solidFill>
                     <a:srgbClr val="000000"/>
                   </a:solidFill>
@@ -7218,7 +7218,7 @@
             </a:ln>
             <a:extLst>
               <a:ext uri="{91240B29-F687-4f45-9708-019B960494DF}">
-                <a14:hiddenLine xmlns="" xmlns:a14="http://schemas.microsoft.com/office/drawing/2010/main" w="9525">
+                <a14:hiddenLine xmlns:a14="http://schemas.microsoft.com/office/drawing/2010/main" xmlns="" w="9525">
                   <a:solidFill>
                     <a:srgbClr val="000000"/>
                   </a:solidFill>
@@ -7252,7 +7252,7 @@
             </a:ln>
             <a:extLst>
               <a:ext uri="{91240B29-F687-4f45-9708-019B960494DF}">
-                <a14:hiddenLine xmlns="" xmlns:a14="http://schemas.microsoft.com/office/drawing/2010/main" w="9525">
+                <a14:hiddenLine xmlns:a14="http://schemas.microsoft.com/office/drawing/2010/main" xmlns="" w="9525">
                   <a:solidFill>
                     <a:srgbClr val="000000"/>
                   </a:solidFill>
@@ -7317,7 +7317,7 @@
             </a:ln>
             <a:extLst>
               <a:ext uri="{91240B29-F687-4f45-9708-019B960494DF}">
-                <a14:hiddenLine xmlns="" xmlns:a14="http://schemas.microsoft.com/office/drawing/2010/main" w="9525">
+                <a14:hiddenLine xmlns:a14="http://schemas.microsoft.com/office/drawing/2010/main" xmlns="" w="9525">
                   <a:solidFill>
                     <a:srgbClr val="000000"/>
                   </a:solidFill>
@@ -7407,7 +7407,7 @@
             </a:ln>
             <a:extLst>
               <a:ext uri="{91240B29-F687-4f45-9708-019B960494DF}">
-                <a14:hiddenLine xmlns="" xmlns:a14="http://schemas.microsoft.com/office/drawing/2010/main" w="9525">
+                <a14:hiddenLine xmlns:a14="http://schemas.microsoft.com/office/drawing/2010/main" xmlns="" w="9525">
                   <a:solidFill>
                     <a:srgbClr val="000000"/>
                   </a:solidFill>
@@ -7469,7 +7469,7 @@
             </a:ln>
             <a:extLst>
               <a:ext uri="{91240B29-F687-4f45-9708-019B960494DF}">
-                <a14:hiddenLine xmlns="" xmlns:a14="http://schemas.microsoft.com/office/drawing/2010/main" w="9525">
+                <a14:hiddenLine xmlns:a14="http://schemas.microsoft.com/office/drawing/2010/main" xmlns="" w="9525">
                   <a:solidFill>
                     <a:srgbClr val="000000"/>
                   </a:solidFill>
@@ -7559,7 +7559,7 @@
             </a:ln>
             <a:extLst>
               <a:ext uri="{91240B29-F687-4f45-9708-019B960494DF}">
-                <a14:hiddenLine xmlns="" xmlns:a14="http://schemas.microsoft.com/office/drawing/2010/main" w="9525">
+                <a14:hiddenLine xmlns:a14="http://schemas.microsoft.com/office/drawing/2010/main" xmlns="" w="9525">
                   <a:solidFill>
                     <a:srgbClr val="000000"/>
                   </a:solidFill>
@@ -7649,7 +7649,7 @@
             </a:ln>
             <a:extLst>
               <a:ext uri="{91240B29-F687-4f45-9708-019B960494DF}">
-                <a14:hiddenLine xmlns="" xmlns:a14="http://schemas.microsoft.com/office/drawing/2010/main" w="9525">
+                <a14:hiddenLine xmlns:a14="http://schemas.microsoft.com/office/drawing/2010/main" xmlns="" w="9525">
                   <a:solidFill>
                     <a:srgbClr val="000000"/>
                   </a:solidFill>
@@ -7714,7 +7714,7 @@
             </a:ln>
             <a:extLst>
               <a:ext uri="{91240B29-F687-4f45-9708-019B960494DF}">
-                <a14:hiddenLine xmlns="" xmlns:a14="http://schemas.microsoft.com/office/drawing/2010/main" w="9525">
+                <a14:hiddenLine xmlns:a14="http://schemas.microsoft.com/office/drawing/2010/main" xmlns="" w="9525">
                   <a:solidFill>
                     <a:srgbClr val="000000"/>
                   </a:solidFill>
@@ -7776,7 +7776,7 @@
             </a:ln>
             <a:extLst>
               <a:ext uri="{91240B29-F687-4f45-9708-019B960494DF}">
-                <a14:hiddenLine xmlns="" xmlns:a14="http://schemas.microsoft.com/office/drawing/2010/main" w="9525">
+                <a14:hiddenLine xmlns:a14="http://schemas.microsoft.com/office/drawing/2010/main" xmlns="" w="9525">
                   <a:solidFill>
                     <a:srgbClr val="000000"/>
                   </a:solidFill>
@@ -7866,7 +7866,7 @@
             </a:ln>
             <a:extLst>
               <a:ext uri="{91240B29-F687-4f45-9708-019B960494DF}">
-                <a14:hiddenLine xmlns="" xmlns:a14="http://schemas.microsoft.com/office/drawing/2010/main" w="9525">
+                <a14:hiddenLine xmlns:a14="http://schemas.microsoft.com/office/drawing/2010/main" xmlns="" w="9525">
                   <a:solidFill>
                     <a:srgbClr val="000000"/>
                   </a:solidFill>
@@ -7956,7 +7956,7 @@
             </a:ln>
             <a:extLst>
               <a:ext uri="{91240B29-F687-4f45-9708-019B960494DF}">
-                <a14:hiddenLine xmlns="" xmlns:a14="http://schemas.microsoft.com/office/drawing/2010/main" w="9525">
+                <a14:hiddenLine xmlns:a14="http://schemas.microsoft.com/office/drawing/2010/main" xmlns="" w="9525">
                   <a:solidFill>
                     <a:srgbClr val="000000"/>
                   </a:solidFill>
@@ -8018,7 +8018,7 @@
             </a:ln>
             <a:extLst>
               <a:ext uri="{91240B29-F687-4f45-9708-019B960494DF}">
-                <a14:hiddenLine xmlns="" xmlns:a14="http://schemas.microsoft.com/office/drawing/2010/main" w="9525">
+                <a14:hiddenLine xmlns:a14="http://schemas.microsoft.com/office/drawing/2010/main" xmlns="" w="9525">
                   <a:solidFill>
                     <a:srgbClr val="000000"/>
                   </a:solidFill>
@@ -8138,7 +8138,7 @@
             </a:ln>
             <a:extLst>
               <a:ext uri="{91240B29-F687-4f45-9708-019B960494DF}">
-                <a14:hiddenLine xmlns="" xmlns:a14="http://schemas.microsoft.com/office/drawing/2010/main" w="9525">
+                <a14:hiddenLine xmlns:a14="http://schemas.microsoft.com/office/drawing/2010/main" xmlns="" w="9525">
                   <a:solidFill>
                     <a:srgbClr val="000000"/>
                   </a:solidFill>
@@ -8206,7 +8206,7 @@
             </a:ln>
             <a:extLst>
               <a:ext uri="{91240B29-F687-4f45-9708-019B960494DF}">
-                <a14:hiddenLine xmlns="" xmlns:a14="http://schemas.microsoft.com/office/drawing/2010/main" w="9525">
+                <a14:hiddenLine xmlns:a14="http://schemas.microsoft.com/office/drawing/2010/main" xmlns="" w="9525">
                   <a:solidFill>
                     <a:srgbClr val="000000"/>
                   </a:solidFill>
@@ -8296,7 +8296,7 @@
             </a:ln>
             <a:extLst>
               <a:ext uri="{91240B29-F687-4f45-9708-019B960494DF}">
-                <a14:hiddenLine xmlns="" xmlns:a14="http://schemas.microsoft.com/office/drawing/2010/main" w="9525">
+                <a14:hiddenLine xmlns:a14="http://schemas.microsoft.com/office/drawing/2010/main" xmlns="" w="9525">
                   <a:solidFill>
                     <a:srgbClr val="000000"/>
                   </a:solidFill>
@@ -8436,7 +8436,7 @@
           <a:p>
             <a:fld id="{48A87A34-81AB-432B-8DAE-1953F412C126}" type="datetimeFigureOut">
               <a:rPr lang="en-US" dirty="0"/>
-              <a:t>10/15/2017</a:t>
+              <a:t>10/16/2017</a:t>
             </a:fld>
             <a:endParaRPr lang="en-US" dirty="0"/>
           </a:p>
@@ -8698,7 +8698,7 @@
           <a:p>
             <a:fld id="{48A87A34-81AB-432B-8DAE-1953F412C126}" type="datetimeFigureOut">
               <a:rPr lang="en-US" dirty="0"/>
-              <a:t>10/15/2017</a:t>
+              <a:t>10/16/2017</a:t>
             </a:fld>
             <a:endParaRPr lang="en-US" dirty="0"/>
           </a:p>
@@ -8889,7 +8889,7 @@
           <a:p>
             <a:fld id="{48A87A34-81AB-432B-8DAE-1953F412C126}" type="datetimeFigureOut">
               <a:rPr lang="en-US" dirty="0"/>
-              <a:t>10/15/2017</a:t>
+              <a:t>10/16/2017</a:t>
             </a:fld>
             <a:endParaRPr lang="en-US" dirty="0"/>
           </a:p>
@@ -9147,7 +9147,7 @@
           <a:p>
             <a:fld id="{48A87A34-81AB-432B-8DAE-1953F412C126}" type="datetimeFigureOut">
               <a:rPr lang="en-US" dirty="0"/>
-              <a:t>10/15/2017</a:t>
+              <a:t>10/16/2017</a:t>
             </a:fld>
             <a:endParaRPr lang="en-US" dirty="0"/>
           </a:p>
@@ -9576,7 +9576,7 @@
           <a:p>
             <a:fld id="{48A87A34-81AB-432B-8DAE-1953F412C126}" type="datetimeFigureOut">
               <a:rPr lang="en-US" dirty="0"/>
-              <a:t>10/15/2017</a:t>
+              <a:t>10/16/2017</a:t>
             </a:fld>
             <a:endParaRPr lang="en-US" dirty="0"/>
           </a:p>
@@ -10117,7 +10117,7 @@
           <a:p>
             <a:fld id="{48A87A34-81AB-432B-8DAE-1953F412C126}" type="datetimeFigureOut">
               <a:rPr lang="en-US" dirty="0"/>
-              <a:t>10/15/2017</a:t>
+              <a:t>10/16/2017</a:t>
             </a:fld>
             <a:endParaRPr lang="en-US" dirty="0"/>
           </a:p>
@@ -10832,7 +10832,7 @@
           <a:p>
             <a:fld id="{48A87A34-81AB-432B-8DAE-1953F412C126}" type="datetimeFigureOut">
               <a:rPr lang="en-US" dirty="0"/>
-              <a:t>10/15/2017</a:t>
+              <a:t>10/16/2017</a:t>
             </a:fld>
             <a:endParaRPr lang="en-US" dirty="0"/>
           </a:p>
@@ -10997,7 +10997,7 @@
           <a:p>
             <a:fld id="{48A87A34-81AB-432B-8DAE-1953F412C126}" type="datetimeFigureOut">
               <a:rPr lang="en-US" dirty="0"/>
-              <a:t>10/15/2017</a:t>
+              <a:t>10/16/2017</a:t>
             </a:fld>
             <a:endParaRPr lang="en-US" dirty="0"/>
           </a:p>
@@ -11172,7 +11172,7 @@
           <a:p>
             <a:fld id="{48A87A34-81AB-432B-8DAE-1953F412C126}" type="datetimeFigureOut">
               <a:rPr lang="en-US" dirty="0"/>
-              <a:t>10/15/2017</a:t>
+              <a:t>10/16/2017</a:t>
             </a:fld>
             <a:endParaRPr lang="en-US" dirty="0"/>
           </a:p>
@@ -11337,7 +11337,7 @@
           <a:p>
             <a:fld id="{48A87A34-81AB-432B-8DAE-1953F412C126}" type="datetimeFigureOut">
               <a:rPr lang="en-US" dirty="0"/>
-              <a:t>10/15/2017</a:t>
+              <a:t>10/16/2017</a:t>
             </a:fld>
             <a:endParaRPr lang="en-US" dirty="0"/>
           </a:p>
@@ -11582,7 +11582,7 @@
           <a:p>
             <a:fld id="{48A87A34-81AB-432B-8DAE-1953F412C126}" type="datetimeFigureOut">
               <a:rPr lang="en-US" dirty="0"/>
-              <a:t>10/15/2017</a:t>
+              <a:t>10/16/2017</a:t>
             </a:fld>
             <a:endParaRPr lang="en-US" dirty="0"/>
           </a:p>
@@ -11809,7 +11809,7 @@
           <a:p>
             <a:fld id="{48A87A34-81AB-432B-8DAE-1953F412C126}" type="datetimeFigureOut">
               <a:rPr lang="en-US" dirty="0"/>
-              <a:t>10/15/2017</a:t>
+              <a:t>10/16/2017</a:t>
             </a:fld>
             <a:endParaRPr lang="en-US" dirty="0"/>
           </a:p>
@@ -12185,7 +12185,7 @@
           <a:p>
             <a:fld id="{48A87A34-81AB-432B-8DAE-1953F412C126}" type="datetimeFigureOut">
               <a:rPr lang="en-US" dirty="0"/>
-              <a:t>10/15/2017</a:t>
+              <a:t>10/16/2017</a:t>
             </a:fld>
             <a:endParaRPr lang="en-US" dirty="0"/>
           </a:p>
@@ -12298,7 +12298,7 @@
           <a:p>
             <a:fld id="{48A87A34-81AB-432B-8DAE-1953F412C126}" type="datetimeFigureOut">
               <a:rPr lang="en-US" dirty="0"/>
-              <a:t>10/15/2017</a:t>
+              <a:t>10/16/2017</a:t>
             </a:fld>
             <a:endParaRPr lang="en-US" dirty="0"/>
           </a:p>
@@ -12388,7 +12388,7 @@
           <a:p>
             <a:fld id="{48A87A34-81AB-432B-8DAE-1953F412C126}" type="datetimeFigureOut">
               <a:rPr lang="en-US" dirty="0"/>
-              <a:t>10/15/2017</a:t>
+              <a:t>10/16/2017</a:t>
             </a:fld>
             <a:endParaRPr lang="en-US" dirty="0"/>
           </a:p>
@@ -12632,7 +12632,7 @@
           <a:p>
             <a:fld id="{48A87A34-81AB-432B-8DAE-1953F412C126}" type="datetimeFigureOut">
               <a:rPr lang="en-US" dirty="0"/>
-              <a:t>10/15/2017</a:t>
+              <a:t>10/16/2017</a:t>
             </a:fld>
             <a:endParaRPr lang="en-US" dirty="0"/>
           </a:p>
@@ -12907,7 +12907,7 @@
           <a:p>
             <a:fld id="{48A87A34-81AB-432B-8DAE-1953F412C126}" type="datetimeFigureOut">
               <a:rPr lang="en-US" dirty="0"/>
-              <a:t>10/15/2017</a:t>
+              <a:t>10/16/2017</a:t>
             </a:fld>
             <a:endParaRPr lang="en-US" dirty="0"/>
           </a:p>
@@ -13025,7 +13025,7 @@
           <a:noFill/>
           <a:extLst>
             <a:ext uri="{909E8E84-426E-40dd-AFC4-6F175D3DCCD1}">
-              <a14:hiddenFill xmlns="" xmlns:a14="http://schemas.microsoft.com/office/drawing/2010/main">
+              <a14:hiddenFill xmlns:a14="http://schemas.microsoft.com/office/drawing/2010/main" xmlns="">
                 <a:solidFill>
                   <a:srgbClr val="FFFFFF"/>
                 </a:solidFill>
@@ -13099,7 +13099,7 @@
               </a:ln>
               <a:extLst>
                 <a:ext uri="{91240B29-F687-4f45-9708-019B960494DF}">
-                  <a14:hiddenLine xmlns="" xmlns:a14="http://schemas.microsoft.com/office/drawing/2010/main" w="9525">
+                  <a14:hiddenLine xmlns:a14="http://schemas.microsoft.com/office/drawing/2010/main" xmlns="" w="9525">
                     <a:solidFill>
                       <a:srgbClr val="000000"/>
                     </a:solidFill>
@@ -13189,7 +13189,7 @@
               </a:ln>
               <a:extLst>
                 <a:ext uri="{91240B29-F687-4f45-9708-019B960494DF}">
-                  <a14:hiddenLine xmlns="" xmlns:a14="http://schemas.microsoft.com/office/drawing/2010/main" w="9525">
+                  <a14:hiddenLine xmlns:a14="http://schemas.microsoft.com/office/drawing/2010/main" xmlns="" w="9525">
                     <a:solidFill>
                       <a:srgbClr val="000000"/>
                     </a:solidFill>
@@ -13279,7 +13279,7 @@
               </a:ln>
               <a:extLst>
                 <a:ext uri="{91240B29-F687-4f45-9708-019B960494DF}">
-                  <a14:hiddenLine xmlns="" xmlns:a14="http://schemas.microsoft.com/office/drawing/2010/main" w="9525">
+                  <a14:hiddenLine xmlns:a14="http://schemas.microsoft.com/office/drawing/2010/main" xmlns="" w="9525">
                     <a:solidFill>
                       <a:srgbClr val="000000"/>
                     </a:solidFill>
@@ -13341,7 +13341,7 @@
               </a:ln>
               <a:extLst>
                 <a:ext uri="{91240B29-F687-4f45-9708-019B960494DF}">
-                  <a14:hiddenLine xmlns="" xmlns:a14="http://schemas.microsoft.com/office/drawing/2010/main" w="9525">
+                  <a14:hiddenLine xmlns:a14="http://schemas.microsoft.com/office/drawing/2010/main" xmlns="" w="9525">
                     <a:solidFill>
                       <a:srgbClr val="000000"/>
                     </a:solidFill>
@@ -13431,7 +13431,7 @@
               </a:ln>
               <a:extLst>
                 <a:ext uri="{91240B29-F687-4f45-9708-019B960494DF}">
-                  <a14:hiddenLine xmlns="" xmlns:a14="http://schemas.microsoft.com/office/drawing/2010/main" w="9525">
+                  <a14:hiddenLine xmlns:a14="http://schemas.microsoft.com/office/drawing/2010/main" xmlns="" w="9525">
                     <a:solidFill>
                       <a:srgbClr val="000000"/>
                     </a:solidFill>
@@ -13493,7 +13493,7 @@
               </a:ln>
               <a:extLst>
                 <a:ext uri="{91240B29-F687-4f45-9708-019B960494DF}">
-                  <a14:hiddenLine xmlns="" xmlns:a14="http://schemas.microsoft.com/office/drawing/2010/main" w="9525">
+                  <a14:hiddenLine xmlns:a14="http://schemas.microsoft.com/office/drawing/2010/main" xmlns="" w="9525">
                     <a:solidFill>
                       <a:srgbClr val="000000"/>
                     </a:solidFill>
@@ -13555,7 +13555,7 @@
               </a:ln>
               <a:extLst>
                 <a:ext uri="{91240B29-F687-4f45-9708-019B960494DF}">
-                  <a14:hiddenLine xmlns="" xmlns:a14="http://schemas.microsoft.com/office/drawing/2010/main" w="9525">
+                  <a14:hiddenLine xmlns:a14="http://schemas.microsoft.com/office/drawing/2010/main" xmlns="" w="9525">
                     <a:solidFill>
                       <a:srgbClr val="000000"/>
                     </a:solidFill>
@@ -13645,7 +13645,7 @@
               </a:ln>
               <a:extLst>
                 <a:ext uri="{91240B29-F687-4f45-9708-019B960494DF}">
-                  <a14:hiddenLine xmlns="" xmlns:a14="http://schemas.microsoft.com/office/drawing/2010/main" w="9525">
+                  <a14:hiddenLine xmlns:a14="http://schemas.microsoft.com/office/drawing/2010/main" xmlns="" w="9525">
                     <a:solidFill>
                       <a:srgbClr val="000000"/>
                     </a:solidFill>
@@ -13735,7 +13735,7 @@
               </a:ln>
               <a:extLst>
                 <a:ext uri="{91240B29-F687-4f45-9708-019B960494DF}">
-                  <a14:hiddenLine xmlns="" xmlns:a14="http://schemas.microsoft.com/office/drawing/2010/main" w="9525">
+                  <a14:hiddenLine xmlns:a14="http://schemas.microsoft.com/office/drawing/2010/main" xmlns="" w="9525">
                     <a:solidFill>
                       <a:srgbClr val="000000"/>
                     </a:solidFill>
@@ -13797,7 +13797,7 @@
               </a:ln>
               <a:extLst>
                 <a:ext uri="{91240B29-F687-4f45-9708-019B960494DF}">
-                  <a14:hiddenLine xmlns="" xmlns:a14="http://schemas.microsoft.com/office/drawing/2010/main" w="9525">
+                  <a14:hiddenLine xmlns:a14="http://schemas.microsoft.com/office/drawing/2010/main" xmlns="" w="9525">
                     <a:solidFill>
                       <a:srgbClr val="000000"/>
                     </a:solidFill>
@@ -13907,7 +13907,7 @@
               </a:ln>
               <a:extLst>
                 <a:ext uri="{91240B29-F687-4f45-9708-019B960494DF}">
-                  <a14:hiddenLine xmlns="" xmlns:a14="http://schemas.microsoft.com/office/drawing/2010/main" w="9525">
+                  <a14:hiddenLine xmlns:a14="http://schemas.microsoft.com/office/drawing/2010/main" xmlns="" w="9525">
                     <a:solidFill>
                       <a:srgbClr val="000000"/>
                     </a:solidFill>
@@ -13991,7 +13991,7 @@
               </a:ln>
               <a:extLst>
                 <a:ext uri="{91240B29-F687-4f45-9708-019B960494DF}">
-                  <a14:hiddenLine xmlns="" xmlns:a14="http://schemas.microsoft.com/office/drawing/2010/main" w="9525">
+                  <a14:hiddenLine xmlns:a14="http://schemas.microsoft.com/office/drawing/2010/main" xmlns="" w="9525">
                     <a:solidFill>
                       <a:srgbClr val="000000"/>
                     </a:solidFill>
@@ -14053,7 +14053,7 @@
               </a:ln>
               <a:extLst>
                 <a:ext uri="{91240B29-F687-4f45-9708-019B960494DF}">
-                  <a14:hiddenLine xmlns="" xmlns:a14="http://schemas.microsoft.com/office/drawing/2010/main" w="9525">
+                  <a14:hiddenLine xmlns:a14="http://schemas.microsoft.com/office/drawing/2010/main" xmlns="" w="9525">
                     <a:solidFill>
                       <a:srgbClr val="000000"/>
                     </a:solidFill>
@@ -14115,7 +14115,7 @@
               </a:ln>
               <a:extLst>
                 <a:ext uri="{91240B29-F687-4f45-9708-019B960494DF}">
-                  <a14:hiddenLine xmlns="" xmlns:a14="http://schemas.microsoft.com/office/drawing/2010/main" w="9525">
+                  <a14:hiddenLine xmlns:a14="http://schemas.microsoft.com/office/drawing/2010/main" xmlns="" w="9525">
                     <a:solidFill>
                       <a:srgbClr val="000000"/>
                     </a:solidFill>
@@ -14205,7 +14205,7 @@
               </a:ln>
               <a:extLst>
                 <a:ext uri="{91240B29-F687-4f45-9708-019B960494DF}">
-                  <a14:hiddenLine xmlns="" xmlns:a14="http://schemas.microsoft.com/office/drawing/2010/main" w="9525">
+                  <a14:hiddenLine xmlns:a14="http://schemas.microsoft.com/office/drawing/2010/main" xmlns="" w="9525">
                     <a:solidFill>
                       <a:srgbClr val="000000"/>
                     </a:solidFill>
@@ -14239,7 +14239,7 @@
               </a:ln>
               <a:extLst>
                 <a:ext uri="{91240B29-F687-4f45-9708-019B960494DF}">
-                  <a14:hiddenLine xmlns="" xmlns:a14="http://schemas.microsoft.com/office/drawing/2010/main" w="9525">
+                  <a14:hiddenLine xmlns:a14="http://schemas.microsoft.com/office/drawing/2010/main" xmlns="" w="9525">
                     <a:solidFill>
                       <a:srgbClr val="000000"/>
                     </a:solidFill>
@@ -14304,7 +14304,7 @@
               </a:ln>
               <a:extLst>
                 <a:ext uri="{91240B29-F687-4f45-9708-019B960494DF}">
-                  <a14:hiddenLine xmlns="" xmlns:a14="http://schemas.microsoft.com/office/drawing/2010/main" w="9525">
+                  <a14:hiddenLine xmlns:a14="http://schemas.microsoft.com/office/drawing/2010/main" xmlns="" w="9525">
                     <a:solidFill>
                       <a:srgbClr val="000000"/>
                     </a:solidFill>
@@ -14394,7 +14394,7 @@
               </a:ln>
               <a:extLst>
                 <a:ext uri="{91240B29-F687-4f45-9708-019B960494DF}">
-                  <a14:hiddenLine xmlns="" xmlns:a14="http://schemas.microsoft.com/office/drawing/2010/main" w="9525">
+                  <a14:hiddenLine xmlns:a14="http://schemas.microsoft.com/office/drawing/2010/main" xmlns="" w="9525">
                     <a:solidFill>
                       <a:srgbClr val="000000"/>
                     </a:solidFill>
@@ -14456,7 +14456,7 @@
               </a:ln>
               <a:extLst>
                 <a:ext uri="{91240B29-F687-4f45-9708-019B960494DF}">
-                  <a14:hiddenLine xmlns="" xmlns:a14="http://schemas.microsoft.com/office/drawing/2010/main" w="9525">
+                  <a14:hiddenLine xmlns:a14="http://schemas.microsoft.com/office/drawing/2010/main" xmlns="" w="9525">
                     <a:solidFill>
                       <a:srgbClr val="000000"/>
                     </a:solidFill>
@@ -14546,7 +14546,7 @@
               </a:ln>
               <a:extLst>
                 <a:ext uri="{91240B29-F687-4f45-9708-019B960494DF}">
-                  <a14:hiddenLine xmlns="" xmlns:a14="http://schemas.microsoft.com/office/drawing/2010/main" w="9525">
+                  <a14:hiddenLine xmlns:a14="http://schemas.microsoft.com/office/drawing/2010/main" xmlns="" w="9525">
                     <a:solidFill>
                       <a:srgbClr val="000000"/>
                     </a:solidFill>
@@ -14611,7 +14611,7 @@
               </a:ln>
               <a:extLst>
                 <a:ext uri="{91240B29-F687-4f45-9708-019B960494DF}">
-                  <a14:hiddenLine xmlns="" xmlns:a14="http://schemas.microsoft.com/office/drawing/2010/main" w="9525">
+                  <a14:hiddenLine xmlns:a14="http://schemas.microsoft.com/office/drawing/2010/main" xmlns="" w="9525">
                     <a:solidFill>
                       <a:srgbClr val="000000"/>
                     </a:solidFill>
@@ -14673,7 +14673,7 @@
               </a:ln>
               <a:extLst>
                 <a:ext uri="{91240B29-F687-4f45-9708-019B960494DF}">
-                  <a14:hiddenLine xmlns="" xmlns:a14="http://schemas.microsoft.com/office/drawing/2010/main" w="9525">
+                  <a14:hiddenLine xmlns:a14="http://schemas.microsoft.com/office/drawing/2010/main" xmlns="" w="9525">
                     <a:solidFill>
                       <a:srgbClr val="000000"/>
                     </a:solidFill>
@@ -14763,7 +14763,7 @@
               </a:ln>
               <a:extLst>
                 <a:ext uri="{91240B29-F687-4f45-9708-019B960494DF}">
-                  <a14:hiddenLine xmlns="" xmlns:a14="http://schemas.microsoft.com/office/drawing/2010/main" w="9525">
+                  <a14:hiddenLine xmlns:a14="http://schemas.microsoft.com/office/drawing/2010/main" xmlns="" w="9525">
                     <a:solidFill>
                       <a:srgbClr val="000000"/>
                     </a:solidFill>
@@ -14853,7 +14853,7 @@
               </a:ln>
               <a:extLst>
                 <a:ext uri="{91240B29-F687-4f45-9708-019B960494DF}">
-                  <a14:hiddenLine xmlns="" xmlns:a14="http://schemas.microsoft.com/office/drawing/2010/main" w="9525">
+                  <a14:hiddenLine xmlns:a14="http://schemas.microsoft.com/office/drawing/2010/main" xmlns="" w="9525">
                     <a:solidFill>
                       <a:srgbClr val="000000"/>
                     </a:solidFill>
@@ -14918,7 +14918,7 @@
               </a:ln>
               <a:extLst>
                 <a:ext uri="{91240B29-F687-4f45-9708-019B960494DF}">
-                  <a14:hiddenLine xmlns="" xmlns:a14="http://schemas.microsoft.com/office/drawing/2010/main" w="9525">
+                  <a14:hiddenLine xmlns:a14="http://schemas.microsoft.com/office/drawing/2010/main" xmlns="" w="9525">
                     <a:solidFill>
                       <a:srgbClr val="000000"/>
                     </a:solidFill>
@@ -15038,7 +15038,7 @@
               </a:ln>
               <a:extLst>
                 <a:ext uri="{91240B29-F687-4f45-9708-019B960494DF}">
-                  <a14:hiddenLine xmlns="" xmlns:a14="http://schemas.microsoft.com/office/drawing/2010/main" w="9525">
+                  <a14:hiddenLine xmlns:a14="http://schemas.microsoft.com/office/drawing/2010/main" xmlns="" w="9525">
                     <a:solidFill>
                       <a:srgbClr val="000000"/>
                     </a:solidFill>
@@ -15119,7 +15119,7 @@
               </a:ln>
               <a:extLst>
                 <a:ext uri="{91240B29-F687-4f45-9708-019B960494DF}">
-                  <a14:hiddenLine xmlns="" xmlns:a14="http://schemas.microsoft.com/office/drawing/2010/main" w="9525">
+                  <a14:hiddenLine xmlns:a14="http://schemas.microsoft.com/office/drawing/2010/main" xmlns="" w="9525">
                     <a:solidFill>
                       <a:srgbClr val="000000"/>
                     </a:solidFill>
@@ -15234,7 +15234,7 @@
               </a:ln>
               <a:extLst>
                 <a:ext uri="{91240B29-F687-4f45-9708-019B960494DF}">
-                  <a14:hiddenLine xmlns="" xmlns:a14="http://schemas.microsoft.com/office/drawing/2010/main" w="9525">
+                  <a14:hiddenLine xmlns:a14="http://schemas.microsoft.com/office/drawing/2010/main" xmlns="" w="9525">
                     <a:solidFill>
                       <a:srgbClr val="000000"/>
                     </a:solidFill>
@@ -15324,7 +15324,7 @@
               </a:ln>
               <a:extLst>
                 <a:ext uri="{91240B29-F687-4f45-9708-019B960494DF}">
-                  <a14:hiddenLine xmlns="" xmlns:a14="http://schemas.microsoft.com/office/drawing/2010/main" w="9525">
+                  <a14:hiddenLine xmlns:a14="http://schemas.microsoft.com/office/drawing/2010/main" xmlns="" w="9525">
                     <a:solidFill>
                       <a:srgbClr val="000000"/>
                     </a:solidFill>
@@ -15389,7 +15389,7 @@
               </a:ln>
               <a:extLst>
                 <a:ext uri="{91240B29-F687-4f45-9708-019B960494DF}">
-                  <a14:hiddenLine xmlns="" xmlns:a14="http://schemas.microsoft.com/office/drawing/2010/main" w="9525">
+                  <a14:hiddenLine xmlns:a14="http://schemas.microsoft.com/office/drawing/2010/main" xmlns="" w="9525">
                     <a:solidFill>
                       <a:srgbClr val="000000"/>
                     </a:solidFill>
@@ -15479,7 +15479,7 @@
               </a:ln>
               <a:extLst>
                 <a:ext uri="{91240B29-F687-4f45-9708-019B960494DF}">
-                  <a14:hiddenLine xmlns="" xmlns:a14="http://schemas.microsoft.com/office/drawing/2010/main" w="9525">
+                  <a14:hiddenLine xmlns:a14="http://schemas.microsoft.com/office/drawing/2010/main" xmlns="" w="9525">
                     <a:solidFill>
                       <a:srgbClr val="000000"/>
                     </a:solidFill>
@@ -15547,7 +15547,7 @@
               </a:ln>
               <a:extLst>
                 <a:ext uri="{91240B29-F687-4f45-9708-019B960494DF}">
-                  <a14:hiddenLine xmlns="" xmlns:a14="http://schemas.microsoft.com/office/drawing/2010/main" w="9525">
+                  <a14:hiddenLine xmlns:a14="http://schemas.microsoft.com/office/drawing/2010/main" xmlns="" w="9525">
                     <a:solidFill>
                       <a:srgbClr val="000000"/>
                     </a:solidFill>
@@ -15637,7 +15637,7 @@
               </a:ln>
               <a:extLst>
                 <a:ext uri="{91240B29-F687-4f45-9708-019B960494DF}">
-                  <a14:hiddenLine xmlns="" xmlns:a14="http://schemas.microsoft.com/office/drawing/2010/main" w="9525">
+                  <a14:hiddenLine xmlns:a14="http://schemas.microsoft.com/office/drawing/2010/main" xmlns="" w="9525">
                     <a:solidFill>
                       <a:srgbClr val="000000"/>
                     </a:solidFill>
@@ -15705,7 +15705,7 @@
               </a:ln>
               <a:extLst>
                 <a:ext uri="{91240B29-F687-4f45-9708-019B960494DF}">
-                  <a14:hiddenLine xmlns="" xmlns:a14="http://schemas.microsoft.com/office/drawing/2010/main" w="9525">
+                  <a14:hiddenLine xmlns:a14="http://schemas.microsoft.com/office/drawing/2010/main" xmlns="" w="9525">
                     <a:solidFill>
                       <a:srgbClr val="000000"/>
                     </a:solidFill>
@@ -15795,7 +15795,7 @@
               </a:ln>
               <a:extLst>
                 <a:ext uri="{91240B29-F687-4f45-9708-019B960494DF}">
-                  <a14:hiddenLine xmlns="" xmlns:a14="http://schemas.microsoft.com/office/drawing/2010/main" w="9525">
+                  <a14:hiddenLine xmlns:a14="http://schemas.microsoft.com/office/drawing/2010/main" xmlns="" w="9525">
                     <a:solidFill>
                       <a:srgbClr val="000000"/>
                     </a:solidFill>
@@ -15829,7 +15829,7 @@
               </a:ln>
               <a:extLst>
                 <a:ext uri="{91240B29-F687-4f45-9708-019B960494DF}">
-                  <a14:hiddenLine xmlns="" xmlns:a14="http://schemas.microsoft.com/office/drawing/2010/main" w="9525">
+                  <a14:hiddenLine xmlns:a14="http://schemas.microsoft.com/office/drawing/2010/main" xmlns="" w="9525">
                     <a:solidFill>
                       <a:srgbClr val="000000"/>
                     </a:solidFill>
@@ -15970,7 +15970,7 @@
             <a:fld id="{48A87A34-81AB-432B-8DAE-1953F412C126}" type="datetimeFigureOut">
               <a:rPr lang="en-US" dirty="0"/>
               <a:pPr/>
-              <a:t>10/15/2017</a:t>
+              <a:t>10/16/2017</a:t>
             </a:fld>
             <a:endParaRPr lang="en-US" dirty="0"/>
           </a:p>
@@ -26842,30 +26842,33 @@
             <p:ph type="title"/>
           </p:nvPr>
         </p:nvSpPr>
-        <p:spPr/>
-        <p:txBody>
-          <a:bodyPr/>
-          <a:lstStyle/>
-          <a:p>
-            <a:r>
-              <a:rPr lang="de-CH" dirty="0" smtClean="0"/>
-              <a:t>Precision </a:t>
-            </a:r>
-            <a:r>
-              <a:rPr lang="de-CH" dirty="0" err="1" smtClean="0"/>
-              <a:t>and</a:t>
-            </a:r>
-            <a:r>
-              <a:rPr lang="de-CH" dirty="0" smtClean="0"/>
-              <a:t> Recall</a:t>
-            </a:r>
-            <a:endParaRPr lang="de-CH" dirty="0"/>
-          </a:p>
-        </p:txBody>
-      </p:sp>
-      <p:sp>
-        <p:nvSpPr>
-          <p:cNvPr id="3" name="Content Placeholder 2"/>
+        <p:spPr>
+          <a:xfrm>
+            <a:off x="1141413" y="316872"/>
+            <a:ext cx="9905998" cy="1221959"/>
+          </a:xfrm>
+        </p:spPr>
+        <p:txBody>
+          <a:bodyPr>
+            <a:normAutofit/>
+          </a:bodyPr>
+          <a:lstStyle/>
+          <a:p>
+            <a:r>
+              <a:rPr lang="de-CH" sz="3200" dirty="0" smtClean="0"/>
+              <a:t>Performance-Masse von binären </a:t>
+            </a:r>
+            <a:r>
+              <a:rPr lang="de-CH" sz="3200" dirty="0" err="1" smtClean="0"/>
+              <a:t>Klassifikatoren</a:t>
+            </a:r>
+            <a:endParaRPr lang="de-CH" sz="3200" dirty="0"/>
+          </a:p>
+        </p:txBody>
+      </p:sp>
+      <p:sp>
+        <p:nvSpPr>
+          <p:cNvPr id="9" name="Content Placeholder 8"/>
           <p:cNvSpPr>
             <a:spLocks noGrp="1"/>
           </p:cNvSpPr>
@@ -26884,7 +26887,7 @@
       </p:sp>
       <p:pic>
         <p:nvPicPr>
-          <p:cNvPr id="4" name="Picture 3"/>
+          <p:cNvPr id="10" name="Picture 9"/>
           <p:cNvPicPr>
             <a:picLocks noChangeAspect="1"/>
           </p:cNvPicPr>
@@ -26898,32 +26901,8 @@
         </p:blipFill>
         <p:spPr>
           <a:xfrm>
-            <a:off x="1583867" y="1847067"/>
-            <a:ext cx="3247183" cy="4132778"/>
-          </a:xfrm>
-          <a:prstGeom prst="rect">
-            <a:avLst/>
-          </a:prstGeom>
-        </p:spPr>
-      </p:pic>
-      <p:pic>
-        <p:nvPicPr>
-          <p:cNvPr id="5" name="Picture 4"/>
-          <p:cNvPicPr>
-            <a:picLocks noChangeAspect="1"/>
-          </p:cNvPicPr>
-          <p:nvPr/>
-        </p:nvPicPr>
-        <p:blipFill>
-          <a:blip r:embed="rId4"/>
-          <a:stretch>
-            <a:fillRect/>
-          </a:stretch>
-        </p:blipFill>
-        <p:spPr>
-          <a:xfrm>
-            <a:off x="5704509" y="2346208"/>
-            <a:ext cx="4610134" cy="2904385"/>
+            <a:off x="1268588" y="1395431"/>
+            <a:ext cx="9387337" cy="4593586"/>
           </a:xfrm>
           <a:prstGeom prst="rect">
             <a:avLst/>

</xml_diff>

<commit_message>
Reinforcement learning in walkthrough integrated.
</commit_message>
<xml_diff>
--- a/presentation.pptx
+++ b/presentation.pptx
@@ -238,7 +238,7 @@
           <a:p>
             <a:fld id="{7C9032C8-5182-4818-BB2B-C6DBA1F28B4F}" type="datetimeFigureOut">
               <a:rPr lang="de-CH" smtClean="0"/>
-              <a:t>16.10.2017</a:t>
+              <a:t>17.10.2017</a:t>
             </a:fld>
             <a:endParaRPr lang="de-CH"/>
           </a:p>
@@ -4211,7 +4211,7 @@
           <a:noFill/>
           <a:extLst>
             <a:ext uri="{909E8E84-426E-40dd-AFC4-6F175D3DCCD1}">
-              <a14:hiddenFill xmlns:a14="http://schemas.microsoft.com/office/drawing/2010/main" xmlns="">
+              <a14:hiddenFill xmlns="" xmlns:a14="http://schemas.microsoft.com/office/drawing/2010/main">
                 <a:solidFill>
                   <a:srgbClr val="FFFFFF"/>
                 </a:solidFill>
@@ -4270,7 +4270,7 @@
             </a:ln>
             <a:extLst>
               <a:ext uri="{91240B29-F687-4f45-9708-019B960494DF}">
-                <a14:hiddenLine xmlns:a14="http://schemas.microsoft.com/office/drawing/2010/main" xmlns="" w="9525">
+                <a14:hiddenLine xmlns="" xmlns:a14="http://schemas.microsoft.com/office/drawing/2010/main" w="9525">
                   <a:solidFill>
                     <a:srgbClr val="000000"/>
                   </a:solidFill>
@@ -4360,7 +4360,7 @@
             </a:ln>
             <a:extLst>
               <a:ext uri="{91240B29-F687-4f45-9708-019B960494DF}">
-                <a14:hiddenLine xmlns:a14="http://schemas.microsoft.com/office/drawing/2010/main" xmlns="" w="9525">
+                <a14:hiddenLine xmlns="" xmlns:a14="http://schemas.microsoft.com/office/drawing/2010/main" w="9525">
                   <a:solidFill>
                     <a:srgbClr val="000000"/>
                   </a:solidFill>
@@ -4450,7 +4450,7 @@
             </a:ln>
             <a:extLst>
               <a:ext uri="{91240B29-F687-4f45-9708-019B960494DF}">
-                <a14:hiddenLine xmlns:a14="http://schemas.microsoft.com/office/drawing/2010/main" xmlns="" w="9525">
+                <a14:hiddenLine xmlns="" xmlns:a14="http://schemas.microsoft.com/office/drawing/2010/main" w="9525">
                   <a:solidFill>
                     <a:srgbClr val="000000"/>
                   </a:solidFill>
@@ -4484,7 +4484,7 @@
             </a:ln>
             <a:extLst>
               <a:ext uri="{91240B29-F687-4f45-9708-019B960494DF}">
-                <a14:hiddenLine xmlns:a14="http://schemas.microsoft.com/office/drawing/2010/main" xmlns="" w="9525">
+                <a14:hiddenLine xmlns="" xmlns:a14="http://schemas.microsoft.com/office/drawing/2010/main" w="9525">
                   <a:solidFill>
                     <a:srgbClr val="000000"/>
                   </a:solidFill>
@@ -4574,7 +4574,7 @@
             </a:ln>
             <a:extLst>
               <a:ext uri="{91240B29-F687-4f45-9708-019B960494DF}">
-                <a14:hiddenLine xmlns:a14="http://schemas.microsoft.com/office/drawing/2010/main" xmlns="" w="9525">
+                <a14:hiddenLine xmlns="" xmlns:a14="http://schemas.microsoft.com/office/drawing/2010/main" w="9525">
                   <a:solidFill>
                     <a:srgbClr val="000000"/>
                   </a:solidFill>
@@ -4636,7 +4636,7 @@
             </a:ln>
             <a:extLst>
               <a:ext uri="{91240B29-F687-4f45-9708-019B960494DF}">
-                <a14:hiddenLine xmlns:a14="http://schemas.microsoft.com/office/drawing/2010/main" xmlns="" w="9525">
+                <a14:hiddenLine xmlns="" xmlns:a14="http://schemas.microsoft.com/office/drawing/2010/main" w="9525">
                   <a:solidFill>
                     <a:srgbClr val="000000"/>
                   </a:solidFill>
@@ -4698,7 +4698,7 @@
             </a:ln>
             <a:extLst>
               <a:ext uri="{91240B29-F687-4f45-9708-019B960494DF}">
-                <a14:hiddenLine xmlns:a14="http://schemas.microsoft.com/office/drawing/2010/main" xmlns="" w="9525">
+                <a14:hiddenLine xmlns="" xmlns:a14="http://schemas.microsoft.com/office/drawing/2010/main" w="9525">
                   <a:solidFill>
                     <a:srgbClr val="000000"/>
                   </a:solidFill>
@@ -4788,7 +4788,7 @@
             </a:ln>
             <a:extLst>
               <a:ext uri="{91240B29-F687-4f45-9708-019B960494DF}">
-                <a14:hiddenLine xmlns:a14="http://schemas.microsoft.com/office/drawing/2010/main" xmlns="" w="9525">
+                <a14:hiddenLine xmlns="" xmlns:a14="http://schemas.microsoft.com/office/drawing/2010/main" w="9525">
                   <a:solidFill>
                     <a:srgbClr val="000000"/>
                   </a:solidFill>
@@ -4850,7 +4850,7 @@
             </a:ln>
             <a:extLst>
               <a:ext uri="{91240B29-F687-4f45-9708-019B960494DF}">
-                <a14:hiddenLine xmlns:a14="http://schemas.microsoft.com/office/drawing/2010/main" xmlns="" w="9525">
+                <a14:hiddenLine xmlns="" xmlns:a14="http://schemas.microsoft.com/office/drawing/2010/main" w="9525">
                   <a:solidFill>
                     <a:srgbClr val="000000"/>
                   </a:solidFill>
@@ -4912,7 +4912,7 @@
             </a:ln>
             <a:extLst>
               <a:ext uri="{91240B29-F687-4f45-9708-019B960494DF}">
-                <a14:hiddenLine xmlns:a14="http://schemas.microsoft.com/office/drawing/2010/main" xmlns="" w="9525">
+                <a14:hiddenLine xmlns="" xmlns:a14="http://schemas.microsoft.com/office/drawing/2010/main" w="9525">
                   <a:solidFill>
                     <a:srgbClr val="000000"/>
                   </a:solidFill>
@@ -5002,7 +5002,7 @@
             </a:ln>
             <a:extLst>
               <a:ext uri="{91240B29-F687-4f45-9708-019B960494DF}">
-                <a14:hiddenLine xmlns:a14="http://schemas.microsoft.com/office/drawing/2010/main" xmlns="" w="9525">
+                <a14:hiddenLine xmlns="" xmlns:a14="http://schemas.microsoft.com/office/drawing/2010/main" w="9525">
                   <a:solidFill>
                     <a:srgbClr val="000000"/>
                   </a:solidFill>
@@ -5092,7 +5092,7 @@
             </a:ln>
             <a:extLst>
               <a:ext uri="{91240B29-F687-4f45-9708-019B960494DF}">
-                <a14:hiddenLine xmlns:a14="http://schemas.microsoft.com/office/drawing/2010/main" xmlns="" w="9525">
+                <a14:hiddenLine xmlns="" xmlns:a14="http://schemas.microsoft.com/office/drawing/2010/main" w="9525">
                   <a:solidFill>
                     <a:srgbClr val="000000"/>
                   </a:solidFill>
@@ -5154,7 +5154,7 @@
             </a:ln>
             <a:extLst>
               <a:ext uri="{91240B29-F687-4f45-9708-019B960494DF}">
-                <a14:hiddenLine xmlns:a14="http://schemas.microsoft.com/office/drawing/2010/main" xmlns="" w="9525">
+                <a14:hiddenLine xmlns="" xmlns:a14="http://schemas.microsoft.com/office/drawing/2010/main" w="9525">
                   <a:solidFill>
                     <a:srgbClr val="000000"/>
                   </a:solidFill>
@@ -5264,7 +5264,7 @@
             </a:ln>
             <a:extLst>
               <a:ext uri="{91240B29-F687-4f45-9708-019B960494DF}">
-                <a14:hiddenLine xmlns:a14="http://schemas.microsoft.com/office/drawing/2010/main" xmlns="" w="9525">
+                <a14:hiddenLine xmlns="" xmlns:a14="http://schemas.microsoft.com/office/drawing/2010/main" w="9525">
                   <a:solidFill>
                     <a:srgbClr val="000000"/>
                   </a:solidFill>
@@ -5326,7 +5326,7 @@
             </a:ln>
             <a:extLst>
               <a:ext uri="{91240B29-F687-4f45-9708-019B960494DF}">
-                <a14:hiddenLine xmlns:a14="http://schemas.microsoft.com/office/drawing/2010/main" xmlns="" w="9525">
+                <a14:hiddenLine xmlns="" xmlns:a14="http://schemas.microsoft.com/office/drawing/2010/main" w="9525">
                   <a:solidFill>
                     <a:srgbClr val="000000"/>
                   </a:solidFill>
@@ -5416,7 +5416,7 @@
             </a:ln>
             <a:extLst>
               <a:ext uri="{91240B29-F687-4f45-9708-019B960494DF}">
-                <a14:hiddenLine xmlns:a14="http://schemas.microsoft.com/office/drawing/2010/main" xmlns="" w="9525">
+                <a14:hiddenLine xmlns="" xmlns:a14="http://schemas.microsoft.com/office/drawing/2010/main" w="9525">
                   <a:solidFill>
                     <a:srgbClr val="000000"/>
                   </a:solidFill>
@@ -5506,7 +5506,7 @@
             </a:ln>
             <a:extLst>
               <a:ext uri="{91240B29-F687-4f45-9708-019B960494DF}">
-                <a14:hiddenLine xmlns:a14="http://schemas.microsoft.com/office/drawing/2010/main" xmlns="" w="9525">
+                <a14:hiddenLine xmlns="" xmlns:a14="http://schemas.microsoft.com/office/drawing/2010/main" w="9525">
                   <a:solidFill>
                     <a:srgbClr val="000000"/>
                   </a:solidFill>
@@ -5568,7 +5568,7 @@
             </a:ln>
             <a:extLst>
               <a:ext uri="{91240B29-F687-4f45-9708-019B960494DF}">
-                <a14:hiddenLine xmlns:a14="http://schemas.microsoft.com/office/drawing/2010/main" xmlns="" w="9525">
+                <a14:hiddenLine xmlns="" xmlns:a14="http://schemas.microsoft.com/office/drawing/2010/main" w="9525">
                   <a:solidFill>
                     <a:srgbClr val="000000"/>
                   </a:solidFill>
@@ -5658,7 +5658,7 @@
             </a:ln>
             <a:extLst>
               <a:ext uri="{91240B29-F687-4f45-9708-019B960494DF}">
-                <a14:hiddenLine xmlns:a14="http://schemas.microsoft.com/office/drawing/2010/main" xmlns="" w="9525">
+                <a14:hiddenLine xmlns="" xmlns:a14="http://schemas.microsoft.com/office/drawing/2010/main" w="9525">
                   <a:solidFill>
                     <a:srgbClr val="000000"/>
                   </a:solidFill>
@@ -5748,7 +5748,7 @@
             </a:ln>
             <a:extLst>
               <a:ext uri="{91240B29-F687-4f45-9708-019B960494DF}">
-                <a14:hiddenLine xmlns:a14="http://schemas.microsoft.com/office/drawing/2010/main" xmlns="" w="9525">
+                <a14:hiddenLine xmlns="" xmlns:a14="http://schemas.microsoft.com/office/drawing/2010/main" w="9525">
                   <a:solidFill>
                     <a:srgbClr val="000000"/>
                   </a:solidFill>
@@ -5804,7 +5804,7 @@
             </a:ln>
             <a:extLst>
               <a:ext uri="{91240B29-F687-4f45-9708-019B960494DF}">
-                <a14:hiddenLine xmlns:a14="http://schemas.microsoft.com/office/drawing/2010/main" xmlns="" w="9525">
+                <a14:hiddenLine xmlns="" xmlns:a14="http://schemas.microsoft.com/office/drawing/2010/main" w="9525">
                   <a:solidFill>
                     <a:srgbClr val="000000"/>
                   </a:solidFill>
@@ -5894,7 +5894,7 @@
             </a:ln>
             <a:extLst>
               <a:ext uri="{91240B29-F687-4f45-9708-019B960494DF}">
-                <a14:hiddenLine xmlns:a14="http://schemas.microsoft.com/office/drawing/2010/main" xmlns="" w="9525">
+                <a14:hiddenLine xmlns="" xmlns:a14="http://schemas.microsoft.com/office/drawing/2010/main" w="9525">
                   <a:solidFill>
                     <a:srgbClr val="000000"/>
                   </a:solidFill>
@@ -5950,7 +5950,7 @@
             </a:ln>
             <a:extLst>
               <a:ext uri="{91240B29-F687-4f45-9708-019B960494DF}">
-                <a14:hiddenLine xmlns:a14="http://schemas.microsoft.com/office/drawing/2010/main" xmlns="" w="9525">
+                <a14:hiddenLine xmlns="" xmlns:a14="http://schemas.microsoft.com/office/drawing/2010/main" w="9525">
                   <a:solidFill>
                     <a:srgbClr val="000000"/>
                   </a:solidFill>
@@ -6040,7 +6040,7 @@
             </a:ln>
             <a:extLst>
               <a:ext uri="{91240B29-F687-4f45-9708-019B960494DF}">
-                <a14:hiddenLine xmlns:a14="http://schemas.microsoft.com/office/drawing/2010/main" xmlns="" w="9525">
+                <a14:hiddenLine xmlns="" xmlns:a14="http://schemas.microsoft.com/office/drawing/2010/main" w="9525">
                   <a:solidFill>
                     <a:srgbClr val="000000"/>
                   </a:solidFill>
@@ -6108,7 +6108,7 @@
             </a:ln>
             <a:extLst>
               <a:ext uri="{91240B29-F687-4f45-9708-019B960494DF}">
-                <a14:hiddenLine xmlns:a14="http://schemas.microsoft.com/office/drawing/2010/main" xmlns="" w="9525">
+                <a14:hiddenLine xmlns="" xmlns:a14="http://schemas.microsoft.com/office/drawing/2010/main" w="9525">
                   <a:solidFill>
                     <a:srgbClr val="000000"/>
                   </a:solidFill>
@@ -6198,7 +6198,7 @@
             </a:ln>
             <a:extLst>
               <a:ext uri="{91240B29-F687-4f45-9708-019B960494DF}">
-                <a14:hiddenLine xmlns:a14="http://schemas.microsoft.com/office/drawing/2010/main" xmlns="" w="9525">
+                <a14:hiddenLine xmlns="" xmlns:a14="http://schemas.microsoft.com/office/drawing/2010/main" w="9525">
                   <a:solidFill>
                     <a:srgbClr val="000000"/>
                   </a:solidFill>
@@ -6266,7 +6266,7 @@
             </a:ln>
             <a:extLst>
               <a:ext uri="{91240B29-F687-4f45-9708-019B960494DF}">
-                <a14:hiddenLine xmlns:a14="http://schemas.microsoft.com/office/drawing/2010/main" xmlns="" w="9525">
+                <a14:hiddenLine xmlns="" xmlns:a14="http://schemas.microsoft.com/office/drawing/2010/main" w="9525">
                   <a:solidFill>
                     <a:srgbClr val="000000"/>
                   </a:solidFill>
@@ -6356,7 +6356,7 @@
             </a:ln>
             <a:extLst>
               <a:ext uri="{91240B29-F687-4f45-9708-019B960494DF}">
-                <a14:hiddenLine xmlns:a14="http://schemas.microsoft.com/office/drawing/2010/main" xmlns="" w="9525">
+                <a14:hiddenLine xmlns="" xmlns:a14="http://schemas.microsoft.com/office/drawing/2010/main" w="9525">
                   <a:solidFill>
                     <a:srgbClr val="000000"/>
                   </a:solidFill>
@@ -6390,7 +6390,7 @@
             </a:ln>
             <a:extLst>
               <a:ext uri="{91240B29-F687-4f45-9708-019B960494DF}">
-                <a14:hiddenLine xmlns:a14="http://schemas.microsoft.com/office/drawing/2010/main" xmlns="" w="9525">
+                <a14:hiddenLine xmlns="" xmlns:a14="http://schemas.microsoft.com/office/drawing/2010/main" w="9525">
                   <a:solidFill>
                     <a:srgbClr val="000000"/>
                   </a:solidFill>
@@ -6480,7 +6480,7 @@
             </a:ln>
             <a:extLst>
               <a:ext uri="{91240B29-F687-4f45-9708-019B960494DF}">
-                <a14:hiddenLine xmlns:a14="http://schemas.microsoft.com/office/drawing/2010/main" xmlns="" w="9525">
+                <a14:hiddenLine xmlns="" xmlns:a14="http://schemas.microsoft.com/office/drawing/2010/main" w="9525">
                   <a:solidFill>
                     <a:srgbClr val="000000"/>
                   </a:solidFill>
@@ -6542,7 +6542,7 @@
             </a:ln>
             <a:extLst>
               <a:ext uri="{91240B29-F687-4f45-9708-019B960494DF}">
-                <a14:hiddenLine xmlns:a14="http://schemas.microsoft.com/office/drawing/2010/main" xmlns="" w="9525">
+                <a14:hiddenLine xmlns="" xmlns:a14="http://schemas.microsoft.com/office/drawing/2010/main" w="9525">
                   <a:solidFill>
                     <a:srgbClr val="000000"/>
                   </a:solidFill>
@@ -6604,7 +6604,7 @@
             </a:ln>
             <a:extLst>
               <a:ext uri="{91240B29-F687-4f45-9708-019B960494DF}">
-                <a14:hiddenLine xmlns:a14="http://schemas.microsoft.com/office/drawing/2010/main" xmlns="" w="9525">
+                <a14:hiddenLine xmlns="" xmlns:a14="http://schemas.microsoft.com/office/drawing/2010/main" w="9525">
                   <a:solidFill>
                     <a:srgbClr val="000000"/>
                   </a:solidFill>
@@ -6694,7 +6694,7 @@
             </a:ln>
             <a:extLst>
               <a:ext uri="{91240B29-F687-4f45-9708-019B960494DF}">
-                <a14:hiddenLine xmlns:a14="http://schemas.microsoft.com/office/drawing/2010/main" xmlns="" w="9525">
+                <a14:hiddenLine xmlns="" xmlns:a14="http://schemas.microsoft.com/office/drawing/2010/main" w="9525">
                   <a:solidFill>
                     <a:srgbClr val="000000"/>
                   </a:solidFill>
@@ -6762,7 +6762,7 @@
             </a:ln>
             <a:extLst>
               <a:ext uri="{91240B29-F687-4f45-9708-019B960494DF}">
-                <a14:hiddenLine xmlns:a14="http://schemas.microsoft.com/office/drawing/2010/main" xmlns="" w="9525">
+                <a14:hiddenLine xmlns="" xmlns:a14="http://schemas.microsoft.com/office/drawing/2010/main" w="9525">
                   <a:solidFill>
                     <a:srgbClr val="000000"/>
                   </a:solidFill>
@@ -6824,7 +6824,7 @@
             </a:ln>
             <a:extLst>
               <a:ext uri="{91240B29-F687-4f45-9708-019B960494DF}">
-                <a14:hiddenLine xmlns:a14="http://schemas.microsoft.com/office/drawing/2010/main" xmlns="" w="9525">
+                <a14:hiddenLine xmlns="" xmlns:a14="http://schemas.microsoft.com/office/drawing/2010/main" w="9525">
                   <a:solidFill>
                     <a:srgbClr val="000000"/>
                   </a:solidFill>
@@ -6914,7 +6914,7 @@
             </a:ln>
             <a:extLst>
               <a:ext uri="{91240B29-F687-4f45-9708-019B960494DF}">
-                <a14:hiddenLine xmlns:a14="http://schemas.microsoft.com/office/drawing/2010/main" xmlns="" w="9525">
+                <a14:hiddenLine xmlns="" xmlns:a14="http://schemas.microsoft.com/office/drawing/2010/main" w="9525">
                   <a:solidFill>
                     <a:srgbClr val="000000"/>
                   </a:solidFill>
@@ -6976,7 +6976,7 @@
             </a:ln>
             <a:extLst>
               <a:ext uri="{91240B29-F687-4f45-9708-019B960494DF}">
-                <a14:hiddenLine xmlns:a14="http://schemas.microsoft.com/office/drawing/2010/main" xmlns="" w="9525">
+                <a14:hiddenLine xmlns="" xmlns:a14="http://schemas.microsoft.com/office/drawing/2010/main" w="9525">
                   <a:solidFill>
                     <a:srgbClr val="000000"/>
                   </a:solidFill>
@@ -7066,7 +7066,7 @@
             </a:ln>
             <a:extLst>
               <a:ext uri="{91240B29-F687-4f45-9708-019B960494DF}">
-                <a14:hiddenLine xmlns:a14="http://schemas.microsoft.com/office/drawing/2010/main" xmlns="" w="9525">
+                <a14:hiddenLine xmlns="" xmlns:a14="http://schemas.microsoft.com/office/drawing/2010/main" w="9525">
                   <a:solidFill>
                     <a:srgbClr val="000000"/>
                   </a:solidFill>
@@ -7128,7 +7128,7 @@
             </a:ln>
             <a:extLst>
               <a:ext uri="{91240B29-F687-4f45-9708-019B960494DF}">
-                <a14:hiddenLine xmlns:a14="http://schemas.microsoft.com/office/drawing/2010/main" xmlns="" w="9525">
+                <a14:hiddenLine xmlns="" xmlns:a14="http://schemas.microsoft.com/office/drawing/2010/main" w="9525">
                   <a:solidFill>
                     <a:srgbClr val="000000"/>
                   </a:solidFill>
@@ -7218,7 +7218,7 @@
             </a:ln>
             <a:extLst>
               <a:ext uri="{91240B29-F687-4f45-9708-019B960494DF}">
-                <a14:hiddenLine xmlns:a14="http://schemas.microsoft.com/office/drawing/2010/main" xmlns="" w="9525">
+                <a14:hiddenLine xmlns="" xmlns:a14="http://schemas.microsoft.com/office/drawing/2010/main" w="9525">
                   <a:solidFill>
                     <a:srgbClr val="000000"/>
                   </a:solidFill>
@@ -7252,7 +7252,7 @@
             </a:ln>
             <a:extLst>
               <a:ext uri="{91240B29-F687-4f45-9708-019B960494DF}">
-                <a14:hiddenLine xmlns:a14="http://schemas.microsoft.com/office/drawing/2010/main" xmlns="" w="9525">
+                <a14:hiddenLine xmlns="" xmlns:a14="http://schemas.microsoft.com/office/drawing/2010/main" w="9525">
                   <a:solidFill>
                     <a:srgbClr val="000000"/>
                   </a:solidFill>
@@ -7317,7 +7317,7 @@
             </a:ln>
             <a:extLst>
               <a:ext uri="{91240B29-F687-4f45-9708-019B960494DF}">
-                <a14:hiddenLine xmlns:a14="http://schemas.microsoft.com/office/drawing/2010/main" xmlns="" w="9525">
+                <a14:hiddenLine xmlns="" xmlns:a14="http://schemas.microsoft.com/office/drawing/2010/main" w="9525">
                   <a:solidFill>
                     <a:srgbClr val="000000"/>
                   </a:solidFill>
@@ -7407,7 +7407,7 @@
             </a:ln>
             <a:extLst>
               <a:ext uri="{91240B29-F687-4f45-9708-019B960494DF}">
-                <a14:hiddenLine xmlns:a14="http://schemas.microsoft.com/office/drawing/2010/main" xmlns="" w="9525">
+                <a14:hiddenLine xmlns="" xmlns:a14="http://schemas.microsoft.com/office/drawing/2010/main" w="9525">
                   <a:solidFill>
                     <a:srgbClr val="000000"/>
                   </a:solidFill>
@@ -7469,7 +7469,7 @@
             </a:ln>
             <a:extLst>
               <a:ext uri="{91240B29-F687-4f45-9708-019B960494DF}">
-                <a14:hiddenLine xmlns:a14="http://schemas.microsoft.com/office/drawing/2010/main" xmlns="" w="9525">
+                <a14:hiddenLine xmlns="" xmlns:a14="http://schemas.microsoft.com/office/drawing/2010/main" w="9525">
                   <a:solidFill>
                     <a:srgbClr val="000000"/>
                   </a:solidFill>
@@ -7559,7 +7559,7 @@
             </a:ln>
             <a:extLst>
               <a:ext uri="{91240B29-F687-4f45-9708-019B960494DF}">
-                <a14:hiddenLine xmlns:a14="http://schemas.microsoft.com/office/drawing/2010/main" xmlns="" w="9525">
+                <a14:hiddenLine xmlns="" xmlns:a14="http://schemas.microsoft.com/office/drawing/2010/main" w="9525">
                   <a:solidFill>
                     <a:srgbClr val="000000"/>
                   </a:solidFill>
@@ -7649,7 +7649,7 @@
             </a:ln>
             <a:extLst>
               <a:ext uri="{91240B29-F687-4f45-9708-019B960494DF}">
-                <a14:hiddenLine xmlns:a14="http://schemas.microsoft.com/office/drawing/2010/main" xmlns="" w="9525">
+                <a14:hiddenLine xmlns="" xmlns:a14="http://schemas.microsoft.com/office/drawing/2010/main" w="9525">
                   <a:solidFill>
                     <a:srgbClr val="000000"/>
                   </a:solidFill>
@@ -7714,7 +7714,7 @@
             </a:ln>
             <a:extLst>
               <a:ext uri="{91240B29-F687-4f45-9708-019B960494DF}">
-                <a14:hiddenLine xmlns:a14="http://schemas.microsoft.com/office/drawing/2010/main" xmlns="" w="9525">
+                <a14:hiddenLine xmlns="" xmlns:a14="http://schemas.microsoft.com/office/drawing/2010/main" w="9525">
                   <a:solidFill>
                     <a:srgbClr val="000000"/>
                   </a:solidFill>
@@ -7776,7 +7776,7 @@
             </a:ln>
             <a:extLst>
               <a:ext uri="{91240B29-F687-4f45-9708-019B960494DF}">
-                <a14:hiddenLine xmlns:a14="http://schemas.microsoft.com/office/drawing/2010/main" xmlns="" w="9525">
+                <a14:hiddenLine xmlns="" xmlns:a14="http://schemas.microsoft.com/office/drawing/2010/main" w="9525">
                   <a:solidFill>
                     <a:srgbClr val="000000"/>
                   </a:solidFill>
@@ -7866,7 +7866,7 @@
             </a:ln>
             <a:extLst>
               <a:ext uri="{91240B29-F687-4f45-9708-019B960494DF}">
-                <a14:hiddenLine xmlns:a14="http://schemas.microsoft.com/office/drawing/2010/main" xmlns="" w="9525">
+                <a14:hiddenLine xmlns="" xmlns:a14="http://schemas.microsoft.com/office/drawing/2010/main" w="9525">
                   <a:solidFill>
                     <a:srgbClr val="000000"/>
                   </a:solidFill>
@@ -7956,7 +7956,7 @@
             </a:ln>
             <a:extLst>
               <a:ext uri="{91240B29-F687-4f45-9708-019B960494DF}">
-                <a14:hiddenLine xmlns:a14="http://schemas.microsoft.com/office/drawing/2010/main" xmlns="" w="9525">
+                <a14:hiddenLine xmlns="" xmlns:a14="http://schemas.microsoft.com/office/drawing/2010/main" w="9525">
                   <a:solidFill>
                     <a:srgbClr val="000000"/>
                   </a:solidFill>
@@ -8018,7 +8018,7 @@
             </a:ln>
             <a:extLst>
               <a:ext uri="{91240B29-F687-4f45-9708-019B960494DF}">
-                <a14:hiddenLine xmlns:a14="http://schemas.microsoft.com/office/drawing/2010/main" xmlns="" w="9525">
+                <a14:hiddenLine xmlns="" xmlns:a14="http://schemas.microsoft.com/office/drawing/2010/main" w="9525">
                   <a:solidFill>
                     <a:srgbClr val="000000"/>
                   </a:solidFill>
@@ -8138,7 +8138,7 @@
             </a:ln>
             <a:extLst>
               <a:ext uri="{91240B29-F687-4f45-9708-019B960494DF}">
-                <a14:hiddenLine xmlns:a14="http://schemas.microsoft.com/office/drawing/2010/main" xmlns="" w="9525">
+                <a14:hiddenLine xmlns="" xmlns:a14="http://schemas.microsoft.com/office/drawing/2010/main" w="9525">
                   <a:solidFill>
                     <a:srgbClr val="000000"/>
                   </a:solidFill>
@@ -8206,7 +8206,7 @@
             </a:ln>
             <a:extLst>
               <a:ext uri="{91240B29-F687-4f45-9708-019B960494DF}">
-                <a14:hiddenLine xmlns:a14="http://schemas.microsoft.com/office/drawing/2010/main" xmlns="" w="9525">
+                <a14:hiddenLine xmlns="" xmlns:a14="http://schemas.microsoft.com/office/drawing/2010/main" w="9525">
                   <a:solidFill>
                     <a:srgbClr val="000000"/>
                   </a:solidFill>
@@ -8296,7 +8296,7 @@
             </a:ln>
             <a:extLst>
               <a:ext uri="{91240B29-F687-4f45-9708-019B960494DF}">
-                <a14:hiddenLine xmlns:a14="http://schemas.microsoft.com/office/drawing/2010/main" xmlns="" w="9525">
+                <a14:hiddenLine xmlns="" xmlns:a14="http://schemas.microsoft.com/office/drawing/2010/main" w="9525">
                   <a:solidFill>
                     <a:srgbClr val="000000"/>
                   </a:solidFill>
@@ -8436,7 +8436,7 @@
           <a:p>
             <a:fld id="{48A87A34-81AB-432B-8DAE-1953F412C126}" type="datetimeFigureOut">
               <a:rPr lang="en-US" dirty="0"/>
-              <a:t>10/16/2017</a:t>
+              <a:t>10/17/2017</a:t>
             </a:fld>
             <a:endParaRPr lang="en-US" dirty="0"/>
           </a:p>
@@ -8698,7 +8698,7 @@
           <a:p>
             <a:fld id="{48A87A34-81AB-432B-8DAE-1953F412C126}" type="datetimeFigureOut">
               <a:rPr lang="en-US" dirty="0"/>
-              <a:t>10/16/2017</a:t>
+              <a:t>10/17/2017</a:t>
             </a:fld>
             <a:endParaRPr lang="en-US" dirty="0"/>
           </a:p>
@@ -8889,7 +8889,7 @@
           <a:p>
             <a:fld id="{48A87A34-81AB-432B-8DAE-1953F412C126}" type="datetimeFigureOut">
               <a:rPr lang="en-US" dirty="0"/>
-              <a:t>10/16/2017</a:t>
+              <a:t>10/17/2017</a:t>
             </a:fld>
             <a:endParaRPr lang="en-US" dirty="0"/>
           </a:p>
@@ -9147,7 +9147,7 @@
           <a:p>
             <a:fld id="{48A87A34-81AB-432B-8DAE-1953F412C126}" type="datetimeFigureOut">
               <a:rPr lang="en-US" dirty="0"/>
-              <a:t>10/16/2017</a:t>
+              <a:t>10/17/2017</a:t>
             </a:fld>
             <a:endParaRPr lang="en-US" dirty="0"/>
           </a:p>
@@ -9576,7 +9576,7 @@
           <a:p>
             <a:fld id="{48A87A34-81AB-432B-8DAE-1953F412C126}" type="datetimeFigureOut">
               <a:rPr lang="en-US" dirty="0"/>
-              <a:t>10/16/2017</a:t>
+              <a:t>10/17/2017</a:t>
             </a:fld>
             <a:endParaRPr lang="en-US" dirty="0"/>
           </a:p>
@@ -10117,7 +10117,7 @@
           <a:p>
             <a:fld id="{48A87A34-81AB-432B-8DAE-1953F412C126}" type="datetimeFigureOut">
               <a:rPr lang="en-US" dirty="0"/>
-              <a:t>10/16/2017</a:t>
+              <a:t>10/17/2017</a:t>
             </a:fld>
             <a:endParaRPr lang="en-US" dirty="0"/>
           </a:p>
@@ -10832,7 +10832,7 @@
           <a:p>
             <a:fld id="{48A87A34-81AB-432B-8DAE-1953F412C126}" type="datetimeFigureOut">
               <a:rPr lang="en-US" dirty="0"/>
-              <a:t>10/16/2017</a:t>
+              <a:t>10/17/2017</a:t>
             </a:fld>
             <a:endParaRPr lang="en-US" dirty="0"/>
           </a:p>
@@ -10997,7 +10997,7 @@
           <a:p>
             <a:fld id="{48A87A34-81AB-432B-8DAE-1953F412C126}" type="datetimeFigureOut">
               <a:rPr lang="en-US" dirty="0"/>
-              <a:t>10/16/2017</a:t>
+              <a:t>10/17/2017</a:t>
             </a:fld>
             <a:endParaRPr lang="en-US" dirty="0"/>
           </a:p>
@@ -11172,7 +11172,7 @@
           <a:p>
             <a:fld id="{48A87A34-81AB-432B-8DAE-1953F412C126}" type="datetimeFigureOut">
               <a:rPr lang="en-US" dirty="0"/>
-              <a:t>10/16/2017</a:t>
+              <a:t>10/17/2017</a:t>
             </a:fld>
             <a:endParaRPr lang="en-US" dirty="0"/>
           </a:p>
@@ -11337,7 +11337,7 @@
           <a:p>
             <a:fld id="{48A87A34-81AB-432B-8DAE-1953F412C126}" type="datetimeFigureOut">
               <a:rPr lang="en-US" dirty="0"/>
-              <a:t>10/16/2017</a:t>
+              <a:t>10/17/2017</a:t>
             </a:fld>
             <a:endParaRPr lang="en-US" dirty="0"/>
           </a:p>
@@ -11582,7 +11582,7 @@
           <a:p>
             <a:fld id="{48A87A34-81AB-432B-8DAE-1953F412C126}" type="datetimeFigureOut">
               <a:rPr lang="en-US" dirty="0"/>
-              <a:t>10/16/2017</a:t>
+              <a:t>10/17/2017</a:t>
             </a:fld>
             <a:endParaRPr lang="en-US" dirty="0"/>
           </a:p>
@@ -11809,7 +11809,7 @@
           <a:p>
             <a:fld id="{48A87A34-81AB-432B-8DAE-1953F412C126}" type="datetimeFigureOut">
               <a:rPr lang="en-US" dirty="0"/>
-              <a:t>10/16/2017</a:t>
+              <a:t>10/17/2017</a:t>
             </a:fld>
             <a:endParaRPr lang="en-US" dirty="0"/>
           </a:p>
@@ -12185,7 +12185,7 @@
           <a:p>
             <a:fld id="{48A87A34-81AB-432B-8DAE-1953F412C126}" type="datetimeFigureOut">
               <a:rPr lang="en-US" dirty="0"/>
-              <a:t>10/16/2017</a:t>
+              <a:t>10/17/2017</a:t>
             </a:fld>
             <a:endParaRPr lang="en-US" dirty="0"/>
           </a:p>
@@ -12298,7 +12298,7 @@
           <a:p>
             <a:fld id="{48A87A34-81AB-432B-8DAE-1953F412C126}" type="datetimeFigureOut">
               <a:rPr lang="en-US" dirty="0"/>
-              <a:t>10/16/2017</a:t>
+              <a:t>10/17/2017</a:t>
             </a:fld>
             <a:endParaRPr lang="en-US" dirty="0"/>
           </a:p>
@@ -12388,7 +12388,7 @@
           <a:p>
             <a:fld id="{48A87A34-81AB-432B-8DAE-1953F412C126}" type="datetimeFigureOut">
               <a:rPr lang="en-US" dirty="0"/>
-              <a:t>10/16/2017</a:t>
+              <a:t>10/17/2017</a:t>
             </a:fld>
             <a:endParaRPr lang="en-US" dirty="0"/>
           </a:p>
@@ -12632,7 +12632,7 @@
           <a:p>
             <a:fld id="{48A87A34-81AB-432B-8DAE-1953F412C126}" type="datetimeFigureOut">
               <a:rPr lang="en-US" dirty="0"/>
-              <a:t>10/16/2017</a:t>
+              <a:t>10/17/2017</a:t>
             </a:fld>
             <a:endParaRPr lang="en-US" dirty="0"/>
           </a:p>
@@ -12907,7 +12907,7 @@
           <a:p>
             <a:fld id="{48A87A34-81AB-432B-8DAE-1953F412C126}" type="datetimeFigureOut">
               <a:rPr lang="en-US" dirty="0"/>
-              <a:t>10/16/2017</a:t>
+              <a:t>10/17/2017</a:t>
             </a:fld>
             <a:endParaRPr lang="en-US" dirty="0"/>
           </a:p>
@@ -13025,7 +13025,7 @@
           <a:noFill/>
           <a:extLst>
             <a:ext uri="{909E8E84-426E-40dd-AFC4-6F175D3DCCD1}">
-              <a14:hiddenFill xmlns:a14="http://schemas.microsoft.com/office/drawing/2010/main" xmlns="">
+              <a14:hiddenFill xmlns="" xmlns:a14="http://schemas.microsoft.com/office/drawing/2010/main">
                 <a:solidFill>
                   <a:srgbClr val="FFFFFF"/>
                 </a:solidFill>
@@ -13099,7 +13099,7 @@
               </a:ln>
               <a:extLst>
                 <a:ext uri="{91240B29-F687-4f45-9708-019B960494DF}">
-                  <a14:hiddenLine xmlns:a14="http://schemas.microsoft.com/office/drawing/2010/main" xmlns="" w="9525">
+                  <a14:hiddenLine xmlns="" xmlns:a14="http://schemas.microsoft.com/office/drawing/2010/main" w="9525">
                     <a:solidFill>
                       <a:srgbClr val="000000"/>
                     </a:solidFill>
@@ -13189,7 +13189,7 @@
               </a:ln>
               <a:extLst>
                 <a:ext uri="{91240B29-F687-4f45-9708-019B960494DF}">
-                  <a14:hiddenLine xmlns:a14="http://schemas.microsoft.com/office/drawing/2010/main" xmlns="" w="9525">
+                  <a14:hiddenLine xmlns="" xmlns:a14="http://schemas.microsoft.com/office/drawing/2010/main" w="9525">
                     <a:solidFill>
                       <a:srgbClr val="000000"/>
                     </a:solidFill>
@@ -13279,7 +13279,7 @@
               </a:ln>
               <a:extLst>
                 <a:ext uri="{91240B29-F687-4f45-9708-019B960494DF}">
-                  <a14:hiddenLine xmlns:a14="http://schemas.microsoft.com/office/drawing/2010/main" xmlns="" w="9525">
+                  <a14:hiddenLine xmlns="" xmlns:a14="http://schemas.microsoft.com/office/drawing/2010/main" w="9525">
                     <a:solidFill>
                       <a:srgbClr val="000000"/>
                     </a:solidFill>
@@ -13341,7 +13341,7 @@
               </a:ln>
               <a:extLst>
                 <a:ext uri="{91240B29-F687-4f45-9708-019B960494DF}">
-                  <a14:hiddenLine xmlns:a14="http://schemas.microsoft.com/office/drawing/2010/main" xmlns="" w="9525">
+                  <a14:hiddenLine xmlns="" xmlns:a14="http://schemas.microsoft.com/office/drawing/2010/main" w="9525">
                     <a:solidFill>
                       <a:srgbClr val="000000"/>
                     </a:solidFill>
@@ -13431,7 +13431,7 @@
               </a:ln>
               <a:extLst>
                 <a:ext uri="{91240B29-F687-4f45-9708-019B960494DF}">
-                  <a14:hiddenLine xmlns:a14="http://schemas.microsoft.com/office/drawing/2010/main" xmlns="" w="9525">
+                  <a14:hiddenLine xmlns="" xmlns:a14="http://schemas.microsoft.com/office/drawing/2010/main" w="9525">
                     <a:solidFill>
                       <a:srgbClr val="000000"/>
                     </a:solidFill>
@@ -13493,7 +13493,7 @@
               </a:ln>
               <a:extLst>
                 <a:ext uri="{91240B29-F687-4f45-9708-019B960494DF}">
-                  <a14:hiddenLine xmlns:a14="http://schemas.microsoft.com/office/drawing/2010/main" xmlns="" w="9525">
+                  <a14:hiddenLine xmlns="" xmlns:a14="http://schemas.microsoft.com/office/drawing/2010/main" w="9525">
                     <a:solidFill>
                       <a:srgbClr val="000000"/>
                     </a:solidFill>
@@ -13555,7 +13555,7 @@
               </a:ln>
               <a:extLst>
                 <a:ext uri="{91240B29-F687-4f45-9708-019B960494DF}">
-                  <a14:hiddenLine xmlns:a14="http://schemas.microsoft.com/office/drawing/2010/main" xmlns="" w="9525">
+                  <a14:hiddenLine xmlns="" xmlns:a14="http://schemas.microsoft.com/office/drawing/2010/main" w="9525">
                     <a:solidFill>
                       <a:srgbClr val="000000"/>
                     </a:solidFill>
@@ -13645,7 +13645,7 @@
               </a:ln>
               <a:extLst>
                 <a:ext uri="{91240B29-F687-4f45-9708-019B960494DF}">
-                  <a14:hiddenLine xmlns:a14="http://schemas.microsoft.com/office/drawing/2010/main" xmlns="" w="9525">
+                  <a14:hiddenLine xmlns="" xmlns:a14="http://schemas.microsoft.com/office/drawing/2010/main" w="9525">
                     <a:solidFill>
                       <a:srgbClr val="000000"/>
                     </a:solidFill>
@@ -13735,7 +13735,7 @@
               </a:ln>
               <a:extLst>
                 <a:ext uri="{91240B29-F687-4f45-9708-019B960494DF}">
-                  <a14:hiddenLine xmlns:a14="http://schemas.microsoft.com/office/drawing/2010/main" xmlns="" w="9525">
+                  <a14:hiddenLine xmlns="" xmlns:a14="http://schemas.microsoft.com/office/drawing/2010/main" w="9525">
                     <a:solidFill>
                       <a:srgbClr val="000000"/>
                     </a:solidFill>
@@ -13797,7 +13797,7 @@
               </a:ln>
               <a:extLst>
                 <a:ext uri="{91240B29-F687-4f45-9708-019B960494DF}">
-                  <a14:hiddenLine xmlns:a14="http://schemas.microsoft.com/office/drawing/2010/main" xmlns="" w="9525">
+                  <a14:hiddenLine xmlns="" xmlns:a14="http://schemas.microsoft.com/office/drawing/2010/main" w="9525">
                     <a:solidFill>
                       <a:srgbClr val="000000"/>
                     </a:solidFill>
@@ -13907,7 +13907,7 @@
               </a:ln>
               <a:extLst>
                 <a:ext uri="{91240B29-F687-4f45-9708-019B960494DF}">
-                  <a14:hiddenLine xmlns:a14="http://schemas.microsoft.com/office/drawing/2010/main" xmlns="" w="9525">
+                  <a14:hiddenLine xmlns="" xmlns:a14="http://schemas.microsoft.com/office/drawing/2010/main" w="9525">
                     <a:solidFill>
                       <a:srgbClr val="000000"/>
                     </a:solidFill>
@@ -13991,7 +13991,7 @@
               </a:ln>
               <a:extLst>
                 <a:ext uri="{91240B29-F687-4f45-9708-019B960494DF}">
-                  <a14:hiddenLine xmlns:a14="http://schemas.microsoft.com/office/drawing/2010/main" xmlns="" w="9525">
+                  <a14:hiddenLine xmlns="" xmlns:a14="http://schemas.microsoft.com/office/drawing/2010/main" w="9525">
                     <a:solidFill>
                       <a:srgbClr val="000000"/>
                     </a:solidFill>
@@ -14053,7 +14053,7 @@
               </a:ln>
               <a:extLst>
                 <a:ext uri="{91240B29-F687-4f45-9708-019B960494DF}">
-                  <a14:hiddenLine xmlns:a14="http://schemas.microsoft.com/office/drawing/2010/main" xmlns="" w="9525">
+                  <a14:hiddenLine xmlns="" xmlns:a14="http://schemas.microsoft.com/office/drawing/2010/main" w="9525">
                     <a:solidFill>
                       <a:srgbClr val="000000"/>
                     </a:solidFill>
@@ -14115,7 +14115,7 @@
               </a:ln>
               <a:extLst>
                 <a:ext uri="{91240B29-F687-4f45-9708-019B960494DF}">
-                  <a14:hiddenLine xmlns:a14="http://schemas.microsoft.com/office/drawing/2010/main" xmlns="" w="9525">
+                  <a14:hiddenLine xmlns="" xmlns:a14="http://schemas.microsoft.com/office/drawing/2010/main" w="9525">
                     <a:solidFill>
                       <a:srgbClr val="000000"/>
                     </a:solidFill>
@@ -14205,7 +14205,7 @@
               </a:ln>
               <a:extLst>
                 <a:ext uri="{91240B29-F687-4f45-9708-019B960494DF}">
-                  <a14:hiddenLine xmlns:a14="http://schemas.microsoft.com/office/drawing/2010/main" xmlns="" w="9525">
+                  <a14:hiddenLine xmlns="" xmlns:a14="http://schemas.microsoft.com/office/drawing/2010/main" w="9525">
                     <a:solidFill>
                       <a:srgbClr val="000000"/>
                     </a:solidFill>
@@ -14239,7 +14239,7 @@
               </a:ln>
               <a:extLst>
                 <a:ext uri="{91240B29-F687-4f45-9708-019B960494DF}">
-                  <a14:hiddenLine xmlns:a14="http://schemas.microsoft.com/office/drawing/2010/main" xmlns="" w="9525">
+                  <a14:hiddenLine xmlns="" xmlns:a14="http://schemas.microsoft.com/office/drawing/2010/main" w="9525">
                     <a:solidFill>
                       <a:srgbClr val="000000"/>
                     </a:solidFill>
@@ -14304,7 +14304,7 @@
               </a:ln>
               <a:extLst>
                 <a:ext uri="{91240B29-F687-4f45-9708-019B960494DF}">
-                  <a14:hiddenLine xmlns:a14="http://schemas.microsoft.com/office/drawing/2010/main" xmlns="" w="9525">
+                  <a14:hiddenLine xmlns="" xmlns:a14="http://schemas.microsoft.com/office/drawing/2010/main" w="9525">
                     <a:solidFill>
                       <a:srgbClr val="000000"/>
                     </a:solidFill>
@@ -14394,7 +14394,7 @@
               </a:ln>
               <a:extLst>
                 <a:ext uri="{91240B29-F687-4f45-9708-019B960494DF}">
-                  <a14:hiddenLine xmlns:a14="http://schemas.microsoft.com/office/drawing/2010/main" xmlns="" w="9525">
+                  <a14:hiddenLine xmlns="" xmlns:a14="http://schemas.microsoft.com/office/drawing/2010/main" w="9525">
                     <a:solidFill>
                       <a:srgbClr val="000000"/>
                     </a:solidFill>
@@ -14456,7 +14456,7 @@
               </a:ln>
               <a:extLst>
                 <a:ext uri="{91240B29-F687-4f45-9708-019B960494DF}">
-                  <a14:hiddenLine xmlns:a14="http://schemas.microsoft.com/office/drawing/2010/main" xmlns="" w="9525">
+                  <a14:hiddenLine xmlns="" xmlns:a14="http://schemas.microsoft.com/office/drawing/2010/main" w="9525">
                     <a:solidFill>
                       <a:srgbClr val="000000"/>
                     </a:solidFill>
@@ -14546,7 +14546,7 @@
               </a:ln>
               <a:extLst>
                 <a:ext uri="{91240B29-F687-4f45-9708-019B960494DF}">
-                  <a14:hiddenLine xmlns:a14="http://schemas.microsoft.com/office/drawing/2010/main" xmlns="" w="9525">
+                  <a14:hiddenLine xmlns="" xmlns:a14="http://schemas.microsoft.com/office/drawing/2010/main" w="9525">
                     <a:solidFill>
                       <a:srgbClr val="000000"/>
                     </a:solidFill>
@@ -14611,7 +14611,7 @@
               </a:ln>
               <a:extLst>
                 <a:ext uri="{91240B29-F687-4f45-9708-019B960494DF}">
-                  <a14:hiddenLine xmlns:a14="http://schemas.microsoft.com/office/drawing/2010/main" xmlns="" w="9525">
+                  <a14:hiddenLine xmlns="" xmlns:a14="http://schemas.microsoft.com/office/drawing/2010/main" w="9525">
                     <a:solidFill>
                       <a:srgbClr val="000000"/>
                     </a:solidFill>
@@ -14673,7 +14673,7 @@
               </a:ln>
               <a:extLst>
                 <a:ext uri="{91240B29-F687-4f45-9708-019B960494DF}">
-                  <a14:hiddenLine xmlns:a14="http://schemas.microsoft.com/office/drawing/2010/main" xmlns="" w="9525">
+                  <a14:hiddenLine xmlns="" xmlns:a14="http://schemas.microsoft.com/office/drawing/2010/main" w="9525">
                     <a:solidFill>
                       <a:srgbClr val="000000"/>
                     </a:solidFill>
@@ -14763,7 +14763,7 @@
               </a:ln>
               <a:extLst>
                 <a:ext uri="{91240B29-F687-4f45-9708-019B960494DF}">
-                  <a14:hiddenLine xmlns:a14="http://schemas.microsoft.com/office/drawing/2010/main" xmlns="" w="9525">
+                  <a14:hiddenLine xmlns="" xmlns:a14="http://schemas.microsoft.com/office/drawing/2010/main" w="9525">
                     <a:solidFill>
                       <a:srgbClr val="000000"/>
                     </a:solidFill>
@@ -14853,7 +14853,7 @@
               </a:ln>
               <a:extLst>
                 <a:ext uri="{91240B29-F687-4f45-9708-019B960494DF}">
-                  <a14:hiddenLine xmlns:a14="http://schemas.microsoft.com/office/drawing/2010/main" xmlns="" w="9525">
+                  <a14:hiddenLine xmlns="" xmlns:a14="http://schemas.microsoft.com/office/drawing/2010/main" w="9525">
                     <a:solidFill>
                       <a:srgbClr val="000000"/>
                     </a:solidFill>
@@ -14918,7 +14918,7 @@
               </a:ln>
               <a:extLst>
                 <a:ext uri="{91240B29-F687-4f45-9708-019B960494DF}">
-                  <a14:hiddenLine xmlns:a14="http://schemas.microsoft.com/office/drawing/2010/main" xmlns="" w="9525">
+                  <a14:hiddenLine xmlns="" xmlns:a14="http://schemas.microsoft.com/office/drawing/2010/main" w="9525">
                     <a:solidFill>
                       <a:srgbClr val="000000"/>
                     </a:solidFill>
@@ -15038,7 +15038,7 @@
               </a:ln>
               <a:extLst>
                 <a:ext uri="{91240B29-F687-4f45-9708-019B960494DF}">
-                  <a14:hiddenLine xmlns:a14="http://schemas.microsoft.com/office/drawing/2010/main" xmlns="" w="9525">
+                  <a14:hiddenLine xmlns="" xmlns:a14="http://schemas.microsoft.com/office/drawing/2010/main" w="9525">
                     <a:solidFill>
                       <a:srgbClr val="000000"/>
                     </a:solidFill>
@@ -15119,7 +15119,7 @@
               </a:ln>
               <a:extLst>
                 <a:ext uri="{91240B29-F687-4f45-9708-019B960494DF}">
-                  <a14:hiddenLine xmlns:a14="http://schemas.microsoft.com/office/drawing/2010/main" xmlns="" w="9525">
+                  <a14:hiddenLine xmlns="" xmlns:a14="http://schemas.microsoft.com/office/drawing/2010/main" w="9525">
                     <a:solidFill>
                       <a:srgbClr val="000000"/>
                     </a:solidFill>
@@ -15234,7 +15234,7 @@
               </a:ln>
               <a:extLst>
                 <a:ext uri="{91240B29-F687-4f45-9708-019B960494DF}">
-                  <a14:hiddenLine xmlns:a14="http://schemas.microsoft.com/office/drawing/2010/main" xmlns="" w="9525">
+                  <a14:hiddenLine xmlns="" xmlns:a14="http://schemas.microsoft.com/office/drawing/2010/main" w="9525">
                     <a:solidFill>
                       <a:srgbClr val="000000"/>
                     </a:solidFill>
@@ -15324,7 +15324,7 @@
               </a:ln>
               <a:extLst>
                 <a:ext uri="{91240B29-F687-4f45-9708-019B960494DF}">
-                  <a14:hiddenLine xmlns:a14="http://schemas.microsoft.com/office/drawing/2010/main" xmlns="" w="9525">
+                  <a14:hiddenLine xmlns="" xmlns:a14="http://schemas.microsoft.com/office/drawing/2010/main" w="9525">
                     <a:solidFill>
                       <a:srgbClr val="000000"/>
                     </a:solidFill>
@@ -15389,7 +15389,7 @@
               </a:ln>
               <a:extLst>
                 <a:ext uri="{91240B29-F687-4f45-9708-019B960494DF}">
-                  <a14:hiddenLine xmlns:a14="http://schemas.microsoft.com/office/drawing/2010/main" xmlns="" w="9525">
+                  <a14:hiddenLine xmlns="" xmlns:a14="http://schemas.microsoft.com/office/drawing/2010/main" w="9525">
                     <a:solidFill>
                       <a:srgbClr val="000000"/>
                     </a:solidFill>
@@ -15479,7 +15479,7 @@
               </a:ln>
               <a:extLst>
                 <a:ext uri="{91240B29-F687-4f45-9708-019B960494DF}">
-                  <a14:hiddenLine xmlns:a14="http://schemas.microsoft.com/office/drawing/2010/main" xmlns="" w="9525">
+                  <a14:hiddenLine xmlns="" xmlns:a14="http://schemas.microsoft.com/office/drawing/2010/main" w="9525">
                     <a:solidFill>
                       <a:srgbClr val="000000"/>
                     </a:solidFill>
@@ -15547,7 +15547,7 @@
               </a:ln>
               <a:extLst>
                 <a:ext uri="{91240B29-F687-4f45-9708-019B960494DF}">
-                  <a14:hiddenLine xmlns:a14="http://schemas.microsoft.com/office/drawing/2010/main" xmlns="" w="9525">
+                  <a14:hiddenLine xmlns="" xmlns:a14="http://schemas.microsoft.com/office/drawing/2010/main" w="9525">
                     <a:solidFill>
                       <a:srgbClr val="000000"/>
                     </a:solidFill>
@@ -15637,7 +15637,7 @@
               </a:ln>
               <a:extLst>
                 <a:ext uri="{91240B29-F687-4f45-9708-019B960494DF}">
-                  <a14:hiddenLine xmlns:a14="http://schemas.microsoft.com/office/drawing/2010/main" xmlns="" w="9525">
+                  <a14:hiddenLine xmlns="" xmlns:a14="http://schemas.microsoft.com/office/drawing/2010/main" w="9525">
                     <a:solidFill>
                       <a:srgbClr val="000000"/>
                     </a:solidFill>
@@ -15705,7 +15705,7 @@
               </a:ln>
               <a:extLst>
                 <a:ext uri="{91240B29-F687-4f45-9708-019B960494DF}">
-                  <a14:hiddenLine xmlns:a14="http://schemas.microsoft.com/office/drawing/2010/main" xmlns="" w="9525">
+                  <a14:hiddenLine xmlns="" xmlns:a14="http://schemas.microsoft.com/office/drawing/2010/main" w="9525">
                     <a:solidFill>
                       <a:srgbClr val="000000"/>
                     </a:solidFill>
@@ -15795,7 +15795,7 @@
               </a:ln>
               <a:extLst>
                 <a:ext uri="{91240B29-F687-4f45-9708-019B960494DF}">
-                  <a14:hiddenLine xmlns:a14="http://schemas.microsoft.com/office/drawing/2010/main" xmlns="" w="9525">
+                  <a14:hiddenLine xmlns="" xmlns:a14="http://schemas.microsoft.com/office/drawing/2010/main" w="9525">
                     <a:solidFill>
                       <a:srgbClr val="000000"/>
                     </a:solidFill>
@@ -15829,7 +15829,7 @@
               </a:ln>
               <a:extLst>
                 <a:ext uri="{91240B29-F687-4f45-9708-019B960494DF}">
-                  <a14:hiddenLine xmlns:a14="http://schemas.microsoft.com/office/drawing/2010/main" xmlns="" w="9525">
+                  <a14:hiddenLine xmlns="" xmlns:a14="http://schemas.microsoft.com/office/drawing/2010/main" w="9525">
                     <a:solidFill>
                       <a:srgbClr val="000000"/>
                     </a:solidFill>
@@ -15970,7 +15970,7 @@
             <a:fld id="{48A87A34-81AB-432B-8DAE-1953F412C126}" type="datetimeFigureOut">
               <a:rPr lang="en-US" dirty="0"/>
               <a:pPr/>
-              <a:t>10/16/2017</a:t>
+              <a:t>10/17/2017</a:t>
             </a:fld>
             <a:endParaRPr lang="en-US" dirty="0"/>
           </a:p>

</xml_diff>

<commit_message>
Movielens dataset added and other small additions.
</commit_message>
<xml_diff>
--- a/presentation.pptx
+++ b/presentation.pptx
@@ -5,7 +5,7 @@
     <p:sldMasterId id="2147483648" r:id="rId1"/>
   </p:sldMasterIdLst>
   <p:notesMasterIdLst>
-    <p:notesMasterId r:id="rId45"/>
+    <p:notesMasterId r:id="rId47"/>
   </p:notesMasterIdLst>
   <p:sldIdLst>
     <p:sldId id="256" r:id="rId2"/>
@@ -51,6 +51,8 @@
     <p:sldId id="293" r:id="rId42"/>
     <p:sldId id="294" r:id="rId43"/>
     <p:sldId id="288" r:id="rId44"/>
+    <p:sldId id="302" r:id="rId45"/>
+    <p:sldId id="301" r:id="rId46"/>
   </p:sldIdLst>
   <p:sldSz cx="12192000" cy="6858000"/>
   <p:notesSz cx="6858000" cy="9144000"/>
@@ -1854,11 +1856,7 @@
           <a:p>
             <a:r>
               <a:rPr lang="de-CH" dirty="0" smtClean="0"/>
-              <a:t>Wir wissen was es ist, wirklich interessant ist aber, was man damit tun kann. Das werden wir später sehen, aber dies hier vorab</a:t>
-            </a:r>
-            <a:r>
-              <a:rPr lang="de-CH" dirty="0" smtClean="0"/>
-              <a:t>.</a:t>
+              <a:t>Wir wissen was es ist, wirklich interessant ist aber, was man damit tun kann. Das werden wir später sehen, aber dies hier vorab.</a:t>
             </a:r>
           </a:p>
           <a:p>
@@ -2695,11 +2693,7 @@
             </a:r>
             <a:r>
               <a:rPr lang="de-CH" baseline="0" dirty="0" smtClean="0"/>
-              <a:t> man das bereits macht</a:t>
-            </a:r>
-            <a:r>
-              <a:rPr lang="de-CH" baseline="0" dirty="0" smtClean="0"/>
-              <a:t>?</a:t>
+              <a:t> man das bereits macht?</a:t>
             </a:r>
           </a:p>
           <a:p>
@@ -2936,18 +2930,24 @@
           <a:lstStyle/>
           <a:p>
             <a:r>
+              <a:rPr lang="de-CH" dirty="0" err="1" smtClean="0"/>
+              <a:t>Markov</a:t>
+            </a:r>
+            <a:r>
               <a:rPr lang="de-CH" dirty="0" smtClean="0"/>
-              <a:t>Labeled</a:t>
-            </a:r>
-          </a:p>
-          <a:p>
+              <a:t> </a:t>
+            </a:r>
+            <a:r>
+              <a:rPr lang="de-CH" dirty="0" err="1" smtClean="0"/>
+              <a:t>Descision</a:t>
+            </a:r>
             <a:r>
               <a:rPr lang="de-CH" dirty="0" smtClean="0"/>
-              <a:t>Weiss jemand wo</a:t>
-            </a:r>
-            <a:r>
-              <a:rPr lang="de-CH" baseline="0" dirty="0" smtClean="0"/>
-              <a:t> man das bereits macht?</a:t>
+              <a:t> </a:t>
+            </a:r>
+            <a:r>
+              <a:rPr lang="de-CH" dirty="0" err="1" smtClean="0"/>
+              <a:t>Process</a:t>
             </a:r>
             <a:endParaRPr lang="de-CH" dirty="0"/>
           </a:p>
@@ -3604,6 +3604,226 @@
     <p:extLst>
       <p:ext uri="{BB962C8B-B14F-4D97-AF65-F5344CB8AC3E}">
         <p14:creationId xmlns:p14="http://schemas.microsoft.com/office/powerpoint/2010/main" val="2774138433"/>
+      </p:ext>
+    </p:extLst>
+  </p:cSld>
+  <p:clrMapOvr>
+    <a:masterClrMapping/>
+  </p:clrMapOvr>
+</p:notes>
+</file>
+
+<file path=ppt/notesSlides/notesSlide33.xml><?xml version="1.0" encoding="utf-8"?>
+<p:notes xmlns:a="http://schemas.openxmlformats.org/drawingml/2006/main" xmlns:r="http://schemas.openxmlformats.org/officeDocument/2006/relationships" xmlns:p="http://schemas.openxmlformats.org/presentationml/2006/main">
+  <p:cSld>
+    <p:spTree>
+      <p:nvGrpSpPr>
+        <p:cNvPr id="1" name=""/>
+        <p:cNvGrpSpPr/>
+        <p:nvPr/>
+      </p:nvGrpSpPr>
+      <p:grpSpPr>
+        <a:xfrm>
+          <a:off x="0" y="0"/>
+          <a:ext cx="0" cy="0"/>
+          <a:chOff x="0" y="0"/>
+          <a:chExt cx="0" cy="0"/>
+        </a:xfrm>
+      </p:grpSpPr>
+      <p:sp>
+        <p:nvSpPr>
+          <p:cNvPr id="2" name="Slide Image Placeholder 1"/>
+          <p:cNvSpPr>
+            <a:spLocks noGrp="1" noRot="1" noChangeAspect="1"/>
+          </p:cNvSpPr>
+          <p:nvPr>
+            <p:ph type="sldImg"/>
+          </p:nvPr>
+        </p:nvSpPr>
+        <p:spPr/>
+      </p:sp>
+      <p:sp>
+        <p:nvSpPr>
+          <p:cNvPr id="3" name="Notes Placeholder 2"/>
+          <p:cNvSpPr>
+            <a:spLocks noGrp="1"/>
+          </p:cNvSpPr>
+          <p:nvPr>
+            <p:ph type="body" idx="1"/>
+          </p:nvPr>
+        </p:nvSpPr>
+        <p:spPr/>
+        <p:txBody>
+          <a:bodyPr/>
+          <a:lstStyle/>
+          <a:p>
+            <a:r>
+              <a:rPr lang="de-CH" dirty="0" err="1" smtClean="0"/>
+              <a:t>Concerns</a:t>
+            </a:r>
+            <a:r>
+              <a:rPr lang="de-CH" dirty="0" smtClean="0"/>
+              <a:t>? </a:t>
+            </a:r>
+            <a:endParaRPr lang="de-CH" dirty="0"/>
+          </a:p>
+        </p:txBody>
+      </p:sp>
+      <p:sp>
+        <p:nvSpPr>
+          <p:cNvPr id="4" name="Slide Number Placeholder 3"/>
+          <p:cNvSpPr>
+            <a:spLocks noGrp="1"/>
+          </p:cNvSpPr>
+          <p:nvPr>
+            <p:ph type="sldNum" sz="quarter" idx="10"/>
+          </p:nvPr>
+        </p:nvSpPr>
+        <p:spPr/>
+        <p:txBody>
+          <a:bodyPr/>
+          <a:lstStyle/>
+          <a:p>
+            <a:fld id="{DA58BC1F-B303-41BB-B1E5-E3EE1F495441}" type="slidenum">
+              <a:rPr lang="de-CH" smtClean="0"/>
+              <a:t>44</a:t>
+            </a:fld>
+            <a:endParaRPr lang="de-CH"/>
+          </a:p>
+        </p:txBody>
+      </p:sp>
+    </p:spTree>
+    <p:extLst>
+      <p:ext uri="{BB962C8B-B14F-4D97-AF65-F5344CB8AC3E}">
+        <p14:creationId xmlns:p14="http://schemas.microsoft.com/office/powerpoint/2010/main" val="2949606340"/>
+      </p:ext>
+    </p:extLst>
+  </p:cSld>
+  <p:clrMapOvr>
+    <a:masterClrMapping/>
+  </p:clrMapOvr>
+</p:notes>
+</file>
+
+<file path=ppt/notesSlides/notesSlide34.xml><?xml version="1.0" encoding="utf-8"?>
+<p:notes xmlns:a="http://schemas.openxmlformats.org/drawingml/2006/main" xmlns:r="http://schemas.openxmlformats.org/officeDocument/2006/relationships" xmlns:p="http://schemas.openxmlformats.org/presentationml/2006/main">
+  <p:cSld>
+    <p:spTree>
+      <p:nvGrpSpPr>
+        <p:cNvPr id="1" name=""/>
+        <p:cNvGrpSpPr/>
+        <p:nvPr/>
+      </p:nvGrpSpPr>
+      <p:grpSpPr>
+        <a:xfrm>
+          <a:off x="0" y="0"/>
+          <a:ext cx="0" cy="0"/>
+          <a:chOff x="0" y="0"/>
+          <a:chExt cx="0" cy="0"/>
+        </a:xfrm>
+      </p:grpSpPr>
+      <p:sp>
+        <p:nvSpPr>
+          <p:cNvPr id="2" name="Slide Image Placeholder 1"/>
+          <p:cNvSpPr>
+            <a:spLocks noGrp="1" noRot="1" noChangeAspect="1"/>
+          </p:cNvSpPr>
+          <p:nvPr>
+            <p:ph type="sldImg"/>
+          </p:nvPr>
+        </p:nvSpPr>
+        <p:spPr/>
+      </p:sp>
+      <p:sp>
+        <p:nvSpPr>
+          <p:cNvPr id="3" name="Notes Placeholder 2"/>
+          <p:cNvSpPr>
+            <a:spLocks noGrp="1"/>
+          </p:cNvSpPr>
+          <p:nvPr>
+            <p:ph type="body" idx="1"/>
+          </p:nvPr>
+        </p:nvSpPr>
+        <p:spPr/>
+        <p:txBody>
+          <a:bodyPr/>
+          <a:lstStyle/>
+          <a:p>
+            <a:r>
+              <a:rPr lang="de-CH" dirty="0" smtClean="0"/>
+              <a:t>Ensemble </a:t>
+            </a:r>
+            <a:r>
+              <a:rPr lang="de-CH" dirty="0" err="1" smtClean="0"/>
+              <a:t>learning</a:t>
+            </a:r>
+            <a:r>
+              <a:rPr lang="de-CH" dirty="0" smtClean="0"/>
+              <a:t> (e.g. Random </a:t>
+            </a:r>
+            <a:r>
+              <a:rPr lang="de-CH" dirty="0" err="1" smtClean="0"/>
+              <a:t>Forests</a:t>
+            </a:r>
+            <a:r>
+              <a:rPr lang="de-CH" dirty="0" smtClean="0"/>
+              <a:t>), </a:t>
+            </a:r>
+            <a:r>
+              <a:rPr lang="de-CH" dirty="0" err="1" smtClean="0"/>
+              <a:t>Neural</a:t>
+            </a:r>
+            <a:r>
+              <a:rPr lang="de-CH" dirty="0" smtClean="0"/>
+              <a:t> Networks, </a:t>
+            </a:r>
+            <a:r>
+              <a:rPr lang="de-CH" dirty="0" err="1" smtClean="0"/>
+              <a:t>Recommenders</a:t>
+            </a:r>
+            <a:r>
+              <a:rPr lang="de-CH" dirty="0" smtClean="0"/>
+              <a:t>, Dimension </a:t>
+            </a:r>
+            <a:r>
+              <a:rPr lang="de-CH" dirty="0" err="1" smtClean="0"/>
+              <a:t>Reduction</a:t>
+            </a:r>
+            <a:r>
+              <a:rPr lang="de-CH" dirty="0" smtClean="0"/>
+              <a:t>, Feature Engineering</a:t>
+            </a:r>
+            <a:endParaRPr lang="de-CH" dirty="0"/>
+          </a:p>
+        </p:txBody>
+      </p:sp>
+      <p:sp>
+        <p:nvSpPr>
+          <p:cNvPr id="4" name="Slide Number Placeholder 3"/>
+          <p:cNvSpPr>
+            <a:spLocks noGrp="1"/>
+          </p:cNvSpPr>
+          <p:nvPr>
+            <p:ph type="sldNum" sz="quarter" idx="10"/>
+          </p:nvPr>
+        </p:nvSpPr>
+        <p:spPr/>
+        <p:txBody>
+          <a:bodyPr/>
+          <a:lstStyle/>
+          <a:p>
+            <a:fld id="{DA58BC1F-B303-41BB-B1E5-E3EE1F495441}" type="slidenum">
+              <a:rPr lang="de-CH" smtClean="0"/>
+              <a:t>45</a:t>
+            </a:fld>
+            <a:endParaRPr lang="de-CH"/>
+          </a:p>
+        </p:txBody>
+      </p:sp>
+    </p:spTree>
+    <p:extLst>
+      <p:ext uri="{BB962C8B-B14F-4D97-AF65-F5344CB8AC3E}">
+        <p14:creationId xmlns:p14="http://schemas.microsoft.com/office/powerpoint/2010/main" val="469871801"/>
       </p:ext>
     </p:extLst>
   </p:cSld>
@@ -4376,7 +4596,7 @@
           <a:noFill/>
           <a:extLst>
             <a:ext uri="{909E8E84-426E-40dd-AFC4-6F175D3DCCD1}">
-              <a14:hiddenFill xmlns:a14="http://schemas.microsoft.com/office/drawing/2010/main" xmlns="">
+              <a14:hiddenFill xmlns="" xmlns:a14="http://schemas.microsoft.com/office/drawing/2010/main">
                 <a:solidFill>
                   <a:srgbClr val="FFFFFF"/>
                 </a:solidFill>
@@ -4435,7 +4655,7 @@
             </a:ln>
             <a:extLst>
               <a:ext uri="{91240B29-F687-4f45-9708-019B960494DF}">
-                <a14:hiddenLine xmlns:a14="http://schemas.microsoft.com/office/drawing/2010/main" xmlns="" w="9525">
+                <a14:hiddenLine xmlns="" xmlns:a14="http://schemas.microsoft.com/office/drawing/2010/main" w="9525">
                   <a:solidFill>
                     <a:srgbClr val="000000"/>
                   </a:solidFill>
@@ -4525,7 +4745,7 @@
             </a:ln>
             <a:extLst>
               <a:ext uri="{91240B29-F687-4f45-9708-019B960494DF}">
-                <a14:hiddenLine xmlns:a14="http://schemas.microsoft.com/office/drawing/2010/main" xmlns="" w="9525">
+                <a14:hiddenLine xmlns="" xmlns:a14="http://schemas.microsoft.com/office/drawing/2010/main" w="9525">
                   <a:solidFill>
                     <a:srgbClr val="000000"/>
                   </a:solidFill>
@@ -4615,7 +4835,7 @@
             </a:ln>
             <a:extLst>
               <a:ext uri="{91240B29-F687-4f45-9708-019B960494DF}">
-                <a14:hiddenLine xmlns:a14="http://schemas.microsoft.com/office/drawing/2010/main" xmlns="" w="9525">
+                <a14:hiddenLine xmlns="" xmlns:a14="http://schemas.microsoft.com/office/drawing/2010/main" w="9525">
                   <a:solidFill>
                     <a:srgbClr val="000000"/>
                   </a:solidFill>
@@ -4649,7 +4869,7 @@
             </a:ln>
             <a:extLst>
               <a:ext uri="{91240B29-F687-4f45-9708-019B960494DF}">
-                <a14:hiddenLine xmlns:a14="http://schemas.microsoft.com/office/drawing/2010/main" xmlns="" w="9525">
+                <a14:hiddenLine xmlns="" xmlns:a14="http://schemas.microsoft.com/office/drawing/2010/main" w="9525">
                   <a:solidFill>
                     <a:srgbClr val="000000"/>
                   </a:solidFill>
@@ -4739,7 +4959,7 @@
             </a:ln>
             <a:extLst>
               <a:ext uri="{91240B29-F687-4f45-9708-019B960494DF}">
-                <a14:hiddenLine xmlns:a14="http://schemas.microsoft.com/office/drawing/2010/main" xmlns="" w="9525">
+                <a14:hiddenLine xmlns="" xmlns:a14="http://schemas.microsoft.com/office/drawing/2010/main" w="9525">
                   <a:solidFill>
                     <a:srgbClr val="000000"/>
                   </a:solidFill>
@@ -4801,7 +5021,7 @@
             </a:ln>
             <a:extLst>
               <a:ext uri="{91240B29-F687-4f45-9708-019B960494DF}">
-                <a14:hiddenLine xmlns:a14="http://schemas.microsoft.com/office/drawing/2010/main" xmlns="" w="9525">
+                <a14:hiddenLine xmlns="" xmlns:a14="http://schemas.microsoft.com/office/drawing/2010/main" w="9525">
                   <a:solidFill>
                     <a:srgbClr val="000000"/>
                   </a:solidFill>
@@ -4863,7 +5083,7 @@
             </a:ln>
             <a:extLst>
               <a:ext uri="{91240B29-F687-4f45-9708-019B960494DF}">
-                <a14:hiddenLine xmlns:a14="http://schemas.microsoft.com/office/drawing/2010/main" xmlns="" w="9525">
+                <a14:hiddenLine xmlns="" xmlns:a14="http://schemas.microsoft.com/office/drawing/2010/main" w="9525">
                   <a:solidFill>
                     <a:srgbClr val="000000"/>
                   </a:solidFill>
@@ -4953,7 +5173,7 @@
             </a:ln>
             <a:extLst>
               <a:ext uri="{91240B29-F687-4f45-9708-019B960494DF}">
-                <a14:hiddenLine xmlns:a14="http://schemas.microsoft.com/office/drawing/2010/main" xmlns="" w="9525">
+                <a14:hiddenLine xmlns="" xmlns:a14="http://schemas.microsoft.com/office/drawing/2010/main" w="9525">
                   <a:solidFill>
                     <a:srgbClr val="000000"/>
                   </a:solidFill>
@@ -5015,7 +5235,7 @@
             </a:ln>
             <a:extLst>
               <a:ext uri="{91240B29-F687-4f45-9708-019B960494DF}">
-                <a14:hiddenLine xmlns:a14="http://schemas.microsoft.com/office/drawing/2010/main" xmlns="" w="9525">
+                <a14:hiddenLine xmlns="" xmlns:a14="http://schemas.microsoft.com/office/drawing/2010/main" w="9525">
                   <a:solidFill>
                     <a:srgbClr val="000000"/>
                   </a:solidFill>
@@ -5077,7 +5297,7 @@
             </a:ln>
             <a:extLst>
               <a:ext uri="{91240B29-F687-4f45-9708-019B960494DF}">
-                <a14:hiddenLine xmlns:a14="http://schemas.microsoft.com/office/drawing/2010/main" xmlns="" w="9525">
+                <a14:hiddenLine xmlns="" xmlns:a14="http://schemas.microsoft.com/office/drawing/2010/main" w="9525">
                   <a:solidFill>
                     <a:srgbClr val="000000"/>
                   </a:solidFill>
@@ -5167,7 +5387,7 @@
             </a:ln>
             <a:extLst>
               <a:ext uri="{91240B29-F687-4f45-9708-019B960494DF}">
-                <a14:hiddenLine xmlns:a14="http://schemas.microsoft.com/office/drawing/2010/main" xmlns="" w="9525">
+                <a14:hiddenLine xmlns="" xmlns:a14="http://schemas.microsoft.com/office/drawing/2010/main" w="9525">
                   <a:solidFill>
                     <a:srgbClr val="000000"/>
                   </a:solidFill>
@@ -5257,7 +5477,7 @@
             </a:ln>
             <a:extLst>
               <a:ext uri="{91240B29-F687-4f45-9708-019B960494DF}">
-                <a14:hiddenLine xmlns:a14="http://schemas.microsoft.com/office/drawing/2010/main" xmlns="" w="9525">
+                <a14:hiddenLine xmlns="" xmlns:a14="http://schemas.microsoft.com/office/drawing/2010/main" w="9525">
                   <a:solidFill>
                     <a:srgbClr val="000000"/>
                   </a:solidFill>
@@ -5319,7 +5539,7 @@
             </a:ln>
             <a:extLst>
               <a:ext uri="{91240B29-F687-4f45-9708-019B960494DF}">
-                <a14:hiddenLine xmlns:a14="http://schemas.microsoft.com/office/drawing/2010/main" xmlns="" w="9525">
+                <a14:hiddenLine xmlns="" xmlns:a14="http://schemas.microsoft.com/office/drawing/2010/main" w="9525">
                   <a:solidFill>
                     <a:srgbClr val="000000"/>
                   </a:solidFill>
@@ -5429,7 +5649,7 @@
             </a:ln>
             <a:extLst>
               <a:ext uri="{91240B29-F687-4f45-9708-019B960494DF}">
-                <a14:hiddenLine xmlns:a14="http://schemas.microsoft.com/office/drawing/2010/main" xmlns="" w="9525">
+                <a14:hiddenLine xmlns="" xmlns:a14="http://schemas.microsoft.com/office/drawing/2010/main" w="9525">
                   <a:solidFill>
                     <a:srgbClr val="000000"/>
                   </a:solidFill>
@@ -5491,7 +5711,7 @@
             </a:ln>
             <a:extLst>
               <a:ext uri="{91240B29-F687-4f45-9708-019B960494DF}">
-                <a14:hiddenLine xmlns:a14="http://schemas.microsoft.com/office/drawing/2010/main" xmlns="" w="9525">
+                <a14:hiddenLine xmlns="" xmlns:a14="http://schemas.microsoft.com/office/drawing/2010/main" w="9525">
                   <a:solidFill>
                     <a:srgbClr val="000000"/>
                   </a:solidFill>
@@ -5581,7 +5801,7 @@
             </a:ln>
             <a:extLst>
               <a:ext uri="{91240B29-F687-4f45-9708-019B960494DF}">
-                <a14:hiddenLine xmlns:a14="http://schemas.microsoft.com/office/drawing/2010/main" xmlns="" w="9525">
+                <a14:hiddenLine xmlns="" xmlns:a14="http://schemas.microsoft.com/office/drawing/2010/main" w="9525">
                   <a:solidFill>
                     <a:srgbClr val="000000"/>
                   </a:solidFill>
@@ -5671,7 +5891,7 @@
             </a:ln>
             <a:extLst>
               <a:ext uri="{91240B29-F687-4f45-9708-019B960494DF}">
-                <a14:hiddenLine xmlns:a14="http://schemas.microsoft.com/office/drawing/2010/main" xmlns="" w="9525">
+                <a14:hiddenLine xmlns="" xmlns:a14="http://schemas.microsoft.com/office/drawing/2010/main" w="9525">
                   <a:solidFill>
                     <a:srgbClr val="000000"/>
                   </a:solidFill>
@@ -5733,7 +5953,7 @@
             </a:ln>
             <a:extLst>
               <a:ext uri="{91240B29-F687-4f45-9708-019B960494DF}">
-                <a14:hiddenLine xmlns:a14="http://schemas.microsoft.com/office/drawing/2010/main" xmlns="" w="9525">
+                <a14:hiddenLine xmlns="" xmlns:a14="http://schemas.microsoft.com/office/drawing/2010/main" w="9525">
                   <a:solidFill>
                     <a:srgbClr val="000000"/>
                   </a:solidFill>
@@ -5823,7 +6043,7 @@
             </a:ln>
             <a:extLst>
               <a:ext uri="{91240B29-F687-4f45-9708-019B960494DF}">
-                <a14:hiddenLine xmlns:a14="http://schemas.microsoft.com/office/drawing/2010/main" xmlns="" w="9525">
+                <a14:hiddenLine xmlns="" xmlns:a14="http://schemas.microsoft.com/office/drawing/2010/main" w="9525">
                   <a:solidFill>
                     <a:srgbClr val="000000"/>
                   </a:solidFill>
@@ -5913,7 +6133,7 @@
             </a:ln>
             <a:extLst>
               <a:ext uri="{91240B29-F687-4f45-9708-019B960494DF}">
-                <a14:hiddenLine xmlns:a14="http://schemas.microsoft.com/office/drawing/2010/main" xmlns="" w="9525">
+                <a14:hiddenLine xmlns="" xmlns:a14="http://schemas.microsoft.com/office/drawing/2010/main" w="9525">
                   <a:solidFill>
                     <a:srgbClr val="000000"/>
                   </a:solidFill>
@@ -5969,7 +6189,7 @@
             </a:ln>
             <a:extLst>
               <a:ext uri="{91240B29-F687-4f45-9708-019B960494DF}">
-                <a14:hiddenLine xmlns:a14="http://schemas.microsoft.com/office/drawing/2010/main" xmlns="" w="9525">
+                <a14:hiddenLine xmlns="" xmlns:a14="http://schemas.microsoft.com/office/drawing/2010/main" w="9525">
                   <a:solidFill>
                     <a:srgbClr val="000000"/>
                   </a:solidFill>
@@ -6059,7 +6279,7 @@
             </a:ln>
             <a:extLst>
               <a:ext uri="{91240B29-F687-4f45-9708-019B960494DF}">
-                <a14:hiddenLine xmlns:a14="http://schemas.microsoft.com/office/drawing/2010/main" xmlns="" w="9525">
+                <a14:hiddenLine xmlns="" xmlns:a14="http://schemas.microsoft.com/office/drawing/2010/main" w="9525">
                   <a:solidFill>
                     <a:srgbClr val="000000"/>
                   </a:solidFill>
@@ -6115,7 +6335,7 @@
             </a:ln>
             <a:extLst>
               <a:ext uri="{91240B29-F687-4f45-9708-019B960494DF}">
-                <a14:hiddenLine xmlns:a14="http://schemas.microsoft.com/office/drawing/2010/main" xmlns="" w="9525">
+                <a14:hiddenLine xmlns="" xmlns:a14="http://schemas.microsoft.com/office/drawing/2010/main" w="9525">
                   <a:solidFill>
                     <a:srgbClr val="000000"/>
                   </a:solidFill>
@@ -6205,7 +6425,7 @@
             </a:ln>
             <a:extLst>
               <a:ext uri="{91240B29-F687-4f45-9708-019B960494DF}">
-                <a14:hiddenLine xmlns:a14="http://schemas.microsoft.com/office/drawing/2010/main" xmlns="" w="9525">
+                <a14:hiddenLine xmlns="" xmlns:a14="http://schemas.microsoft.com/office/drawing/2010/main" w="9525">
                   <a:solidFill>
                     <a:srgbClr val="000000"/>
                   </a:solidFill>
@@ -6273,7 +6493,7 @@
             </a:ln>
             <a:extLst>
               <a:ext uri="{91240B29-F687-4f45-9708-019B960494DF}">
-                <a14:hiddenLine xmlns:a14="http://schemas.microsoft.com/office/drawing/2010/main" xmlns="" w="9525">
+                <a14:hiddenLine xmlns="" xmlns:a14="http://schemas.microsoft.com/office/drawing/2010/main" w="9525">
                   <a:solidFill>
                     <a:srgbClr val="000000"/>
                   </a:solidFill>
@@ -6363,7 +6583,7 @@
             </a:ln>
             <a:extLst>
               <a:ext uri="{91240B29-F687-4f45-9708-019B960494DF}">
-                <a14:hiddenLine xmlns:a14="http://schemas.microsoft.com/office/drawing/2010/main" xmlns="" w="9525">
+                <a14:hiddenLine xmlns="" xmlns:a14="http://schemas.microsoft.com/office/drawing/2010/main" w="9525">
                   <a:solidFill>
                     <a:srgbClr val="000000"/>
                   </a:solidFill>
@@ -6431,7 +6651,7 @@
             </a:ln>
             <a:extLst>
               <a:ext uri="{91240B29-F687-4f45-9708-019B960494DF}">
-                <a14:hiddenLine xmlns:a14="http://schemas.microsoft.com/office/drawing/2010/main" xmlns="" w="9525">
+                <a14:hiddenLine xmlns="" xmlns:a14="http://schemas.microsoft.com/office/drawing/2010/main" w="9525">
                   <a:solidFill>
                     <a:srgbClr val="000000"/>
                   </a:solidFill>
@@ -6521,7 +6741,7 @@
             </a:ln>
             <a:extLst>
               <a:ext uri="{91240B29-F687-4f45-9708-019B960494DF}">
-                <a14:hiddenLine xmlns:a14="http://schemas.microsoft.com/office/drawing/2010/main" xmlns="" w="9525">
+                <a14:hiddenLine xmlns="" xmlns:a14="http://schemas.microsoft.com/office/drawing/2010/main" w="9525">
                   <a:solidFill>
                     <a:srgbClr val="000000"/>
                   </a:solidFill>
@@ -6555,7 +6775,7 @@
             </a:ln>
             <a:extLst>
               <a:ext uri="{91240B29-F687-4f45-9708-019B960494DF}">
-                <a14:hiddenLine xmlns:a14="http://schemas.microsoft.com/office/drawing/2010/main" xmlns="" w="9525">
+                <a14:hiddenLine xmlns="" xmlns:a14="http://schemas.microsoft.com/office/drawing/2010/main" w="9525">
                   <a:solidFill>
                     <a:srgbClr val="000000"/>
                   </a:solidFill>
@@ -6645,7 +6865,7 @@
             </a:ln>
             <a:extLst>
               <a:ext uri="{91240B29-F687-4f45-9708-019B960494DF}">
-                <a14:hiddenLine xmlns:a14="http://schemas.microsoft.com/office/drawing/2010/main" xmlns="" w="9525">
+                <a14:hiddenLine xmlns="" xmlns:a14="http://schemas.microsoft.com/office/drawing/2010/main" w="9525">
                   <a:solidFill>
                     <a:srgbClr val="000000"/>
                   </a:solidFill>
@@ -6707,7 +6927,7 @@
             </a:ln>
             <a:extLst>
               <a:ext uri="{91240B29-F687-4f45-9708-019B960494DF}">
-                <a14:hiddenLine xmlns:a14="http://schemas.microsoft.com/office/drawing/2010/main" xmlns="" w="9525">
+                <a14:hiddenLine xmlns="" xmlns:a14="http://schemas.microsoft.com/office/drawing/2010/main" w="9525">
                   <a:solidFill>
                     <a:srgbClr val="000000"/>
                   </a:solidFill>
@@ -6769,7 +6989,7 @@
             </a:ln>
             <a:extLst>
               <a:ext uri="{91240B29-F687-4f45-9708-019B960494DF}">
-                <a14:hiddenLine xmlns:a14="http://schemas.microsoft.com/office/drawing/2010/main" xmlns="" w="9525">
+                <a14:hiddenLine xmlns="" xmlns:a14="http://schemas.microsoft.com/office/drawing/2010/main" w="9525">
                   <a:solidFill>
                     <a:srgbClr val="000000"/>
                   </a:solidFill>
@@ -6859,7 +7079,7 @@
             </a:ln>
             <a:extLst>
               <a:ext uri="{91240B29-F687-4f45-9708-019B960494DF}">
-                <a14:hiddenLine xmlns:a14="http://schemas.microsoft.com/office/drawing/2010/main" xmlns="" w="9525">
+                <a14:hiddenLine xmlns="" xmlns:a14="http://schemas.microsoft.com/office/drawing/2010/main" w="9525">
                   <a:solidFill>
                     <a:srgbClr val="000000"/>
                   </a:solidFill>
@@ -6927,7 +7147,7 @@
             </a:ln>
             <a:extLst>
               <a:ext uri="{91240B29-F687-4f45-9708-019B960494DF}">
-                <a14:hiddenLine xmlns:a14="http://schemas.microsoft.com/office/drawing/2010/main" xmlns="" w="9525">
+                <a14:hiddenLine xmlns="" xmlns:a14="http://schemas.microsoft.com/office/drawing/2010/main" w="9525">
                   <a:solidFill>
                     <a:srgbClr val="000000"/>
                   </a:solidFill>
@@ -6989,7 +7209,7 @@
             </a:ln>
             <a:extLst>
               <a:ext uri="{91240B29-F687-4f45-9708-019B960494DF}">
-                <a14:hiddenLine xmlns:a14="http://schemas.microsoft.com/office/drawing/2010/main" xmlns="" w="9525">
+                <a14:hiddenLine xmlns="" xmlns:a14="http://schemas.microsoft.com/office/drawing/2010/main" w="9525">
                   <a:solidFill>
                     <a:srgbClr val="000000"/>
                   </a:solidFill>
@@ -7079,7 +7299,7 @@
             </a:ln>
             <a:extLst>
               <a:ext uri="{91240B29-F687-4f45-9708-019B960494DF}">
-                <a14:hiddenLine xmlns:a14="http://schemas.microsoft.com/office/drawing/2010/main" xmlns="" w="9525">
+                <a14:hiddenLine xmlns="" xmlns:a14="http://schemas.microsoft.com/office/drawing/2010/main" w="9525">
                   <a:solidFill>
                     <a:srgbClr val="000000"/>
                   </a:solidFill>
@@ -7141,7 +7361,7 @@
             </a:ln>
             <a:extLst>
               <a:ext uri="{91240B29-F687-4f45-9708-019B960494DF}">
-                <a14:hiddenLine xmlns:a14="http://schemas.microsoft.com/office/drawing/2010/main" xmlns="" w="9525">
+                <a14:hiddenLine xmlns="" xmlns:a14="http://schemas.microsoft.com/office/drawing/2010/main" w="9525">
                   <a:solidFill>
                     <a:srgbClr val="000000"/>
                   </a:solidFill>
@@ -7231,7 +7451,7 @@
             </a:ln>
             <a:extLst>
               <a:ext uri="{91240B29-F687-4f45-9708-019B960494DF}">
-                <a14:hiddenLine xmlns:a14="http://schemas.microsoft.com/office/drawing/2010/main" xmlns="" w="9525">
+                <a14:hiddenLine xmlns="" xmlns:a14="http://schemas.microsoft.com/office/drawing/2010/main" w="9525">
                   <a:solidFill>
                     <a:srgbClr val="000000"/>
                   </a:solidFill>
@@ -7293,7 +7513,7 @@
             </a:ln>
             <a:extLst>
               <a:ext uri="{91240B29-F687-4f45-9708-019B960494DF}">
-                <a14:hiddenLine xmlns:a14="http://schemas.microsoft.com/office/drawing/2010/main" xmlns="" w="9525">
+                <a14:hiddenLine xmlns="" xmlns:a14="http://schemas.microsoft.com/office/drawing/2010/main" w="9525">
                   <a:solidFill>
                     <a:srgbClr val="000000"/>
                   </a:solidFill>
@@ -7383,7 +7603,7 @@
             </a:ln>
             <a:extLst>
               <a:ext uri="{91240B29-F687-4f45-9708-019B960494DF}">
-                <a14:hiddenLine xmlns:a14="http://schemas.microsoft.com/office/drawing/2010/main" xmlns="" w="9525">
+                <a14:hiddenLine xmlns="" xmlns:a14="http://schemas.microsoft.com/office/drawing/2010/main" w="9525">
                   <a:solidFill>
                     <a:srgbClr val="000000"/>
                   </a:solidFill>
@@ -7417,7 +7637,7 @@
             </a:ln>
             <a:extLst>
               <a:ext uri="{91240B29-F687-4f45-9708-019B960494DF}">
-                <a14:hiddenLine xmlns:a14="http://schemas.microsoft.com/office/drawing/2010/main" xmlns="" w="9525">
+                <a14:hiddenLine xmlns="" xmlns:a14="http://schemas.microsoft.com/office/drawing/2010/main" w="9525">
                   <a:solidFill>
                     <a:srgbClr val="000000"/>
                   </a:solidFill>
@@ -7482,7 +7702,7 @@
             </a:ln>
             <a:extLst>
               <a:ext uri="{91240B29-F687-4f45-9708-019B960494DF}">
-                <a14:hiddenLine xmlns:a14="http://schemas.microsoft.com/office/drawing/2010/main" xmlns="" w="9525">
+                <a14:hiddenLine xmlns="" xmlns:a14="http://schemas.microsoft.com/office/drawing/2010/main" w="9525">
                   <a:solidFill>
                     <a:srgbClr val="000000"/>
                   </a:solidFill>
@@ -7572,7 +7792,7 @@
             </a:ln>
             <a:extLst>
               <a:ext uri="{91240B29-F687-4f45-9708-019B960494DF}">
-                <a14:hiddenLine xmlns:a14="http://schemas.microsoft.com/office/drawing/2010/main" xmlns="" w="9525">
+                <a14:hiddenLine xmlns="" xmlns:a14="http://schemas.microsoft.com/office/drawing/2010/main" w="9525">
                   <a:solidFill>
                     <a:srgbClr val="000000"/>
                   </a:solidFill>
@@ -7634,7 +7854,7 @@
             </a:ln>
             <a:extLst>
               <a:ext uri="{91240B29-F687-4f45-9708-019B960494DF}">
-                <a14:hiddenLine xmlns:a14="http://schemas.microsoft.com/office/drawing/2010/main" xmlns="" w="9525">
+                <a14:hiddenLine xmlns="" xmlns:a14="http://schemas.microsoft.com/office/drawing/2010/main" w="9525">
                   <a:solidFill>
                     <a:srgbClr val="000000"/>
                   </a:solidFill>
@@ -7724,7 +7944,7 @@
             </a:ln>
             <a:extLst>
               <a:ext uri="{91240B29-F687-4f45-9708-019B960494DF}">
-                <a14:hiddenLine xmlns:a14="http://schemas.microsoft.com/office/drawing/2010/main" xmlns="" w="9525">
+                <a14:hiddenLine xmlns="" xmlns:a14="http://schemas.microsoft.com/office/drawing/2010/main" w="9525">
                   <a:solidFill>
                     <a:srgbClr val="000000"/>
                   </a:solidFill>
@@ -7814,7 +8034,7 @@
             </a:ln>
             <a:extLst>
               <a:ext uri="{91240B29-F687-4f45-9708-019B960494DF}">
-                <a14:hiddenLine xmlns:a14="http://schemas.microsoft.com/office/drawing/2010/main" xmlns="" w="9525">
+                <a14:hiddenLine xmlns="" xmlns:a14="http://schemas.microsoft.com/office/drawing/2010/main" w="9525">
                   <a:solidFill>
                     <a:srgbClr val="000000"/>
                   </a:solidFill>
@@ -7879,7 +8099,7 @@
             </a:ln>
             <a:extLst>
               <a:ext uri="{91240B29-F687-4f45-9708-019B960494DF}">
-                <a14:hiddenLine xmlns:a14="http://schemas.microsoft.com/office/drawing/2010/main" xmlns="" w="9525">
+                <a14:hiddenLine xmlns="" xmlns:a14="http://schemas.microsoft.com/office/drawing/2010/main" w="9525">
                   <a:solidFill>
                     <a:srgbClr val="000000"/>
                   </a:solidFill>
@@ -7941,7 +8161,7 @@
             </a:ln>
             <a:extLst>
               <a:ext uri="{91240B29-F687-4f45-9708-019B960494DF}">
-                <a14:hiddenLine xmlns:a14="http://schemas.microsoft.com/office/drawing/2010/main" xmlns="" w="9525">
+                <a14:hiddenLine xmlns="" xmlns:a14="http://schemas.microsoft.com/office/drawing/2010/main" w="9525">
                   <a:solidFill>
                     <a:srgbClr val="000000"/>
                   </a:solidFill>
@@ -8031,7 +8251,7 @@
             </a:ln>
             <a:extLst>
               <a:ext uri="{91240B29-F687-4f45-9708-019B960494DF}">
-                <a14:hiddenLine xmlns:a14="http://schemas.microsoft.com/office/drawing/2010/main" xmlns="" w="9525">
+                <a14:hiddenLine xmlns="" xmlns:a14="http://schemas.microsoft.com/office/drawing/2010/main" w="9525">
                   <a:solidFill>
                     <a:srgbClr val="000000"/>
                   </a:solidFill>
@@ -8121,7 +8341,7 @@
             </a:ln>
             <a:extLst>
               <a:ext uri="{91240B29-F687-4f45-9708-019B960494DF}">
-                <a14:hiddenLine xmlns:a14="http://schemas.microsoft.com/office/drawing/2010/main" xmlns="" w="9525">
+                <a14:hiddenLine xmlns="" xmlns:a14="http://schemas.microsoft.com/office/drawing/2010/main" w="9525">
                   <a:solidFill>
                     <a:srgbClr val="000000"/>
                   </a:solidFill>
@@ -8183,7 +8403,7 @@
             </a:ln>
             <a:extLst>
               <a:ext uri="{91240B29-F687-4f45-9708-019B960494DF}">
-                <a14:hiddenLine xmlns:a14="http://schemas.microsoft.com/office/drawing/2010/main" xmlns="" w="9525">
+                <a14:hiddenLine xmlns="" xmlns:a14="http://schemas.microsoft.com/office/drawing/2010/main" w="9525">
                   <a:solidFill>
                     <a:srgbClr val="000000"/>
                   </a:solidFill>
@@ -8303,7 +8523,7 @@
             </a:ln>
             <a:extLst>
               <a:ext uri="{91240B29-F687-4f45-9708-019B960494DF}">
-                <a14:hiddenLine xmlns:a14="http://schemas.microsoft.com/office/drawing/2010/main" xmlns="" w="9525">
+                <a14:hiddenLine xmlns="" xmlns:a14="http://schemas.microsoft.com/office/drawing/2010/main" w="9525">
                   <a:solidFill>
                     <a:srgbClr val="000000"/>
                   </a:solidFill>
@@ -8371,7 +8591,7 @@
             </a:ln>
             <a:extLst>
               <a:ext uri="{91240B29-F687-4f45-9708-019B960494DF}">
-                <a14:hiddenLine xmlns:a14="http://schemas.microsoft.com/office/drawing/2010/main" xmlns="" w="9525">
+                <a14:hiddenLine xmlns="" xmlns:a14="http://schemas.microsoft.com/office/drawing/2010/main" w="9525">
                   <a:solidFill>
                     <a:srgbClr val="000000"/>
                   </a:solidFill>
@@ -8461,7 +8681,7 @@
             </a:ln>
             <a:extLst>
               <a:ext uri="{91240B29-F687-4f45-9708-019B960494DF}">
-                <a14:hiddenLine xmlns:a14="http://schemas.microsoft.com/office/drawing/2010/main" xmlns="" w="9525">
+                <a14:hiddenLine xmlns="" xmlns:a14="http://schemas.microsoft.com/office/drawing/2010/main" w="9525">
                   <a:solidFill>
                     <a:srgbClr val="000000"/>
                   </a:solidFill>
@@ -13190,7 +13410,7 @@
           <a:noFill/>
           <a:extLst>
             <a:ext uri="{909E8E84-426E-40dd-AFC4-6F175D3DCCD1}">
-              <a14:hiddenFill xmlns:a14="http://schemas.microsoft.com/office/drawing/2010/main" xmlns="">
+              <a14:hiddenFill xmlns="" xmlns:a14="http://schemas.microsoft.com/office/drawing/2010/main">
                 <a:solidFill>
                   <a:srgbClr val="FFFFFF"/>
                 </a:solidFill>
@@ -13264,7 +13484,7 @@
               </a:ln>
               <a:extLst>
                 <a:ext uri="{91240B29-F687-4f45-9708-019B960494DF}">
-                  <a14:hiddenLine xmlns:a14="http://schemas.microsoft.com/office/drawing/2010/main" xmlns="" w="9525">
+                  <a14:hiddenLine xmlns="" xmlns:a14="http://schemas.microsoft.com/office/drawing/2010/main" w="9525">
                     <a:solidFill>
                       <a:srgbClr val="000000"/>
                     </a:solidFill>
@@ -13354,7 +13574,7 @@
               </a:ln>
               <a:extLst>
                 <a:ext uri="{91240B29-F687-4f45-9708-019B960494DF}">
-                  <a14:hiddenLine xmlns:a14="http://schemas.microsoft.com/office/drawing/2010/main" xmlns="" w="9525">
+                  <a14:hiddenLine xmlns="" xmlns:a14="http://schemas.microsoft.com/office/drawing/2010/main" w="9525">
                     <a:solidFill>
                       <a:srgbClr val="000000"/>
                     </a:solidFill>
@@ -13444,7 +13664,7 @@
               </a:ln>
               <a:extLst>
                 <a:ext uri="{91240B29-F687-4f45-9708-019B960494DF}">
-                  <a14:hiddenLine xmlns:a14="http://schemas.microsoft.com/office/drawing/2010/main" xmlns="" w="9525">
+                  <a14:hiddenLine xmlns="" xmlns:a14="http://schemas.microsoft.com/office/drawing/2010/main" w="9525">
                     <a:solidFill>
                       <a:srgbClr val="000000"/>
                     </a:solidFill>
@@ -13506,7 +13726,7 @@
               </a:ln>
               <a:extLst>
                 <a:ext uri="{91240B29-F687-4f45-9708-019B960494DF}">
-                  <a14:hiddenLine xmlns:a14="http://schemas.microsoft.com/office/drawing/2010/main" xmlns="" w="9525">
+                  <a14:hiddenLine xmlns="" xmlns:a14="http://schemas.microsoft.com/office/drawing/2010/main" w="9525">
                     <a:solidFill>
                       <a:srgbClr val="000000"/>
                     </a:solidFill>
@@ -13596,7 +13816,7 @@
               </a:ln>
               <a:extLst>
                 <a:ext uri="{91240B29-F687-4f45-9708-019B960494DF}">
-                  <a14:hiddenLine xmlns:a14="http://schemas.microsoft.com/office/drawing/2010/main" xmlns="" w="9525">
+                  <a14:hiddenLine xmlns="" xmlns:a14="http://schemas.microsoft.com/office/drawing/2010/main" w="9525">
                     <a:solidFill>
                       <a:srgbClr val="000000"/>
                     </a:solidFill>
@@ -13658,7 +13878,7 @@
               </a:ln>
               <a:extLst>
                 <a:ext uri="{91240B29-F687-4f45-9708-019B960494DF}">
-                  <a14:hiddenLine xmlns:a14="http://schemas.microsoft.com/office/drawing/2010/main" xmlns="" w="9525">
+                  <a14:hiddenLine xmlns="" xmlns:a14="http://schemas.microsoft.com/office/drawing/2010/main" w="9525">
                     <a:solidFill>
                       <a:srgbClr val="000000"/>
                     </a:solidFill>
@@ -13720,7 +13940,7 @@
               </a:ln>
               <a:extLst>
                 <a:ext uri="{91240B29-F687-4f45-9708-019B960494DF}">
-                  <a14:hiddenLine xmlns:a14="http://schemas.microsoft.com/office/drawing/2010/main" xmlns="" w="9525">
+                  <a14:hiddenLine xmlns="" xmlns:a14="http://schemas.microsoft.com/office/drawing/2010/main" w="9525">
                     <a:solidFill>
                       <a:srgbClr val="000000"/>
                     </a:solidFill>
@@ -13810,7 +14030,7 @@
               </a:ln>
               <a:extLst>
                 <a:ext uri="{91240B29-F687-4f45-9708-019B960494DF}">
-                  <a14:hiddenLine xmlns:a14="http://schemas.microsoft.com/office/drawing/2010/main" xmlns="" w="9525">
+                  <a14:hiddenLine xmlns="" xmlns:a14="http://schemas.microsoft.com/office/drawing/2010/main" w="9525">
                     <a:solidFill>
                       <a:srgbClr val="000000"/>
                     </a:solidFill>
@@ -13900,7 +14120,7 @@
               </a:ln>
               <a:extLst>
                 <a:ext uri="{91240B29-F687-4f45-9708-019B960494DF}">
-                  <a14:hiddenLine xmlns:a14="http://schemas.microsoft.com/office/drawing/2010/main" xmlns="" w="9525">
+                  <a14:hiddenLine xmlns="" xmlns:a14="http://schemas.microsoft.com/office/drawing/2010/main" w="9525">
                     <a:solidFill>
                       <a:srgbClr val="000000"/>
                     </a:solidFill>
@@ -13962,7 +14182,7 @@
               </a:ln>
               <a:extLst>
                 <a:ext uri="{91240B29-F687-4f45-9708-019B960494DF}">
-                  <a14:hiddenLine xmlns:a14="http://schemas.microsoft.com/office/drawing/2010/main" xmlns="" w="9525">
+                  <a14:hiddenLine xmlns="" xmlns:a14="http://schemas.microsoft.com/office/drawing/2010/main" w="9525">
                     <a:solidFill>
                       <a:srgbClr val="000000"/>
                     </a:solidFill>
@@ -14072,7 +14292,7 @@
               </a:ln>
               <a:extLst>
                 <a:ext uri="{91240B29-F687-4f45-9708-019B960494DF}">
-                  <a14:hiddenLine xmlns:a14="http://schemas.microsoft.com/office/drawing/2010/main" xmlns="" w="9525">
+                  <a14:hiddenLine xmlns="" xmlns:a14="http://schemas.microsoft.com/office/drawing/2010/main" w="9525">
                     <a:solidFill>
                       <a:srgbClr val="000000"/>
                     </a:solidFill>
@@ -14156,7 +14376,7 @@
               </a:ln>
               <a:extLst>
                 <a:ext uri="{91240B29-F687-4f45-9708-019B960494DF}">
-                  <a14:hiddenLine xmlns:a14="http://schemas.microsoft.com/office/drawing/2010/main" xmlns="" w="9525">
+                  <a14:hiddenLine xmlns="" xmlns:a14="http://schemas.microsoft.com/office/drawing/2010/main" w="9525">
                     <a:solidFill>
                       <a:srgbClr val="000000"/>
                     </a:solidFill>
@@ -14218,7 +14438,7 @@
               </a:ln>
               <a:extLst>
                 <a:ext uri="{91240B29-F687-4f45-9708-019B960494DF}">
-                  <a14:hiddenLine xmlns:a14="http://schemas.microsoft.com/office/drawing/2010/main" xmlns="" w="9525">
+                  <a14:hiddenLine xmlns="" xmlns:a14="http://schemas.microsoft.com/office/drawing/2010/main" w="9525">
                     <a:solidFill>
                       <a:srgbClr val="000000"/>
                     </a:solidFill>
@@ -14280,7 +14500,7 @@
               </a:ln>
               <a:extLst>
                 <a:ext uri="{91240B29-F687-4f45-9708-019B960494DF}">
-                  <a14:hiddenLine xmlns:a14="http://schemas.microsoft.com/office/drawing/2010/main" xmlns="" w="9525">
+                  <a14:hiddenLine xmlns="" xmlns:a14="http://schemas.microsoft.com/office/drawing/2010/main" w="9525">
                     <a:solidFill>
                       <a:srgbClr val="000000"/>
                     </a:solidFill>
@@ -14370,7 +14590,7 @@
               </a:ln>
               <a:extLst>
                 <a:ext uri="{91240B29-F687-4f45-9708-019B960494DF}">
-                  <a14:hiddenLine xmlns:a14="http://schemas.microsoft.com/office/drawing/2010/main" xmlns="" w="9525">
+                  <a14:hiddenLine xmlns="" xmlns:a14="http://schemas.microsoft.com/office/drawing/2010/main" w="9525">
                     <a:solidFill>
                       <a:srgbClr val="000000"/>
                     </a:solidFill>
@@ -14404,7 +14624,7 @@
               </a:ln>
               <a:extLst>
                 <a:ext uri="{91240B29-F687-4f45-9708-019B960494DF}">
-                  <a14:hiddenLine xmlns:a14="http://schemas.microsoft.com/office/drawing/2010/main" xmlns="" w="9525">
+                  <a14:hiddenLine xmlns="" xmlns:a14="http://schemas.microsoft.com/office/drawing/2010/main" w="9525">
                     <a:solidFill>
                       <a:srgbClr val="000000"/>
                     </a:solidFill>
@@ -14469,7 +14689,7 @@
               </a:ln>
               <a:extLst>
                 <a:ext uri="{91240B29-F687-4f45-9708-019B960494DF}">
-                  <a14:hiddenLine xmlns:a14="http://schemas.microsoft.com/office/drawing/2010/main" xmlns="" w="9525">
+                  <a14:hiddenLine xmlns="" xmlns:a14="http://schemas.microsoft.com/office/drawing/2010/main" w="9525">
                     <a:solidFill>
                       <a:srgbClr val="000000"/>
                     </a:solidFill>
@@ -14559,7 +14779,7 @@
               </a:ln>
               <a:extLst>
                 <a:ext uri="{91240B29-F687-4f45-9708-019B960494DF}">
-                  <a14:hiddenLine xmlns:a14="http://schemas.microsoft.com/office/drawing/2010/main" xmlns="" w="9525">
+                  <a14:hiddenLine xmlns="" xmlns:a14="http://schemas.microsoft.com/office/drawing/2010/main" w="9525">
                     <a:solidFill>
                       <a:srgbClr val="000000"/>
                     </a:solidFill>
@@ -14621,7 +14841,7 @@
               </a:ln>
               <a:extLst>
                 <a:ext uri="{91240B29-F687-4f45-9708-019B960494DF}">
-                  <a14:hiddenLine xmlns:a14="http://schemas.microsoft.com/office/drawing/2010/main" xmlns="" w="9525">
+                  <a14:hiddenLine xmlns="" xmlns:a14="http://schemas.microsoft.com/office/drawing/2010/main" w="9525">
                     <a:solidFill>
                       <a:srgbClr val="000000"/>
                     </a:solidFill>
@@ -14711,7 +14931,7 @@
               </a:ln>
               <a:extLst>
                 <a:ext uri="{91240B29-F687-4f45-9708-019B960494DF}">
-                  <a14:hiddenLine xmlns:a14="http://schemas.microsoft.com/office/drawing/2010/main" xmlns="" w="9525">
+                  <a14:hiddenLine xmlns="" xmlns:a14="http://schemas.microsoft.com/office/drawing/2010/main" w="9525">
                     <a:solidFill>
                       <a:srgbClr val="000000"/>
                     </a:solidFill>
@@ -14776,7 +14996,7 @@
               </a:ln>
               <a:extLst>
                 <a:ext uri="{91240B29-F687-4f45-9708-019B960494DF}">
-                  <a14:hiddenLine xmlns:a14="http://schemas.microsoft.com/office/drawing/2010/main" xmlns="" w="9525">
+                  <a14:hiddenLine xmlns="" xmlns:a14="http://schemas.microsoft.com/office/drawing/2010/main" w="9525">
                     <a:solidFill>
                       <a:srgbClr val="000000"/>
                     </a:solidFill>
@@ -14838,7 +15058,7 @@
               </a:ln>
               <a:extLst>
                 <a:ext uri="{91240B29-F687-4f45-9708-019B960494DF}">
-                  <a14:hiddenLine xmlns:a14="http://schemas.microsoft.com/office/drawing/2010/main" xmlns="" w="9525">
+                  <a14:hiddenLine xmlns="" xmlns:a14="http://schemas.microsoft.com/office/drawing/2010/main" w="9525">
                     <a:solidFill>
                       <a:srgbClr val="000000"/>
                     </a:solidFill>
@@ -14928,7 +15148,7 @@
               </a:ln>
               <a:extLst>
                 <a:ext uri="{91240B29-F687-4f45-9708-019B960494DF}">
-                  <a14:hiddenLine xmlns:a14="http://schemas.microsoft.com/office/drawing/2010/main" xmlns="" w="9525">
+                  <a14:hiddenLine xmlns="" xmlns:a14="http://schemas.microsoft.com/office/drawing/2010/main" w="9525">
                     <a:solidFill>
                       <a:srgbClr val="000000"/>
                     </a:solidFill>
@@ -15018,7 +15238,7 @@
               </a:ln>
               <a:extLst>
                 <a:ext uri="{91240B29-F687-4f45-9708-019B960494DF}">
-                  <a14:hiddenLine xmlns:a14="http://schemas.microsoft.com/office/drawing/2010/main" xmlns="" w="9525">
+                  <a14:hiddenLine xmlns="" xmlns:a14="http://schemas.microsoft.com/office/drawing/2010/main" w="9525">
                     <a:solidFill>
                       <a:srgbClr val="000000"/>
                     </a:solidFill>
@@ -15083,7 +15303,7 @@
               </a:ln>
               <a:extLst>
                 <a:ext uri="{91240B29-F687-4f45-9708-019B960494DF}">
-                  <a14:hiddenLine xmlns:a14="http://schemas.microsoft.com/office/drawing/2010/main" xmlns="" w="9525">
+                  <a14:hiddenLine xmlns="" xmlns:a14="http://schemas.microsoft.com/office/drawing/2010/main" w="9525">
                     <a:solidFill>
                       <a:srgbClr val="000000"/>
                     </a:solidFill>
@@ -15203,7 +15423,7 @@
               </a:ln>
               <a:extLst>
                 <a:ext uri="{91240B29-F687-4f45-9708-019B960494DF}">
-                  <a14:hiddenLine xmlns:a14="http://schemas.microsoft.com/office/drawing/2010/main" xmlns="" w="9525">
+                  <a14:hiddenLine xmlns="" xmlns:a14="http://schemas.microsoft.com/office/drawing/2010/main" w="9525">
                     <a:solidFill>
                       <a:srgbClr val="000000"/>
                     </a:solidFill>
@@ -15284,7 +15504,7 @@
               </a:ln>
               <a:extLst>
                 <a:ext uri="{91240B29-F687-4f45-9708-019B960494DF}">
-                  <a14:hiddenLine xmlns:a14="http://schemas.microsoft.com/office/drawing/2010/main" xmlns="" w="9525">
+                  <a14:hiddenLine xmlns="" xmlns:a14="http://schemas.microsoft.com/office/drawing/2010/main" w="9525">
                     <a:solidFill>
                       <a:srgbClr val="000000"/>
                     </a:solidFill>
@@ -15399,7 +15619,7 @@
               </a:ln>
               <a:extLst>
                 <a:ext uri="{91240B29-F687-4f45-9708-019B960494DF}">
-                  <a14:hiddenLine xmlns:a14="http://schemas.microsoft.com/office/drawing/2010/main" xmlns="" w="9525">
+                  <a14:hiddenLine xmlns="" xmlns:a14="http://schemas.microsoft.com/office/drawing/2010/main" w="9525">
                     <a:solidFill>
                       <a:srgbClr val="000000"/>
                     </a:solidFill>
@@ -15489,7 +15709,7 @@
               </a:ln>
               <a:extLst>
                 <a:ext uri="{91240B29-F687-4f45-9708-019B960494DF}">
-                  <a14:hiddenLine xmlns:a14="http://schemas.microsoft.com/office/drawing/2010/main" xmlns="" w="9525">
+                  <a14:hiddenLine xmlns="" xmlns:a14="http://schemas.microsoft.com/office/drawing/2010/main" w="9525">
                     <a:solidFill>
                       <a:srgbClr val="000000"/>
                     </a:solidFill>
@@ -15554,7 +15774,7 @@
               </a:ln>
               <a:extLst>
                 <a:ext uri="{91240B29-F687-4f45-9708-019B960494DF}">
-                  <a14:hiddenLine xmlns:a14="http://schemas.microsoft.com/office/drawing/2010/main" xmlns="" w="9525">
+                  <a14:hiddenLine xmlns="" xmlns:a14="http://schemas.microsoft.com/office/drawing/2010/main" w="9525">
                     <a:solidFill>
                       <a:srgbClr val="000000"/>
                     </a:solidFill>
@@ -15644,7 +15864,7 @@
               </a:ln>
               <a:extLst>
                 <a:ext uri="{91240B29-F687-4f45-9708-019B960494DF}">
-                  <a14:hiddenLine xmlns:a14="http://schemas.microsoft.com/office/drawing/2010/main" xmlns="" w="9525">
+                  <a14:hiddenLine xmlns="" xmlns:a14="http://schemas.microsoft.com/office/drawing/2010/main" w="9525">
                     <a:solidFill>
                       <a:srgbClr val="000000"/>
                     </a:solidFill>
@@ -15712,7 +15932,7 @@
               </a:ln>
               <a:extLst>
                 <a:ext uri="{91240B29-F687-4f45-9708-019B960494DF}">
-                  <a14:hiddenLine xmlns:a14="http://schemas.microsoft.com/office/drawing/2010/main" xmlns="" w="9525">
+                  <a14:hiddenLine xmlns="" xmlns:a14="http://schemas.microsoft.com/office/drawing/2010/main" w="9525">
                     <a:solidFill>
                       <a:srgbClr val="000000"/>
                     </a:solidFill>
@@ -15802,7 +16022,7 @@
               </a:ln>
               <a:extLst>
                 <a:ext uri="{91240B29-F687-4f45-9708-019B960494DF}">
-                  <a14:hiddenLine xmlns:a14="http://schemas.microsoft.com/office/drawing/2010/main" xmlns="" w="9525">
+                  <a14:hiddenLine xmlns="" xmlns:a14="http://schemas.microsoft.com/office/drawing/2010/main" w="9525">
                     <a:solidFill>
                       <a:srgbClr val="000000"/>
                     </a:solidFill>
@@ -15870,7 +16090,7 @@
               </a:ln>
               <a:extLst>
                 <a:ext uri="{91240B29-F687-4f45-9708-019B960494DF}">
-                  <a14:hiddenLine xmlns:a14="http://schemas.microsoft.com/office/drawing/2010/main" xmlns="" w="9525">
+                  <a14:hiddenLine xmlns="" xmlns:a14="http://schemas.microsoft.com/office/drawing/2010/main" w="9525">
                     <a:solidFill>
                       <a:srgbClr val="000000"/>
                     </a:solidFill>
@@ -15960,7 +16180,7 @@
               </a:ln>
               <a:extLst>
                 <a:ext uri="{91240B29-F687-4f45-9708-019B960494DF}">
-                  <a14:hiddenLine xmlns:a14="http://schemas.microsoft.com/office/drawing/2010/main" xmlns="" w="9525">
+                  <a14:hiddenLine xmlns="" xmlns:a14="http://schemas.microsoft.com/office/drawing/2010/main" w="9525">
                     <a:solidFill>
                       <a:srgbClr val="000000"/>
                     </a:solidFill>
@@ -15994,7 +16214,7 @@
               </a:ln>
               <a:extLst>
                 <a:ext uri="{91240B29-F687-4f45-9708-019B960494DF}">
-                  <a14:hiddenLine xmlns:a14="http://schemas.microsoft.com/office/drawing/2010/main" xmlns="" w="9525">
+                  <a14:hiddenLine xmlns="" xmlns:a14="http://schemas.microsoft.com/office/drawing/2010/main" w="9525">
                     <a:solidFill>
                       <a:srgbClr val="000000"/>
                     </a:solidFill>
@@ -26536,44 +26756,23 @@
           <a:p>
             <a:r>
               <a:rPr lang="de-CH" dirty="0" smtClean="0"/>
-              <a:t>Verhalten wird mit g</a:t>
-            </a:r>
+              <a:t>Verhalten wird mit geordneten (labeled) Daten trainiert</a:t>
+            </a:r>
+          </a:p>
+          <a:p>
+            <a:endParaRPr lang="de-CH" dirty="0" smtClean="0"/>
+          </a:p>
+          <a:p>
             <a:r>
               <a:rPr lang="de-CH" dirty="0" smtClean="0"/>
-              <a:t>eordneten </a:t>
-            </a:r>
-            <a:r>
-              <a:rPr lang="de-CH" dirty="0" smtClean="0"/>
-              <a:t>(labeled) Daten </a:t>
-            </a:r>
-            <a:r>
-              <a:rPr lang="de-CH" dirty="0" smtClean="0"/>
-              <a:t>trainiert</a:t>
-            </a:r>
-            <a:endParaRPr lang="de-CH" dirty="0" smtClean="0"/>
-          </a:p>
-          <a:p>
-            <a:endParaRPr lang="de-CH" dirty="0" smtClean="0"/>
-          </a:p>
-          <a:p>
-            <a:r>
-              <a:rPr lang="de-CH" dirty="0" smtClean="0"/>
-              <a:t>Voraussagen </a:t>
-            </a:r>
-            <a:r>
-              <a:rPr lang="de-CH" dirty="0" smtClean="0"/>
-              <a:t>über neue </a:t>
+              <a:t>Voraussagen über neue </a:t>
             </a:r>
             <a:br>
               <a:rPr lang="de-CH" dirty="0" smtClean="0"/>
             </a:br>
             <a:r>
               <a:rPr lang="de-CH" dirty="0" smtClean="0"/>
-              <a:t>(unlabeled) Daten </a:t>
-            </a:r>
-            <a:r>
-              <a:rPr lang="de-CH" dirty="0" smtClean="0"/>
-              <a:t>können gemacht werden</a:t>
+              <a:t>(unlabeled) Daten können gemacht werden</a:t>
             </a:r>
             <a:endParaRPr lang="de-CH" dirty="0"/>
           </a:p>
@@ -27458,6 +27657,48 @@
           </a:prstGeom>
         </p:spPr>
       </p:pic>
+      <p:sp>
+        <p:nvSpPr>
+          <p:cNvPr id="2" name="TextBox 1"/>
+          <p:cNvSpPr txBox="1"/>
+          <p:nvPr/>
+        </p:nvSpPr>
+        <p:spPr>
+          <a:xfrm>
+            <a:off x="4638611" y="5843682"/>
+            <a:ext cx="5144357" cy="307777"/>
+          </a:xfrm>
+          <a:prstGeom prst="rect">
+            <a:avLst/>
+          </a:prstGeom>
+          <a:noFill/>
+        </p:spPr>
+        <p:txBody>
+          <a:bodyPr wrap="none" rtlCol="0">
+            <a:spAutoFit/>
+          </a:bodyPr>
+          <a:lstStyle/>
+          <a:p>
+            <a:r>
+              <a:rPr lang="de-CH" sz="1400" dirty="0" err="1" smtClean="0"/>
+              <a:t>Descision</a:t>
+            </a:r>
+            <a:r>
+              <a:rPr lang="de-CH" sz="1400" dirty="0" smtClean="0"/>
+              <a:t> </a:t>
+            </a:r>
+            <a:r>
+              <a:rPr lang="de-CH" sz="1400" dirty="0" err="1" smtClean="0"/>
+              <a:t>Tree</a:t>
+            </a:r>
+            <a:r>
+              <a:rPr lang="de-CH" sz="1400" dirty="0" smtClean="0"/>
+              <a:t> aus Beispiel mit Häuser und deren Standort</a:t>
+            </a:r>
+            <a:endParaRPr lang="de-CH" sz="1400" dirty="0"/>
+          </a:p>
+        </p:txBody>
+      </p:sp>
     </p:spTree>
     <p:extLst>
       <p:ext uri="{BB962C8B-B14F-4D97-AF65-F5344CB8AC3E}">
@@ -27591,14 +27832,52 @@
         </p:blipFill>
         <p:spPr>
           <a:xfrm>
-            <a:off x="4381813" y="1162680"/>
-            <a:ext cx="6566764" cy="4566080"/>
+            <a:off x="4932447" y="1429543"/>
+            <a:ext cx="5852627" cy="4069518"/>
           </a:xfrm>
           <a:prstGeom prst="rect">
             <a:avLst/>
           </a:prstGeom>
         </p:spPr>
       </p:pic>
+      <p:sp>
+        <p:nvSpPr>
+          <p:cNvPr id="7" name="TextBox 6"/>
+          <p:cNvSpPr txBox="1"/>
+          <p:nvPr/>
+        </p:nvSpPr>
+        <p:spPr>
+          <a:xfrm>
+            <a:off x="4905061" y="5546957"/>
+            <a:ext cx="5974713" cy="307777"/>
+          </a:xfrm>
+          <a:prstGeom prst="rect">
+            <a:avLst/>
+          </a:prstGeom>
+          <a:noFill/>
+        </p:spPr>
+        <p:txBody>
+          <a:bodyPr wrap="none" rtlCol="0">
+            <a:spAutoFit/>
+          </a:bodyPr>
+          <a:lstStyle/>
+          <a:p>
+            <a:r>
+              <a:rPr lang="de-CH" sz="1400" dirty="0" smtClean="0"/>
+              <a:t>Regression von Price pro Quadratfuss in </a:t>
+            </a:r>
+            <a:r>
+              <a:rPr lang="de-CH" sz="1400" dirty="0"/>
+              <a:t>A</a:t>
+            </a:r>
+            <a:r>
+              <a:rPr lang="de-CH" sz="1400" dirty="0" smtClean="0"/>
+              <a:t>bhängigkeit von Standort</a:t>
+            </a:r>
+            <a:endParaRPr lang="de-CH" sz="1400" dirty="0"/>
+          </a:p>
+        </p:txBody>
+      </p:sp>
     </p:spTree>
     <p:extLst>
       <p:ext uri="{BB962C8B-B14F-4D97-AF65-F5344CB8AC3E}">
@@ -27677,8 +27956,8 @@
         </p:blipFill>
         <p:spPr>
           <a:xfrm>
-            <a:off x="4518292" y="1130305"/>
-            <a:ext cx="6430286" cy="4721138"/>
+            <a:off x="4815145" y="1338294"/>
+            <a:ext cx="5982042" cy="4392036"/>
           </a:xfrm>
           <a:prstGeom prst="rect">
             <a:avLst/>
@@ -27709,6 +27988,44 @@
               <a:t>algorithms</a:t>
             </a:r>
             <a:endParaRPr lang="de-CH" dirty="0"/>
+          </a:p>
+        </p:txBody>
+      </p:sp>
+      <p:sp>
+        <p:nvSpPr>
+          <p:cNvPr id="5" name="TextBox 4"/>
+          <p:cNvSpPr txBox="1"/>
+          <p:nvPr/>
+        </p:nvSpPr>
+        <p:spPr>
+          <a:xfrm>
+            <a:off x="4905055" y="5791200"/>
+            <a:ext cx="5630067" cy="307777"/>
+          </a:xfrm>
+          <a:prstGeom prst="rect">
+            <a:avLst/>
+          </a:prstGeom>
+          <a:noFill/>
+        </p:spPr>
+        <p:txBody>
+          <a:bodyPr wrap="none" rtlCol="0">
+            <a:spAutoFit/>
+          </a:bodyPr>
+          <a:lstStyle/>
+          <a:p>
+            <a:r>
+              <a:rPr lang="de-CH" sz="1400" dirty="0" smtClean="0"/>
+              <a:t>Visualisierung von unterschiedlichen </a:t>
+            </a:r>
+            <a:r>
+              <a:rPr lang="de-CH" sz="1400" dirty="0" err="1" smtClean="0"/>
+              <a:t>Pflanzenspezien</a:t>
+            </a:r>
+            <a:r>
+              <a:rPr lang="de-CH" sz="1400" dirty="0" smtClean="0"/>
+              <a:t> in Clusters</a:t>
+            </a:r>
+            <a:endParaRPr lang="de-CH" sz="1400" dirty="0"/>
           </a:p>
         </p:txBody>
       </p:sp>
@@ -27977,6 +28294,48 @@
           </a:prstGeom>
         </p:spPr>
       </p:pic>
+      <p:sp>
+        <p:nvSpPr>
+          <p:cNvPr id="7" name="TextBox 6"/>
+          <p:cNvSpPr txBox="1"/>
+          <p:nvPr/>
+        </p:nvSpPr>
+        <p:spPr>
+          <a:xfrm>
+            <a:off x="5226007" y="5846252"/>
+            <a:ext cx="4227439" cy="307777"/>
+          </a:xfrm>
+          <a:prstGeom prst="rect">
+            <a:avLst/>
+          </a:prstGeom>
+          <a:noFill/>
+        </p:spPr>
+        <p:txBody>
+          <a:bodyPr wrap="none" rtlCol="0">
+            <a:spAutoFit/>
+          </a:bodyPr>
+          <a:lstStyle/>
+          <a:p>
+            <a:r>
+              <a:rPr lang="de-CH" sz="1400" dirty="0" err="1" smtClean="0"/>
+              <a:t>Anomaly</a:t>
+            </a:r>
+            <a:r>
+              <a:rPr lang="de-CH" sz="1400" dirty="0" smtClean="0"/>
+              <a:t> </a:t>
+            </a:r>
+            <a:r>
+              <a:rPr lang="de-CH" sz="1400" dirty="0" err="1" smtClean="0"/>
+              <a:t>detection</a:t>
+            </a:r>
+            <a:r>
+              <a:rPr lang="de-CH" sz="1400" dirty="0" smtClean="0"/>
+              <a:t> mit Algorithmus von Twitter</a:t>
+            </a:r>
+            <a:endParaRPr lang="de-CH" sz="1400" dirty="0"/>
+          </a:p>
+        </p:txBody>
+      </p:sp>
     </p:spTree>
     <p:extLst>
       <p:ext uri="{BB962C8B-B14F-4D97-AF65-F5344CB8AC3E}">
@@ -28091,6 +28450,84 @@
           </a:p>
         </p:txBody>
       </p:sp>
+      <p:pic>
+        <p:nvPicPr>
+          <p:cNvPr id="3" name="Picture 2"/>
+          <p:cNvPicPr>
+            <a:picLocks noChangeAspect="1"/>
+          </p:cNvPicPr>
+          <p:nvPr/>
+        </p:nvPicPr>
+        <p:blipFill>
+          <a:blip r:embed="rId2"/>
+          <a:stretch>
+            <a:fillRect/>
+          </a:stretch>
+        </p:blipFill>
+        <p:spPr>
+          <a:xfrm>
+            <a:off x="5232063" y="1543467"/>
+            <a:ext cx="5383378" cy="3993788"/>
+          </a:xfrm>
+          <a:prstGeom prst="rect">
+            <a:avLst/>
+          </a:prstGeom>
+        </p:spPr>
+      </p:pic>
+      <p:sp>
+        <p:nvSpPr>
+          <p:cNvPr id="7" name="TextBox 6"/>
+          <p:cNvSpPr txBox="1"/>
+          <p:nvPr/>
+        </p:nvSpPr>
+        <p:spPr>
+          <a:xfrm>
+            <a:off x="5156200" y="5680181"/>
+            <a:ext cx="4265911" cy="307777"/>
+          </a:xfrm>
+          <a:prstGeom prst="rect">
+            <a:avLst/>
+          </a:prstGeom>
+          <a:noFill/>
+        </p:spPr>
+        <p:txBody>
+          <a:bodyPr wrap="none" rtlCol="0">
+            <a:spAutoFit/>
+          </a:bodyPr>
+          <a:lstStyle/>
+          <a:p>
+            <a:r>
+              <a:rPr lang="de-CH" sz="1400" dirty="0" smtClean="0"/>
+              <a:t>State-Action </a:t>
+            </a:r>
+            <a:r>
+              <a:rPr lang="de-CH" sz="1400" dirty="0" err="1" smtClean="0"/>
+              <a:t>function</a:t>
+            </a:r>
+            <a:r>
+              <a:rPr lang="de-CH" sz="1400" dirty="0" smtClean="0"/>
+              <a:t> Q aus Tic-</a:t>
+            </a:r>
+            <a:r>
+              <a:rPr lang="de-CH" sz="1400" dirty="0" err="1" smtClean="0"/>
+              <a:t>Tac</a:t>
+            </a:r>
+            <a:r>
+              <a:rPr lang="de-CH" sz="1400" dirty="0" smtClean="0"/>
+              <a:t>-</a:t>
+            </a:r>
+            <a:r>
+              <a:rPr lang="de-CH" sz="1400" dirty="0" err="1" smtClean="0"/>
+              <a:t>Toe</a:t>
+            </a:r>
+            <a:r>
+              <a:rPr lang="de-CH" sz="1400" dirty="0" smtClean="0"/>
+              <a:t>-Beispiel</a:t>
+            </a:r>
+            <a:endParaRPr lang="de-CH" sz="1400" dirty="0"/>
+          </a:p>
+        </p:txBody>
+      </p:sp>
     </p:spTree>
     <p:extLst>
       <p:ext uri="{BB962C8B-B14F-4D97-AF65-F5344CB8AC3E}">
@@ -28376,6 +28813,282 @@
   <p:clrMapOvr>
     <a:masterClrMapping/>
   </p:clrMapOvr>
+  <p:timing>
+    <p:tnLst>
+      <p:par>
+        <p:cTn id="1" dur="indefinite" restart="never" nodeType="tmRoot"/>
+      </p:par>
+    </p:tnLst>
+  </p:timing>
+</p:sld>
+</file>
+
+<file path=ppt/slides/slide44.xml><?xml version="1.0" encoding="utf-8"?>
+<p:sld xmlns:a="http://schemas.openxmlformats.org/drawingml/2006/main" xmlns:r="http://schemas.openxmlformats.org/officeDocument/2006/relationships" xmlns:p="http://schemas.openxmlformats.org/presentationml/2006/main">
+  <p:cSld>
+    <p:spTree>
+      <p:nvGrpSpPr>
+        <p:cNvPr id="1" name=""/>
+        <p:cNvGrpSpPr/>
+        <p:nvPr/>
+      </p:nvGrpSpPr>
+      <p:grpSpPr>
+        <a:xfrm>
+          <a:off x="0" y="0"/>
+          <a:ext cx="0" cy="0"/>
+          <a:chOff x="0" y="0"/>
+          <a:chExt cx="0" cy="0"/>
+        </a:xfrm>
+      </p:grpSpPr>
+      <p:sp>
+        <p:nvSpPr>
+          <p:cNvPr id="3" name="Title 2"/>
+          <p:cNvSpPr>
+            <a:spLocks noGrp="1"/>
+          </p:cNvSpPr>
+          <p:nvPr>
+            <p:ph type="title"/>
+          </p:nvPr>
+        </p:nvSpPr>
+        <p:spPr/>
+        <p:txBody>
+          <a:bodyPr/>
+          <a:lstStyle/>
+          <a:p>
+            <a:endParaRPr lang="de-CH"/>
+          </a:p>
+        </p:txBody>
+      </p:sp>
+      <p:sp>
+        <p:nvSpPr>
+          <p:cNvPr id="5" name="Text Placeholder 4"/>
+          <p:cNvSpPr>
+            <a:spLocks noGrp="1"/>
+          </p:cNvSpPr>
+          <p:nvPr>
+            <p:ph type="body" idx="1"/>
+          </p:nvPr>
+        </p:nvSpPr>
+        <p:spPr/>
+        <p:txBody>
+          <a:bodyPr/>
+          <a:lstStyle/>
+          <a:p>
+            <a:endParaRPr lang="de-CH"/>
+          </a:p>
+        </p:txBody>
+      </p:sp>
+      <p:pic>
+        <p:nvPicPr>
+          <p:cNvPr id="6" name="Picture 5"/>
+          <p:cNvPicPr>
+            <a:picLocks noChangeAspect="1"/>
+          </p:cNvPicPr>
+          <p:nvPr/>
+        </p:nvPicPr>
+        <p:blipFill>
+          <a:blip r:embed="rId3">
+            <a:extLst>
+              <a:ext uri="{28A0092B-C50C-407E-A947-70E740481C1C}">
+                <a14:useLocalDpi xmlns:a14="http://schemas.microsoft.com/office/drawing/2010/main" val="0"/>
+              </a:ext>
+            </a:extLst>
+          </a:blip>
+          <a:stretch>
+            <a:fillRect/>
+          </a:stretch>
+        </p:blipFill>
+        <p:spPr>
+          <a:xfrm>
+            <a:off x="2785402" y="1975338"/>
+            <a:ext cx="6621197" cy="2907325"/>
+          </a:xfrm>
+          <a:prstGeom prst="rect">
+            <a:avLst/>
+          </a:prstGeom>
+        </p:spPr>
+      </p:pic>
+    </p:spTree>
+    <p:extLst>
+      <p:ext uri="{BB962C8B-B14F-4D97-AF65-F5344CB8AC3E}">
+        <p14:creationId xmlns:p14="http://schemas.microsoft.com/office/powerpoint/2010/main" val="2093611516"/>
+      </p:ext>
+    </p:extLst>
+  </p:cSld>
+  <p:clrMapOvr>
+    <a:masterClrMapping/>
+  </p:clrMapOvr>
+  <p:timing>
+    <p:tnLst>
+      <p:par>
+        <p:cTn id="1" dur="indefinite" restart="never" nodeType="tmRoot"/>
+      </p:par>
+    </p:tnLst>
+  </p:timing>
+</p:sld>
+</file>
+
+<file path=ppt/slides/slide45.xml><?xml version="1.0" encoding="utf-8"?>
+<p:sld xmlns:a="http://schemas.openxmlformats.org/drawingml/2006/main" xmlns:r="http://schemas.openxmlformats.org/officeDocument/2006/relationships" xmlns:p="http://schemas.openxmlformats.org/presentationml/2006/main">
+  <p:cSld>
+    <p:spTree>
+      <p:nvGrpSpPr>
+        <p:cNvPr id="1" name=""/>
+        <p:cNvGrpSpPr/>
+        <p:nvPr/>
+      </p:nvGrpSpPr>
+      <p:grpSpPr>
+        <a:xfrm>
+          <a:off x="0" y="0"/>
+          <a:ext cx="0" cy="0"/>
+          <a:chOff x="0" y="0"/>
+          <a:chExt cx="0" cy="0"/>
+        </a:xfrm>
+      </p:grpSpPr>
+      <p:pic>
+        <p:nvPicPr>
+          <p:cNvPr id="1026" name="Picture 2" descr="Bildergebnis für matrix pill"/>
+          <p:cNvPicPr>
+            <a:picLocks noChangeAspect="1" noChangeArrowheads="1"/>
+          </p:cNvPicPr>
+          <p:nvPr/>
+        </p:nvPicPr>
+        <p:blipFill>
+          <a:blip r:embed="rId3">
+            <a:extLst>
+              <a:ext uri="{28A0092B-C50C-407E-A947-70E740481C1C}">
+                <a14:useLocalDpi xmlns:a14="http://schemas.microsoft.com/office/drawing/2010/main" val="0"/>
+              </a:ext>
+            </a:extLst>
+          </a:blip>
+          <a:srcRect/>
+          <a:stretch>
+            <a:fillRect/>
+          </a:stretch>
+        </p:blipFill>
+        <p:spPr bwMode="auto">
+          <a:xfrm>
+            <a:off x="1" y="0"/>
+            <a:ext cx="12192000" cy="6858000"/>
+          </a:xfrm>
+          <a:prstGeom prst="rect">
+            <a:avLst/>
+          </a:prstGeom>
+          <a:noFill/>
+          <a:extLst>
+            <a:ext uri="{909E8E84-426E-40DD-AFC4-6F175D3DCCD1}">
+              <a14:hiddenFill xmlns:a14="http://schemas.microsoft.com/office/drawing/2010/main">
+                <a:solidFill>
+                  <a:srgbClr val="FFFFFF"/>
+                </a:solidFill>
+              </a14:hiddenFill>
+            </a:ext>
+          </a:extLst>
+        </p:spPr>
+      </p:pic>
+      <p:sp>
+        <p:nvSpPr>
+          <p:cNvPr id="3" name="Title 2"/>
+          <p:cNvSpPr>
+            <a:spLocks noGrp="1"/>
+          </p:cNvSpPr>
+          <p:nvPr>
+            <p:ph type="title"/>
+          </p:nvPr>
+        </p:nvSpPr>
+        <p:spPr>
+          <a:xfrm>
+            <a:off x="1141411" y="1776509"/>
+            <a:ext cx="9906000" cy="2852737"/>
+          </a:xfrm>
+        </p:spPr>
+        <p:txBody>
+          <a:bodyPr/>
+          <a:lstStyle/>
+          <a:p>
+            <a:pPr algn="ctr"/>
+            <a:r>
+              <a:rPr lang="en-US" i="1" dirty="0"/>
+              <a:t>“</a:t>
+            </a:r>
+            <a:r>
+              <a:rPr lang="en-US" i="1" dirty="0" smtClean="0"/>
+              <a:t>I </a:t>
+            </a:r>
+            <a:r>
+              <a:rPr lang="en-US" i="1" dirty="0"/>
+              <a:t>can only show you the door. You're the one that has to walk through it</a:t>
+            </a:r>
+            <a:r>
+              <a:rPr lang="en-US" i="1" dirty="0" smtClean="0"/>
+              <a:t>.“ </a:t>
+            </a:r>
+            <a:br>
+              <a:rPr lang="en-US" i="1" dirty="0" smtClean="0"/>
+            </a:br>
+            <a:r>
+              <a:rPr lang="en-US" i="1" dirty="0" smtClean="0"/>
+              <a:t/>
+            </a:r>
+            <a:br>
+              <a:rPr lang="en-US" i="1" dirty="0" smtClean="0"/>
+            </a:br>
+            <a:r>
+              <a:rPr lang="en-US" sz="1800" i="1" dirty="0" smtClean="0"/>
+              <a:t>(The Matrix, Wachowski Brothers)</a:t>
+            </a:r>
+            <a:r>
+              <a:rPr lang="en-US" sz="1800" dirty="0"/>
+              <a:t/>
+            </a:r>
+            <a:br>
+              <a:rPr lang="en-US" sz="1800" dirty="0"/>
+            </a:br>
+            <a:endParaRPr lang="de-CH" dirty="0"/>
+          </a:p>
+        </p:txBody>
+      </p:sp>
+      <p:sp>
+        <p:nvSpPr>
+          <p:cNvPr id="5" name="Text Placeholder 4"/>
+          <p:cNvSpPr>
+            <a:spLocks noGrp="1"/>
+          </p:cNvSpPr>
+          <p:nvPr>
+            <p:ph type="body" idx="1"/>
+          </p:nvPr>
+        </p:nvSpPr>
+        <p:spPr/>
+        <p:txBody>
+          <a:bodyPr/>
+          <a:lstStyle/>
+          <a:p>
+            <a:endParaRPr lang="de-CH"/>
+          </a:p>
+        </p:txBody>
+      </p:sp>
+    </p:spTree>
+    <p:extLst>
+      <p:ext uri="{BB962C8B-B14F-4D97-AF65-F5344CB8AC3E}">
+        <p14:creationId xmlns:p14="http://schemas.microsoft.com/office/powerpoint/2010/main" val="2741503769"/>
+      </p:ext>
+    </p:extLst>
+  </p:cSld>
+  <p:clrMapOvr>
+    <a:masterClrMapping/>
+  </p:clrMapOvr>
+  <mc:AlternateContent xmlns:mc="http://schemas.openxmlformats.org/markup-compatibility/2006">
+    <mc:Choice xmlns:p14="http://schemas.microsoft.com/office/powerpoint/2010/main" Requires="p14">
+      <p:transition spd="slow" p14:dur="1200">
+        <p:dissolve/>
+      </p:transition>
+    </mc:Choice>
+    <mc:Fallback>
+      <p:transition spd="slow">
+        <p:dissolve/>
+      </p:transition>
+    </mc:Fallback>
+  </mc:AlternateContent>
   <p:timing>
     <p:tnLst>
       <p:par>

</xml_diff>